<commit_message>
added R-generated figures and organized text about each
</commit_message>
<xml_diff>
--- a/activities.pptx
+++ b/activities.pptx
@@ -5,13 +5,12 @@
     <p:sldMasterId id="2147483648" r:id="rId1"/>
   </p:sldMasterIdLst>
   <p:sldIdLst>
-    <p:sldId id="264" r:id="rId2"/>
-    <p:sldId id="258" r:id="rId3"/>
-    <p:sldId id="259" r:id="rId4"/>
-    <p:sldId id="261" r:id="rId5"/>
-    <p:sldId id="260" r:id="rId6"/>
-    <p:sldId id="262" r:id="rId7"/>
-    <p:sldId id="263" r:id="rId8"/>
+    <p:sldId id="258" r:id="rId2"/>
+    <p:sldId id="265" r:id="rId3"/>
+    <p:sldId id="266" r:id="rId4"/>
+    <p:sldId id="260" r:id="rId5"/>
+    <p:sldId id="267" r:id="rId6"/>
+    <p:sldId id="268" r:id="rId7"/>
   </p:sldIdLst>
   <p:sldSz cx="12192000" cy="6858000"/>
   <p:notesSz cx="6858000" cy="9144000"/>
@@ -110,6 +109,11 @@
       </a:defRPr>
     </a:lvl9pPr>
   </p:defaultTextStyle>
+  <p:extLst>
+    <p:ext uri="{EFAFB233-063F-42B5-8137-9DF3F51BA10A}">
+      <p15:sldGuideLst xmlns:p15="http://schemas.microsoft.com/office/powerpoint/2012/main"/>
+    </p:ext>
+  </p:extLst>
 </p:presentation>
 </file>
 
@@ -244,7 +248,7 @@
           <a:p>
             <a:fld id="{868BB8F8-F1C7-4CE6-852F-F59F39DC3752}" type="datetimeFigureOut">
               <a:rPr lang="en-US" smtClean="0"/>
-              <a:t>1/24/2019</a:t>
+              <a:t>1/28/2019</a:t>
             </a:fld>
             <a:endParaRPr lang="en-US"/>
           </a:p>
@@ -414,7 +418,7 @@
           <a:p>
             <a:fld id="{868BB8F8-F1C7-4CE6-852F-F59F39DC3752}" type="datetimeFigureOut">
               <a:rPr lang="en-US" smtClean="0"/>
-              <a:t>1/24/2019</a:t>
+              <a:t>1/28/2019</a:t>
             </a:fld>
             <a:endParaRPr lang="en-US"/>
           </a:p>
@@ -594,7 +598,7 @@
           <a:p>
             <a:fld id="{868BB8F8-F1C7-4CE6-852F-F59F39DC3752}" type="datetimeFigureOut">
               <a:rPr lang="en-US" smtClean="0"/>
-              <a:t>1/24/2019</a:t>
+              <a:t>1/28/2019</a:t>
             </a:fld>
             <a:endParaRPr lang="en-US"/>
           </a:p>
@@ -764,7 +768,7 @@
           <a:p>
             <a:fld id="{868BB8F8-F1C7-4CE6-852F-F59F39DC3752}" type="datetimeFigureOut">
               <a:rPr lang="en-US" smtClean="0"/>
-              <a:t>1/24/2019</a:t>
+              <a:t>1/28/2019</a:t>
             </a:fld>
             <a:endParaRPr lang="en-US"/>
           </a:p>
@@ -1010,7 +1014,7 @@
           <a:p>
             <a:fld id="{868BB8F8-F1C7-4CE6-852F-F59F39DC3752}" type="datetimeFigureOut">
               <a:rPr lang="en-US" smtClean="0"/>
-              <a:t>1/24/2019</a:t>
+              <a:t>1/28/2019</a:t>
             </a:fld>
             <a:endParaRPr lang="en-US"/>
           </a:p>
@@ -1242,7 +1246,7 @@
           <a:p>
             <a:fld id="{868BB8F8-F1C7-4CE6-852F-F59F39DC3752}" type="datetimeFigureOut">
               <a:rPr lang="en-US" smtClean="0"/>
-              <a:t>1/24/2019</a:t>
+              <a:t>1/28/2019</a:t>
             </a:fld>
             <a:endParaRPr lang="en-US"/>
           </a:p>
@@ -1609,7 +1613,7 @@
           <a:p>
             <a:fld id="{868BB8F8-F1C7-4CE6-852F-F59F39DC3752}" type="datetimeFigureOut">
               <a:rPr lang="en-US" smtClean="0"/>
-              <a:t>1/24/2019</a:t>
+              <a:t>1/28/2019</a:t>
             </a:fld>
             <a:endParaRPr lang="en-US"/>
           </a:p>
@@ -1727,7 +1731,7 @@
           <a:p>
             <a:fld id="{868BB8F8-F1C7-4CE6-852F-F59F39DC3752}" type="datetimeFigureOut">
               <a:rPr lang="en-US" smtClean="0"/>
-              <a:t>1/24/2019</a:t>
+              <a:t>1/28/2019</a:t>
             </a:fld>
             <a:endParaRPr lang="en-US"/>
           </a:p>
@@ -1822,7 +1826,7 @@
           <a:p>
             <a:fld id="{868BB8F8-F1C7-4CE6-852F-F59F39DC3752}" type="datetimeFigureOut">
               <a:rPr lang="en-US" smtClean="0"/>
-              <a:t>1/24/2019</a:t>
+              <a:t>1/28/2019</a:t>
             </a:fld>
             <a:endParaRPr lang="en-US"/>
           </a:p>
@@ -2099,7 +2103,7 @@
           <a:p>
             <a:fld id="{868BB8F8-F1C7-4CE6-852F-F59F39DC3752}" type="datetimeFigureOut">
               <a:rPr lang="en-US" smtClean="0"/>
-              <a:t>1/24/2019</a:t>
+              <a:t>1/28/2019</a:t>
             </a:fld>
             <a:endParaRPr lang="en-US"/>
           </a:p>
@@ -2352,7 +2356,7 @@
           <a:p>
             <a:fld id="{868BB8F8-F1C7-4CE6-852F-F59F39DC3752}" type="datetimeFigureOut">
               <a:rPr lang="en-US" smtClean="0"/>
-              <a:t>1/24/2019</a:t>
+              <a:t>1/28/2019</a:t>
             </a:fld>
             <a:endParaRPr lang="en-US"/>
           </a:p>
@@ -2565,7 +2569,7 @@
           <a:p>
             <a:fld id="{868BB8F8-F1C7-4CE6-852F-F59F39DC3752}" type="datetimeFigureOut">
               <a:rPr lang="en-US" smtClean="0"/>
-              <a:t>1/24/2019</a:t>
+              <a:t>1/28/2019</a:t>
             </a:fld>
             <a:endParaRPr lang="en-US"/>
           </a:p>
@@ -2987,51 +2991,40 @@
           <a:p>
             <a:r>
               <a:rPr lang="en-US" dirty="0" smtClean="0"/>
-              <a:t>Choose a graph for your data</a:t>
+              <a:t>What is effective about this?  What is not?</a:t>
             </a:r>
             <a:endParaRPr lang="en-US" dirty="0"/>
           </a:p>
         </p:txBody>
       </p:sp>
-      <p:sp>
-        <p:nvSpPr>
-          <p:cNvPr id="3" name="Content Placeholder 2"/>
-          <p:cNvSpPr>
-            <a:spLocks noGrp="1"/>
-          </p:cNvSpPr>
-          <p:nvPr>
-            <p:ph idx="1"/>
-          </p:nvPr>
-        </p:nvSpPr>
-        <p:spPr/>
-        <p:txBody>
-          <a:bodyPr/>
-          <a:lstStyle/>
-          <a:p>
-            <a:r>
-              <a:rPr lang="en-US" dirty="0" smtClean="0"/>
-              <a:t>What is your response variable?</a:t>
-            </a:r>
-          </a:p>
-          <a:p>
-            <a:r>
-              <a:rPr lang="en-US" dirty="0" smtClean="0"/>
-              <a:t>What is your predictor(s)?</a:t>
-            </a:r>
-          </a:p>
-          <a:p>
-            <a:r>
-              <a:rPr lang="en-US" dirty="0" smtClean="0"/>
-              <a:t>Do you have groupings?</a:t>
-            </a:r>
-            <a:endParaRPr lang="en-US" dirty="0"/>
-          </a:p>
-        </p:txBody>
-      </p:sp>
+      <p:pic>
+        <p:nvPicPr>
+          <p:cNvPr id="3" name="Picture 2"/>
+          <p:cNvPicPr>
+            <a:picLocks noChangeAspect="1"/>
+          </p:cNvPicPr>
+          <p:nvPr/>
+        </p:nvPicPr>
+        <p:blipFill>
+          <a:blip r:embed="rId2"/>
+          <a:stretch>
+            <a:fillRect/>
+          </a:stretch>
+        </p:blipFill>
+        <p:spPr>
+          <a:xfrm>
+            <a:off x="1379944" y="2104836"/>
+            <a:ext cx="6057143" cy="3895238"/>
+          </a:xfrm>
+          <a:prstGeom prst="rect">
+            <a:avLst/>
+          </a:prstGeom>
+        </p:spPr>
+      </p:pic>
     </p:spTree>
     <p:extLst>
       <p:ext uri="{BB962C8B-B14F-4D97-AF65-F5344CB8AC3E}">
-        <p14:creationId xmlns:p14="http://schemas.microsoft.com/office/powerpoint/2010/main" val="2955657697"/>
+        <p14:creationId xmlns:p14="http://schemas.microsoft.com/office/powerpoint/2010/main" val="1065217042"/>
       </p:ext>
     </p:extLst>
   </p:cSld>
@@ -3081,10 +3074,156 @@
           </a:p>
         </p:txBody>
       </p:sp>
+      <p:pic>
+        <p:nvPicPr>
+          <p:cNvPr id="3" name="Picture 2"/>
+          <p:cNvPicPr>
+            <a:picLocks noChangeAspect="1"/>
+          </p:cNvPicPr>
+          <p:nvPr/>
+        </p:nvPicPr>
+        <p:blipFill>
+          <a:blip r:embed="rId2"/>
+          <a:stretch>
+            <a:fillRect/>
+          </a:stretch>
+        </p:blipFill>
+        <p:spPr>
+          <a:xfrm>
+            <a:off x="1379944" y="2104836"/>
+            <a:ext cx="6057143" cy="3895238"/>
+          </a:xfrm>
+          <a:prstGeom prst="rect">
+            <a:avLst/>
+          </a:prstGeom>
+        </p:spPr>
+      </p:pic>
+      <p:sp>
+        <p:nvSpPr>
+          <p:cNvPr id="4" name="Rectangle 3"/>
+          <p:cNvSpPr/>
+          <p:nvPr/>
+        </p:nvSpPr>
+        <p:spPr>
+          <a:xfrm>
+            <a:off x="7752970" y="1790297"/>
+            <a:ext cx="3217409" cy="4524315"/>
+          </a:xfrm>
+          <a:prstGeom prst="rect">
+            <a:avLst/>
+          </a:prstGeom>
+        </p:spPr>
+        <p:txBody>
+          <a:bodyPr wrap="square">
+            <a:spAutoFit/>
+          </a:bodyPr>
+          <a:lstStyle/>
+          <a:p>
+            <a:r>
+              <a:rPr lang="en-US" dirty="0" smtClean="0"/>
+              <a:t>Effective</a:t>
+            </a:r>
+          </a:p>
+          <a:p>
+            <a:pPr marL="742950" lvl="1" indent="-285750">
+              <a:buFont typeface="Arial" panose="020B0604020202020204" pitchFamily="34" charset="0"/>
+              <a:buChar char="•"/>
+            </a:pPr>
+            <a:r>
+              <a:rPr lang="en-US" dirty="0" smtClean="0"/>
+              <a:t>Data </a:t>
+            </a:r>
+            <a:r>
+              <a:rPr lang="en-US" dirty="0" smtClean="0"/>
+              <a:t>density (information per unit area</a:t>
+            </a:r>
+            <a:r>
+              <a:rPr lang="en-US" dirty="0"/>
+              <a:t>), Data/ink ratio: maximize use of ink for </a:t>
+            </a:r>
+            <a:r>
+              <a:rPr lang="en-US" dirty="0" smtClean="0"/>
+              <a:t>data</a:t>
+            </a:r>
+          </a:p>
+          <a:p>
+            <a:pPr marL="742950" lvl="1" indent="-285750">
+              <a:buFont typeface="Arial" panose="020B0604020202020204" pitchFamily="34" charset="0"/>
+              <a:buChar char="•"/>
+            </a:pPr>
+            <a:r>
+              <a:rPr lang="en-US" dirty="0" smtClean="0"/>
+              <a:t>No optical illusions</a:t>
+            </a:r>
+          </a:p>
+          <a:p>
+            <a:pPr marL="742950" lvl="1" indent="-285750">
+              <a:buFont typeface="Arial" panose="020B0604020202020204" pitchFamily="34" charset="0"/>
+              <a:buChar char="•"/>
+            </a:pPr>
+            <a:r>
+              <a:rPr lang="en-US" dirty="0"/>
+              <a:t>Accessibility: color blind color </a:t>
+            </a:r>
+            <a:r>
+              <a:rPr lang="en-US" dirty="0" smtClean="0"/>
+              <a:t>choices</a:t>
+            </a:r>
+            <a:endParaRPr lang="en-US" dirty="0"/>
+          </a:p>
+          <a:p>
+            <a:r>
+              <a:rPr lang="en-US" dirty="0" smtClean="0"/>
+              <a:t>Not effective</a:t>
+            </a:r>
+            <a:endParaRPr lang="en-US" dirty="0" smtClean="0"/>
+          </a:p>
+          <a:p>
+            <a:pPr marL="742950" lvl="1" indent="-285750">
+              <a:buFont typeface="Arial" panose="020B0604020202020204" pitchFamily="34" charset="0"/>
+              <a:buChar char="•"/>
+            </a:pPr>
+            <a:r>
+              <a:rPr lang="en-US" dirty="0" smtClean="0"/>
+              <a:t>Extraneous </a:t>
+            </a:r>
+            <a:r>
+              <a:rPr lang="en-US" dirty="0" smtClean="0"/>
+              <a:t>grid lines, </a:t>
+            </a:r>
+            <a:r>
+              <a:rPr lang="en-US" dirty="0" smtClean="0"/>
+              <a:t>unnecessary color</a:t>
+            </a:r>
+            <a:endParaRPr lang="en-US" dirty="0"/>
+          </a:p>
+          <a:p>
+            <a:pPr marL="742950" lvl="1" indent="-285750">
+              <a:buFont typeface="Arial" panose="020B0604020202020204" pitchFamily="34" charset="0"/>
+              <a:buChar char="•"/>
+            </a:pPr>
+            <a:r>
+              <a:rPr lang="en-US" dirty="0" smtClean="0"/>
+              <a:t>Accessibility: </a:t>
+            </a:r>
+            <a:r>
+              <a:rPr lang="en-US" dirty="0"/>
+              <a:t>font sizes (presentations vs manuscripts)</a:t>
+            </a:r>
+          </a:p>
+          <a:p>
+            <a:pPr marL="742950" lvl="1" indent="-285750">
+              <a:buFont typeface="Arial" panose="020B0604020202020204" pitchFamily="34" charset="0"/>
+              <a:buChar char="•"/>
+            </a:pPr>
+            <a:endParaRPr lang="en-US" b="1" dirty="0"/>
+          </a:p>
+        </p:txBody>
+      </p:sp>
     </p:spTree>
     <p:extLst>
       <p:ext uri="{BB962C8B-B14F-4D97-AF65-F5344CB8AC3E}">
-        <p14:creationId xmlns:p14="http://schemas.microsoft.com/office/powerpoint/2010/main" val="1065217042"/>
+        <p14:creationId xmlns:p14="http://schemas.microsoft.com/office/powerpoint/2010/main" val="3441054681"/>
       </p:ext>
     </p:extLst>
   </p:cSld>
@@ -3126,7 +3265,11 @@
           <a:bodyPr/>
           <a:lstStyle/>
           <a:p>
-            <a:endParaRPr lang="en-US"/>
+            <a:r>
+              <a:rPr lang="en-US" dirty="0" smtClean="0"/>
+              <a:t>What is effective about this?  What is not?</a:t>
+            </a:r>
+            <a:endParaRPr lang="en-US" dirty="0"/>
           </a:p>
         </p:txBody>
       </p:sp>
@@ -3138,8 +3281,8 @@
         </p:nvSpPr>
         <p:spPr>
           <a:xfrm>
-            <a:off x="3048000" y="2690336"/>
-            <a:ext cx="7606496" cy="1477328"/>
+            <a:off x="7752970" y="1790297"/>
+            <a:ext cx="3217409" cy="4524315"/>
           </a:xfrm>
           <a:prstGeom prst="rect">
             <a:avLst/>
@@ -3151,77 +3294,156 @@
           </a:bodyPr>
           <a:lstStyle/>
           <a:p>
-            <a:pPr marL="285750" indent="-285750">
+            <a:r>
+              <a:rPr lang="en-US" dirty="0" smtClean="0"/>
+              <a:t>Effective</a:t>
+            </a:r>
+          </a:p>
+          <a:p>
+            <a:pPr marL="742950" lvl="1" indent="-285750">
               <a:buFont typeface="Arial" panose="020B0604020202020204" pitchFamily="34" charset="0"/>
               <a:buChar char="•"/>
             </a:pPr>
             <a:r>
               <a:rPr lang="en-US" dirty="0" smtClean="0"/>
-              <a:t>Data density (information per unit area)</a:t>
-            </a:r>
-          </a:p>
-          <a:p>
-            <a:pPr marL="285750" indent="-285750">
+              <a:t>Increased data </a:t>
+            </a:r>
+            <a:r>
+              <a:rPr lang="en-US" dirty="0" smtClean="0"/>
+              <a:t>density (information per unit </a:t>
+            </a:r>
+            <a:r>
+              <a:rPr lang="en-US" dirty="0" smtClean="0"/>
+              <a:t>area) with colors</a:t>
+            </a:r>
+          </a:p>
+          <a:p>
+            <a:pPr marL="742950" lvl="1" indent="-285750">
               <a:buFont typeface="Arial" panose="020B0604020202020204" pitchFamily="34" charset="0"/>
               <a:buChar char="•"/>
             </a:pPr>
             <a:r>
-              <a:rPr lang="en-US" dirty="0" err="1" smtClean="0"/>
-              <a:t>Chartjunk</a:t>
-            </a:r>
-            <a:r>
-              <a:rPr lang="en-US" dirty="0" smtClean="0"/>
-              <a:t> (</a:t>
-            </a:r>
-            <a:r>
-              <a:rPr lang="en-US" b="1" dirty="0" smtClean="0"/>
-              <a:t>extraneous grid lines</a:t>
-            </a:r>
-            <a:r>
-              <a:rPr lang="en-US" dirty="0" smtClean="0"/>
-              <a:t>, optical illusions, </a:t>
-            </a:r>
-            <a:r>
-              <a:rPr lang="en-US" b="1" dirty="0" smtClean="0"/>
-              <a:t>unnecessary color</a:t>
-            </a:r>
-            <a:r>
-              <a:rPr lang="en-US" dirty="0" smtClean="0"/>
-              <a:t>)</a:t>
-            </a:r>
-            <a:endParaRPr lang="en-US" dirty="0"/>
-          </a:p>
-          <a:p>
-            <a:pPr marL="285750" indent="-285750">
+              <a:rPr lang="en-US" dirty="0" smtClean="0"/>
+              <a:t>Data/ink </a:t>
+            </a:r>
+            <a:r>
+              <a:rPr lang="en-US" dirty="0"/>
+              <a:t>ratio: maximize use of ink for </a:t>
+            </a:r>
+            <a:r>
+              <a:rPr lang="en-US" dirty="0" smtClean="0"/>
+              <a:t>data</a:t>
+            </a:r>
+          </a:p>
+          <a:p>
+            <a:pPr marL="742950" lvl="1" indent="-285750">
               <a:buFont typeface="Arial" panose="020B0604020202020204" pitchFamily="34" charset="0"/>
               <a:buChar char="•"/>
             </a:pPr>
             <a:r>
               <a:rPr lang="en-US" dirty="0" smtClean="0"/>
-              <a:t>Data/ink ratio: maximize use of ink for data</a:t>
-            </a:r>
-          </a:p>
-          <a:p>
-            <a:pPr marL="285750" indent="-285750">
+              <a:t>No optical illusions</a:t>
+            </a:r>
+          </a:p>
+          <a:p>
+            <a:pPr marL="742950" lvl="1" indent="-285750">
               <a:buFont typeface="Arial" panose="020B0604020202020204" pitchFamily="34" charset="0"/>
               <a:buChar char="•"/>
             </a:pPr>
             <a:r>
-              <a:rPr lang="en-US" dirty="0" smtClean="0"/>
-              <a:t>Accessibility: color blind color choices, </a:t>
-            </a:r>
-            <a:r>
-              <a:rPr lang="en-US" b="1" dirty="0" smtClean="0"/>
-              <a:t>font sizes (presentations vs manuscripts)</a:t>
-            </a:r>
+              <a:rPr lang="en-US" dirty="0"/>
+              <a:t>Accessibility: color blind color </a:t>
+            </a:r>
+            <a:r>
+              <a:rPr lang="en-US" dirty="0" smtClean="0"/>
+              <a:t>choices</a:t>
+            </a:r>
+            <a:endParaRPr lang="en-US" dirty="0"/>
+          </a:p>
+          <a:p>
+            <a:r>
+              <a:rPr lang="en-US" dirty="0" smtClean="0"/>
+              <a:t>Improvements</a:t>
+            </a:r>
+            <a:endParaRPr lang="en-US" dirty="0" smtClean="0"/>
+          </a:p>
+          <a:p>
+            <a:pPr marL="742950" lvl="1" indent="-285750">
+              <a:buFont typeface="Arial" panose="020B0604020202020204" pitchFamily="34" charset="0"/>
+              <a:buChar char="•"/>
+            </a:pPr>
+            <a:r>
+              <a:rPr lang="en-US" dirty="0" smtClean="0"/>
+              <a:t>Removed </a:t>
+            </a:r>
+            <a:r>
+              <a:rPr lang="en-US" dirty="0" smtClean="0"/>
+              <a:t>grid </a:t>
+            </a:r>
+            <a:r>
+              <a:rPr lang="en-US" dirty="0" smtClean="0"/>
+              <a:t>lines</a:t>
+            </a:r>
+          </a:p>
+          <a:p>
+            <a:pPr marL="742950" lvl="1" indent="-285750">
+              <a:buFont typeface="Arial" panose="020B0604020202020204" pitchFamily="34" charset="0"/>
+              <a:buChar char="•"/>
+            </a:pPr>
+            <a:r>
+              <a:rPr lang="en-US" dirty="0" smtClean="0"/>
+              <a:t>Made color a different grouping variable</a:t>
+            </a:r>
+            <a:endParaRPr lang="en-US" dirty="0"/>
+          </a:p>
+          <a:p>
+            <a:pPr marL="742950" lvl="1" indent="-285750">
+              <a:buFont typeface="Arial" panose="020B0604020202020204" pitchFamily="34" charset="0"/>
+              <a:buChar char="•"/>
+            </a:pPr>
+            <a:r>
+              <a:rPr lang="en-US" dirty="0" smtClean="0"/>
+              <a:t>Increased font size for readability</a:t>
+            </a:r>
+            <a:endParaRPr lang="en-US" dirty="0"/>
+          </a:p>
+          <a:p>
+            <a:pPr marL="742950" lvl="1" indent="-285750">
+              <a:buFont typeface="Arial" panose="020B0604020202020204" pitchFamily="34" charset="0"/>
+              <a:buChar char="•"/>
+            </a:pPr>
             <a:endParaRPr lang="en-US" b="1" dirty="0"/>
           </a:p>
         </p:txBody>
       </p:sp>
+      <p:pic>
+        <p:nvPicPr>
+          <p:cNvPr id="5" name="Picture 4"/>
+          <p:cNvPicPr>
+            <a:picLocks noChangeAspect="1"/>
+          </p:cNvPicPr>
+          <p:nvPr/>
+        </p:nvPicPr>
+        <p:blipFill>
+          <a:blip r:embed="rId2"/>
+          <a:stretch>
+            <a:fillRect/>
+          </a:stretch>
+        </p:blipFill>
+        <p:spPr>
+          <a:xfrm>
+            <a:off x="1064061" y="2187961"/>
+            <a:ext cx="6057143" cy="3895238"/>
+          </a:xfrm>
+          <a:prstGeom prst="rect">
+            <a:avLst/>
+          </a:prstGeom>
+        </p:spPr>
+      </p:pic>
     </p:spTree>
     <p:extLst>
       <p:ext uri="{BB962C8B-B14F-4D97-AF65-F5344CB8AC3E}">
-        <p14:creationId xmlns:p14="http://schemas.microsoft.com/office/powerpoint/2010/main" val="3743284865"/>
+        <p14:creationId xmlns:p14="http://schemas.microsoft.com/office/powerpoint/2010/main" val="642578150"/>
       </p:ext>
     </p:extLst>
   </p:cSld>
@@ -3250,119 +3472,60 @@
       </p:grpSpPr>
       <p:sp>
         <p:nvSpPr>
-          <p:cNvPr id="2" name="Title 1"/>
+          <p:cNvPr id="4" name="Title 1"/>
           <p:cNvSpPr>
             <a:spLocks noGrp="1"/>
           </p:cNvSpPr>
           <p:nvPr>
             <p:ph type="title"/>
           </p:nvPr>
-        </p:nvSpPr>
-        <p:spPr/>
-        <p:txBody>
-          <a:bodyPr/>
-          <a:lstStyle/>
-          <a:p>
-            <a:r>
-              <a:rPr lang="en-US" dirty="0" smtClean="0"/>
-              <a:t>Improvements</a:t>
-            </a:r>
-            <a:endParaRPr lang="en-US" dirty="0"/>
-          </a:p>
-        </p:txBody>
-      </p:sp>
-      <p:sp>
-        <p:nvSpPr>
-          <p:cNvPr id="4" name="Rectangle 3"/>
-          <p:cNvSpPr/>
-          <p:nvPr/>
         </p:nvSpPr>
         <p:spPr>
           <a:xfrm>
-            <a:off x="3048000" y="2690336"/>
-            <a:ext cx="7606496" cy="1477328"/>
+            <a:off x="838200" y="365125"/>
+            <a:ext cx="10515600" cy="1325563"/>
+          </a:xfrm>
+        </p:spPr>
+        <p:txBody>
+          <a:bodyPr/>
+          <a:lstStyle/>
+          <a:p>
+            <a:r>
+              <a:rPr lang="en-US" dirty="0" smtClean="0"/>
+              <a:t>What is clear about this?  What is misleading?</a:t>
+            </a:r>
+            <a:endParaRPr lang="en-US" dirty="0"/>
+          </a:p>
+        </p:txBody>
+      </p:sp>
+      <p:pic>
+        <p:nvPicPr>
+          <p:cNvPr id="2" name="Picture 1"/>
+          <p:cNvPicPr>
+            <a:picLocks noChangeAspect="1"/>
+          </p:cNvPicPr>
+          <p:nvPr/>
+        </p:nvPicPr>
+        <p:blipFill>
+          <a:blip r:embed="rId2"/>
+          <a:stretch>
+            <a:fillRect/>
+          </a:stretch>
+        </p:blipFill>
+        <p:spPr>
+          <a:xfrm>
+            <a:off x="1147188" y="2221214"/>
+            <a:ext cx="6057143" cy="3895238"/>
           </a:xfrm>
           <a:prstGeom prst="rect">
             <a:avLst/>
           </a:prstGeom>
         </p:spPr>
-        <p:txBody>
-          <a:bodyPr wrap="square">
-            <a:spAutoFit/>
-          </a:bodyPr>
-          <a:lstStyle/>
-          <a:p>
-            <a:pPr marL="285750" indent="-285750">
-              <a:buFont typeface="Arial" panose="020B0604020202020204" pitchFamily="34" charset="0"/>
-              <a:buChar char="•"/>
-            </a:pPr>
-            <a:r>
-              <a:rPr lang="en-US" dirty="0" smtClean="0"/>
-              <a:t>Data density (information per unit area)</a:t>
-            </a:r>
-          </a:p>
-          <a:p>
-            <a:pPr marL="285750" indent="-285750">
-              <a:buFont typeface="Arial" panose="020B0604020202020204" pitchFamily="34" charset="0"/>
-              <a:buChar char="•"/>
-            </a:pPr>
-            <a:r>
-              <a:rPr lang="en-US" dirty="0" err="1" smtClean="0"/>
-              <a:t>Chartjunk</a:t>
-            </a:r>
-            <a:r>
-              <a:rPr lang="en-US" dirty="0" smtClean="0"/>
-              <a:t> (</a:t>
-            </a:r>
-            <a:r>
-              <a:rPr lang="en-US" b="1" dirty="0" smtClean="0"/>
-              <a:t>extraneous grid lines</a:t>
-            </a:r>
-            <a:r>
-              <a:rPr lang="en-US" dirty="0" smtClean="0"/>
-              <a:t>, optical illusions, </a:t>
-            </a:r>
-            <a:r>
-              <a:rPr lang="en-US" b="1" dirty="0" smtClean="0"/>
-              <a:t>unnecessary color</a:t>
-            </a:r>
-            <a:r>
-              <a:rPr lang="en-US" dirty="0" smtClean="0"/>
-              <a:t>)</a:t>
-            </a:r>
-            <a:endParaRPr lang="en-US" dirty="0"/>
-          </a:p>
-          <a:p>
-            <a:pPr marL="285750" indent="-285750">
-              <a:buFont typeface="Arial" panose="020B0604020202020204" pitchFamily="34" charset="0"/>
-              <a:buChar char="•"/>
-            </a:pPr>
-            <a:r>
-              <a:rPr lang="en-US" dirty="0" smtClean="0"/>
-              <a:t>Data/ink ratio: maximize use of ink for data</a:t>
-            </a:r>
-          </a:p>
-          <a:p>
-            <a:pPr marL="285750" indent="-285750">
-              <a:buFont typeface="Arial" panose="020B0604020202020204" pitchFamily="34" charset="0"/>
-              <a:buChar char="•"/>
-            </a:pPr>
-            <a:r>
-              <a:rPr lang="en-US" dirty="0" smtClean="0"/>
-              <a:t>Accessibility: color blind color choices, </a:t>
-            </a:r>
-            <a:r>
-              <a:rPr lang="en-US" b="1" dirty="0" smtClean="0"/>
-              <a:t>font sizes (presentations vs manuscripts)</a:t>
-            </a:r>
-            <a:endParaRPr lang="en-US" b="1" dirty="0"/>
-          </a:p>
-        </p:txBody>
-      </p:sp>
+      </p:pic>
     </p:spTree>
     <p:extLst>
       <p:ext uri="{BB962C8B-B14F-4D97-AF65-F5344CB8AC3E}">
-        <p14:creationId xmlns:p14="http://schemas.microsoft.com/office/powerpoint/2010/main" val="433461327"/>
+        <p14:creationId xmlns:p14="http://schemas.microsoft.com/office/powerpoint/2010/main" val="1102031110"/>
       </p:ext>
     </p:extLst>
   </p:cSld>
@@ -3417,10 +3580,150 @@
           </a:p>
         </p:txBody>
       </p:sp>
+      <p:pic>
+        <p:nvPicPr>
+          <p:cNvPr id="2" name="Picture 1"/>
+          <p:cNvPicPr>
+            <a:picLocks noChangeAspect="1"/>
+          </p:cNvPicPr>
+          <p:nvPr/>
+        </p:nvPicPr>
+        <p:blipFill>
+          <a:blip r:embed="rId2"/>
+          <a:stretch>
+            <a:fillRect/>
+          </a:stretch>
+        </p:blipFill>
+        <p:spPr>
+          <a:xfrm>
+            <a:off x="1147188" y="2221214"/>
+            <a:ext cx="6057143" cy="3895238"/>
+          </a:xfrm>
+          <a:prstGeom prst="rect">
+            <a:avLst/>
+          </a:prstGeom>
+        </p:spPr>
+      </p:pic>
+      <p:sp>
+        <p:nvSpPr>
+          <p:cNvPr id="5" name="Rectangle 4"/>
+          <p:cNvSpPr/>
+          <p:nvPr/>
+        </p:nvSpPr>
+        <p:spPr>
+          <a:xfrm>
+            <a:off x="7872152" y="1839760"/>
+            <a:ext cx="3765666" cy="3416320"/>
+          </a:xfrm>
+          <a:prstGeom prst="rect">
+            <a:avLst/>
+          </a:prstGeom>
+        </p:spPr>
+        <p:txBody>
+          <a:bodyPr wrap="square">
+            <a:spAutoFit/>
+          </a:bodyPr>
+          <a:lstStyle/>
+          <a:p>
+            <a:r>
+              <a:rPr lang="en-US" dirty="0" smtClean="0"/>
+              <a:t>Clear</a:t>
+            </a:r>
+          </a:p>
+          <a:p>
+            <a:pPr marL="285750" indent="-285750">
+              <a:buFont typeface="Arial" panose="020B0604020202020204" pitchFamily="34" charset="0"/>
+              <a:buChar char="•"/>
+            </a:pPr>
+            <a:r>
+              <a:rPr lang="en-US" dirty="0" smtClean="0"/>
+              <a:t>Chart design consistent throughout</a:t>
+            </a:r>
+          </a:p>
+          <a:p>
+            <a:pPr marL="285750" indent="-285750">
+              <a:buFont typeface="Arial" panose="020B0604020202020204" pitchFamily="34" charset="0"/>
+              <a:buChar char="•"/>
+            </a:pPr>
+            <a:r>
+              <a:rPr lang="en-US" dirty="0" smtClean="0"/>
+              <a:t>Units appropriate</a:t>
+            </a:r>
+          </a:p>
+          <a:p>
+            <a:endParaRPr lang="en-US" dirty="0" smtClean="0"/>
+          </a:p>
+          <a:p>
+            <a:r>
+              <a:rPr lang="en-US" dirty="0" smtClean="0"/>
+              <a:t>Not clear</a:t>
+            </a:r>
+            <a:endParaRPr lang="en-US" dirty="0" smtClean="0"/>
+          </a:p>
+          <a:p>
+            <a:pPr marL="285750" indent="-285750">
+              <a:buFont typeface="Arial" panose="020B0604020202020204" pitchFamily="34" charset="0"/>
+              <a:buChar char="•"/>
+            </a:pPr>
+            <a:r>
+              <a:rPr lang="en-US" dirty="0" smtClean="0"/>
+              <a:t>Symbols </a:t>
+            </a:r>
+            <a:r>
+              <a:rPr lang="en-US" dirty="0" smtClean="0"/>
+              <a:t>and axes proportional to numbers represented (problem with pie charts, area in </a:t>
+            </a:r>
+            <a:r>
+              <a:rPr lang="en-US" dirty="0" smtClean="0"/>
+              <a:t>general)</a:t>
+            </a:r>
+          </a:p>
+          <a:p>
+            <a:pPr marL="285750" indent="-285750">
+              <a:buFont typeface="Arial" panose="020B0604020202020204" pitchFamily="34" charset="0"/>
+              <a:buChar char="•"/>
+            </a:pPr>
+            <a:r>
+              <a:rPr lang="en-US" dirty="0" smtClean="0"/>
+              <a:t>Lack </a:t>
+            </a:r>
+            <a:r>
+              <a:rPr lang="en-US" dirty="0" smtClean="0"/>
+              <a:t>of </a:t>
+            </a:r>
+            <a:r>
+              <a:rPr lang="en-US" dirty="0" smtClean="0"/>
+              <a:t>context: did not show </a:t>
+            </a:r>
+            <a:r>
+              <a:rPr lang="en-US" dirty="0" smtClean="0"/>
+              <a:t>all relevant </a:t>
+            </a:r>
+            <a:r>
+              <a:rPr lang="en-US" dirty="0" smtClean="0"/>
+              <a:t>data</a:t>
+            </a:r>
+          </a:p>
+          <a:p>
+            <a:pPr marL="285750" indent="-285750">
+              <a:buFont typeface="Arial" panose="020B0604020202020204" pitchFamily="34" charset="0"/>
+              <a:buChar char="•"/>
+            </a:pPr>
+            <a:r>
+              <a:rPr lang="en-US" dirty="0" smtClean="0"/>
+              <a:t>Clear </a:t>
+            </a:r>
+            <a:r>
+              <a:rPr lang="en-US" dirty="0" smtClean="0"/>
+              <a:t>labels (minimize abbreviations)	</a:t>
+            </a:r>
+          </a:p>
+        </p:txBody>
+      </p:sp>
     </p:spTree>
     <p:extLst>
       <p:ext uri="{BB962C8B-B14F-4D97-AF65-F5344CB8AC3E}">
-        <p14:creationId xmlns:p14="http://schemas.microsoft.com/office/powerpoint/2010/main" val="1102031110"/>
+        <p14:creationId xmlns:p14="http://schemas.microsoft.com/office/powerpoint/2010/main" val="3528415198"/>
       </p:ext>
     </p:extLst>
   </p:cSld>
@@ -3447,6 +3750,30 @@
           <a:chExt cx="0" cy="0"/>
         </a:xfrm>
       </p:grpSpPr>
+      <p:pic>
+        <p:nvPicPr>
+          <p:cNvPr id="6" name="Picture 5"/>
+          <p:cNvPicPr>
+            <a:picLocks noChangeAspect="1"/>
+          </p:cNvPicPr>
+          <p:nvPr/>
+        </p:nvPicPr>
+        <p:blipFill>
+          <a:blip r:embed="rId2"/>
+          <a:stretch>
+            <a:fillRect/>
+          </a:stretch>
+        </p:blipFill>
+        <p:spPr>
+          <a:xfrm>
+            <a:off x="1022497" y="2221214"/>
+            <a:ext cx="6057143" cy="3895238"/>
+          </a:xfrm>
+          <a:prstGeom prst="rect">
+            <a:avLst/>
+          </a:prstGeom>
+        </p:spPr>
+      </p:pic>
       <p:sp>
         <p:nvSpPr>
           <p:cNvPr id="4" name="Title 1"/>
@@ -3483,202 +3810,115 @@
         </p:nvSpPr>
         <p:spPr>
           <a:xfrm>
-            <a:off x="3048000" y="2413338"/>
-            <a:ext cx="6096000" cy="2308324"/>
+            <a:off x="7872152" y="1839760"/>
+            <a:ext cx="3765666" cy="2585323"/>
           </a:xfrm>
           <a:prstGeom prst="rect">
             <a:avLst/>
           </a:prstGeom>
         </p:spPr>
         <p:txBody>
-          <a:bodyPr>
+          <a:bodyPr wrap="square">
             <a:spAutoFit/>
           </a:bodyPr>
           <a:lstStyle/>
           <a:p>
+            <a:r>
+              <a:rPr lang="en-US" dirty="0" smtClean="0"/>
+              <a:t>Clear</a:t>
+            </a:r>
+          </a:p>
+          <a:p>
             <a:pPr marL="285750" indent="-285750">
-              <a:buFontTx/>
-              <a:buChar char="-"/>
+              <a:buFont typeface="Arial" panose="020B0604020202020204" pitchFamily="34" charset="0"/>
+              <a:buChar char="•"/>
             </a:pPr>
             <a:r>
               <a:rPr lang="en-US" dirty="0" smtClean="0"/>
-              <a:t>Symbols and axes proportional to numbers represented (problem with pie charts, area in general)</a:t>
+              <a:t>Chart design consistent throughout</a:t>
             </a:r>
           </a:p>
           <a:p>
             <a:pPr marL="285750" indent="-285750">
-              <a:buFontTx/>
-              <a:buChar char="-"/>
+              <a:buFont typeface="Arial" panose="020B0604020202020204" pitchFamily="34" charset="0"/>
+              <a:buChar char="•"/>
             </a:pPr>
             <a:r>
-              <a:rPr lang="en-US" dirty="0" smtClean="0"/>
-              <a:t>Reduce external variation / lack of context: Use standardized units (per capita, per weight, whatever relevant to your field), show all relevant data</a:t>
-            </a:r>
+              <a:rPr lang="en-US" smtClean="0"/>
+              <a:t>Units appropriate</a:t>
+            </a:r>
+          </a:p>
+          <a:p>
+            <a:endParaRPr lang="en-US" dirty="0" smtClean="0"/>
+          </a:p>
+          <a:p>
+            <a:r>
+              <a:rPr lang="en-US" dirty="0" smtClean="0"/>
+              <a:t>Improvements</a:t>
+            </a:r>
+            <a:endParaRPr lang="en-US" dirty="0" smtClean="0"/>
           </a:p>
           <a:p>
             <a:pPr marL="285750" indent="-285750">
-              <a:buFontTx/>
-              <a:buChar char="-"/>
+              <a:buFont typeface="Arial" panose="020B0604020202020204" pitchFamily="34" charset="0"/>
+              <a:buChar char="•"/>
             </a:pPr>
             <a:r>
               <a:rPr lang="en-US" dirty="0" smtClean="0"/>
-              <a:t>Clear labels (minimize </a:t>
-            </a:r>
-            <a:r>
-              <a:rPr lang="en-US" dirty="0" err="1" smtClean="0"/>
-              <a:t>abbrevations</a:t>
-            </a:r>
-            <a:r>
-              <a:rPr lang="en-US" dirty="0" smtClean="0"/>
-              <a:t>)	</a:t>
+              <a:t>Removed area-cut relationship</a:t>
             </a:r>
           </a:p>
           <a:p>
             <a:pPr marL="285750" indent="-285750">
-              <a:buFontTx/>
-              <a:buChar char="-"/>
+              <a:buFont typeface="Arial" panose="020B0604020202020204" pitchFamily="34" charset="0"/>
+              <a:buChar char="•"/>
             </a:pPr>
             <a:r>
               <a:rPr lang="en-US" dirty="0" smtClean="0"/>
-              <a:t>Do not change chart design partway through (emphasize variation in data, not design)</a:t>
-            </a:r>
-            <a:endParaRPr lang="en-US" dirty="0"/>
+              <a:t>Lack </a:t>
+            </a:r>
+            <a:r>
+              <a:rPr lang="en-US" dirty="0" smtClean="0"/>
+              <a:t>of </a:t>
+            </a:r>
+            <a:r>
+              <a:rPr lang="en-US" dirty="0" smtClean="0"/>
+              <a:t>context: did not show </a:t>
+            </a:r>
+            <a:r>
+              <a:rPr lang="en-US" dirty="0" smtClean="0"/>
+              <a:t>all relevant </a:t>
+            </a:r>
+            <a:r>
+              <a:rPr lang="en-US" dirty="0" smtClean="0"/>
+              <a:t>data</a:t>
+            </a:r>
+          </a:p>
+          <a:p>
+            <a:pPr marL="285750" indent="-285750">
+              <a:buFont typeface="Arial" panose="020B0604020202020204" pitchFamily="34" charset="0"/>
+              <a:buChar char="•"/>
+            </a:pPr>
+            <a:r>
+              <a:rPr lang="en-US" dirty="0" smtClean="0"/>
+              <a:t>Clear </a:t>
+            </a:r>
+            <a:r>
+              <a:rPr lang="en-US" dirty="0" smtClean="0"/>
+              <a:t>labels </a:t>
+            </a:r>
+            <a:r>
+              <a:rPr lang="en-US" dirty="0" smtClean="0"/>
+              <a:t>– not abbreviated</a:t>
+            </a:r>
+            <a:endParaRPr lang="en-US" dirty="0" smtClean="0"/>
           </a:p>
         </p:txBody>
       </p:sp>
     </p:spTree>
     <p:extLst>
       <p:ext uri="{BB962C8B-B14F-4D97-AF65-F5344CB8AC3E}">
-        <p14:creationId xmlns:p14="http://schemas.microsoft.com/office/powerpoint/2010/main" val="1059799780"/>
-      </p:ext>
-    </p:extLst>
-  </p:cSld>
-  <p:clrMapOvr>
-    <a:masterClrMapping/>
-  </p:clrMapOvr>
-</p:sld>
-</file>
-
-<file path=ppt/slides/slide7.xml><?xml version="1.0" encoding="utf-8"?>
-<p:sld xmlns:a="http://schemas.openxmlformats.org/drawingml/2006/main" xmlns:r="http://schemas.openxmlformats.org/officeDocument/2006/relationships" xmlns:p="http://schemas.openxmlformats.org/presentationml/2006/main">
-  <p:cSld>
-    <p:spTree>
-      <p:nvGrpSpPr>
-        <p:cNvPr id="1" name=""/>
-        <p:cNvGrpSpPr/>
-        <p:nvPr/>
-      </p:nvGrpSpPr>
-      <p:grpSpPr>
-        <a:xfrm>
-          <a:off x="0" y="0"/>
-          <a:ext cx="0" cy="0"/>
-          <a:chOff x="0" y="0"/>
-          <a:chExt cx="0" cy="0"/>
-        </a:xfrm>
-      </p:grpSpPr>
-      <p:sp>
-        <p:nvSpPr>
-          <p:cNvPr id="4" name="Title 1"/>
-          <p:cNvSpPr>
-            <a:spLocks noGrp="1"/>
-          </p:cNvSpPr>
-          <p:nvPr>
-            <p:ph type="title"/>
-          </p:nvPr>
-        </p:nvSpPr>
-        <p:spPr>
-          <a:xfrm>
-            <a:off x="838200" y="365125"/>
-            <a:ext cx="10515600" cy="1325563"/>
-          </a:xfrm>
-        </p:spPr>
-        <p:txBody>
-          <a:bodyPr/>
-          <a:lstStyle/>
-          <a:p>
-            <a:r>
-              <a:rPr lang="en-US" dirty="0" smtClean="0"/>
-              <a:t>Improvements</a:t>
-            </a:r>
-            <a:endParaRPr lang="en-US" dirty="0"/>
-          </a:p>
-        </p:txBody>
-      </p:sp>
-      <p:sp>
-        <p:nvSpPr>
-          <p:cNvPr id="5" name="Rectangle 4"/>
-          <p:cNvSpPr/>
-          <p:nvPr/>
-        </p:nvSpPr>
-        <p:spPr>
-          <a:xfrm>
-            <a:off x="3048000" y="2413338"/>
-            <a:ext cx="6096000" cy="2308324"/>
-          </a:xfrm>
-          <a:prstGeom prst="rect">
-            <a:avLst/>
-          </a:prstGeom>
-        </p:spPr>
-        <p:txBody>
-          <a:bodyPr>
-            <a:spAutoFit/>
-          </a:bodyPr>
-          <a:lstStyle/>
-          <a:p>
-            <a:pPr marL="285750" indent="-285750">
-              <a:buFontTx/>
-              <a:buChar char="-"/>
-            </a:pPr>
-            <a:r>
-              <a:rPr lang="en-US" dirty="0" smtClean="0"/>
-              <a:t>Symbols and axes proportional to numbers represented (problem with pie charts, area in general)</a:t>
-            </a:r>
-          </a:p>
-          <a:p>
-            <a:pPr marL="285750" indent="-285750">
-              <a:buFontTx/>
-              <a:buChar char="-"/>
-            </a:pPr>
-            <a:r>
-              <a:rPr lang="en-US" dirty="0" smtClean="0"/>
-              <a:t>Reduce external variation / lack of context: Use standardized units (per capita, per weight, whatever relevant to your field), show all relevant data</a:t>
-            </a:r>
-          </a:p>
-          <a:p>
-            <a:pPr marL="285750" indent="-285750">
-              <a:buFontTx/>
-              <a:buChar char="-"/>
-            </a:pPr>
-            <a:r>
-              <a:rPr lang="en-US" dirty="0" smtClean="0"/>
-              <a:t>Clear labels (minimize </a:t>
-            </a:r>
-            <a:r>
-              <a:rPr lang="en-US" dirty="0" err="1" smtClean="0"/>
-              <a:t>abbrevations</a:t>
-            </a:r>
-            <a:r>
-              <a:rPr lang="en-US" dirty="0" smtClean="0"/>
-              <a:t>)	</a:t>
-            </a:r>
-          </a:p>
-          <a:p>
-            <a:pPr marL="285750" indent="-285750">
-              <a:buFontTx/>
-              <a:buChar char="-"/>
-            </a:pPr>
-            <a:r>
-              <a:rPr lang="en-US" dirty="0" smtClean="0"/>
-              <a:t>Do not change chart design partway through (emphasize variation in data, not design)</a:t>
-            </a:r>
-            <a:endParaRPr lang="en-US" dirty="0"/>
-          </a:p>
-        </p:txBody>
-      </p:sp>
-    </p:spTree>
-    <p:extLst>
-      <p:ext uri="{BB962C8B-B14F-4D97-AF65-F5344CB8AC3E}">
-        <p14:creationId xmlns:p14="http://schemas.microsoft.com/office/powerpoint/2010/main" val="2991917719"/>
+        <p14:creationId xmlns:p14="http://schemas.microsoft.com/office/powerpoint/2010/main" val="1753344333"/>
       </p:ext>
     </p:extLst>
   </p:cSld>

</xml_diff>

<commit_message>
started adding examples of steps 2 and 3 from handout
</commit_message>
<xml_diff>
--- a/activities.pptx
+++ b/activities.pptx
@@ -5,7 +5,7 @@
     <p:sldMasterId id="2147483660" r:id="rId1"/>
   </p:sldMasterIdLst>
   <p:notesMasterIdLst>
-    <p:notesMasterId r:id="rId40"/>
+    <p:notesMasterId r:id="rId45"/>
   </p:notesMasterIdLst>
   <p:sldIdLst>
     <p:sldId id="265" r:id="rId2"/>
@@ -37,15 +37,20 @@
     <p:sldId id="306" r:id="rId28"/>
     <p:sldId id="308" r:id="rId29"/>
     <p:sldId id="279" r:id="rId30"/>
-    <p:sldId id="269" r:id="rId31"/>
-    <p:sldId id="270" r:id="rId32"/>
-    <p:sldId id="271" r:id="rId33"/>
-    <p:sldId id="272" r:id="rId34"/>
-    <p:sldId id="273" r:id="rId35"/>
-    <p:sldId id="274" r:id="rId36"/>
-    <p:sldId id="275" r:id="rId37"/>
-    <p:sldId id="276" r:id="rId38"/>
-    <p:sldId id="277" r:id="rId39"/>
+    <p:sldId id="310" r:id="rId31"/>
+    <p:sldId id="311" r:id="rId32"/>
+    <p:sldId id="312" r:id="rId33"/>
+    <p:sldId id="309" r:id="rId34"/>
+    <p:sldId id="269" r:id="rId35"/>
+    <p:sldId id="270" r:id="rId36"/>
+    <p:sldId id="271" r:id="rId37"/>
+    <p:sldId id="272" r:id="rId38"/>
+    <p:sldId id="313" r:id="rId39"/>
+    <p:sldId id="273" r:id="rId40"/>
+    <p:sldId id="274" r:id="rId41"/>
+    <p:sldId id="275" r:id="rId42"/>
+    <p:sldId id="277" r:id="rId43"/>
+    <p:sldId id="276" r:id="rId44"/>
   </p:sldIdLst>
   <p:sldSz cx="12192000" cy="6858000"/>
   <p:notesSz cx="6858000" cy="9144000"/>
@@ -579,7 +584,7 @@
           <a:p>
             <a:fld id="{7D86B546-8556-4315-96DD-942723B58990}" type="slidenum">
               <a:rPr lang="en-US" smtClean="0"/>
-              <a:t>37</a:t>
+              <a:t>43</a:t>
             </a:fld>
             <a:endParaRPr lang="en-US"/>
           </a:p>
@@ -9922,6 +9927,29 @@
       </p:grpSpPr>
       <p:sp>
         <p:nvSpPr>
+          <p:cNvPr id="4" name="Content Placeholder 3"/>
+          <p:cNvSpPr>
+            <a:spLocks noGrp="1"/>
+          </p:cNvSpPr>
+          <p:nvPr>
+            <p:ph idx="10"/>
+          </p:nvPr>
+        </p:nvSpPr>
+        <p:spPr/>
+        <p:txBody>
+          <a:bodyPr/>
+          <a:lstStyle/>
+          <a:p>
+            <a:r>
+              <a:rPr lang="en-US" dirty="0" smtClean="0"/>
+              <a:t>Accessibility</a:t>
+            </a:r>
+            <a:endParaRPr lang="en-US" dirty="0"/>
+          </a:p>
+        </p:txBody>
+      </p:sp>
+      <p:sp>
+        <p:nvSpPr>
           <p:cNvPr id="10" name="Title 9">
             <a:extLst>
               <a:ext uri="{FF2B5EF4-FFF2-40B4-BE49-F238E27FC236}">
@@ -9937,10 +9965,6 @@
           </p:nvPr>
         </p:nvSpPr>
         <p:spPr>
-          <a:xfrm>
-            <a:off x="1168708" y="675829"/>
-            <a:ext cx="9616202" cy="500289"/>
-          </a:xfrm>
           <a:prstGeom prst="rect">
             <a:avLst/>
           </a:prstGeom>
@@ -9950,13 +9974,18 @@
           <a:lstStyle/>
           <a:p>
             <a:r>
-              <a:rPr lang="en-US" b="1" dirty="0">
+              <a:rPr lang="en-US" b="1" smtClean="0">
                 <a:solidFill>
                   <a:srgbClr val="8E1731"/>
                 </a:solidFill>
               </a:rPr>
-              <a:t>What is effective about this?  What is not?</a:t>
-            </a:r>
+              <a:t>Step 2: effective visuals</a:t>
+            </a:r>
+            <a:endParaRPr lang="en-US" b="1" dirty="0">
+              <a:solidFill>
+                <a:srgbClr val="8E1731"/>
+              </a:solidFill>
+            </a:endParaRPr>
           </a:p>
         </p:txBody>
       </p:sp>
@@ -10003,30 +10032,6 @@
           </a:p>
         </p:txBody>
       </p:sp>
-      <p:pic>
-        <p:nvPicPr>
-          <p:cNvPr id="7" name="Picture 6"/>
-          <p:cNvPicPr>
-            <a:picLocks noChangeAspect="1"/>
-          </p:cNvPicPr>
-          <p:nvPr/>
-        </p:nvPicPr>
-        <p:blipFill>
-          <a:blip r:embed="rId2"/>
-          <a:stretch>
-            <a:fillRect/>
-          </a:stretch>
-        </p:blipFill>
-        <p:spPr>
-          <a:xfrm>
-            <a:off x="1379944" y="2104836"/>
-            <a:ext cx="6057143" cy="3895238"/>
-          </a:xfrm>
-          <a:prstGeom prst="rect">
-            <a:avLst/>
-          </a:prstGeom>
-        </p:spPr>
-      </p:pic>
     </p:spTree>
     <p:extLst>
       <p:ext uri="{BB962C8B-B14F-4D97-AF65-F5344CB8AC3E}">
@@ -10209,6 +10214,29 @@
       </p:grpSpPr>
       <p:sp>
         <p:nvSpPr>
+          <p:cNvPr id="4" name="Content Placeholder 3"/>
+          <p:cNvSpPr>
+            <a:spLocks noGrp="1"/>
+          </p:cNvSpPr>
+          <p:nvPr>
+            <p:ph idx="10"/>
+          </p:nvPr>
+        </p:nvSpPr>
+        <p:spPr/>
+        <p:txBody>
+          <a:bodyPr/>
+          <a:lstStyle/>
+          <a:p>
+            <a:r>
+              <a:rPr lang="en-US" dirty="0" smtClean="0"/>
+              <a:t>Summaries</a:t>
+            </a:r>
+            <a:endParaRPr lang="en-US" dirty="0"/>
+          </a:p>
+        </p:txBody>
+      </p:sp>
+      <p:sp>
+        <p:nvSpPr>
           <p:cNvPr id="10" name="Title 9">
             <a:extLst>
               <a:ext uri="{FF2B5EF4-FFF2-40B4-BE49-F238E27FC236}">
@@ -10224,10 +10252,6 @@
           </p:nvPr>
         </p:nvSpPr>
         <p:spPr>
-          <a:xfrm>
-            <a:off x="1168708" y="675829"/>
-            <a:ext cx="9616202" cy="500289"/>
-          </a:xfrm>
           <a:prstGeom prst="rect">
             <a:avLst/>
           </a:prstGeom>
@@ -10237,13 +10261,18 @@
           <a:lstStyle/>
           <a:p>
             <a:r>
-              <a:rPr lang="en-US" b="1" dirty="0">
+              <a:rPr lang="en-US" b="1" smtClean="0">
                 <a:solidFill>
                   <a:srgbClr val="8E1731"/>
                 </a:solidFill>
               </a:rPr>
-              <a:t>What is effective about this?  What is not?</a:t>
-            </a:r>
+              <a:t>Step 2: effective visuals</a:t>
+            </a:r>
+            <a:endParaRPr lang="en-US" b="1" dirty="0">
+              <a:solidFill>
+                <a:srgbClr val="8E1731"/>
+              </a:solidFill>
+            </a:endParaRPr>
           </a:p>
         </p:txBody>
       </p:sp>
@@ -10290,129 +10319,10 @@
           </a:p>
         </p:txBody>
       </p:sp>
-      <p:pic>
-        <p:nvPicPr>
-          <p:cNvPr id="7" name="Picture 6"/>
-          <p:cNvPicPr>
-            <a:picLocks noChangeAspect="1"/>
-          </p:cNvPicPr>
-          <p:nvPr/>
-        </p:nvPicPr>
-        <p:blipFill>
-          <a:blip r:embed="rId2"/>
-          <a:stretch>
-            <a:fillRect/>
-          </a:stretch>
-        </p:blipFill>
-        <p:spPr>
-          <a:xfrm>
-            <a:off x="1379944" y="2104836"/>
-            <a:ext cx="6057143" cy="3895238"/>
-          </a:xfrm>
-          <a:prstGeom prst="rect">
-            <a:avLst/>
-          </a:prstGeom>
-        </p:spPr>
-      </p:pic>
-      <p:sp>
-        <p:nvSpPr>
-          <p:cNvPr id="5" name="Rectangle 4"/>
-          <p:cNvSpPr/>
-          <p:nvPr/>
-        </p:nvSpPr>
-        <p:spPr>
-          <a:xfrm>
-            <a:off x="7752970" y="1790297"/>
-            <a:ext cx="4439030" cy="2862322"/>
-          </a:xfrm>
-          <a:prstGeom prst="rect">
-            <a:avLst/>
-          </a:prstGeom>
-        </p:spPr>
-        <p:txBody>
-          <a:bodyPr wrap="square">
-            <a:spAutoFit/>
-          </a:bodyPr>
-          <a:lstStyle/>
-          <a:p>
-            <a:r>
-              <a:rPr lang="en-US" dirty="0" smtClean="0"/>
-              <a:t>Effective</a:t>
-            </a:r>
-          </a:p>
-          <a:p>
-            <a:pPr marL="742950" lvl="1" indent="-285750">
-              <a:buFont typeface="Arial" panose="020B0604020202020204" pitchFamily="34" charset="0"/>
-              <a:buChar char="•"/>
-            </a:pPr>
-            <a:r>
-              <a:rPr lang="en-US" dirty="0" smtClean="0"/>
-              <a:t>No optical illusions</a:t>
-            </a:r>
-          </a:p>
-          <a:p>
-            <a:r>
-              <a:rPr lang="en-US" dirty="0" smtClean="0"/>
-              <a:t>Not effective</a:t>
-            </a:r>
-          </a:p>
-          <a:p>
-            <a:pPr marL="742950" lvl="1" indent="-285750">
-              <a:buFont typeface="Arial" panose="020B0604020202020204" pitchFamily="34" charset="0"/>
-              <a:buChar char="•"/>
-            </a:pPr>
-            <a:r>
-              <a:rPr lang="en-US" dirty="0" smtClean="0"/>
-              <a:t>Extraneous grid lines</a:t>
-            </a:r>
-          </a:p>
-          <a:p>
-            <a:pPr marL="742950" lvl="1" indent="-285750">
-              <a:buFont typeface="Arial" panose="020B0604020202020204" pitchFamily="34" charset="0"/>
-              <a:buChar char="•"/>
-            </a:pPr>
-            <a:r>
-              <a:rPr lang="en-US" dirty="0" smtClean="0"/>
-              <a:t>Unnecessary color</a:t>
-            </a:r>
-          </a:p>
-          <a:p>
-            <a:pPr marL="742950" lvl="1" indent="-285750">
-              <a:buFont typeface="Arial" panose="020B0604020202020204" pitchFamily="34" charset="0"/>
-              <a:buChar char="•"/>
-            </a:pPr>
-            <a:r>
-              <a:rPr lang="en-US" dirty="0" smtClean="0"/>
-              <a:t>Low contrast between shades of blue</a:t>
-            </a:r>
-          </a:p>
-          <a:p>
-            <a:pPr marL="742950" lvl="1" indent="-285750">
-              <a:buFont typeface="Arial" panose="020B0604020202020204" pitchFamily="34" charset="0"/>
-              <a:buChar char="•"/>
-            </a:pPr>
-            <a:r>
-              <a:rPr lang="en-US" dirty="0" smtClean="0"/>
-              <a:t>Font </a:t>
-            </a:r>
-            <a:r>
-              <a:rPr lang="en-US" dirty="0"/>
-              <a:t>sizes (presentations vs manuscripts)</a:t>
-            </a:r>
-          </a:p>
-          <a:p>
-            <a:pPr marL="742950" lvl="1" indent="-285750">
-              <a:buFont typeface="Arial" panose="020B0604020202020204" pitchFamily="34" charset="0"/>
-              <a:buChar char="•"/>
-            </a:pPr>
-            <a:endParaRPr lang="en-US" b="1" dirty="0"/>
-          </a:p>
-        </p:txBody>
-      </p:sp>
     </p:spTree>
     <p:extLst>
       <p:ext uri="{BB962C8B-B14F-4D97-AF65-F5344CB8AC3E}">
-        <p14:creationId xmlns:p14="http://schemas.microsoft.com/office/powerpoint/2010/main" val="3841075137"/>
+        <p14:creationId xmlns:p14="http://schemas.microsoft.com/office/powerpoint/2010/main" val="2020232574"/>
       </p:ext>
     </p:extLst>
   </p:cSld>
@@ -10441,6 +10351,35 @@
       </p:grpSpPr>
       <p:sp>
         <p:nvSpPr>
+          <p:cNvPr id="4" name="Content Placeholder 3"/>
+          <p:cNvSpPr>
+            <a:spLocks noGrp="1"/>
+          </p:cNvSpPr>
+          <p:nvPr>
+            <p:ph idx="10"/>
+          </p:nvPr>
+        </p:nvSpPr>
+        <p:spPr/>
+        <p:txBody>
+          <a:bodyPr/>
+          <a:lstStyle/>
+          <a:p>
+            <a:r>
+              <a:rPr lang="en-US" dirty="0" smtClean="0"/>
+              <a:t>Connect related items</a:t>
+            </a:r>
+          </a:p>
+          <a:p>
+            <a:r>
+              <a:rPr lang="en-US" dirty="0" smtClean="0"/>
+              <a:t>Lines </a:t>
+            </a:r>
+            <a:endParaRPr lang="en-US" dirty="0"/>
+          </a:p>
+        </p:txBody>
+      </p:sp>
+      <p:sp>
+        <p:nvSpPr>
           <p:cNvPr id="10" name="Title 9">
             <a:extLst>
               <a:ext uri="{FF2B5EF4-FFF2-40B4-BE49-F238E27FC236}">
@@ -10456,10 +10395,6 @@
           </p:nvPr>
         </p:nvSpPr>
         <p:spPr>
-          <a:xfrm>
-            <a:off x="1168708" y="675829"/>
-            <a:ext cx="9616202" cy="500289"/>
-          </a:xfrm>
           <a:prstGeom prst="rect">
             <a:avLst/>
           </a:prstGeom>
@@ -10469,20 +10404,12 @@
           <a:lstStyle/>
           <a:p>
             <a:r>
-              <a:rPr lang="en-US" b="1" dirty="0">
+              <a:rPr lang="en-US" b="1" smtClean="0">
                 <a:solidFill>
                   <a:srgbClr val="8E1731"/>
                 </a:solidFill>
               </a:rPr>
-              <a:t>What </a:t>
-            </a:r>
-            <a:r>
-              <a:rPr lang="en-US" b="1" dirty="0" smtClean="0">
-                <a:solidFill>
-                  <a:srgbClr val="8E1731"/>
-                </a:solidFill>
-              </a:rPr>
-              <a:t>improvements can we make?</a:t>
+              <a:t>Step 2: effective visuals</a:t>
             </a:r>
             <a:endParaRPr lang="en-US" b="1" dirty="0">
               <a:solidFill>
@@ -10535,115 +10462,10 @@
           </a:p>
         </p:txBody>
       </p:sp>
-      <p:sp>
-        <p:nvSpPr>
-          <p:cNvPr id="8" name="Rectangle 7"/>
-          <p:cNvSpPr/>
-          <p:nvPr/>
-        </p:nvSpPr>
-        <p:spPr>
-          <a:xfrm>
-            <a:off x="7742867" y="2031585"/>
-            <a:ext cx="3977186" cy="3046988"/>
-          </a:xfrm>
-          <a:prstGeom prst="rect">
-            <a:avLst/>
-          </a:prstGeom>
-        </p:spPr>
-        <p:txBody>
-          <a:bodyPr wrap="square">
-            <a:spAutoFit/>
-          </a:bodyPr>
-          <a:lstStyle/>
-          <a:p>
-            <a:pPr marL="742950" lvl="1" indent="-285750">
-              <a:buFont typeface="Arial" panose="020B0604020202020204" pitchFamily="34" charset="0"/>
-              <a:buChar char="•"/>
-            </a:pPr>
-            <a:r>
-              <a:rPr lang="en-US" sz="2400" dirty="0" smtClean="0"/>
-              <a:t>Increased data density with colors</a:t>
-            </a:r>
-          </a:p>
-          <a:p>
-            <a:pPr marL="742950" lvl="1" indent="-285750">
-              <a:buFont typeface="Arial" panose="020B0604020202020204" pitchFamily="34" charset="0"/>
-              <a:buChar char="•"/>
-            </a:pPr>
-            <a:r>
-              <a:rPr lang="en-US" sz="2400" dirty="0" smtClean="0"/>
-              <a:t>No optical illusions</a:t>
-            </a:r>
-          </a:p>
-          <a:p>
-            <a:pPr marL="742950" lvl="1" indent="-285750">
-              <a:buFont typeface="Arial" panose="020B0604020202020204" pitchFamily="34" charset="0"/>
-              <a:buChar char="•"/>
-            </a:pPr>
-            <a:r>
-              <a:rPr lang="en-US" sz="2400" dirty="0" smtClean="0"/>
-              <a:t>Color contrasts</a:t>
-            </a:r>
-            <a:endParaRPr lang="en-US" sz="2400" dirty="0"/>
-          </a:p>
-          <a:p>
-            <a:pPr marL="742950" lvl="1" indent="-285750">
-              <a:buFont typeface="Arial" panose="020B0604020202020204" pitchFamily="34" charset="0"/>
-              <a:buChar char="•"/>
-            </a:pPr>
-            <a:r>
-              <a:rPr lang="en-US" sz="2400" dirty="0" smtClean="0"/>
-              <a:t>Removed grid lines</a:t>
-            </a:r>
-          </a:p>
-          <a:p>
-            <a:pPr marL="742950" lvl="1" indent="-285750">
-              <a:buFont typeface="Arial" panose="020B0604020202020204" pitchFamily="34" charset="0"/>
-              <a:buChar char="•"/>
-            </a:pPr>
-            <a:r>
-              <a:rPr lang="en-US" sz="2400" dirty="0" smtClean="0"/>
-              <a:t>Increased font size for readability</a:t>
-            </a:r>
-            <a:endParaRPr lang="en-US" sz="2400" dirty="0"/>
-          </a:p>
-          <a:p>
-            <a:pPr marL="742950" lvl="1" indent="-285750">
-              <a:buFont typeface="Arial" panose="020B0604020202020204" pitchFamily="34" charset="0"/>
-              <a:buChar char="•"/>
-            </a:pPr>
-            <a:endParaRPr lang="en-US" sz="2400" b="1" dirty="0"/>
-          </a:p>
-        </p:txBody>
-      </p:sp>
-      <p:pic>
-        <p:nvPicPr>
-          <p:cNvPr id="9" name="Picture 8"/>
-          <p:cNvPicPr>
-            <a:picLocks noChangeAspect="1"/>
-          </p:cNvPicPr>
-          <p:nvPr/>
-        </p:nvPicPr>
-        <p:blipFill>
-          <a:blip r:embed="rId2"/>
-          <a:stretch>
-            <a:fillRect/>
-          </a:stretch>
-        </p:blipFill>
-        <p:spPr>
-          <a:xfrm>
-            <a:off x="1001038" y="2137857"/>
-            <a:ext cx="6057143" cy="3895238"/>
-          </a:xfrm>
-          <a:prstGeom prst="rect">
-            <a:avLst/>
-          </a:prstGeom>
-        </p:spPr>
-      </p:pic>
     </p:spTree>
     <p:extLst>
       <p:ext uri="{BB962C8B-B14F-4D97-AF65-F5344CB8AC3E}">
-        <p14:creationId xmlns:p14="http://schemas.microsoft.com/office/powerpoint/2010/main" val="1502662390"/>
+        <p14:creationId xmlns:p14="http://schemas.microsoft.com/office/powerpoint/2010/main" val="4196235552"/>
       </p:ext>
     </p:extLst>
   </p:cSld>
@@ -10672,6 +10494,29 @@
       </p:grpSpPr>
       <p:sp>
         <p:nvSpPr>
+          <p:cNvPr id="4" name="Content Placeholder 3"/>
+          <p:cNvSpPr>
+            <a:spLocks noGrp="1"/>
+          </p:cNvSpPr>
+          <p:nvPr>
+            <p:ph idx="10"/>
+          </p:nvPr>
+        </p:nvSpPr>
+        <p:spPr/>
+        <p:txBody>
+          <a:bodyPr/>
+          <a:lstStyle/>
+          <a:p>
+            <a:r>
+              <a:rPr lang="en-US" dirty="0" smtClean="0"/>
+              <a:t>Data/ink ratio and data density</a:t>
+            </a:r>
+            <a:endParaRPr lang="en-US" dirty="0"/>
+          </a:p>
+        </p:txBody>
+      </p:sp>
+      <p:sp>
+        <p:nvSpPr>
           <p:cNvPr id="10" name="Title 9">
             <a:extLst>
               <a:ext uri="{FF2B5EF4-FFF2-40B4-BE49-F238E27FC236}">
@@ -10687,10 +10532,6 @@
           </p:nvPr>
         </p:nvSpPr>
         <p:spPr>
-          <a:xfrm>
-            <a:off x="1168708" y="675829"/>
-            <a:ext cx="9616202" cy="500289"/>
-          </a:xfrm>
           <a:prstGeom prst="rect">
             <a:avLst/>
           </a:prstGeom>
@@ -10700,20 +10541,12 @@
           <a:lstStyle/>
           <a:p>
             <a:r>
-              <a:rPr lang="en-US" b="1" dirty="0">
+              <a:rPr lang="en-US" b="1" smtClean="0">
                 <a:solidFill>
                   <a:srgbClr val="8E1731"/>
                 </a:solidFill>
               </a:rPr>
-              <a:t>What </a:t>
-            </a:r>
-            <a:r>
-              <a:rPr lang="en-US" b="1" dirty="0" smtClean="0">
-                <a:solidFill>
-                  <a:srgbClr val="8E1731"/>
-                </a:solidFill>
-              </a:rPr>
-              <a:t>else could we improve?</a:t>
+              <a:t>Step 2: effective visuals</a:t>
             </a:r>
             <a:endParaRPr lang="en-US" b="1" dirty="0">
               <a:solidFill>
@@ -10766,108 +10599,10 @@
           </a:p>
         </p:txBody>
       </p:sp>
-      <p:sp>
-        <p:nvSpPr>
-          <p:cNvPr id="8" name="Rectangle 7"/>
-          <p:cNvSpPr/>
-          <p:nvPr/>
-        </p:nvSpPr>
-        <p:spPr>
-          <a:xfrm>
-            <a:off x="7058181" y="1176118"/>
-            <a:ext cx="4011376" cy="4893647"/>
-          </a:xfrm>
-          <a:prstGeom prst="rect">
-            <a:avLst/>
-          </a:prstGeom>
-        </p:spPr>
-        <p:txBody>
-          <a:bodyPr wrap="square">
-            <a:spAutoFit/>
-          </a:bodyPr>
-          <a:lstStyle/>
-          <a:p>
-            <a:pPr marL="742950" lvl="1" indent="-285750">
-              <a:buFont typeface="Arial" panose="020B0604020202020204" pitchFamily="34" charset="0"/>
-              <a:buChar char="•"/>
-            </a:pPr>
-            <a:r>
-              <a:rPr lang="en-US" sz="2400" dirty="0" smtClean="0"/>
-              <a:t>Test or change color to grayscale</a:t>
-            </a:r>
-          </a:p>
-          <a:p>
-            <a:pPr marL="742950" lvl="1" indent="-285750">
-              <a:buFont typeface="Arial" panose="020B0604020202020204" pitchFamily="34" charset="0"/>
-              <a:buChar char="•"/>
-            </a:pPr>
-            <a:r>
-              <a:rPr lang="en-US" sz="2400" dirty="0" smtClean="0"/>
-              <a:t>Increase legend size</a:t>
-            </a:r>
-          </a:p>
-          <a:p>
-            <a:pPr marL="742950" lvl="1" indent="-285750">
-              <a:buFont typeface="Arial" panose="020B0604020202020204" pitchFamily="34" charset="0"/>
-              <a:buChar char="•"/>
-            </a:pPr>
-            <a:r>
-              <a:rPr lang="en-US" sz="2400" dirty="0" smtClean="0"/>
-              <a:t>What is clarity?  Is it ordered?</a:t>
-            </a:r>
-          </a:p>
-          <a:p>
-            <a:pPr marL="742950" lvl="1" indent="-285750">
-              <a:buFont typeface="Arial" panose="020B0604020202020204" pitchFamily="34" charset="0"/>
-              <a:buChar char="•"/>
-            </a:pPr>
-            <a:r>
-              <a:rPr lang="en-US" sz="2400" dirty="0" smtClean="0"/>
-              <a:t>For a presentation, rotate y-axis label to horizontal</a:t>
-            </a:r>
-            <a:endParaRPr lang="en-US" sz="2400" dirty="0"/>
-          </a:p>
-          <a:p>
-            <a:pPr marL="742950" lvl="1" indent="-285750">
-              <a:buFont typeface="Arial" panose="020B0604020202020204" pitchFamily="34" charset="0"/>
-              <a:buChar char="•"/>
-            </a:pPr>
-            <a:r>
-              <a:rPr lang="en-US" sz="2400" dirty="0" smtClean="0"/>
-              <a:t>Add commas (or periods in Europe) to large numbers if domain- or journal-specific allows</a:t>
-            </a:r>
-            <a:endParaRPr lang="en-US" sz="2400" dirty="0"/>
-          </a:p>
-        </p:txBody>
-      </p:sp>
-      <p:pic>
-        <p:nvPicPr>
-          <p:cNvPr id="9" name="Picture 8"/>
-          <p:cNvPicPr>
-            <a:picLocks noChangeAspect="1"/>
-          </p:cNvPicPr>
-          <p:nvPr/>
-        </p:nvPicPr>
-        <p:blipFill>
-          <a:blip r:embed="rId2"/>
-          <a:stretch>
-            <a:fillRect/>
-          </a:stretch>
-        </p:blipFill>
-        <p:spPr>
-          <a:xfrm>
-            <a:off x="1001038" y="2137857"/>
-            <a:ext cx="6057143" cy="3895238"/>
-          </a:xfrm>
-          <a:prstGeom prst="rect">
-            <a:avLst/>
-          </a:prstGeom>
-        </p:spPr>
-      </p:pic>
     </p:spTree>
     <p:extLst>
       <p:ext uri="{BB962C8B-B14F-4D97-AF65-F5344CB8AC3E}">
-        <p14:creationId xmlns:p14="http://schemas.microsoft.com/office/powerpoint/2010/main" val="310885816"/>
+        <p14:creationId xmlns:p14="http://schemas.microsoft.com/office/powerpoint/2010/main" val="3520467149"/>
       </p:ext>
     </p:extLst>
   </p:cSld>
@@ -10896,7 +10631,13 @@
       </p:grpSpPr>
       <p:sp>
         <p:nvSpPr>
-          <p:cNvPr id="2" name="Title 1"/>
+          <p:cNvPr id="10" name="Title 9">
+            <a:extLst>
+              <a:ext uri="{FF2B5EF4-FFF2-40B4-BE49-F238E27FC236}">
+                <a16:creationId xmlns:a16="http://schemas.microsoft.com/office/drawing/2014/main" id="{FFFB4824-2F2C-0B4E-8B65-C35C93FB68FF}"/>
+              </a:ext>
+            </a:extLst>
+          </p:cNvPr>
           <p:cNvSpPr>
             <a:spLocks noGrp="1"/>
           </p:cNvSpPr>
@@ -10907,8 +10648,11 @@
         <p:spPr>
           <a:xfrm>
             <a:off x="1168708" y="675829"/>
-            <a:ext cx="10229977" cy="500289"/>
-          </a:xfrm>
+            <a:ext cx="9616202" cy="500289"/>
+          </a:xfrm>
+          <a:prstGeom prst="rect">
+            <a:avLst/>
+          </a:prstGeom>
         </p:spPr>
         <p:txBody>
           <a:bodyPr/>
@@ -10920,23 +10664,57 @@
                   <a:srgbClr val="8E1731"/>
                 </a:solidFill>
               </a:rPr>
-              <a:t>What is </a:t>
-            </a:r>
-            <a:r>
-              <a:rPr lang="en-US" b="1" dirty="0" smtClean="0">
-                <a:solidFill>
-                  <a:srgbClr val="8E1731"/>
-                </a:solidFill>
-              </a:rPr>
-              <a:t>clear or misleading about this?</a:t>
-            </a:r>
+              <a:t>What is effective about this?  What is not?</a:t>
+            </a:r>
+          </a:p>
+        </p:txBody>
+      </p:sp>
+      <p:sp>
+        <p:nvSpPr>
+          <p:cNvPr id="6" name="Title 1"/>
+          <p:cNvSpPr txBox="1">
+            <a:spLocks/>
+          </p:cNvSpPr>
+          <p:nvPr/>
+        </p:nvSpPr>
+        <p:spPr>
+          <a:xfrm>
+            <a:off x="838200" y="365125"/>
+            <a:ext cx="10515600" cy="1325563"/>
+          </a:xfrm>
+          <a:prstGeom prst="rect">
+            <a:avLst/>
+          </a:prstGeom>
+        </p:spPr>
+        <p:txBody>
+          <a:bodyPr/>
+          <a:lstStyle>
+            <a:lvl1pPr algn="l" defTabSz="914400" rtl="0" eaLnBrk="1" latinLnBrk="0" hangingPunct="1">
+              <a:lnSpc>
+                <a:spcPct val="90000"/>
+              </a:lnSpc>
+              <a:spcBef>
+                <a:spcPct val="0"/>
+              </a:spcBef>
+              <a:buNone/>
+              <a:defRPr sz="3600" kern="1200">
+                <a:solidFill>
+                  <a:schemeClr val="tx1"/>
+                </a:solidFill>
+                <a:latin typeface="+mj-lt"/>
+                <a:ea typeface="+mj-ea"/>
+                <a:cs typeface="+mj-cs"/>
+              </a:defRPr>
+            </a:lvl1pPr>
+          </a:lstStyle>
+          <a:p>
             <a:endParaRPr lang="en-US" dirty="0"/>
           </a:p>
         </p:txBody>
       </p:sp>
       <p:pic>
         <p:nvPicPr>
-          <p:cNvPr id="3" name="Picture 2"/>
+          <p:cNvPr id="7" name="Picture 6"/>
           <p:cNvPicPr>
             <a:picLocks noChangeAspect="1"/>
           </p:cNvPicPr>
@@ -10950,7 +10728,7 @@
         </p:blipFill>
         <p:spPr>
           <a:xfrm>
-            <a:off x="1147188" y="2221214"/>
+            <a:off x="1379944" y="2104836"/>
             <a:ext cx="6057143" cy="3895238"/>
           </a:xfrm>
           <a:prstGeom prst="rect">
@@ -10961,7 +10739,7 @@
     </p:spTree>
     <p:extLst>
       <p:ext uri="{BB962C8B-B14F-4D97-AF65-F5344CB8AC3E}">
-        <p14:creationId xmlns:p14="http://schemas.microsoft.com/office/powerpoint/2010/main" val="3712317676"/>
+        <p14:creationId xmlns:p14="http://schemas.microsoft.com/office/powerpoint/2010/main" val="41676820"/>
       </p:ext>
     </p:extLst>
   </p:cSld>
@@ -10990,7 +10768,13 @@
       </p:grpSpPr>
       <p:sp>
         <p:nvSpPr>
-          <p:cNvPr id="2" name="Title 1"/>
+          <p:cNvPr id="10" name="Title 9">
+            <a:extLst>
+              <a:ext uri="{FF2B5EF4-FFF2-40B4-BE49-F238E27FC236}">
+                <a16:creationId xmlns:a16="http://schemas.microsoft.com/office/drawing/2014/main" id="{FFFB4824-2F2C-0B4E-8B65-C35C93FB68FF}"/>
+              </a:ext>
+            </a:extLst>
+          </p:cNvPr>
           <p:cNvSpPr>
             <a:spLocks noGrp="1"/>
           </p:cNvSpPr>
@@ -11001,8 +10785,11 @@
         <p:spPr>
           <a:xfrm>
             <a:off x="1168708" y="675829"/>
-            <a:ext cx="10229977" cy="500289"/>
-          </a:xfrm>
+            <a:ext cx="9616202" cy="500289"/>
+          </a:xfrm>
+          <a:prstGeom prst="rect">
+            <a:avLst/>
+          </a:prstGeom>
         </p:spPr>
         <p:txBody>
           <a:bodyPr/>
@@ -11014,23 +10801,57 @@
                   <a:srgbClr val="8E1731"/>
                 </a:solidFill>
               </a:rPr>
-              <a:t>What is </a:t>
-            </a:r>
-            <a:r>
-              <a:rPr lang="en-US" b="1" dirty="0" smtClean="0">
-                <a:solidFill>
-                  <a:srgbClr val="8E1731"/>
-                </a:solidFill>
-              </a:rPr>
-              <a:t>clear or misleading about this?</a:t>
-            </a:r>
+              <a:t>What is effective about this?  What is not?</a:t>
+            </a:r>
+          </a:p>
+        </p:txBody>
+      </p:sp>
+      <p:sp>
+        <p:nvSpPr>
+          <p:cNvPr id="6" name="Title 1"/>
+          <p:cNvSpPr txBox="1">
+            <a:spLocks/>
+          </p:cNvSpPr>
+          <p:nvPr/>
+        </p:nvSpPr>
+        <p:spPr>
+          <a:xfrm>
+            <a:off x="838200" y="365125"/>
+            <a:ext cx="10515600" cy="1325563"/>
+          </a:xfrm>
+          <a:prstGeom prst="rect">
+            <a:avLst/>
+          </a:prstGeom>
+        </p:spPr>
+        <p:txBody>
+          <a:bodyPr/>
+          <a:lstStyle>
+            <a:lvl1pPr algn="l" defTabSz="914400" rtl="0" eaLnBrk="1" latinLnBrk="0" hangingPunct="1">
+              <a:lnSpc>
+                <a:spcPct val="90000"/>
+              </a:lnSpc>
+              <a:spcBef>
+                <a:spcPct val="0"/>
+              </a:spcBef>
+              <a:buNone/>
+              <a:defRPr sz="3600" kern="1200">
+                <a:solidFill>
+                  <a:schemeClr val="tx1"/>
+                </a:solidFill>
+                <a:latin typeface="+mj-lt"/>
+                <a:ea typeface="+mj-ea"/>
+                <a:cs typeface="+mj-cs"/>
+              </a:defRPr>
+            </a:lvl1pPr>
+          </a:lstStyle>
+          <a:p>
             <a:endParaRPr lang="en-US" dirty="0"/>
           </a:p>
         </p:txBody>
       </p:sp>
       <p:pic>
         <p:nvPicPr>
-          <p:cNvPr id="3" name="Picture 2"/>
+          <p:cNvPr id="7" name="Picture 6"/>
           <p:cNvPicPr>
             <a:picLocks noChangeAspect="1"/>
           </p:cNvPicPr>
@@ -11044,7 +10865,7 @@
         </p:blipFill>
         <p:spPr>
           <a:xfrm>
-            <a:off x="1147188" y="2221214"/>
+            <a:off x="1379944" y="2104836"/>
             <a:ext cx="6057143" cy="3895238"/>
           </a:xfrm>
           <a:prstGeom prst="rect">
@@ -11054,14 +10875,14 @@
       </p:pic>
       <p:sp>
         <p:nvSpPr>
-          <p:cNvPr id="4" name="Rectangle 3"/>
+          <p:cNvPr id="5" name="Rectangle 4"/>
           <p:cNvSpPr/>
           <p:nvPr/>
         </p:nvSpPr>
         <p:spPr>
           <a:xfrm>
-            <a:off x="7407057" y="1860766"/>
-            <a:ext cx="4129414" cy="3416320"/>
+            <a:off x="7752970" y="1790297"/>
+            <a:ext cx="4439030" cy="3139321"/>
           </a:xfrm>
           <a:prstGeom prst="rect">
             <a:avLst/>
@@ -11074,76 +10895,88 @@
           <a:lstStyle/>
           <a:p>
             <a:r>
-              <a:rPr lang="en-US" dirty="0"/>
-              <a:t>Clear</a:t>
-            </a:r>
-          </a:p>
-          <a:p>
-            <a:pPr marL="285750" indent="-285750">
+              <a:rPr lang="en-US" dirty="0" smtClean="0"/>
+              <a:t>Effective</a:t>
+            </a:r>
+          </a:p>
+          <a:p>
+            <a:pPr marL="742950" lvl="1" indent="-285750">
               <a:buFont typeface="Arial" panose="020B0604020202020204" pitchFamily="34" charset="0"/>
               <a:buChar char="•"/>
             </a:pPr>
             <a:r>
-              <a:rPr lang="en-US" dirty="0"/>
-              <a:t>Chart design consistent throughout</a:t>
-            </a:r>
-          </a:p>
-          <a:p>
-            <a:pPr marL="285750" indent="-285750">
+              <a:rPr lang="en-US" dirty="0" smtClean="0"/>
+              <a:t>No </a:t>
+            </a:r>
+            <a:r>
+              <a:rPr lang="en-US" dirty="0" smtClean="0"/>
+              <a:t>related items needing connected</a:t>
+            </a:r>
+            <a:endParaRPr lang="en-US" dirty="0" smtClean="0"/>
+          </a:p>
+          <a:p>
+            <a:r>
+              <a:rPr lang="en-US" dirty="0" smtClean="0"/>
+              <a:t>Not effective</a:t>
+            </a:r>
+          </a:p>
+          <a:p>
+            <a:pPr marL="742950" lvl="1" indent="-285750">
               <a:buFont typeface="Arial" panose="020B0604020202020204" pitchFamily="34" charset="0"/>
               <a:buChar char="•"/>
             </a:pPr>
             <a:r>
-              <a:rPr lang="en-US" dirty="0"/>
-              <a:t>Units appropriate</a:t>
-            </a:r>
-          </a:p>
-          <a:p>
-            <a:endParaRPr lang="en-US" dirty="0"/>
-          </a:p>
-          <a:p>
-            <a:r>
               <a:rPr lang="en-US" dirty="0" smtClean="0"/>
-              <a:t>Potentially misleading</a:t>
-            </a:r>
-            <a:endParaRPr lang="en-US" dirty="0"/>
-          </a:p>
-          <a:p>
-            <a:pPr marL="285750" indent="-285750">
+              <a:t>Extraneous grid lines</a:t>
+            </a:r>
+          </a:p>
+          <a:p>
+            <a:pPr marL="742950" lvl="1" indent="-285750">
               <a:buFont typeface="Arial" panose="020B0604020202020204" pitchFamily="34" charset="0"/>
               <a:buChar char="•"/>
             </a:pPr>
             <a:r>
-              <a:rPr lang="en-US" dirty="0"/>
-              <a:t>Symbols and axes proportional to numbers represented (problem with pie charts, area in general)</a:t>
-            </a:r>
-          </a:p>
-          <a:p>
-            <a:pPr marL="285750" indent="-285750">
+              <a:rPr lang="en-US" dirty="0" smtClean="0"/>
+              <a:t>Unnecessary color</a:t>
+            </a:r>
+          </a:p>
+          <a:p>
+            <a:pPr marL="742950" lvl="1" indent="-285750">
               <a:buFont typeface="Arial" panose="020B0604020202020204" pitchFamily="34" charset="0"/>
               <a:buChar char="•"/>
             </a:pPr>
             <a:r>
-              <a:rPr lang="en-US" dirty="0"/>
-              <a:t>Lack of context: did not show all relevant data</a:t>
-            </a:r>
-          </a:p>
-          <a:p>
-            <a:pPr marL="285750" indent="-285750">
+              <a:rPr lang="en-US" dirty="0" smtClean="0"/>
+              <a:t>Low contrast between shades of blue</a:t>
+            </a:r>
+          </a:p>
+          <a:p>
+            <a:pPr marL="742950" lvl="1" indent="-285750">
               <a:buFont typeface="Arial" panose="020B0604020202020204" pitchFamily="34" charset="0"/>
               <a:buChar char="•"/>
             </a:pPr>
             <a:r>
+              <a:rPr lang="en-US" dirty="0" smtClean="0"/>
+              <a:t>Font </a:t>
+            </a:r>
+            <a:r>
               <a:rPr lang="en-US" dirty="0"/>
-              <a:t>Clear labels (minimize abbreviations)	</a:t>
-            </a:r>
+              <a:t>sizes (presentations vs manuscripts)</a:t>
+            </a:r>
+          </a:p>
+          <a:p>
+            <a:pPr marL="742950" lvl="1" indent="-285750">
+              <a:buFont typeface="Arial" panose="020B0604020202020204" pitchFamily="34" charset="0"/>
+              <a:buChar char="•"/>
+            </a:pPr>
+            <a:endParaRPr lang="en-US" b="1" dirty="0"/>
           </a:p>
         </p:txBody>
       </p:sp>
     </p:spTree>
     <p:extLst>
       <p:ext uri="{BB962C8B-B14F-4D97-AF65-F5344CB8AC3E}">
-        <p14:creationId xmlns:p14="http://schemas.microsoft.com/office/powerpoint/2010/main" val="2671584075"/>
+        <p14:creationId xmlns:p14="http://schemas.microsoft.com/office/powerpoint/2010/main" val="3841075137"/>
       </p:ext>
     </p:extLst>
   </p:cSld>
@@ -11172,7 +11005,13 @@
       </p:grpSpPr>
       <p:sp>
         <p:nvSpPr>
-          <p:cNvPr id="2" name="Title 1"/>
+          <p:cNvPr id="10" name="Title 9">
+            <a:extLst>
+              <a:ext uri="{FF2B5EF4-FFF2-40B4-BE49-F238E27FC236}">
+                <a16:creationId xmlns:a16="http://schemas.microsoft.com/office/drawing/2014/main" id="{FFFB4824-2F2C-0B4E-8B65-C35C93FB68FF}"/>
+              </a:ext>
+            </a:extLst>
+          </p:cNvPr>
           <p:cNvSpPr>
             <a:spLocks noGrp="1"/>
           </p:cNvSpPr>
@@ -11183,28 +11022,165 @@
         <p:spPr>
           <a:xfrm>
             <a:off x="1168708" y="675829"/>
-            <a:ext cx="10229977" cy="500289"/>
-          </a:xfrm>
+            <a:ext cx="9616202" cy="500289"/>
+          </a:xfrm>
+          <a:prstGeom prst="rect">
+            <a:avLst/>
+          </a:prstGeom>
         </p:spPr>
         <p:txBody>
           <a:bodyPr/>
           <a:lstStyle/>
           <a:p>
             <a:r>
+              <a:rPr lang="en-US" b="1" dirty="0">
+                <a:solidFill>
+                  <a:srgbClr val="8E1731"/>
+                </a:solidFill>
+              </a:rPr>
+              <a:t>What </a:t>
+            </a:r>
+            <a:r>
               <a:rPr lang="en-US" b="1" dirty="0" smtClean="0">
                 <a:solidFill>
                   <a:srgbClr val="8E1731"/>
                 </a:solidFill>
               </a:rPr>
-              <a:t>What improvements can we make?</a:t>
-            </a:r>
+              <a:t>improvements can we make?</a:t>
+            </a:r>
+            <a:endParaRPr lang="en-US" b="1" dirty="0">
+              <a:solidFill>
+                <a:srgbClr val="8E1731"/>
+              </a:solidFill>
+            </a:endParaRPr>
+          </a:p>
+        </p:txBody>
+      </p:sp>
+      <p:sp>
+        <p:nvSpPr>
+          <p:cNvPr id="6" name="Title 1"/>
+          <p:cNvSpPr txBox="1">
+            <a:spLocks/>
+          </p:cNvSpPr>
+          <p:nvPr/>
+        </p:nvSpPr>
+        <p:spPr>
+          <a:xfrm>
+            <a:off x="838200" y="365125"/>
+            <a:ext cx="10515600" cy="1325563"/>
+          </a:xfrm>
+          <a:prstGeom prst="rect">
+            <a:avLst/>
+          </a:prstGeom>
+        </p:spPr>
+        <p:txBody>
+          <a:bodyPr/>
+          <a:lstStyle>
+            <a:lvl1pPr algn="l" defTabSz="914400" rtl="0" eaLnBrk="1" latinLnBrk="0" hangingPunct="1">
+              <a:lnSpc>
+                <a:spcPct val="90000"/>
+              </a:lnSpc>
+              <a:spcBef>
+                <a:spcPct val="0"/>
+              </a:spcBef>
+              <a:buNone/>
+              <a:defRPr sz="3600" kern="1200">
+                <a:solidFill>
+                  <a:schemeClr val="tx1"/>
+                </a:solidFill>
+                <a:latin typeface="+mj-lt"/>
+                <a:ea typeface="+mj-ea"/>
+                <a:cs typeface="+mj-cs"/>
+              </a:defRPr>
+            </a:lvl1pPr>
+          </a:lstStyle>
+          <a:p>
             <a:endParaRPr lang="en-US" dirty="0"/>
+          </a:p>
+        </p:txBody>
+      </p:sp>
+      <p:sp>
+        <p:nvSpPr>
+          <p:cNvPr id="8" name="Rectangle 7"/>
+          <p:cNvSpPr/>
+          <p:nvPr/>
+        </p:nvSpPr>
+        <p:spPr>
+          <a:xfrm>
+            <a:off x="7742867" y="2031585"/>
+            <a:ext cx="3977186" cy="2677656"/>
+          </a:xfrm>
+          <a:prstGeom prst="rect">
+            <a:avLst/>
+          </a:prstGeom>
+        </p:spPr>
+        <p:txBody>
+          <a:bodyPr wrap="square">
+            <a:spAutoFit/>
+          </a:bodyPr>
+          <a:lstStyle/>
+          <a:p>
+            <a:pPr marL="742950" lvl="1" indent="-285750">
+              <a:buFont typeface="Arial" panose="020B0604020202020204" pitchFamily="34" charset="0"/>
+              <a:buChar char="•"/>
+            </a:pPr>
+            <a:r>
+              <a:rPr lang="en-US" sz="2400" dirty="0" smtClean="0"/>
+              <a:t>Increased data density with </a:t>
+            </a:r>
+            <a:r>
+              <a:rPr lang="en-US" sz="2400" dirty="0" smtClean="0"/>
+              <a:t>colors</a:t>
+            </a:r>
+          </a:p>
+          <a:p>
+            <a:pPr marL="742950" lvl="1" indent="-285750">
+              <a:buFont typeface="Arial" panose="020B0604020202020204" pitchFamily="34" charset="0"/>
+              <a:buChar char="•"/>
+            </a:pPr>
+            <a:r>
+              <a:rPr lang="en-US" sz="2400" dirty="0" smtClean="0"/>
+              <a:t>Color </a:t>
+            </a:r>
+            <a:r>
+              <a:rPr lang="en-US" sz="2400" dirty="0" smtClean="0"/>
+              <a:t>contrasts</a:t>
+            </a:r>
+            <a:endParaRPr lang="en-US" sz="2400" dirty="0"/>
+          </a:p>
+          <a:p>
+            <a:pPr marL="742950" lvl="1" indent="-285750">
+              <a:buFont typeface="Arial" panose="020B0604020202020204" pitchFamily="34" charset="0"/>
+              <a:buChar char="•"/>
+            </a:pPr>
+            <a:r>
+              <a:rPr lang="en-US" sz="2400" dirty="0" smtClean="0"/>
+              <a:t>Removed grid lines</a:t>
+            </a:r>
+          </a:p>
+          <a:p>
+            <a:pPr marL="742950" lvl="1" indent="-285750">
+              <a:buFont typeface="Arial" panose="020B0604020202020204" pitchFamily="34" charset="0"/>
+              <a:buChar char="•"/>
+            </a:pPr>
+            <a:r>
+              <a:rPr lang="en-US" sz="2400" dirty="0" smtClean="0"/>
+              <a:t>Increased font size for readability</a:t>
+            </a:r>
+            <a:endParaRPr lang="en-US" sz="2400" dirty="0"/>
+          </a:p>
+          <a:p>
+            <a:pPr marL="742950" lvl="1" indent="-285750">
+              <a:buFont typeface="Arial" panose="020B0604020202020204" pitchFamily="34" charset="0"/>
+              <a:buChar char="•"/>
+            </a:pPr>
+            <a:endParaRPr lang="en-US" sz="2400" b="1" dirty="0"/>
           </a:p>
         </p:txBody>
       </p:sp>
       <p:pic>
         <p:nvPicPr>
-          <p:cNvPr id="6" name="Picture 5"/>
+          <p:cNvPr id="9" name="Picture 8"/>
           <p:cNvPicPr>
             <a:picLocks noChangeAspect="1"/>
           </p:cNvPicPr>
@@ -11218,86 +11194,18 @@
         </p:blipFill>
         <p:spPr>
           <a:xfrm>
-            <a:off x="1007416" y="2081149"/>
-            <a:ext cx="6047619" cy="3895238"/>
+            <a:off x="1001038" y="2137857"/>
+            <a:ext cx="6057143" cy="3895238"/>
           </a:xfrm>
           <a:prstGeom prst="rect">
             <a:avLst/>
           </a:prstGeom>
         </p:spPr>
       </p:pic>
-      <p:sp>
-        <p:nvSpPr>
-          <p:cNvPr id="7" name="Rectangle 6"/>
-          <p:cNvSpPr/>
-          <p:nvPr/>
-        </p:nvSpPr>
-        <p:spPr>
-          <a:xfrm>
-            <a:off x="7407057" y="2490031"/>
-            <a:ext cx="4129414" cy="1938992"/>
-          </a:xfrm>
-          <a:prstGeom prst="rect">
-            <a:avLst/>
-          </a:prstGeom>
-        </p:spPr>
-        <p:txBody>
-          <a:bodyPr wrap="square">
-            <a:spAutoFit/>
-          </a:bodyPr>
-          <a:lstStyle/>
-          <a:p>
-            <a:pPr marL="285750" indent="-285750">
-              <a:buFont typeface="Arial" panose="020B0604020202020204" pitchFamily="34" charset="0"/>
-              <a:buChar char="•"/>
-            </a:pPr>
-            <a:r>
-              <a:rPr lang="en-US" sz="2400" dirty="0" smtClean="0"/>
-              <a:t>Removed </a:t>
-            </a:r>
-            <a:r>
-              <a:rPr lang="en-US" sz="2400" dirty="0"/>
-              <a:t>area-cut relationship</a:t>
-            </a:r>
-          </a:p>
-          <a:p>
-            <a:pPr marL="285750" indent="-285750">
-              <a:buFont typeface="Arial" panose="020B0604020202020204" pitchFamily="34" charset="0"/>
-              <a:buChar char="•"/>
-            </a:pPr>
-            <a:r>
-              <a:rPr lang="en-US" sz="2400" dirty="0" smtClean="0"/>
-              <a:t>Show full range of data</a:t>
-            </a:r>
-          </a:p>
-          <a:p>
-            <a:pPr marL="285750" indent="-285750">
-              <a:buFont typeface="Arial" panose="020B0604020202020204" pitchFamily="34" charset="0"/>
-              <a:buChar char="•"/>
-            </a:pPr>
-            <a:r>
-              <a:rPr lang="en-US" sz="2400" dirty="0" smtClean="0"/>
-              <a:t>Units for y-axis</a:t>
-            </a:r>
-            <a:endParaRPr lang="en-US" sz="2400" dirty="0"/>
-          </a:p>
-          <a:p>
-            <a:pPr marL="285750" indent="-285750">
-              <a:buFont typeface="Arial" panose="020B0604020202020204" pitchFamily="34" charset="0"/>
-              <a:buChar char="•"/>
-            </a:pPr>
-            <a:r>
-              <a:rPr lang="en-US" sz="2400" dirty="0" smtClean="0"/>
-              <a:t>Labels not abbreviated</a:t>
-            </a:r>
-            <a:endParaRPr lang="en-US" sz="2400" dirty="0"/>
-          </a:p>
-        </p:txBody>
-      </p:sp>
     </p:spTree>
     <p:extLst>
       <p:ext uri="{BB962C8B-B14F-4D97-AF65-F5344CB8AC3E}">
-        <p14:creationId xmlns:p14="http://schemas.microsoft.com/office/powerpoint/2010/main" val="1203345857"/>
+        <p14:creationId xmlns:p14="http://schemas.microsoft.com/office/powerpoint/2010/main" val="1502662390"/>
       </p:ext>
     </p:extLst>
   </p:cSld>
@@ -11326,7 +11234,13 @@
       </p:grpSpPr>
       <p:sp>
         <p:nvSpPr>
-          <p:cNvPr id="2" name="Title 1"/>
+          <p:cNvPr id="10" name="Title 9">
+            <a:extLst>
+              <a:ext uri="{FF2B5EF4-FFF2-40B4-BE49-F238E27FC236}">
+                <a16:creationId xmlns:a16="http://schemas.microsoft.com/office/drawing/2014/main" id="{FFFB4824-2F2C-0B4E-8B65-C35C93FB68FF}"/>
+              </a:ext>
+            </a:extLst>
+          </p:cNvPr>
           <p:cNvSpPr>
             <a:spLocks noGrp="1"/>
           </p:cNvSpPr>
@@ -11337,8 +11251,11 @@
         <p:spPr>
           <a:xfrm>
             <a:off x="1168708" y="675829"/>
-            <a:ext cx="10229977" cy="500289"/>
-          </a:xfrm>
+            <a:ext cx="9616202" cy="500289"/>
+          </a:xfrm>
+          <a:prstGeom prst="rect">
+            <a:avLst/>
+          </a:prstGeom>
         </p:spPr>
         <p:txBody>
           <a:bodyPr/>
@@ -11360,13 +11277,134 @@
               </a:rPr>
               <a:t>else could we improve?</a:t>
             </a:r>
+            <a:endParaRPr lang="en-US" b="1" dirty="0">
+              <a:solidFill>
+                <a:srgbClr val="8E1731"/>
+              </a:solidFill>
+            </a:endParaRPr>
+          </a:p>
+        </p:txBody>
+      </p:sp>
+      <p:sp>
+        <p:nvSpPr>
+          <p:cNvPr id="6" name="Title 1"/>
+          <p:cNvSpPr txBox="1">
+            <a:spLocks/>
+          </p:cNvSpPr>
+          <p:nvPr/>
+        </p:nvSpPr>
+        <p:spPr>
+          <a:xfrm>
+            <a:off x="838200" y="365125"/>
+            <a:ext cx="10515600" cy="1325563"/>
+          </a:xfrm>
+          <a:prstGeom prst="rect">
+            <a:avLst/>
+          </a:prstGeom>
+        </p:spPr>
+        <p:txBody>
+          <a:bodyPr/>
+          <a:lstStyle>
+            <a:lvl1pPr algn="l" defTabSz="914400" rtl="0" eaLnBrk="1" latinLnBrk="0" hangingPunct="1">
+              <a:lnSpc>
+                <a:spcPct val="90000"/>
+              </a:lnSpc>
+              <a:spcBef>
+                <a:spcPct val="0"/>
+              </a:spcBef>
+              <a:buNone/>
+              <a:defRPr sz="3600" kern="1200">
+                <a:solidFill>
+                  <a:schemeClr val="tx1"/>
+                </a:solidFill>
+                <a:latin typeface="+mj-lt"/>
+                <a:ea typeface="+mj-ea"/>
+                <a:cs typeface="+mj-cs"/>
+              </a:defRPr>
+            </a:lvl1pPr>
+          </a:lstStyle>
+          <a:p>
             <a:endParaRPr lang="en-US" dirty="0"/>
+          </a:p>
+        </p:txBody>
+      </p:sp>
+      <p:sp>
+        <p:nvSpPr>
+          <p:cNvPr id="8" name="Rectangle 7"/>
+          <p:cNvSpPr/>
+          <p:nvPr/>
+        </p:nvSpPr>
+        <p:spPr>
+          <a:xfrm>
+            <a:off x="7058181" y="1176118"/>
+            <a:ext cx="4011376" cy="4893647"/>
+          </a:xfrm>
+          <a:prstGeom prst="rect">
+            <a:avLst/>
+          </a:prstGeom>
+        </p:spPr>
+        <p:txBody>
+          <a:bodyPr wrap="square">
+            <a:spAutoFit/>
+          </a:bodyPr>
+          <a:lstStyle/>
+          <a:p>
+            <a:pPr marL="742950" lvl="1" indent="-285750">
+              <a:buFont typeface="Arial" panose="020B0604020202020204" pitchFamily="34" charset="0"/>
+              <a:buChar char="•"/>
+            </a:pPr>
+            <a:r>
+              <a:rPr lang="en-US" sz="2400" dirty="0" smtClean="0"/>
+              <a:t>Test or change color to grayscale</a:t>
+            </a:r>
+          </a:p>
+          <a:p>
+            <a:pPr marL="742950" lvl="1" indent="-285750">
+              <a:buFont typeface="Arial" panose="020B0604020202020204" pitchFamily="34" charset="0"/>
+              <a:buChar char="•"/>
+            </a:pPr>
+            <a:r>
+              <a:rPr lang="en-US" sz="2400" dirty="0" smtClean="0"/>
+              <a:t>Increase legend size</a:t>
+            </a:r>
+          </a:p>
+          <a:p>
+            <a:pPr marL="742950" lvl="1" indent="-285750">
+              <a:buFont typeface="Arial" panose="020B0604020202020204" pitchFamily="34" charset="0"/>
+              <a:buChar char="•"/>
+            </a:pPr>
+            <a:r>
+              <a:rPr lang="en-US" sz="2400" dirty="0" smtClean="0"/>
+              <a:t>What is clarity?  Is it ordered?</a:t>
+            </a:r>
+          </a:p>
+          <a:p>
+            <a:pPr marL="742950" lvl="1" indent="-285750">
+              <a:buFont typeface="Arial" panose="020B0604020202020204" pitchFamily="34" charset="0"/>
+              <a:buChar char="•"/>
+            </a:pPr>
+            <a:r>
+              <a:rPr lang="en-US" sz="2400" dirty="0" smtClean="0"/>
+              <a:t>For a presentation, rotate y-axis label to horizontal</a:t>
+            </a:r>
+            <a:endParaRPr lang="en-US" sz="2400" dirty="0"/>
+          </a:p>
+          <a:p>
+            <a:pPr marL="742950" lvl="1" indent="-285750">
+              <a:buFont typeface="Arial" panose="020B0604020202020204" pitchFamily="34" charset="0"/>
+              <a:buChar char="•"/>
+            </a:pPr>
+            <a:r>
+              <a:rPr lang="en-US" sz="2400" dirty="0" smtClean="0"/>
+              <a:t>Add commas (or periods in Europe) to large numbers if domain- or journal-specific allows</a:t>
+            </a:r>
+            <a:endParaRPr lang="en-US" sz="2400" dirty="0"/>
           </a:p>
         </p:txBody>
       </p:sp>
       <p:pic>
         <p:nvPicPr>
-          <p:cNvPr id="6" name="Picture 5"/>
+          <p:cNvPr id="9" name="Picture 8"/>
           <p:cNvPicPr>
             <a:picLocks noChangeAspect="1"/>
           </p:cNvPicPr>
@@ -11380,87 +11418,18 @@
         </p:blipFill>
         <p:spPr>
           <a:xfrm>
-            <a:off x="1007416" y="2081149"/>
-            <a:ext cx="6047619" cy="3895238"/>
+            <a:off x="1001038" y="2137857"/>
+            <a:ext cx="6057143" cy="3895238"/>
           </a:xfrm>
           <a:prstGeom prst="rect">
             <a:avLst/>
           </a:prstGeom>
         </p:spPr>
       </p:pic>
-      <p:sp>
-        <p:nvSpPr>
-          <p:cNvPr id="5" name="Rectangle 4"/>
-          <p:cNvSpPr/>
-          <p:nvPr/>
-        </p:nvSpPr>
-        <p:spPr>
-          <a:xfrm>
-            <a:off x="7269271" y="1742779"/>
-            <a:ext cx="4129414" cy="4154984"/>
-          </a:xfrm>
-          <a:prstGeom prst="rect">
-            <a:avLst/>
-          </a:prstGeom>
-        </p:spPr>
-        <p:txBody>
-          <a:bodyPr wrap="square">
-            <a:spAutoFit/>
-          </a:bodyPr>
-          <a:lstStyle/>
-          <a:p>
-            <a:pPr marL="285750" indent="-285750">
-              <a:buFont typeface="Arial" panose="020B0604020202020204" pitchFamily="34" charset="0"/>
-              <a:buChar char="•"/>
-            </a:pPr>
-            <a:r>
-              <a:rPr lang="en-US" sz="2400" dirty="0" smtClean="0"/>
-              <a:t>Decide if data density in interior is acceptable</a:t>
-            </a:r>
-          </a:p>
-          <a:p>
-            <a:pPr marL="285750" indent="-285750">
-              <a:buFont typeface="Arial" panose="020B0604020202020204" pitchFamily="34" charset="0"/>
-              <a:buChar char="•"/>
-            </a:pPr>
-            <a:r>
-              <a:rPr lang="en-US" sz="2400" dirty="0" smtClean="0"/>
-              <a:t>Make “fair” easier to see from a distance (darker color)</a:t>
-            </a:r>
-          </a:p>
-          <a:p>
-            <a:pPr marL="285750" indent="-285750">
-              <a:buFont typeface="Arial" panose="020B0604020202020204" pitchFamily="34" charset="0"/>
-              <a:buChar char="•"/>
-            </a:pPr>
-            <a:r>
-              <a:rPr lang="en-US" sz="2400" dirty="0" smtClean="0"/>
-              <a:t>Make all points easier to see from a distance (larger size)</a:t>
-            </a:r>
-          </a:p>
-          <a:p>
-            <a:pPr marL="285750" indent="-285750">
-              <a:buFont typeface="Arial" panose="020B0604020202020204" pitchFamily="34" charset="0"/>
-              <a:buChar char="•"/>
-            </a:pPr>
-            <a:r>
-              <a:rPr lang="en-US" sz="2400" dirty="0" smtClean="0"/>
-              <a:t>Consider goal – do we need all cut categories?</a:t>
-            </a:r>
-          </a:p>
-          <a:p>
-            <a:pPr marL="285750" indent="-285750">
-              <a:buFont typeface="Arial" panose="020B0604020202020204" pitchFamily="34" charset="0"/>
-              <a:buChar char="•"/>
-            </a:pPr>
-            <a:endParaRPr lang="en-US" sz="2400" dirty="0" smtClean="0"/>
-          </a:p>
-        </p:txBody>
-      </p:sp>
     </p:spTree>
     <p:extLst>
       <p:ext uri="{BB962C8B-B14F-4D97-AF65-F5344CB8AC3E}">
-        <p14:creationId xmlns:p14="http://schemas.microsoft.com/office/powerpoint/2010/main" val="871147982"/>
+        <p14:creationId xmlns:p14="http://schemas.microsoft.com/office/powerpoint/2010/main" val="310885816"/>
       </p:ext>
     </p:extLst>
   </p:cSld>
@@ -11489,7 +11458,7 @@
       </p:grpSpPr>
       <p:sp>
         <p:nvSpPr>
-          <p:cNvPr id="2" name="Content Placeholder 1"/>
+          <p:cNvPr id="4" name="Content Placeholder 3"/>
           <p:cNvSpPr>
             <a:spLocks noGrp="1"/>
           </p:cNvSpPr>
@@ -11504,42 +11473,41 @@
           <a:p>
             <a:r>
               <a:rPr lang="en-US" dirty="0" smtClean="0"/>
-              <a:t>Survey link: </a:t>
-            </a:r>
-            <a:r>
-              <a:rPr lang="en-US" dirty="0">
-                <a:hlinkClick r:id="rId3"/>
-              </a:rPr>
-              <a:t>http://</a:t>
-            </a:r>
-            <a:r>
-              <a:rPr lang="en-US" dirty="0" smtClean="0">
-                <a:hlinkClick r:id="rId3"/>
-              </a:rPr>
-              <a:t>bit.ly/oulib_davis_workshop</a:t>
-            </a:r>
+              <a:t>Symbols and axes proportional</a:t>
+            </a:r>
+          </a:p>
+          <a:p>
             <a:r>
               <a:rPr lang="en-US" dirty="0" smtClean="0"/>
-              <a:t> </a:t>
+              <a:t>Clear labels consistent with rest of document</a:t>
             </a:r>
           </a:p>
           <a:p>
             <a:r>
               <a:rPr lang="en-US" dirty="0" smtClean="0"/>
-              <a:t>Today’s topic: Data-driven visualizations</a:t>
-            </a:r>
-          </a:p>
-        </p:txBody>
-      </p:sp>
-      <p:sp>
-        <p:nvSpPr>
-          <p:cNvPr id="4" name="Title 3">
-            <a:extLst>
-              <a:ext uri="{FF2B5EF4-FFF2-40B4-BE49-F238E27FC236}">
-                <a16:creationId xmlns:a16="http://schemas.microsoft.com/office/drawing/2014/main" id="{EE4C4D20-498A-0B4C-B3DF-B1E363085ADC}"/>
-              </a:ext>
-            </a:extLst>
-          </p:cNvPr>
+              <a:t>Reduce lack of context</a:t>
+            </a:r>
+          </a:p>
+          <a:p>
+            <a:r>
+              <a:rPr lang="en-US" dirty="0" smtClean="0"/>
+              <a:t>Do not change chart design partway through – can be done accidentally by having unevenly spaced numbers as categories!</a:t>
+            </a:r>
+          </a:p>
+          <a:p>
+            <a:r>
+              <a:rPr lang="en-US" dirty="0"/>
+              <a:t>Meet your goal – what is your question or hypothesis?</a:t>
+            </a:r>
+          </a:p>
+          <a:p>
+            <a:endParaRPr lang="en-US" dirty="0"/>
+          </a:p>
+        </p:txBody>
+      </p:sp>
+      <p:sp>
+        <p:nvSpPr>
+          <p:cNvPr id="2" name="Title 1"/>
           <p:cNvSpPr>
             <a:spLocks noGrp="1"/>
           </p:cNvSpPr>
@@ -11547,15 +11515,7 @@
             <p:ph type="title"/>
           </p:nvPr>
         </p:nvSpPr>
-        <p:spPr>
-          <a:xfrm>
-            <a:off x="1168708" y="675829"/>
-            <a:ext cx="10042087" cy="500289"/>
-          </a:xfrm>
-          <a:prstGeom prst="rect">
-            <a:avLst/>
-          </a:prstGeom>
-        </p:spPr>
+        <p:spPr/>
         <p:txBody>
           <a:bodyPr/>
           <a:lstStyle/>
@@ -11566,20 +11526,16 @@
                   <a:srgbClr val="8E1731"/>
                 </a:solidFill>
               </a:rPr>
-              <a:t>Please take 3 min to help us improve</a:t>
-            </a:r>
-            <a:endParaRPr lang="en-US" b="1" dirty="0">
-              <a:solidFill>
-                <a:srgbClr val="8E1731"/>
-              </a:solidFill>
-            </a:endParaRPr>
+              <a:t>Step 3: clear visuals</a:t>
+            </a:r>
+            <a:endParaRPr lang="en-US" dirty="0"/>
           </a:p>
         </p:txBody>
       </p:sp>
     </p:spTree>
     <p:extLst>
       <p:ext uri="{BB962C8B-B14F-4D97-AF65-F5344CB8AC3E}">
-        <p14:creationId xmlns:p14="http://schemas.microsoft.com/office/powerpoint/2010/main" val="1017636609"/>
+        <p14:creationId xmlns:p14="http://schemas.microsoft.com/office/powerpoint/2010/main" val="3712317676"/>
       </p:ext>
     </p:extLst>
   </p:cSld>
@@ -11608,172 +11564,7 @@
       </p:grpSpPr>
       <p:sp>
         <p:nvSpPr>
-          <p:cNvPr id="4" name="Content Placeholder 3"/>
-          <p:cNvSpPr>
-            <a:spLocks noGrp="1"/>
-          </p:cNvSpPr>
-          <p:nvPr>
-            <p:ph idx="10"/>
-          </p:nvPr>
-        </p:nvSpPr>
-        <p:spPr>
-          <a:xfrm>
-            <a:off x="358816" y="2208741"/>
-            <a:ext cx="5787342" cy="3549028"/>
-          </a:xfrm>
-        </p:spPr>
-        <p:txBody>
-          <a:bodyPr>
-            <a:normAutofit/>
-          </a:bodyPr>
-          <a:lstStyle/>
-          <a:p>
-            <a:r>
-              <a:rPr lang="en-US" sz="2800" dirty="0" smtClean="0"/>
-              <a:t>Digital Skills Hub Calendar</a:t>
-            </a:r>
-            <a:br>
-              <a:rPr lang="en-US" sz="2800" dirty="0" smtClean="0"/>
-            </a:br>
-            <a:r>
-              <a:rPr lang="en-US" sz="2800" dirty="0" smtClean="0">
-                <a:hlinkClick r:id="rId2"/>
-              </a:rPr>
-              <a:t>https://digitalskills.oucreate.com</a:t>
-            </a:r>
-            <a:r>
-              <a:rPr lang="en-US" sz="2800" dirty="0" smtClean="0"/>
-              <a:t>   </a:t>
-            </a:r>
-          </a:p>
-          <a:p>
-            <a:r>
-              <a:rPr lang="en-US" sz="2800" dirty="0" smtClean="0"/>
-              <a:t>Information Specialists @ DAVIS</a:t>
-            </a:r>
-            <a:br>
-              <a:rPr lang="en-US" sz="2800" dirty="0" smtClean="0"/>
-            </a:br>
-            <a:r>
-              <a:rPr lang="en-US" sz="2800" dirty="0" smtClean="0">
-                <a:hlinkClick r:id="rId3"/>
-              </a:rPr>
-              <a:t>https://libraries.ou.edu/davis</a:t>
-            </a:r>
-            <a:r>
-              <a:rPr lang="en-US" sz="2800" dirty="0" smtClean="0"/>
-              <a:t> </a:t>
-            </a:r>
-            <a:endParaRPr lang="en-US" sz="2800" dirty="0"/>
-          </a:p>
-          <a:p>
-            <a:r>
-              <a:rPr lang="en-US" sz="2800" dirty="0" smtClean="0"/>
-              <a:t>Digital Scholarship Lab</a:t>
-            </a:r>
-            <a:br>
-              <a:rPr lang="en-US" sz="2800" dirty="0" smtClean="0"/>
-            </a:br>
-            <a:r>
-              <a:rPr lang="en-US" sz="2800" dirty="0" smtClean="0">
-                <a:hlinkClick r:id="rId4"/>
-              </a:rPr>
-              <a:t>https://libraries.ou.edu/dsl</a:t>
-            </a:r>
-            <a:endParaRPr lang="en-US" sz="2800" dirty="0" smtClean="0"/>
-          </a:p>
-        </p:txBody>
-      </p:sp>
-      <p:sp>
-        <p:nvSpPr>
-          <p:cNvPr id="6" name="Content Placeholder 5"/>
-          <p:cNvSpPr>
-            <a:spLocks noGrp="1"/>
-          </p:cNvSpPr>
-          <p:nvPr>
-            <p:ph idx="11"/>
-          </p:nvPr>
-        </p:nvSpPr>
-        <p:spPr>
-          <a:xfrm>
-            <a:off x="6616910" y="1979111"/>
-            <a:ext cx="5742868" cy="3778657"/>
-          </a:xfrm>
-        </p:spPr>
-        <p:txBody>
-          <a:bodyPr>
-            <a:noAutofit/>
-          </a:bodyPr>
-          <a:lstStyle/>
-          <a:p>
-            <a:r>
-              <a:rPr lang="en-US" sz="2800" dirty="0" smtClean="0"/>
-              <a:t>DAVIS workshops </a:t>
-            </a:r>
-            <a:r>
-              <a:rPr lang="en-US" sz="2800" dirty="0" smtClean="0">
-                <a:hlinkClick r:id="rId5"/>
-              </a:rPr>
-              <a:t>https://calendar.ou.edu/dsh</a:t>
-            </a:r>
-            <a:r>
-              <a:rPr lang="en-US" sz="2800" dirty="0" smtClean="0"/>
-              <a:t> </a:t>
-            </a:r>
-            <a:endParaRPr lang="en-US" sz="2000" dirty="0" smtClean="0"/>
-          </a:p>
-          <a:p>
-            <a:r>
-              <a:rPr lang="en-US" sz="2800" dirty="0" smtClean="0"/>
-              <a:t>Carpentries </a:t>
-            </a:r>
-            <a:r>
-              <a:rPr lang="en-US" sz="2800" dirty="0"/>
-              <a:t>two-day workshops </a:t>
-            </a:r>
-            <a:r>
-              <a:rPr lang="en-US" sz="2800" dirty="0">
-                <a:hlinkClick r:id="rId6"/>
-              </a:rPr>
-              <a:t>https://libraries.ou.edu</a:t>
-            </a:r>
-            <a:r>
-              <a:rPr lang="en-US" sz="2800" dirty="0" smtClean="0">
-                <a:hlinkClick r:id="rId6"/>
-              </a:rPr>
-              <a:t>/</a:t>
-            </a:r>
-            <a:br>
-              <a:rPr lang="en-US" sz="2800" dirty="0" smtClean="0">
-                <a:hlinkClick r:id="rId6"/>
-              </a:rPr>
-            </a:br>
-            <a:r>
-              <a:rPr lang="en-US" sz="2800" dirty="0" smtClean="0">
-                <a:hlinkClick r:id="rId6"/>
-              </a:rPr>
-              <a:t>carpentries</a:t>
-            </a:r>
-            <a:r>
-              <a:rPr lang="en-US" sz="2800" dirty="0" smtClean="0"/>
-              <a:t> </a:t>
-            </a:r>
-            <a:endParaRPr lang="en-US" sz="2800" dirty="0"/>
-          </a:p>
-          <a:p>
-            <a:endParaRPr lang="en-US" sz="2800" dirty="0"/>
-          </a:p>
-        </p:txBody>
-      </p:sp>
-      <p:sp>
-        <p:nvSpPr>
-          <p:cNvPr id="2" name="Title 1">
-            <a:extLst>
-              <a:ext uri="{FF2B5EF4-FFF2-40B4-BE49-F238E27FC236}">
-                <a16:creationId xmlns:a16="http://schemas.microsoft.com/office/drawing/2014/main" id="{D313C71A-5F8A-5C4C-B19D-A92B8ED34A75}"/>
-              </a:ext>
-            </a:extLst>
-          </p:cNvPr>
+          <p:cNvPr id="2" name="Title 1"/>
           <p:cNvSpPr>
             <a:spLocks noGrp="1"/>
           </p:cNvSpPr>
@@ -11784,36 +11575,243 @@
         <p:spPr>
           <a:xfrm>
             <a:off x="1168708" y="675829"/>
-            <a:ext cx="9916826" cy="500289"/>
+            <a:ext cx="10229977" cy="500289"/>
+          </a:xfrm>
+        </p:spPr>
+        <p:txBody>
+          <a:bodyPr/>
+          <a:lstStyle/>
+          <a:p>
+            <a:r>
+              <a:rPr lang="en-US" b="1" dirty="0">
+                <a:solidFill>
+                  <a:srgbClr val="8E1731"/>
+                </a:solidFill>
+              </a:rPr>
+              <a:t>What is </a:t>
+            </a:r>
+            <a:r>
+              <a:rPr lang="en-US" b="1" dirty="0" smtClean="0">
+                <a:solidFill>
+                  <a:srgbClr val="8E1731"/>
+                </a:solidFill>
+              </a:rPr>
+              <a:t>clear or misleading about this?</a:t>
+            </a:r>
+            <a:endParaRPr lang="en-US" dirty="0"/>
+          </a:p>
+        </p:txBody>
+      </p:sp>
+      <p:pic>
+        <p:nvPicPr>
+          <p:cNvPr id="3" name="Picture 2"/>
+          <p:cNvPicPr>
+            <a:picLocks noChangeAspect="1"/>
+          </p:cNvPicPr>
+          <p:nvPr/>
+        </p:nvPicPr>
+        <p:blipFill>
+          <a:blip r:embed="rId2"/>
+          <a:stretch>
+            <a:fillRect/>
+          </a:stretch>
+        </p:blipFill>
+        <p:spPr>
+          <a:xfrm>
+            <a:off x="1147188" y="2221214"/>
+            <a:ext cx="6057143" cy="3895238"/>
           </a:xfrm>
           <a:prstGeom prst="rect">
             <a:avLst/>
           </a:prstGeom>
         </p:spPr>
-        <p:txBody>
-          <a:bodyPr/>
-          <a:lstStyle/>
-          <a:p>
-            <a:r>
-              <a:rPr lang="en-US" b="1" dirty="0" smtClean="0">
-                <a:solidFill>
-                  <a:srgbClr val="8E1731"/>
-                </a:solidFill>
-              </a:rPr>
-              <a:t>Find more resources and upcoming events!</a:t>
-            </a:r>
-            <a:endParaRPr lang="en-US" b="1" dirty="0">
-              <a:solidFill>
-                <a:srgbClr val="8E1731"/>
-              </a:solidFill>
-            </a:endParaRPr>
-          </a:p>
-        </p:txBody>
-      </p:sp>
+      </p:pic>
     </p:spTree>
     <p:extLst>
       <p:ext uri="{BB962C8B-B14F-4D97-AF65-F5344CB8AC3E}">
-        <p14:creationId xmlns:p14="http://schemas.microsoft.com/office/powerpoint/2010/main" val="1761210051"/>
+        <p14:creationId xmlns:p14="http://schemas.microsoft.com/office/powerpoint/2010/main" val="3582042232"/>
+      </p:ext>
+    </p:extLst>
+  </p:cSld>
+  <p:clrMapOvr>
+    <a:masterClrMapping/>
+  </p:clrMapOvr>
+</p:sld>
+</file>
+
+<file path=ppt/slides/slide39.xml><?xml version="1.0" encoding="utf-8"?>
+<p:sld xmlns:a="http://schemas.openxmlformats.org/drawingml/2006/main" xmlns:r="http://schemas.openxmlformats.org/officeDocument/2006/relationships" xmlns:p="http://schemas.openxmlformats.org/presentationml/2006/main">
+  <p:cSld>
+    <p:spTree>
+      <p:nvGrpSpPr>
+        <p:cNvPr id="1" name=""/>
+        <p:cNvGrpSpPr/>
+        <p:nvPr/>
+      </p:nvGrpSpPr>
+      <p:grpSpPr>
+        <a:xfrm>
+          <a:off x="0" y="0"/>
+          <a:ext cx="0" cy="0"/>
+          <a:chOff x="0" y="0"/>
+          <a:chExt cx="0" cy="0"/>
+        </a:xfrm>
+      </p:grpSpPr>
+      <p:sp>
+        <p:nvSpPr>
+          <p:cNvPr id="2" name="Title 1"/>
+          <p:cNvSpPr>
+            <a:spLocks noGrp="1"/>
+          </p:cNvSpPr>
+          <p:nvPr>
+            <p:ph type="title"/>
+          </p:nvPr>
+        </p:nvSpPr>
+        <p:spPr>
+          <a:xfrm>
+            <a:off x="1168708" y="675829"/>
+            <a:ext cx="10229977" cy="500289"/>
+          </a:xfrm>
+        </p:spPr>
+        <p:txBody>
+          <a:bodyPr/>
+          <a:lstStyle/>
+          <a:p>
+            <a:r>
+              <a:rPr lang="en-US" b="1" dirty="0">
+                <a:solidFill>
+                  <a:srgbClr val="8E1731"/>
+                </a:solidFill>
+              </a:rPr>
+              <a:t>What is </a:t>
+            </a:r>
+            <a:r>
+              <a:rPr lang="en-US" b="1" dirty="0" smtClean="0">
+                <a:solidFill>
+                  <a:srgbClr val="8E1731"/>
+                </a:solidFill>
+              </a:rPr>
+              <a:t>clear or misleading about this?</a:t>
+            </a:r>
+            <a:endParaRPr lang="en-US" dirty="0"/>
+          </a:p>
+        </p:txBody>
+      </p:sp>
+      <p:pic>
+        <p:nvPicPr>
+          <p:cNvPr id="3" name="Picture 2"/>
+          <p:cNvPicPr>
+            <a:picLocks noChangeAspect="1"/>
+          </p:cNvPicPr>
+          <p:nvPr/>
+        </p:nvPicPr>
+        <p:blipFill>
+          <a:blip r:embed="rId2"/>
+          <a:stretch>
+            <a:fillRect/>
+          </a:stretch>
+        </p:blipFill>
+        <p:spPr>
+          <a:xfrm>
+            <a:off x="1147188" y="2221214"/>
+            <a:ext cx="6057143" cy="3895238"/>
+          </a:xfrm>
+          <a:prstGeom prst="rect">
+            <a:avLst/>
+          </a:prstGeom>
+        </p:spPr>
+      </p:pic>
+      <p:sp>
+        <p:nvSpPr>
+          <p:cNvPr id="4" name="Rectangle 3"/>
+          <p:cNvSpPr/>
+          <p:nvPr/>
+        </p:nvSpPr>
+        <p:spPr>
+          <a:xfrm>
+            <a:off x="7407057" y="1860766"/>
+            <a:ext cx="4129414" cy="3416320"/>
+          </a:xfrm>
+          <a:prstGeom prst="rect">
+            <a:avLst/>
+          </a:prstGeom>
+        </p:spPr>
+        <p:txBody>
+          <a:bodyPr wrap="square">
+            <a:spAutoFit/>
+          </a:bodyPr>
+          <a:lstStyle/>
+          <a:p>
+            <a:r>
+              <a:rPr lang="en-US" dirty="0"/>
+              <a:t>Clear</a:t>
+            </a:r>
+          </a:p>
+          <a:p>
+            <a:pPr marL="285750" indent="-285750">
+              <a:buFont typeface="Arial" panose="020B0604020202020204" pitchFamily="34" charset="0"/>
+              <a:buChar char="•"/>
+            </a:pPr>
+            <a:r>
+              <a:rPr lang="en-US" dirty="0"/>
+              <a:t>Chart design consistent throughout</a:t>
+            </a:r>
+          </a:p>
+          <a:p>
+            <a:pPr marL="285750" indent="-285750">
+              <a:buFont typeface="Arial" panose="020B0604020202020204" pitchFamily="34" charset="0"/>
+              <a:buChar char="•"/>
+            </a:pPr>
+            <a:r>
+              <a:rPr lang="en-US" dirty="0"/>
+              <a:t>Units appropriate</a:t>
+            </a:r>
+          </a:p>
+          <a:p>
+            <a:endParaRPr lang="en-US" dirty="0"/>
+          </a:p>
+          <a:p>
+            <a:r>
+              <a:rPr lang="en-US" dirty="0" smtClean="0"/>
+              <a:t>Potentially misleading</a:t>
+            </a:r>
+            <a:endParaRPr lang="en-US" dirty="0"/>
+          </a:p>
+          <a:p>
+            <a:pPr marL="285750" indent="-285750">
+              <a:buFont typeface="Arial" panose="020B0604020202020204" pitchFamily="34" charset="0"/>
+              <a:buChar char="•"/>
+            </a:pPr>
+            <a:r>
+              <a:rPr lang="en-US" dirty="0"/>
+              <a:t>Symbols and axes proportional to numbers represented (problem with pie charts, area in general)</a:t>
+            </a:r>
+          </a:p>
+          <a:p>
+            <a:pPr marL="285750" indent="-285750">
+              <a:buFont typeface="Arial" panose="020B0604020202020204" pitchFamily="34" charset="0"/>
+              <a:buChar char="•"/>
+            </a:pPr>
+            <a:r>
+              <a:rPr lang="en-US" dirty="0"/>
+              <a:t>Lack of context: did not show all relevant data</a:t>
+            </a:r>
+          </a:p>
+          <a:p>
+            <a:pPr marL="285750" indent="-285750">
+              <a:buFont typeface="Arial" panose="020B0604020202020204" pitchFamily="34" charset="0"/>
+              <a:buChar char="•"/>
+            </a:pPr>
+            <a:r>
+              <a:rPr lang="en-US" dirty="0"/>
+              <a:t>Clear labels (minimize abbreviations)	</a:t>
+            </a:r>
+          </a:p>
+        </p:txBody>
+      </p:sp>
+    </p:spTree>
+    <p:extLst>
+      <p:ext uri="{BB962C8B-B14F-4D97-AF65-F5344CB8AC3E}">
+        <p14:creationId xmlns:p14="http://schemas.microsoft.com/office/powerpoint/2010/main" val="2671584075"/>
       </p:ext>
     </p:extLst>
   </p:cSld>
@@ -11987,6 +11985,899 @@
     <p:extLst>
       <p:ext uri="{BB962C8B-B14F-4D97-AF65-F5344CB8AC3E}">
         <p14:creationId xmlns:p14="http://schemas.microsoft.com/office/powerpoint/2010/main" val="194012960"/>
+      </p:ext>
+    </p:extLst>
+  </p:cSld>
+  <p:clrMapOvr>
+    <a:masterClrMapping/>
+  </p:clrMapOvr>
+</p:sld>
+</file>
+
+<file path=ppt/slides/slide40.xml><?xml version="1.0" encoding="utf-8"?>
+<p:sld xmlns:a="http://schemas.openxmlformats.org/drawingml/2006/main" xmlns:r="http://schemas.openxmlformats.org/officeDocument/2006/relationships" xmlns:p="http://schemas.openxmlformats.org/presentationml/2006/main">
+  <p:cSld>
+    <p:spTree>
+      <p:nvGrpSpPr>
+        <p:cNvPr id="1" name=""/>
+        <p:cNvGrpSpPr/>
+        <p:nvPr/>
+      </p:nvGrpSpPr>
+      <p:grpSpPr>
+        <a:xfrm>
+          <a:off x="0" y="0"/>
+          <a:ext cx="0" cy="0"/>
+          <a:chOff x="0" y="0"/>
+          <a:chExt cx="0" cy="0"/>
+        </a:xfrm>
+      </p:grpSpPr>
+      <p:sp>
+        <p:nvSpPr>
+          <p:cNvPr id="2" name="Title 1"/>
+          <p:cNvSpPr>
+            <a:spLocks noGrp="1"/>
+          </p:cNvSpPr>
+          <p:nvPr>
+            <p:ph type="title"/>
+          </p:nvPr>
+        </p:nvSpPr>
+        <p:spPr>
+          <a:xfrm>
+            <a:off x="1168708" y="675829"/>
+            <a:ext cx="10229977" cy="500289"/>
+          </a:xfrm>
+        </p:spPr>
+        <p:txBody>
+          <a:bodyPr/>
+          <a:lstStyle/>
+          <a:p>
+            <a:r>
+              <a:rPr lang="en-US" b="1" dirty="0" smtClean="0">
+                <a:solidFill>
+                  <a:srgbClr val="8E1731"/>
+                </a:solidFill>
+              </a:rPr>
+              <a:t>What improvements can we make?</a:t>
+            </a:r>
+            <a:endParaRPr lang="en-US" dirty="0"/>
+          </a:p>
+        </p:txBody>
+      </p:sp>
+      <p:pic>
+        <p:nvPicPr>
+          <p:cNvPr id="6" name="Picture 5"/>
+          <p:cNvPicPr>
+            <a:picLocks noChangeAspect="1"/>
+          </p:cNvPicPr>
+          <p:nvPr/>
+        </p:nvPicPr>
+        <p:blipFill>
+          <a:blip r:embed="rId2"/>
+          <a:stretch>
+            <a:fillRect/>
+          </a:stretch>
+        </p:blipFill>
+        <p:spPr>
+          <a:xfrm>
+            <a:off x="1007416" y="2081149"/>
+            <a:ext cx="6047619" cy="3895238"/>
+          </a:xfrm>
+          <a:prstGeom prst="rect">
+            <a:avLst/>
+          </a:prstGeom>
+        </p:spPr>
+      </p:pic>
+      <p:sp>
+        <p:nvSpPr>
+          <p:cNvPr id="7" name="Rectangle 6"/>
+          <p:cNvSpPr/>
+          <p:nvPr/>
+        </p:nvSpPr>
+        <p:spPr>
+          <a:xfrm>
+            <a:off x="7407057" y="2490031"/>
+            <a:ext cx="4129414" cy="1938992"/>
+          </a:xfrm>
+          <a:prstGeom prst="rect">
+            <a:avLst/>
+          </a:prstGeom>
+        </p:spPr>
+        <p:txBody>
+          <a:bodyPr wrap="square">
+            <a:spAutoFit/>
+          </a:bodyPr>
+          <a:lstStyle/>
+          <a:p>
+            <a:pPr marL="285750" indent="-285750">
+              <a:buFont typeface="Arial" panose="020B0604020202020204" pitchFamily="34" charset="0"/>
+              <a:buChar char="•"/>
+            </a:pPr>
+            <a:r>
+              <a:rPr lang="en-US" sz="2400" dirty="0" smtClean="0"/>
+              <a:t>Removed </a:t>
+            </a:r>
+            <a:r>
+              <a:rPr lang="en-US" sz="2400" dirty="0"/>
+              <a:t>area-cut relationship</a:t>
+            </a:r>
+          </a:p>
+          <a:p>
+            <a:pPr marL="285750" indent="-285750">
+              <a:buFont typeface="Arial" panose="020B0604020202020204" pitchFamily="34" charset="0"/>
+              <a:buChar char="•"/>
+            </a:pPr>
+            <a:r>
+              <a:rPr lang="en-US" sz="2400" dirty="0" smtClean="0"/>
+              <a:t>Show full range of data</a:t>
+            </a:r>
+          </a:p>
+          <a:p>
+            <a:pPr marL="285750" indent="-285750">
+              <a:buFont typeface="Arial" panose="020B0604020202020204" pitchFamily="34" charset="0"/>
+              <a:buChar char="•"/>
+            </a:pPr>
+            <a:r>
+              <a:rPr lang="en-US" sz="2400" dirty="0" smtClean="0"/>
+              <a:t>Units for y-axis</a:t>
+            </a:r>
+            <a:endParaRPr lang="en-US" sz="2400" dirty="0"/>
+          </a:p>
+          <a:p>
+            <a:pPr marL="285750" indent="-285750">
+              <a:buFont typeface="Arial" panose="020B0604020202020204" pitchFamily="34" charset="0"/>
+              <a:buChar char="•"/>
+            </a:pPr>
+            <a:r>
+              <a:rPr lang="en-US" sz="2400" dirty="0" smtClean="0"/>
+              <a:t>Labels not abbreviated</a:t>
+            </a:r>
+            <a:endParaRPr lang="en-US" sz="2400" dirty="0"/>
+          </a:p>
+        </p:txBody>
+      </p:sp>
+    </p:spTree>
+    <p:extLst>
+      <p:ext uri="{BB962C8B-B14F-4D97-AF65-F5344CB8AC3E}">
+        <p14:creationId xmlns:p14="http://schemas.microsoft.com/office/powerpoint/2010/main" val="1203345857"/>
+      </p:ext>
+    </p:extLst>
+  </p:cSld>
+  <p:clrMapOvr>
+    <a:masterClrMapping/>
+  </p:clrMapOvr>
+</p:sld>
+</file>
+
+<file path=ppt/slides/slide41.xml><?xml version="1.0" encoding="utf-8"?>
+<p:sld xmlns:a="http://schemas.openxmlformats.org/drawingml/2006/main" xmlns:r="http://schemas.openxmlformats.org/officeDocument/2006/relationships" xmlns:p="http://schemas.openxmlformats.org/presentationml/2006/main">
+  <p:cSld>
+    <p:spTree>
+      <p:nvGrpSpPr>
+        <p:cNvPr id="1" name=""/>
+        <p:cNvGrpSpPr/>
+        <p:nvPr/>
+      </p:nvGrpSpPr>
+      <p:grpSpPr>
+        <a:xfrm>
+          <a:off x="0" y="0"/>
+          <a:ext cx="0" cy="0"/>
+          <a:chOff x="0" y="0"/>
+          <a:chExt cx="0" cy="0"/>
+        </a:xfrm>
+      </p:grpSpPr>
+      <p:sp>
+        <p:nvSpPr>
+          <p:cNvPr id="2" name="Title 1"/>
+          <p:cNvSpPr>
+            <a:spLocks noGrp="1"/>
+          </p:cNvSpPr>
+          <p:nvPr>
+            <p:ph type="title"/>
+          </p:nvPr>
+        </p:nvSpPr>
+        <p:spPr>
+          <a:xfrm>
+            <a:off x="1168708" y="675829"/>
+            <a:ext cx="10229977" cy="500289"/>
+          </a:xfrm>
+        </p:spPr>
+        <p:txBody>
+          <a:bodyPr/>
+          <a:lstStyle/>
+          <a:p>
+            <a:r>
+              <a:rPr lang="en-US" b="1" dirty="0">
+                <a:solidFill>
+                  <a:srgbClr val="8E1731"/>
+                </a:solidFill>
+              </a:rPr>
+              <a:t>What </a:t>
+            </a:r>
+            <a:r>
+              <a:rPr lang="en-US" b="1" dirty="0" smtClean="0">
+                <a:solidFill>
+                  <a:srgbClr val="8E1731"/>
+                </a:solidFill>
+              </a:rPr>
+              <a:t>else could we improve?</a:t>
+            </a:r>
+            <a:endParaRPr lang="en-US" dirty="0"/>
+          </a:p>
+        </p:txBody>
+      </p:sp>
+      <p:pic>
+        <p:nvPicPr>
+          <p:cNvPr id="6" name="Picture 5"/>
+          <p:cNvPicPr>
+            <a:picLocks noChangeAspect="1"/>
+          </p:cNvPicPr>
+          <p:nvPr/>
+        </p:nvPicPr>
+        <p:blipFill>
+          <a:blip r:embed="rId2"/>
+          <a:stretch>
+            <a:fillRect/>
+          </a:stretch>
+        </p:blipFill>
+        <p:spPr>
+          <a:xfrm>
+            <a:off x="1007416" y="2081149"/>
+            <a:ext cx="6047619" cy="3895238"/>
+          </a:xfrm>
+          <a:prstGeom prst="rect">
+            <a:avLst/>
+          </a:prstGeom>
+        </p:spPr>
+      </p:pic>
+      <p:sp>
+        <p:nvSpPr>
+          <p:cNvPr id="5" name="Rectangle 4"/>
+          <p:cNvSpPr/>
+          <p:nvPr/>
+        </p:nvSpPr>
+        <p:spPr>
+          <a:xfrm>
+            <a:off x="7055035" y="1615859"/>
+            <a:ext cx="4343650" cy="4154984"/>
+          </a:xfrm>
+          <a:prstGeom prst="rect">
+            <a:avLst/>
+          </a:prstGeom>
+        </p:spPr>
+        <p:txBody>
+          <a:bodyPr wrap="square">
+            <a:spAutoFit/>
+          </a:bodyPr>
+          <a:lstStyle/>
+          <a:p>
+            <a:pPr marL="285750" indent="-285750">
+              <a:buFont typeface="Arial" panose="020B0604020202020204" pitchFamily="34" charset="0"/>
+              <a:buChar char="•"/>
+            </a:pPr>
+            <a:r>
+              <a:rPr lang="en-US" sz="2400" dirty="0" smtClean="0"/>
+              <a:t>Decide if data density in interior is acceptable</a:t>
+            </a:r>
+          </a:p>
+          <a:p>
+            <a:pPr marL="285750" indent="-285750">
+              <a:buFont typeface="Arial" panose="020B0604020202020204" pitchFamily="34" charset="0"/>
+              <a:buChar char="•"/>
+            </a:pPr>
+            <a:r>
+              <a:rPr lang="en-US" sz="2400" dirty="0" smtClean="0"/>
+              <a:t>Make “fair” easier to see from a distance (darker color)</a:t>
+            </a:r>
+          </a:p>
+          <a:p>
+            <a:pPr marL="285750" indent="-285750">
+              <a:buFont typeface="Arial" panose="020B0604020202020204" pitchFamily="34" charset="0"/>
+              <a:buChar char="•"/>
+            </a:pPr>
+            <a:r>
+              <a:rPr lang="en-US" sz="2400" dirty="0" smtClean="0"/>
+              <a:t>Make all points easier to see from a distance (larger size)</a:t>
+            </a:r>
+          </a:p>
+          <a:p>
+            <a:pPr marL="285750" indent="-285750">
+              <a:buFont typeface="Arial" panose="020B0604020202020204" pitchFamily="34" charset="0"/>
+              <a:buChar char="•"/>
+            </a:pPr>
+            <a:r>
+              <a:rPr lang="en-US" sz="2400" dirty="0" smtClean="0"/>
+              <a:t>Consider goal – do we need all cut categories</a:t>
+            </a:r>
+            <a:r>
+              <a:rPr lang="en-US" sz="2400" dirty="0" smtClean="0"/>
+              <a:t>?  Do we need a summary instead?</a:t>
+            </a:r>
+            <a:endParaRPr lang="en-US" sz="2400" dirty="0" smtClean="0"/>
+          </a:p>
+          <a:p>
+            <a:pPr marL="285750" indent="-285750">
+              <a:buFont typeface="Arial" panose="020B0604020202020204" pitchFamily="34" charset="0"/>
+              <a:buChar char="•"/>
+            </a:pPr>
+            <a:endParaRPr lang="en-US" sz="2400" dirty="0" smtClean="0"/>
+          </a:p>
+        </p:txBody>
+      </p:sp>
+    </p:spTree>
+    <p:extLst>
+      <p:ext uri="{BB962C8B-B14F-4D97-AF65-F5344CB8AC3E}">
+        <p14:creationId xmlns:p14="http://schemas.microsoft.com/office/powerpoint/2010/main" val="871147982"/>
+      </p:ext>
+    </p:extLst>
+  </p:cSld>
+  <p:clrMapOvr>
+    <a:masterClrMapping/>
+  </p:clrMapOvr>
+</p:sld>
+</file>
+
+<file path=ppt/slides/slide42.xml><?xml version="1.0" encoding="utf-8"?>
+<p:sld xmlns:a="http://schemas.openxmlformats.org/drawingml/2006/main" xmlns:r="http://schemas.openxmlformats.org/officeDocument/2006/relationships" xmlns:p="http://schemas.openxmlformats.org/presentationml/2006/main">
+  <p:cSld>
+    <p:spTree>
+      <p:nvGrpSpPr>
+        <p:cNvPr id="1" name=""/>
+        <p:cNvGrpSpPr/>
+        <p:nvPr/>
+      </p:nvGrpSpPr>
+      <p:grpSpPr>
+        <a:xfrm>
+          <a:off x="0" y="0"/>
+          <a:ext cx="0" cy="0"/>
+          <a:chOff x="0" y="0"/>
+          <a:chExt cx="0" cy="0"/>
+        </a:xfrm>
+      </p:grpSpPr>
+      <p:sp>
+        <p:nvSpPr>
+          <p:cNvPr id="4" name="Content Placeholder 3"/>
+          <p:cNvSpPr>
+            <a:spLocks noGrp="1"/>
+          </p:cNvSpPr>
+          <p:nvPr>
+            <p:ph idx="10"/>
+          </p:nvPr>
+        </p:nvSpPr>
+        <p:spPr>
+          <a:xfrm>
+            <a:off x="358816" y="2091847"/>
+            <a:ext cx="5787342" cy="3665922"/>
+          </a:xfrm>
+        </p:spPr>
+        <p:txBody>
+          <a:bodyPr>
+            <a:normAutofit/>
+          </a:bodyPr>
+          <a:lstStyle/>
+          <a:p>
+            <a:r>
+              <a:rPr lang="en-US" sz="2800" dirty="0" smtClean="0"/>
+              <a:t>Digital Skills Hub Calendar</a:t>
+            </a:r>
+            <a:br>
+              <a:rPr lang="en-US" sz="2800" dirty="0" smtClean="0"/>
+            </a:br>
+            <a:r>
+              <a:rPr lang="en-US" sz="2800" dirty="0" smtClean="0">
+                <a:hlinkClick r:id="rId2"/>
+              </a:rPr>
+              <a:t>https://digitalskills.oucreate.com</a:t>
+            </a:r>
+            <a:r>
+              <a:rPr lang="en-US" sz="2800" dirty="0" smtClean="0"/>
+              <a:t>   </a:t>
+            </a:r>
+          </a:p>
+          <a:p>
+            <a:r>
+              <a:rPr lang="en-US" sz="2800" dirty="0" smtClean="0"/>
+              <a:t>Information Specialists @ DAVIS</a:t>
+            </a:r>
+            <a:br>
+              <a:rPr lang="en-US" sz="2800" dirty="0" smtClean="0"/>
+            </a:br>
+            <a:r>
+              <a:rPr lang="en-US" sz="2800" dirty="0" smtClean="0">
+                <a:hlinkClick r:id="rId3"/>
+              </a:rPr>
+              <a:t>https://libraries.ou.edu/davis</a:t>
+            </a:r>
+            <a:r>
+              <a:rPr lang="en-US" sz="2800" dirty="0" smtClean="0"/>
+              <a:t> </a:t>
+            </a:r>
+            <a:endParaRPr lang="en-US" sz="2800" dirty="0"/>
+          </a:p>
+        </p:txBody>
+      </p:sp>
+      <p:sp>
+        <p:nvSpPr>
+          <p:cNvPr id="6" name="Content Placeholder 5"/>
+          <p:cNvSpPr>
+            <a:spLocks noGrp="1"/>
+          </p:cNvSpPr>
+          <p:nvPr>
+            <p:ph idx="11"/>
+          </p:nvPr>
+        </p:nvSpPr>
+        <p:spPr>
+          <a:xfrm>
+            <a:off x="6616910" y="1979111"/>
+            <a:ext cx="5742868" cy="3778657"/>
+          </a:xfrm>
+        </p:spPr>
+        <p:txBody>
+          <a:bodyPr>
+            <a:noAutofit/>
+          </a:bodyPr>
+          <a:lstStyle/>
+          <a:p>
+            <a:r>
+              <a:rPr lang="en-US" sz="2800" dirty="0" smtClean="0"/>
+              <a:t>DAVIS workshops </a:t>
+            </a:r>
+            <a:r>
+              <a:rPr lang="en-US" sz="2800" dirty="0" smtClean="0">
+                <a:hlinkClick r:id="rId4"/>
+              </a:rPr>
+              <a:t>https://calendar.ou.edu/dsh</a:t>
+            </a:r>
+            <a:r>
+              <a:rPr lang="en-US" sz="2800" dirty="0" smtClean="0"/>
+              <a:t> </a:t>
+            </a:r>
+            <a:endParaRPr lang="en-US" sz="2000" dirty="0" smtClean="0"/>
+          </a:p>
+          <a:p>
+            <a:r>
+              <a:rPr lang="en-US" sz="2800" dirty="0" smtClean="0"/>
+              <a:t>Carpentries </a:t>
+            </a:r>
+            <a:r>
+              <a:rPr lang="en-US" sz="2800" dirty="0"/>
+              <a:t>two-day workshops </a:t>
+            </a:r>
+            <a:r>
+              <a:rPr lang="en-US" sz="2800" dirty="0">
+                <a:hlinkClick r:id="rId5"/>
+              </a:rPr>
+              <a:t>https://libraries.ou.edu</a:t>
+            </a:r>
+            <a:r>
+              <a:rPr lang="en-US" sz="2800" dirty="0" smtClean="0">
+                <a:hlinkClick r:id="rId5"/>
+              </a:rPr>
+              <a:t>/</a:t>
+            </a:r>
+            <a:br>
+              <a:rPr lang="en-US" sz="2800" dirty="0" smtClean="0">
+                <a:hlinkClick r:id="rId5"/>
+              </a:rPr>
+            </a:br>
+            <a:r>
+              <a:rPr lang="en-US" sz="2800" dirty="0" smtClean="0">
+                <a:hlinkClick r:id="rId5"/>
+              </a:rPr>
+              <a:t>carpentries</a:t>
+            </a:r>
+            <a:r>
+              <a:rPr lang="en-US" sz="2800" dirty="0" smtClean="0"/>
+              <a:t> </a:t>
+            </a:r>
+            <a:endParaRPr lang="en-US" sz="2800" dirty="0"/>
+          </a:p>
+          <a:p>
+            <a:endParaRPr lang="en-US" sz="2800" dirty="0"/>
+          </a:p>
+        </p:txBody>
+      </p:sp>
+      <p:sp>
+        <p:nvSpPr>
+          <p:cNvPr id="2" name="Title 1">
+            <a:extLst>
+              <a:ext uri="{FF2B5EF4-FFF2-40B4-BE49-F238E27FC236}">
+                <a16:creationId xmlns:a16="http://schemas.microsoft.com/office/drawing/2014/main" id="{D313C71A-5F8A-5C4C-B19D-A92B8ED34A75}"/>
+              </a:ext>
+            </a:extLst>
+          </p:cNvPr>
+          <p:cNvSpPr>
+            <a:spLocks noGrp="1"/>
+          </p:cNvSpPr>
+          <p:nvPr>
+            <p:ph type="title"/>
+          </p:nvPr>
+        </p:nvSpPr>
+        <p:spPr>
+          <a:xfrm>
+            <a:off x="1168708" y="675829"/>
+            <a:ext cx="9916826" cy="500289"/>
+          </a:xfrm>
+          <a:prstGeom prst="rect">
+            <a:avLst/>
+          </a:prstGeom>
+        </p:spPr>
+        <p:txBody>
+          <a:bodyPr/>
+          <a:lstStyle/>
+          <a:p>
+            <a:r>
+              <a:rPr lang="en-US" b="1" dirty="0" smtClean="0">
+                <a:solidFill>
+                  <a:srgbClr val="8E1731"/>
+                </a:solidFill>
+              </a:rPr>
+              <a:t>Step 4: get help and learn more</a:t>
+            </a:r>
+            <a:endParaRPr lang="en-US" b="1" dirty="0">
+              <a:solidFill>
+                <a:srgbClr val="8E1731"/>
+              </a:solidFill>
+            </a:endParaRPr>
+          </a:p>
+        </p:txBody>
+      </p:sp>
+      <p:sp>
+        <p:nvSpPr>
+          <p:cNvPr id="5" name="Content Placeholder 3"/>
+          <p:cNvSpPr txBox="1">
+            <a:spLocks/>
+          </p:cNvSpPr>
+          <p:nvPr/>
+        </p:nvSpPr>
+        <p:spPr>
+          <a:xfrm>
+            <a:off x="358815" y="4912304"/>
+            <a:ext cx="10964713" cy="3891391"/>
+          </a:xfrm>
+          <a:prstGeom prst="rect">
+            <a:avLst/>
+          </a:prstGeom>
+        </p:spPr>
+        <p:txBody>
+          <a:bodyPr>
+            <a:normAutofit/>
+          </a:bodyPr>
+          <a:lstStyle>
+            <a:lvl1pPr marL="257162" indent="-257162" algn="l" defTabSz="914400" rtl="0" eaLnBrk="1" latinLnBrk="0" hangingPunct="1">
+              <a:lnSpc>
+                <a:spcPct val="90000"/>
+              </a:lnSpc>
+              <a:spcBef>
+                <a:spcPts val="1000"/>
+              </a:spcBef>
+              <a:buClr>
+                <a:srgbClr val="8E1731"/>
+              </a:buClr>
+              <a:buFont typeface="Wingdings" panose="05000000000000000000" pitchFamily="2" charset="2"/>
+              <a:buChar char="§"/>
+              <a:defRPr lang="en-US" sz="3200" kern="1200" dirty="0" smtClean="0">
+                <a:solidFill>
+                  <a:schemeClr val="tx1"/>
+                </a:solidFill>
+                <a:latin typeface="Arial" panose="020B0604020202020204" pitchFamily="34" charset="0"/>
+                <a:ea typeface="+mn-ea"/>
+                <a:cs typeface="Arial" panose="020B0604020202020204" pitchFamily="34" charset="0"/>
+              </a:defRPr>
+            </a:lvl1pPr>
+            <a:lvl2pPr marL="557185" indent="-214303" algn="l" defTabSz="914400" rtl="0" eaLnBrk="1" latinLnBrk="0" hangingPunct="1">
+              <a:lnSpc>
+                <a:spcPct val="90000"/>
+              </a:lnSpc>
+              <a:spcBef>
+                <a:spcPts val="500"/>
+              </a:spcBef>
+              <a:buClrTx/>
+              <a:buFont typeface="Arial" panose="020B0604020202020204" pitchFamily="34" charset="0"/>
+              <a:buChar char="•"/>
+              <a:defRPr lang="en-US" sz="3200" kern="1200" dirty="0" smtClean="0">
+                <a:solidFill>
+                  <a:schemeClr val="tx1"/>
+                </a:solidFill>
+                <a:latin typeface="Arial" panose="020B0604020202020204" pitchFamily="34" charset="0"/>
+                <a:ea typeface="+mn-ea"/>
+                <a:cs typeface="Arial" panose="020B0604020202020204" pitchFamily="34" charset="0"/>
+              </a:defRPr>
+            </a:lvl2pPr>
+            <a:lvl3pPr marL="857208" indent="-171442" algn="l" defTabSz="914400" rtl="0" eaLnBrk="1" latinLnBrk="0" hangingPunct="1">
+              <a:lnSpc>
+                <a:spcPct val="90000"/>
+              </a:lnSpc>
+              <a:spcBef>
+                <a:spcPts val="500"/>
+              </a:spcBef>
+              <a:buClrTx/>
+              <a:buSzPct val="60000"/>
+              <a:buFont typeface="Courier New" panose="02070309020205020404" pitchFamily="49" charset="0"/>
+              <a:buChar char="o"/>
+              <a:defRPr lang="en-US" sz="3200" kern="1200" dirty="0" smtClean="0">
+                <a:solidFill>
+                  <a:schemeClr val="tx1"/>
+                </a:solidFill>
+                <a:latin typeface="Arial" panose="020B0604020202020204" pitchFamily="34" charset="0"/>
+                <a:ea typeface="+mn-ea"/>
+                <a:cs typeface="Arial" panose="020B0604020202020204" pitchFamily="34" charset="0"/>
+              </a:defRPr>
+            </a:lvl3pPr>
+            <a:lvl4pPr marL="1200091" indent="-171442" algn="l" defTabSz="914400" rtl="0" eaLnBrk="1" latinLnBrk="0" hangingPunct="1">
+              <a:lnSpc>
+                <a:spcPct val="90000"/>
+              </a:lnSpc>
+              <a:spcBef>
+                <a:spcPts val="500"/>
+              </a:spcBef>
+              <a:buClrTx/>
+              <a:buFont typeface="Arial" panose="020B0604020202020204" pitchFamily="34" charset="0"/>
+              <a:buChar char="•"/>
+              <a:defRPr lang="en-US" sz="3200" kern="1200" dirty="0" smtClean="0">
+                <a:solidFill>
+                  <a:schemeClr val="tx1"/>
+                </a:solidFill>
+                <a:latin typeface="Arial" panose="020B0604020202020204" pitchFamily="34" charset="0"/>
+                <a:ea typeface="+mn-ea"/>
+                <a:cs typeface="Arial" panose="020B0604020202020204" pitchFamily="34" charset="0"/>
+              </a:defRPr>
+            </a:lvl4pPr>
+            <a:lvl5pPr marL="1542973" indent="-171442" algn="l" defTabSz="914400" rtl="0" eaLnBrk="1" latinLnBrk="0" hangingPunct="1">
+              <a:lnSpc>
+                <a:spcPct val="90000"/>
+              </a:lnSpc>
+              <a:spcBef>
+                <a:spcPts val="500"/>
+              </a:spcBef>
+              <a:buClrTx/>
+              <a:buSzPct val="35000"/>
+              <a:buFont typeface="Courier New" panose="02070309020205020404" pitchFamily="49" charset="0"/>
+              <a:buChar char="o"/>
+              <a:defRPr lang="en-US" sz="3200" kern="1200" dirty="0">
+                <a:solidFill>
+                  <a:schemeClr val="tx1"/>
+                </a:solidFill>
+                <a:latin typeface="Arial" panose="020B0604020202020204" pitchFamily="34" charset="0"/>
+                <a:ea typeface="+mn-ea"/>
+                <a:cs typeface="Arial" panose="020B0604020202020204" pitchFamily="34" charset="0"/>
+              </a:defRPr>
+            </a:lvl5pPr>
+            <a:lvl6pPr marL="2514600" indent="-228600" algn="l" defTabSz="914400" rtl="0" eaLnBrk="1" latinLnBrk="0" hangingPunct="1">
+              <a:lnSpc>
+                <a:spcPct val="90000"/>
+              </a:lnSpc>
+              <a:spcBef>
+                <a:spcPts val="500"/>
+              </a:spcBef>
+              <a:buFont typeface="Arial" panose="020B0604020202020204" pitchFamily="34" charset="0"/>
+              <a:buChar char="•"/>
+              <a:defRPr sz="1800" kern="1200">
+                <a:solidFill>
+                  <a:schemeClr val="tx1"/>
+                </a:solidFill>
+                <a:latin typeface="+mn-lt"/>
+                <a:ea typeface="+mn-ea"/>
+                <a:cs typeface="+mn-cs"/>
+              </a:defRPr>
+            </a:lvl6pPr>
+            <a:lvl7pPr marL="2971800" indent="-228600" algn="l" defTabSz="914400" rtl="0" eaLnBrk="1" latinLnBrk="0" hangingPunct="1">
+              <a:lnSpc>
+                <a:spcPct val="90000"/>
+              </a:lnSpc>
+              <a:spcBef>
+                <a:spcPts val="500"/>
+              </a:spcBef>
+              <a:buFont typeface="Arial" panose="020B0604020202020204" pitchFamily="34" charset="0"/>
+              <a:buChar char="•"/>
+              <a:defRPr sz="1800" kern="1200">
+                <a:solidFill>
+                  <a:schemeClr val="tx1"/>
+                </a:solidFill>
+                <a:latin typeface="+mn-lt"/>
+                <a:ea typeface="+mn-ea"/>
+                <a:cs typeface="+mn-cs"/>
+              </a:defRPr>
+            </a:lvl7pPr>
+            <a:lvl8pPr marL="3429000" indent="-228600" algn="l" defTabSz="914400" rtl="0" eaLnBrk="1" latinLnBrk="0" hangingPunct="1">
+              <a:lnSpc>
+                <a:spcPct val="90000"/>
+              </a:lnSpc>
+              <a:spcBef>
+                <a:spcPts val="500"/>
+              </a:spcBef>
+              <a:buFont typeface="Arial" panose="020B0604020202020204" pitchFamily="34" charset="0"/>
+              <a:buChar char="•"/>
+              <a:defRPr sz="1800" kern="1200">
+                <a:solidFill>
+                  <a:schemeClr val="tx1"/>
+                </a:solidFill>
+                <a:latin typeface="+mn-lt"/>
+                <a:ea typeface="+mn-ea"/>
+                <a:cs typeface="+mn-cs"/>
+              </a:defRPr>
+            </a:lvl8pPr>
+            <a:lvl9pPr marL="3886200" indent="-228600" algn="l" defTabSz="914400" rtl="0" eaLnBrk="1" latinLnBrk="0" hangingPunct="1">
+              <a:lnSpc>
+                <a:spcPct val="90000"/>
+              </a:lnSpc>
+              <a:spcBef>
+                <a:spcPts val="500"/>
+              </a:spcBef>
+              <a:buFont typeface="Arial" panose="020B0604020202020204" pitchFamily="34" charset="0"/>
+              <a:buChar char="•"/>
+              <a:defRPr sz="1800" kern="1200">
+                <a:solidFill>
+                  <a:schemeClr val="tx1"/>
+                </a:solidFill>
+                <a:latin typeface="+mn-lt"/>
+                <a:ea typeface="+mn-ea"/>
+                <a:cs typeface="+mn-cs"/>
+              </a:defRPr>
+            </a:lvl9pPr>
+          </a:lstStyle>
+          <a:p>
+            <a:r>
+              <a:rPr lang="en-US" sz="2800" dirty="0" smtClean="0"/>
+              <a:t>Read </a:t>
+            </a:r>
+            <a:r>
+              <a:rPr lang="en-US" sz="2800" dirty="0" err="1" smtClean="0"/>
+              <a:t>Tufte’s</a:t>
+            </a:r>
+            <a:r>
+              <a:rPr lang="en-US" sz="2800" dirty="0" smtClean="0"/>
+              <a:t> </a:t>
+            </a:r>
+            <a:r>
+              <a:rPr lang="en-US" sz="2800" i="1" dirty="0" smtClean="0"/>
+              <a:t>The Visual Display of Quantitative Information</a:t>
+            </a:r>
+            <a:r>
+              <a:rPr lang="en-US" sz="2800" dirty="0" smtClean="0"/>
+              <a:t> on Reserves at Circulation Desk (4 hour checkout)</a:t>
+            </a:r>
+            <a:endParaRPr lang="en-US" sz="2800" dirty="0"/>
+          </a:p>
+        </p:txBody>
+      </p:sp>
+    </p:spTree>
+    <p:extLst>
+      <p:ext uri="{BB962C8B-B14F-4D97-AF65-F5344CB8AC3E}">
+        <p14:creationId xmlns:p14="http://schemas.microsoft.com/office/powerpoint/2010/main" val="1761210051"/>
+      </p:ext>
+    </p:extLst>
+  </p:cSld>
+  <p:clrMapOvr>
+    <a:masterClrMapping/>
+  </p:clrMapOvr>
+</p:sld>
+</file>
+
+<file path=ppt/slides/slide43.xml><?xml version="1.0" encoding="utf-8"?>
+<p:sld xmlns:a="http://schemas.openxmlformats.org/drawingml/2006/main" xmlns:r="http://schemas.openxmlformats.org/officeDocument/2006/relationships" xmlns:p="http://schemas.openxmlformats.org/presentationml/2006/main">
+  <p:cSld>
+    <p:spTree>
+      <p:nvGrpSpPr>
+        <p:cNvPr id="1" name=""/>
+        <p:cNvGrpSpPr/>
+        <p:nvPr/>
+      </p:nvGrpSpPr>
+      <p:grpSpPr>
+        <a:xfrm>
+          <a:off x="0" y="0"/>
+          <a:ext cx="0" cy="0"/>
+          <a:chOff x="0" y="0"/>
+          <a:chExt cx="0" cy="0"/>
+        </a:xfrm>
+      </p:grpSpPr>
+      <p:sp>
+        <p:nvSpPr>
+          <p:cNvPr id="2" name="Content Placeholder 1"/>
+          <p:cNvSpPr>
+            <a:spLocks noGrp="1"/>
+          </p:cNvSpPr>
+          <p:nvPr>
+            <p:ph idx="1"/>
+          </p:nvPr>
+        </p:nvSpPr>
+        <p:spPr/>
+        <p:txBody>
+          <a:bodyPr/>
+          <a:lstStyle/>
+          <a:p>
+            <a:r>
+              <a:rPr lang="en-US" dirty="0" smtClean="0"/>
+              <a:t>Survey link: </a:t>
+            </a:r>
+            <a:r>
+              <a:rPr lang="en-US" dirty="0">
+                <a:hlinkClick r:id="rId3"/>
+              </a:rPr>
+              <a:t>http://</a:t>
+            </a:r>
+            <a:r>
+              <a:rPr lang="en-US" dirty="0" smtClean="0">
+                <a:hlinkClick r:id="rId3"/>
+              </a:rPr>
+              <a:t>bit.ly/oulib_davis_workshop</a:t>
+            </a:r>
+            <a:r>
+              <a:rPr lang="en-US" dirty="0" smtClean="0"/>
+              <a:t> </a:t>
+            </a:r>
+          </a:p>
+          <a:p>
+            <a:r>
+              <a:rPr lang="en-US" smtClean="0"/>
+              <a:t>Workshop </a:t>
+            </a:r>
+            <a:r>
+              <a:rPr lang="en-US" dirty="0" smtClean="0"/>
+              <a:t>topic: Data-driven </a:t>
+            </a:r>
+            <a:r>
+              <a:rPr lang="en-US" dirty="0" smtClean="0"/>
+              <a:t>visualizations</a:t>
+            </a:r>
+          </a:p>
+          <a:p>
+            <a:r>
+              <a:rPr lang="en-US" dirty="0" smtClean="0"/>
+              <a:t>Workshop date: April 5, 2019</a:t>
+            </a:r>
+            <a:endParaRPr lang="en-US" dirty="0" smtClean="0"/>
+          </a:p>
+        </p:txBody>
+      </p:sp>
+      <p:sp>
+        <p:nvSpPr>
+          <p:cNvPr id="4" name="Title 3">
+            <a:extLst>
+              <a:ext uri="{FF2B5EF4-FFF2-40B4-BE49-F238E27FC236}">
+                <a16:creationId xmlns:a16="http://schemas.microsoft.com/office/drawing/2014/main" id="{EE4C4D20-498A-0B4C-B3DF-B1E363085ADC}"/>
+              </a:ext>
+            </a:extLst>
+          </p:cNvPr>
+          <p:cNvSpPr>
+            <a:spLocks noGrp="1"/>
+          </p:cNvSpPr>
+          <p:nvPr>
+            <p:ph type="title"/>
+          </p:nvPr>
+        </p:nvSpPr>
+        <p:spPr>
+          <a:xfrm>
+            <a:off x="1168708" y="675829"/>
+            <a:ext cx="10042087" cy="500289"/>
+          </a:xfrm>
+          <a:prstGeom prst="rect">
+            <a:avLst/>
+          </a:prstGeom>
+        </p:spPr>
+        <p:txBody>
+          <a:bodyPr/>
+          <a:lstStyle/>
+          <a:p>
+            <a:r>
+              <a:rPr lang="en-US" b="1" dirty="0" smtClean="0">
+                <a:solidFill>
+                  <a:srgbClr val="8E1731"/>
+                </a:solidFill>
+              </a:rPr>
+              <a:t>Please take 3 min to help us improve</a:t>
+            </a:r>
+            <a:endParaRPr lang="en-US" b="1" dirty="0">
+              <a:solidFill>
+                <a:srgbClr val="8E1731"/>
+              </a:solidFill>
+            </a:endParaRPr>
+          </a:p>
+        </p:txBody>
+      </p:sp>
+    </p:spTree>
+    <p:extLst>
+      <p:ext uri="{BB962C8B-B14F-4D97-AF65-F5344CB8AC3E}">
+        <p14:creationId xmlns:p14="http://schemas.microsoft.com/office/powerpoint/2010/main" val="1017636609"/>
       </p:ext>
     </p:extLst>
   </p:cSld>

</xml_diff>

<commit_message>
making slides match outline better
</commit_message>
<xml_diff>
--- a/activities.pptx
+++ b/activities.pptx
@@ -5,7 +5,7 @@
     <p:sldMasterId id="2147483660" r:id="rId1"/>
   </p:sldMasterIdLst>
   <p:notesMasterIdLst>
-    <p:notesMasterId r:id="rId45"/>
+    <p:notesMasterId r:id="rId48"/>
   </p:notesMasterIdLst>
   <p:sldIdLst>
     <p:sldId id="265" r:id="rId2"/>
@@ -19,14 +19,14 @@
     <p:sldId id="288" r:id="rId10"/>
     <p:sldId id="284" r:id="rId11"/>
     <p:sldId id="290" r:id="rId12"/>
-    <p:sldId id="291" r:id="rId13"/>
-    <p:sldId id="292" r:id="rId14"/>
-    <p:sldId id="289" r:id="rId15"/>
-    <p:sldId id="293" r:id="rId16"/>
-    <p:sldId id="294" r:id="rId17"/>
-    <p:sldId id="295" r:id="rId18"/>
-    <p:sldId id="296" r:id="rId19"/>
-    <p:sldId id="297" r:id="rId20"/>
+    <p:sldId id="292" r:id="rId13"/>
+    <p:sldId id="289" r:id="rId14"/>
+    <p:sldId id="293" r:id="rId15"/>
+    <p:sldId id="294" r:id="rId16"/>
+    <p:sldId id="295" r:id="rId17"/>
+    <p:sldId id="296" r:id="rId18"/>
+    <p:sldId id="297" r:id="rId19"/>
+    <p:sldId id="314" r:id="rId20"/>
     <p:sldId id="301" r:id="rId21"/>
     <p:sldId id="300" r:id="rId22"/>
     <p:sldId id="302" r:id="rId23"/>
@@ -38,19 +38,22 @@
     <p:sldId id="308" r:id="rId29"/>
     <p:sldId id="279" r:id="rId30"/>
     <p:sldId id="310" r:id="rId31"/>
-    <p:sldId id="311" r:id="rId32"/>
-    <p:sldId id="312" r:id="rId33"/>
-    <p:sldId id="309" r:id="rId34"/>
-    <p:sldId id="269" r:id="rId35"/>
-    <p:sldId id="270" r:id="rId36"/>
-    <p:sldId id="271" r:id="rId37"/>
-    <p:sldId id="272" r:id="rId38"/>
-    <p:sldId id="313" r:id="rId39"/>
-    <p:sldId id="273" r:id="rId40"/>
-    <p:sldId id="274" r:id="rId41"/>
-    <p:sldId id="275" r:id="rId42"/>
-    <p:sldId id="277" r:id="rId43"/>
-    <p:sldId id="276" r:id="rId44"/>
+    <p:sldId id="312" r:id="rId32"/>
+    <p:sldId id="309" r:id="rId33"/>
+    <p:sldId id="269" r:id="rId34"/>
+    <p:sldId id="270" r:id="rId35"/>
+    <p:sldId id="271" r:id="rId36"/>
+    <p:sldId id="272" r:id="rId37"/>
+    <p:sldId id="315" r:id="rId38"/>
+    <p:sldId id="317" r:id="rId39"/>
+    <p:sldId id="318" r:id="rId40"/>
+    <p:sldId id="319" r:id="rId41"/>
+    <p:sldId id="313" r:id="rId42"/>
+    <p:sldId id="273" r:id="rId43"/>
+    <p:sldId id="274" r:id="rId44"/>
+    <p:sldId id="275" r:id="rId45"/>
+    <p:sldId id="277" r:id="rId46"/>
+    <p:sldId id="276" r:id="rId47"/>
   </p:sldIdLst>
   <p:sldSz cx="12192000" cy="6858000"/>
   <p:notesSz cx="6858000" cy="9144000"/>
@@ -239,7 +242,7 @@
           <a:p>
             <a:fld id="{DC7024D4-8219-4EEB-977B-76F389E98656}" type="datetimeFigureOut">
               <a:rPr lang="en-US" smtClean="0"/>
-              <a:t>3/27/2019</a:t>
+              <a:t>3/28/2019</a:t>
             </a:fld>
             <a:endParaRPr lang="en-US"/>
           </a:p>
@@ -584,7 +587,7 @@
           <a:p>
             <a:fld id="{7D86B546-8556-4315-96DD-942723B58990}" type="slidenum">
               <a:rPr lang="en-US" smtClean="0"/>
-              <a:t>43</a:t>
+              <a:t>46</a:t>
             </a:fld>
             <a:endParaRPr lang="en-US"/>
           </a:p>
@@ -6482,8 +6485,49 @@
           <a:p>
             <a:r>
               <a:rPr lang="en-US" dirty="0" smtClean="0"/>
-              <a:t>Depends on your question</a:t>
-            </a:r>
+              <a:t>4 </a:t>
+            </a:r>
+            <a:r>
+              <a:rPr lang="en-US" dirty="0"/>
+              <a:t>columns/variables</a:t>
+            </a:r>
+          </a:p>
+          <a:p>
+            <a:pPr lvl="1"/>
+            <a:r>
+              <a:rPr lang="en-US" dirty="0"/>
+              <a:t>Two </a:t>
+            </a:r>
+            <a:r>
+              <a:rPr lang="en-US" dirty="0" smtClean="0"/>
+              <a:t>numeric (</a:t>
+            </a:r>
+            <a:r>
+              <a:rPr lang="en-US" dirty="0"/>
+              <a:t>carat, price)</a:t>
+            </a:r>
+          </a:p>
+          <a:p>
+            <a:pPr lvl="1"/>
+            <a:r>
+              <a:rPr lang="en-US" dirty="0"/>
+              <a:t>Two </a:t>
+            </a:r>
+            <a:r>
+              <a:rPr lang="en-US" dirty="0" smtClean="0"/>
+              <a:t>categorical (cut</a:t>
+            </a:r>
+            <a:r>
+              <a:rPr lang="en-US" dirty="0"/>
+              <a:t>, clarity)</a:t>
+            </a:r>
+          </a:p>
+          <a:p>
+            <a:r>
+              <a:rPr lang="en-US" dirty="0" smtClean="0"/>
+              <a:t>Which we are going to use depends on our question</a:t>
+            </a:r>
+            <a:endParaRPr lang="en-US" dirty="0" smtClean="0"/>
           </a:p>
         </p:txBody>
       </p:sp>
@@ -6578,7 +6622,7 @@
     </p:spTree>
     <p:extLst>
       <p:ext uri="{BB962C8B-B14F-4D97-AF65-F5344CB8AC3E}">
-        <p14:creationId xmlns:p14="http://schemas.microsoft.com/office/powerpoint/2010/main" val="3420984000"/>
+        <p14:creationId xmlns:p14="http://schemas.microsoft.com/office/powerpoint/2010/main" val="2884155880"/>
       </p:ext>
     </p:extLst>
   </p:cSld>
@@ -6618,7 +6662,7 @@
         <p:spPr>
           <a:xfrm>
             <a:off x="609600" y="1600201"/>
-            <a:ext cx="10037523" cy="4123702"/>
+            <a:ext cx="10744200" cy="4123702"/>
           </a:xfrm>
         </p:spPr>
         <p:txBody>
@@ -6629,53 +6673,13 @@
           <a:p>
             <a:r>
               <a:rPr lang="en-US" dirty="0" smtClean="0"/>
-              <a:t>How many variables do you have?</a:t>
-            </a:r>
-          </a:p>
-          <a:p>
+              <a:t>Let’s start with our two numeric </a:t>
+            </a:r>
             <a:r>
               <a:rPr lang="en-US" dirty="0" smtClean="0"/>
-              <a:t>Depends on your question</a:t>
-            </a:r>
-          </a:p>
-          <a:p>
-            <a:r>
-              <a:rPr lang="en-US" dirty="0"/>
-              <a:t>4 columns/variables</a:t>
-            </a:r>
-          </a:p>
-          <a:p>
-            <a:pPr lvl="1"/>
-            <a:r>
-              <a:rPr lang="en-US" dirty="0"/>
-              <a:t>Two </a:t>
-            </a:r>
-            <a:r>
-              <a:rPr lang="en-US" dirty="0" smtClean="0"/>
-              <a:t>numeric (</a:t>
-            </a:r>
-            <a:r>
-              <a:rPr lang="en-US" dirty="0"/>
-              <a:t>carat, price)</a:t>
-            </a:r>
-          </a:p>
-          <a:p>
-            <a:pPr lvl="1"/>
-            <a:r>
-              <a:rPr lang="en-US" dirty="0"/>
-              <a:t>Two </a:t>
-            </a:r>
-            <a:r>
-              <a:rPr lang="en-US" dirty="0" smtClean="0"/>
-              <a:t>categorical (cut</a:t>
-            </a:r>
-            <a:r>
-              <a:rPr lang="en-US" dirty="0"/>
-              <a:t>, clarity)</a:t>
-            </a:r>
-          </a:p>
-          <a:p>
-            <a:endParaRPr lang="en-US" dirty="0" smtClean="0"/>
+              <a:t>variables</a:t>
+            </a:r>
+            <a:endParaRPr lang="en-US" dirty="0"/>
           </a:p>
         </p:txBody>
       </p:sp>
@@ -6770,7 +6774,7 @@
     </p:spTree>
     <p:extLst>
       <p:ext uri="{BB962C8B-B14F-4D97-AF65-F5344CB8AC3E}">
-        <p14:creationId xmlns:p14="http://schemas.microsoft.com/office/powerpoint/2010/main" val="2884155880"/>
+        <p14:creationId xmlns:p14="http://schemas.microsoft.com/office/powerpoint/2010/main" val="2721190574"/>
       </p:ext>
     </p:extLst>
   </p:cSld>
@@ -6820,9 +6824,22 @@
           <a:lstStyle/>
           <a:p>
             <a:r>
+              <a:rPr lang="en-US" dirty="0" smtClean="0">
+                <a:solidFill>
+                  <a:schemeClr val="bg2"/>
+                </a:solidFill>
+              </a:rPr>
+              <a:t>Let’s start with our two numeric variables and choose “2”</a:t>
+            </a:r>
+          </a:p>
+          <a:p>
+            <a:r>
               <a:rPr lang="en-US" dirty="0" smtClean="0"/>
-              <a:t>Let’s start with our two numeric variables and choose “2”</a:t>
-            </a:r>
+              <a:t>Are your data currently raw or summaries?</a:t>
+            </a:r>
+          </a:p>
+          <a:p>
+            <a:endParaRPr lang="en-US" dirty="0" smtClean="0"/>
           </a:p>
           <a:p>
             <a:endParaRPr lang="en-US" dirty="0"/>
@@ -6920,7 +6937,7 @@
     </p:spTree>
     <p:extLst>
       <p:ext uri="{BB962C8B-B14F-4D97-AF65-F5344CB8AC3E}">
-        <p14:creationId xmlns:p14="http://schemas.microsoft.com/office/powerpoint/2010/main" val="2721190574"/>
+        <p14:creationId xmlns:p14="http://schemas.microsoft.com/office/powerpoint/2010/main" val="4228497765"/>
       </p:ext>
     </p:extLst>
   </p:cSld>
@@ -6970,7 +6987,7 @@
           <a:lstStyle/>
           <a:p>
             <a:r>
-              <a:rPr lang="en-US" dirty="0" smtClean="0">
+              <a:rPr lang="en-US" dirty="0">
                 <a:solidFill>
                   <a:schemeClr val="bg2"/>
                 </a:solidFill>
@@ -6980,8 +6997,18 @@
           </a:p>
           <a:p>
             <a:r>
+              <a:rPr lang="en-US" dirty="0">
+                <a:solidFill>
+                  <a:schemeClr val="bg2"/>
+                </a:solidFill>
+              </a:rPr>
+              <a:t>Are your data currently raw or summaries?</a:t>
+            </a:r>
+          </a:p>
+          <a:p>
+            <a:r>
               <a:rPr lang="en-US" dirty="0" smtClean="0"/>
-              <a:t>Are your data currently raw or summaries?</a:t>
+              <a:t>Is your x/predictor/independent variable numeric or categorical?</a:t>
             </a:r>
           </a:p>
           <a:p>
@@ -7083,7 +7110,7 @@
     </p:spTree>
     <p:extLst>
       <p:ext uri="{BB962C8B-B14F-4D97-AF65-F5344CB8AC3E}">
-        <p14:creationId xmlns:p14="http://schemas.microsoft.com/office/powerpoint/2010/main" val="4228497765"/>
+        <p14:creationId xmlns:p14="http://schemas.microsoft.com/office/powerpoint/2010/main" val="2818354766"/>
       </p:ext>
     </p:extLst>
   </p:cSld>
@@ -7153,8 +7180,18 @@
           </a:p>
           <a:p>
             <a:r>
+              <a:rPr lang="en-US" dirty="0" smtClean="0">
+                <a:solidFill>
+                  <a:schemeClr val="bg2"/>
+                </a:solidFill>
+              </a:rPr>
+              <a:t>Is your x/predictor/independent variable numeric or categorical?</a:t>
+            </a:r>
+          </a:p>
+          <a:p>
+            <a:r>
               <a:rPr lang="en-US" dirty="0" smtClean="0"/>
-              <a:t>Is your x/predictor/independent variable numeric or categorical?</a:t>
+              <a:t>Make a scatterplot</a:t>
             </a:r>
           </a:p>
           <a:p>
@@ -7253,10 +7290,34 @@
           </a:p>
         </p:txBody>
       </p:sp>
+      <p:pic>
+        <p:nvPicPr>
+          <p:cNvPr id="4" name="Picture 3"/>
+          <p:cNvPicPr>
+            <a:picLocks noChangeAspect="1"/>
+          </p:cNvPicPr>
+          <p:nvPr/>
+        </p:nvPicPr>
+        <p:blipFill>
+          <a:blip r:embed="rId2"/>
+          <a:stretch>
+            <a:fillRect/>
+          </a:stretch>
+        </p:blipFill>
+        <p:spPr>
+          <a:xfrm>
+            <a:off x="5574083" y="1342871"/>
+            <a:ext cx="5554249" cy="4728849"/>
+          </a:xfrm>
+          <a:prstGeom prst="rect">
+            <a:avLst/>
+          </a:prstGeom>
+        </p:spPr>
+      </p:pic>
     </p:spTree>
     <p:extLst>
       <p:ext uri="{BB962C8B-B14F-4D97-AF65-F5344CB8AC3E}">
-        <p14:creationId xmlns:p14="http://schemas.microsoft.com/office/powerpoint/2010/main" val="2818354766"/>
+        <p14:creationId xmlns:p14="http://schemas.microsoft.com/office/powerpoint/2010/main" val="2372892924"/>
       </p:ext>
     </p:extLst>
   </p:cSld>
@@ -7283,159 +7344,6 @@
           <a:chExt cx="0" cy="0"/>
         </a:xfrm>
       </p:grpSpPr>
-      <p:sp>
-        <p:nvSpPr>
-          <p:cNvPr id="2" name="Content Placeholder 1"/>
-          <p:cNvSpPr>
-            <a:spLocks noGrp="1"/>
-          </p:cNvSpPr>
-          <p:nvPr>
-            <p:ph idx="1"/>
-          </p:nvPr>
-        </p:nvSpPr>
-        <p:spPr>
-          <a:xfrm>
-            <a:off x="609600" y="1600201"/>
-            <a:ext cx="10744200" cy="4123702"/>
-          </a:xfrm>
-        </p:spPr>
-        <p:txBody>
-          <a:bodyPr>
-            <a:normAutofit/>
-          </a:bodyPr>
-          <a:lstStyle/>
-          <a:p>
-            <a:r>
-              <a:rPr lang="en-US" dirty="0">
-                <a:solidFill>
-                  <a:schemeClr val="bg2"/>
-                </a:solidFill>
-              </a:rPr>
-              <a:t>Let’s start with our two numeric variables and choose “2”</a:t>
-            </a:r>
-          </a:p>
-          <a:p>
-            <a:r>
-              <a:rPr lang="en-US" dirty="0">
-                <a:solidFill>
-                  <a:schemeClr val="bg2"/>
-                </a:solidFill>
-              </a:rPr>
-              <a:t>Are your data currently raw or summaries?</a:t>
-            </a:r>
-          </a:p>
-          <a:p>
-            <a:r>
-              <a:rPr lang="en-US" dirty="0" smtClean="0">
-                <a:solidFill>
-                  <a:schemeClr val="bg2"/>
-                </a:solidFill>
-              </a:rPr>
-              <a:t>Is your x/predictor/independent variable numeric or categorical?</a:t>
-            </a:r>
-          </a:p>
-          <a:p>
-            <a:r>
-              <a:rPr lang="en-US" dirty="0" smtClean="0"/>
-              <a:t>Make a scatterplot</a:t>
-            </a:r>
-          </a:p>
-          <a:p>
-            <a:endParaRPr lang="en-US" dirty="0" smtClean="0"/>
-          </a:p>
-          <a:p>
-            <a:endParaRPr lang="en-US" dirty="0"/>
-          </a:p>
-        </p:txBody>
-      </p:sp>
-      <p:sp>
-        <p:nvSpPr>
-          <p:cNvPr id="10" name="Title 9">
-            <a:extLst>
-              <a:ext uri="{FF2B5EF4-FFF2-40B4-BE49-F238E27FC236}">
-                <a16:creationId xmlns:a16="http://schemas.microsoft.com/office/drawing/2014/main" id="{FFFB4824-2F2C-0B4E-8B65-C35C93FB68FF}"/>
-              </a:ext>
-            </a:extLst>
-          </p:cNvPr>
-          <p:cNvSpPr>
-            <a:spLocks noGrp="1"/>
-          </p:cNvSpPr>
-          <p:nvPr>
-            <p:ph type="title"/>
-          </p:nvPr>
-        </p:nvSpPr>
-        <p:spPr>
-          <a:xfrm>
-            <a:off x="1168708" y="675829"/>
-            <a:ext cx="9478415" cy="500289"/>
-          </a:xfrm>
-          <a:prstGeom prst="rect">
-            <a:avLst/>
-          </a:prstGeom>
-        </p:spPr>
-        <p:txBody>
-          <a:bodyPr/>
-          <a:lstStyle/>
-          <a:p>
-            <a:r>
-              <a:rPr lang="en-US" b="1" dirty="0" smtClean="0">
-                <a:solidFill>
-                  <a:srgbClr val="8E1731"/>
-                </a:solidFill>
-              </a:rPr>
-              <a:t>Another example with a larger dataset</a:t>
-            </a:r>
-            <a:endParaRPr lang="en-US" b="1" dirty="0">
-              <a:solidFill>
-                <a:srgbClr val="8E1731"/>
-              </a:solidFill>
-            </a:endParaRPr>
-          </a:p>
-        </p:txBody>
-      </p:sp>
-      <p:sp>
-        <p:nvSpPr>
-          <p:cNvPr id="6" name="Title 1"/>
-          <p:cNvSpPr txBox="1">
-            <a:spLocks/>
-          </p:cNvSpPr>
-          <p:nvPr/>
-        </p:nvSpPr>
-        <p:spPr>
-          <a:xfrm>
-            <a:off x="838200" y="365125"/>
-            <a:ext cx="10515600" cy="1325563"/>
-          </a:xfrm>
-          <a:prstGeom prst="rect">
-            <a:avLst/>
-          </a:prstGeom>
-        </p:spPr>
-        <p:txBody>
-          <a:bodyPr/>
-          <a:lstStyle>
-            <a:lvl1pPr algn="l" defTabSz="914400" rtl="0" eaLnBrk="1" latinLnBrk="0" hangingPunct="1">
-              <a:lnSpc>
-                <a:spcPct val="90000"/>
-              </a:lnSpc>
-              <a:spcBef>
-                <a:spcPct val="0"/>
-              </a:spcBef>
-              <a:buNone/>
-              <a:defRPr sz="3600" kern="1200">
-                <a:solidFill>
-                  <a:schemeClr val="tx1"/>
-                </a:solidFill>
-                <a:latin typeface="+mj-lt"/>
-                <a:ea typeface="+mj-ea"/>
-                <a:cs typeface="+mj-cs"/>
-              </a:defRPr>
-            </a:lvl1pPr>
-          </a:lstStyle>
-          <a:p>
-            <a:endParaRPr lang="en-US" dirty="0"/>
-          </a:p>
-        </p:txBody>
-      </p:sp>
       <p:pic>
         <p:nvPicPr>
           <p:cNvPr id="4" name="Picture 3"/>
@@ -7452,18 +7360,233 @@
         </p:blipFill>
         <p:spPr>
           <a:xfrm>
-            <a:off x="5574083" y="1342871"/>
-            <a:ext cx="5554249" cy="4728849"/>
+            <a:off x="3891373" y="3271397"/>
+            <a:ext cx="11699402" cy="9008268"/>
           </a:xfrm>
           <a:prstGeom prst="rect">
             <a:avLst/>
           </a:prstGeom>
         </p:spPr>
       </p:pic>
+      <p:sp>
+        <p:nvSpPr>
+          <p:cNvPr id="2" name="Content Placeholder 1"/>
+          <p:cNvSpPr>
+            <a:spLocks noGrp="1"/>
+          </p:cNvSpPr>
+          <p:nvPr>
+            <p:ph idx="1"/>
+          </p:nvPr>
+        </p:nvSpPr>
+        <p:spPr>
+          <a:xfrm>
+            <a:off x="609600" y="1600201"/>
+            <a:ext cx="10744200" cy="4123702"/>
+          </a:xfrm>
+        </p:spPr>
+        <p:txBody>
+          <a:bodyPr>
+            <a:normAutofit/>
+          </a:bodyPr>
+          <a:lstStyle/>
+          <a:p>
+            <a:r>
+              <a:rPr lang="en-US" dirty="0" smtClean="0"/>
+              <a:t>Go back to “variables 3+ are”</a:t>
+            </a:r>
+          </a:p>
+          <a:p>
+            <a:pPr marL="0" indent="0">
+              <a:buNone/>
+            </a:pPr>
+            <a:r>
+              <a:rPr lang="en-US" dirty="0" smtClean="0"/>
+              <a:t>(just right of step 1)</a:t>
+            </a:r>
+          </a:p>
+          <a:p>
+            <a:endParaRPr lang="en-US" dirty="0" smtClean="0"/>
+          </a:p>
+          <a:p>
+            <a:endParaRPr lang="en-US" dirty="0"/>
+          </a:p>
+        </p:txBody>
+      </p:sp>
+      <p:sp>
+        <p:nvSpPr>
+          <p:cNvPr id="10" name="Title 9">
+            <a:extLst>
+              <a:ext uri="{FF2B5EF4-FFF2-40B4-BE49-F238E27FC236}">
+                <a16:creationId xmlns:a16="http://schemas.microsoft.com/office/drawing/2014/main" id="{FFFB4824-2F2C-0B4E-8B65-C35C93FB68FF}"/>
+              </a:ext>
+            </a:extLst>
+          </p:cNvPr>
+          <p:cNvSpPr>
+            <a:spLocks noGrp="1"/>
+          </p:cNvSpPr>
+          <p:nvPr>
+            <p:ph type="title"/>
+          </p:nvPr>
+        </p:nvSpPr>
+        <p:spPr>
+          <a:xfrm>
+            <a:off x="1168708" y="675829"/>
+            <a:ext cx="9478415" cy="500289"/>
+          </a:xfrm>
+          <a:prstGeom prst="rect">
+            <a:avLst/>
+          </a:prstGeom>
+        </p:spPr>
+        <p:txBody>
+          <a:bodyPr/>
+          <a:lstStyle/>
+          <a:p>
+            <a:r>
+              <a:rPr lang="en-US" b="1" dirty="0" smtClean="0">
+                <a:solidFill>
+                  <a:srgbClr val="8E1731"/>
+                </a:solidFill>
+              </a:rPr>
+              <a:t>What </a:t>
+            </a:r>
+            <a:r>
+              <a:rPr lang="en-US" b="1" dirty="0" smtClean="0">
+                <a:solidFill>
+                  <a:srgbClr val="8E1731"/>
+                </a:solidFill>
+              </a:rPr>
+              <a:t>if our question includes the groups?</a:t>
+            </a:r>
+            <a:endParaRPr lang="en-US" b="1" dirty="0">
+              <a:solidFill>
+                <a:srgbClr val="8E1731"/>
+              </a:solidFill>
+            </a:endParaRPr>
+          </a:p>
+        </p:txBody>
+      </p:sp>
+      <p:sp>
+        <p:nvSpPr>
+          <p:cNvPr id="6" name="Title 1"/>
+          <p:cNvSpPr txBox="1">
+            <a:spLocks/>
+          </p:cNvSpPr>
+          <p:nvPr/>
+        </p:nvSpPr>
+        <p:spPr>
+          <a:xfrm>
+            <a:off x="838200" y="365125"/>
+            <a:ext cx="10515600" cy="1325563"/>
+          </a:xfrm>
+          <a:prstGeom prst="rect">
+            <a:avLst/>
+          </a:prstGeom>
+        </p:spPr>
+        <p:txBody>
+          <a:bodyPr/>
+          <a:lstStyle>
+            <a:lvl1pPr algn="l" defTabSz="914400" rtl="0" eaLnBrk="1" latinLnBrk="0" hangingPunct="1">
+              <a:lnSpc>
+                <a:spcPct val="90000"/>
+              </a:lnSpc>
+              <a:spcBef>
+                <a:spcPct val="0"/>
+              </a:spcBef>
+              <a:buNone/>
+              <a:defRPr sz="3600" kern="1200">
+                <a:solidFill>
+                  <a:schemeClr val="tx1"/>
+                </a:solidFill>
+                <a:latin typeface="+mj-lt"/>
+                <a:ea typeface="+mj-ea"/>
+                <a:cs typeface="+mj-cs"/>
+              </a:defRPr>
+            </a:lvl1pPr>
+          </a:lstStyle>
+          <a:p>
+            <a:endParaRPr lang="en-US" dirty="0"/>
+          </a:p>
+        </p:txBody>
+      </p:sp>
+      <p:cxnSp>
+        <p:nvCxnSpPr>
+          <p:cNvPr id="7" name="Straight Arrow Connector 6"/>
+          <p:cNvCxnSpPr/>
+          <p:nvPr/>
+        </p:nvCxnSpPr>
+        <p:spPr>
+          <a:xfrm flipH="1">
+            <a:off x="7946375" y="2114771"/>
+            <a:ext cx="511825" cy="1321266"/>
+          </a:xfrm>
+          <a:prstGeom prst="straightConnector1">
+            <a:avLst/>
+          </a:prstGeom>
+          <a:ln w="152400">
+            <a:tailEnd type="triangle"/>
+          </a:ln>
+        </p:spPr>
+        <p:style>
+          <a:lnRef idx="1">
+            <a:schemeClr val="accent1"/>
+          </a:lnRef>
+          <a:fillRef idx="0">
+            <a:schemeClr val="accent1"/>
+          </a:fillRef>
+          <a:effectRef idx="0">
+            <a:schemeClr val="accent1"/>
+          </a:effectRef>
+          <a:fontRef idx="minor">
+            <a:schemeClr val="tx1"/>
+          </a:fontRef>
+        </p:style>
+      </p:cxnSp>
+      <p:sp>
+        <p:nvSpPr>
+          <p:cNvPr id="11" name="Oval 10"/>
+          <p:cNvSpPr/>
+          <p:nvPr/>
+        </p:nvSpPr>
+        <p:spPr>
+          <a:xfrm>
+            <a:off x="7378700" y="3436037"/>
+            <a:ext cx="977900" cy="945463"/>
+          </a:xfrm>
+          <a:prstGeom prst="ellipse">
+            <a:avLst/>
+          </a:prstGeom>
+          <a:noFill/>
+          <a:ln w="76200"/>
+        </p:spPr>
+        <p:style>
+          <a:lnRef idx="2">
+            <a:schemeClr val="accent1">
+              <a:shade val="50000"/>
+            </a:schemeClr>
+          </a:lnRef>
+          <a:fillRef idx="1">
+            <a:schemeClr val="accent1"/>
+          </a:fillRef>
+          <a:effectRef idx="0">
+            <a:schemeClr val="accent1"/>
+          </a:effectRef>
+          <a:fontRef idx="minor">
+            <a:schemeClr val="lt1"/>
+          </a:fontRef>
+        </p:style>
+        <p:txBody>
+          <a:bodyPr rtlCol="0" anchor="ctr"/>
+          <a:lstStyle/>
+          <a:p>
+            <a:pPr algn="ctr"/>
+            <a:endParaRPr lang="en-US"/>
+          </a:p>
+        </p:txBody>
+      </p:sp>
     </p:spTree>
     <p:extLst>
       <p:ext uri="{BB962C8B-B14F-4D97-AF65-F5344CB8AC3E}">
-        <p14:creationId xmlns:p14="http://schemas.microsoft.com/office/powerpoint/2010/main" val="2372892924"/>
+        <p14:creationId xmlns:p14="http://schemas.microsoft.com/office/powerpoint/2010/main" val="1967531156"/>
       </p:ext>
     </p:extLst>
   </p:cSld>
@@ -7514,20 +7637,8 @@
           <a:p>
             <a:r>
               <a:rPr lang="en-US" dirty="0" smtClean="0"/>
-              <a:t>Go back to “variables 3+ are”</a:t>
-            </a:r>
-          </a:p>
-          <a:p>
-            <a:pPr marL="0" indent="0">
-              <a:buNone/>
-            </a:pPr>
-            <a:r>
-              <a:rPr lang="en-US" dirty="0" smtClean="0"/>
-              <a:t>(just right of step 1)</a:t>
-            </a:r>
-          </a:p>
-          <a:p>
-            <a:endParaRPr lang="en-US" dirty="0" smtClean="0"/>
+              <a:t>Variables 3+ are…</a:t>
+            </a:r>
           </a:p>
           <a:p>
             <a:endParaRPr lang="en-US" dirty="0"/>
@@ -7622,109 +7733,10 @@
           </a:p>
         </p:txBody>
       </p:sp>
-      <p:pic>
-        <p:nvPicPr>
-          <p:cNvPr id="3" name="Picture 2"/>
-          <p:cNvPicPr>
-            <a:picLocks noChangeAspect="1"/>
-          </p:cNvPicPr>
-          <p:nvPr/>
-        </p:nvPicPr>
-        <p:blipFill>
-          <a:blip r:embed="rId2"/>
-          <a:stretch>
-            <a:fillRect/>
-          </a:stretch>
-        </p:blipFill>
-        <p:spPr>
-          <a:xfrm>
-            <a:off x="4540176" y="2925764"/>
-            <a:ext cx="10339915" cy="7970906"/>
-          </a:xfrm>
-          <a:prstGeom prst="rect">
-            <a:avLst/>
-          </a:prstGeom>
-        </p:spPr>
-      </p:pic>
-      <p:cxnSp>
-        <p:nvCxnSpPr>
-          <p:cNvPr id="7" name="Straight Arrow Connector 6"/>
-          <p:cNvCxnSpPr/>
-          <p:nvPr/>
-        </p:nvCxnSpPr>
-        <p:spPr>
-          <a:xfrm flipH="1">
-            <a:off x="7946375" y="2114771"/>
-            <a:ext cx="511825" cy="1321266"/>
-          </a:xfrm>
-          <a:prstGeom prst="straightConnector1">
-            <a:avLst/>
-          </a:prstGeom>
-          <a:ln w="152400">
-            <a:tailEnd type="triangle"/>
-          </a:ln>
-        </p:spPr>
-        <p:style>
-          <a:lnRef idx="1">
-            <a:schemeClr val="accent1"/>
-          </a:lnRef>
-          <a:fillRef idx="0">
-            <a:schemeClr val="accent1"/>
-          </a:fillRef>
-          <a:effectRef idx="0">
-            <a:schemeClr val="accent1"/>
-          </a:effectRef>
-          <a:fontRef idx="minor">
-            <a:schemeClr val="tx1"/>
-          </a:fontRef>
-        </p:style>
-      </p:cxnSp>
-      <p:sp>
-        <p:nvSpPr>
-          <p:cNvPr id="11" name="Oval 10"/>
-          <p:cNvSpPr/>
-          <p:nvPr/>
-        </p:nvSpPr>
-        <p:spPr>
-          <a:xfrm>
-            <a:off x="7378700" y="3436037"/>
-            <a:ext cx="977900" cy="945463"/>
-          </a:xfrm>
-          <a:prstGeom prst="ellipse">
-            <a:avLst/>
-          </a:prstGeom>
-          <a:noFill/>
-          <a:ln w="76200"/>
-        </p:spPr>
-        <p:style>
-          <a:lnRef idx="2">
-            <a:schemeClr val="accent1">
-              <a:shade val="50000"/>
-            </a:schemeClr>
-          </a:lnRef>
-          <a:fillRef idx="1">
-            <a:schemeClr val="accent1"/>
-          </a:fillRef>
-          <a:effectRef idx="0">
-            <a:schemeClr val="accent1"/>
-          </a:effectRef>
-          <a:fontRef idx="minor">
-            <a:schemeClr val="lt1"/>
-          </a:fontRef>
-        </p:style>
-        <p:txBody>
-          <a:bodyPr rtlCol="0" anchor="ctr"/>
-          <a:lstStyle/>
-          <a:p>
-            <a:pPr algn="ctr"/>
-            <a:endParaRPr lang="en-US"/>
-          </a:p>
-        </p:txBody>
-      </p:sp>
     </p:spTree>
     <p:extLst>
       <p:ext uri="{BB962C8B-B14F-4D97-AF65-F5344CB8AC3E}">
-        <p14:creationId xmlns:p14="http://schemas.microsoft.com/office/powerpoint/2010/main" val="1967531156"/>
+        <p14:creationId xmlns:p14="http://schemas.microsoft.com/office/powerpoint/2010/main" val="1234981202"/>
       </p:ext>
     </p:extLst>
   </p:cSld>
@@ -7751,6 +7763,30 @@
           <a:chExt cx="0" cy="0"/>
         </a:xfrm>
       </p:grpSpPr>
+      <p:pic>
+        <p:nvPicPr>
+          <p:cNvPr id="4" name="Picture 3"/>
+          <p:cNvPicPr>
+            <a:picLocks noChangeAspect="1"/>
+          </p:cNvPicPr>
+          <p:nvPr/>
+        </p:nvPicPr>
+        <p:blipFill>
+          <a:blip r:embed="rId2"/>
+          <a:stretch>
+            <a:fillRect/>
+          </a:stretch>
+        </p:blipFill>
+        <p:spPr>
+          <a:xfrm>
+            <a:off x="3891373" y="3271397"/>
+            <a:ext cx="11699402" cy="9008268"/>
+          </a:xfrm>
+          <a:prstGeom prst="rect">
+            <a:avLst/>
+          </a:prstGeom>
+        </p:spPr>
+      </p:pic>
       <p:sp>
         <p:nvSpPr>
           <p:cNvPr id="2" name="Content Placeholder 1"/>
@@ -7775,8 +7811,12 @@
           <a:p>
             <a:r>
               <a:rPr lang="en-US" dirty="0" smtClean="0"/>
-              <a:t>Variables 3+ are…</a:t>
-            </a:r>
+              <a:t>We know we want a scatterplot</a:t>
+            </a:r>
+            <a:endParaRPr lang="en-US" dirty="0" smtClean="0"/>
+          </a:p>
+          <a:p>
+            <a:endParaRPr lang="en-US" dirty="0" smtClean="0"/>
           </a:p>
           <a:p>
             <a:endParaRPr lang="en-US" dirty="0"/>
@@ -7818,7 +7858,15 @@
                   <a:srgbClr val="8E1731"/>
                 </a:solidFill>
               </a:rPr>
-              <a:t>What about our grouping variables?</a:t>
+              <a:t>What </a:t>
+            </a:r>
+            <a:r>
+              <a:rPr lang="en-US" b="1" dirty="0" smtClean="0">
+                <a:solidFill>
+                  <a:srgbClr val="8E1731"/>
+                </a:solidFill>
+              </a:rPr>
+              <a:t>if our question includes the groups?</a:t>
             </a:r>
             <a:endParaRPr lang="en-US" b="1" dirty="0">
               <a:solidFill>
@@ -7871,10 +7919,85 @@
           </a:p>
         </p:txBody>
       </p:sp>
+      <p:cxnSp>
+        <p:nvCxnSpPr>
+          <p:cNvPr id="7" name="Straight Arrow Connector 6"/>
+          <p:cNvCxnSpPr/>
+          <p:nvPr/>
+        </p:nvCxnSpPr>
+        <p:spPr>
+          <a:xfrm flipH="1">
+            <a:off x="10647123" y="2847314"/>
+            <a:ext cx="511825" cy="1321266"/>
+          </a:xfrm>
+          <a:prstGeom prst="straightConnector1">
+            <a:avLst/>
+          </a:prstGeom>
+          <a:ln w="152400">
+            <a:tailEnd type="triangle"/>
+          </a:ln>
+        </p:spPr>
+        <p:style>
+          <a:lnRef idx="1">
+            <a:schemeClr val="accent1"/>
+          </a:lnRef>
+          <a:fillRef idx="0">
+            <a:schemeClr val="accent1"/>
+          </a:fillRef>
+          <a:effectRef idx="0">
+            <a:schemeClr val="accent1"/>
+          </a:effectRef>
+          <a:fontRef idx="minor">
+            <a:schemeClr val="tx1"/>
+          </a:fontRef>
+        </p:style>
+      </p:cxnSp>
+      <p:sp>
+        <p:nvSpPr>
+          <p:cNvPr id="11" name="Oval 10"/>
+          <p:cNvSpPr/>
+          <p:nvPr/>
+        </p:nvSpPr>
+        <p:spPr>
+          <a:xfrm>
+            <a:off x="8067630" y="4221271"/>
+            <a:ext cx="3506420" cy="711373"/>
+          </a:xfrm>
+          <a:prstGeom prst="ellipse">
+            <a:avLst/>
+          </a:prstGeom>
+          <a:noFill/>
+          <a:ln w="76200"/>
+        </p:spPr>
+        <p:style>
+          <a:lnRef idx="2">
+            <a:schemeClr val="accent1">
+              <a:shade val="50000"/>
+            </a:schemeClr>
+          </a:lnRef>
+          <a:fillRef idx="1">
+            <a:schemeClr val="accent1"/>
+          </a:fillRef>
+          <a:effectRef idx="0">
+            <a:schemeClr val="accent1"/>
+          </a:effectRef>
+          <a:fontRef idx="minor">
+            <a:schemeClr val="lt1"/>
+          </a:fontRef>
+        </p:style>
+        <p:txBody>
+          <a:bodyPr rtlCol="0" anchor="ctr"/>
+          <a:lstStyle/>
+          <a:p>
+            <a:pPr algn="ctr"/>
+            <a:endParaRPr lang="en-US"/>
+          </a:p>
+        </p:txBody>
+      </p:sp>
     </p:spTree>
     <p:extLst>
       <p:ext uri="{BB962C8B-B14F-4D97-AF65-F5344CB8AC3E}">
-        <p14:creationId xmlns:p14="http://schemas.microsoft.com/office/powerpoint/2010/main" val="1234981202"/>
+        <p14:creationId xmlns:p14="http://schemas.microsoft.com/office/powerpoint/2010/main" val="3350300270"/>
       </p:ext>
     </p:extLst>
   </p:cSld>
@@ -7924,13 +8047,12 @@
             </a:r>
             <a:r>
               <a:rPr lang="en-US" dirty="0"/>
-              <a:t>a sentence, table, or graph based on your question and data </a:t>
+              <a:t>a sentence, table, or </a:t>
             </a:r>
             <a:r>
               <a:rPr lang="en-US" dirty="0" smtClean="0"/>
-              <a:t>types</a:t>
-            </a:r>
-            <a:endParaRPr lang="en-US" dirty="0"/>
+              <a:t>graph</a:t>
+            </a:r>
           </a:p>
           <a:p>
             <a:r>
@@ -9088,11 +9210,7 @@
           <a:p>
             <a:r>
               <a:rPr lang="en-US" dirty="0" smtClean="0"/>
-              <a:t>How </a:t>
-            </a:r>
-            <a:r>
-              <a:rPr lang="en-US" dirty="0" smtClean="0"/>
-              <a:t>many grouping variables?</a:t>
+              <a:t>How many grouping variables?</a:t>
             </a:r>
           </a:p>
           <a:p>
@@ -9249,40 +9367,27 @@
                   <a:schemeClr val="bg2"/>
                 </a:solidFill>
               </a:rPr>
-              <a:t>How </a:t>
-            </a:r>
-            <a:r>
-              <a:rPr lang="en-US" dirty="0" smtClean="0">
-                <a:solidFill>
-                  <a:schemeClr val="bg2"/>
-                </a:solidFill>
-              </a:rPr>
-              <a:t>many grouping variables?</a:t>
+              <a:t>How many grouping variables?</a:t>
             </a:r>
           </a:p>
           <a:p>
             <a:r>
               <a:rPr lang="en-US" dirty="0" smtClean="0"/>
-              <a:t>Reviewer 3: </a:t>
-            </a:r>
+              <a:t>Reviewer 3: “plot hard to read!!!”</a:t>
+            </a:r>
+          </a:p>
+          <a:p>
             <a:r>
               <a:rPr lang="en-US" dirty="0" smtClean="0"/>
-              <a:t>“plot hard to read!!!”</a:t>
-            </a:r>
-            <a:endParaRPr lang="en-US" dirty="0" smtClean="0"/>
-          </a:p>
-          <a:p>
+              <a:t>So, t</a:t>
+            </a:r>
             <a:r>
               <a:rPr lang="en-US" dirty="0" smtClean="0"/>
-              <a:t>Try “few </a:t>
+              <a:t>ry </a:t>
             </a:r>
             <a:r>
               <a:rPr lang="en-US" dirty="0" smtClean="0"/>
-              <a:t>to </a:t>
-            </a:r>
-            <a:r>
-              <a:rPr lang="en-US" dirty="0" smtClean="0"/>
-              <a:t>many”</a:t>
+              <a:t>“few to many”</a:t>
             </a:r>
           </a:p>
           <a:p>
@@ -9439,15 +9544,17 @@
                   <a:schemeClr val="bg2"/>
                 </a:solidFill>
               </a:rPr>
-              <a:t>How </a:t>
-            </a:r>
+              <a:t>How many grouping variables?</a:t>
+            </a:r>
+          </a:p>
+          <a:p>
             <a:r>
               <a:rPr lang="en-US" dirty="0" smtClean="0">
                 <a:solidFill>
                   <a:schemeClr val="bg2"/>
                 </a:solidFill>
               </a:rPr>
-              <a:t>many grouping variables?</a:t>
+              <a:t>Reviewer 3: “plot hard to read!!!”</a:t>
             </a:r>
           </a:p>
           <a:p>
@@ -9457,7 +9564,7 @@
                   <a:schemeClr val="bg2"/>
                 </a:solidFill>
               </a:rPr>
-              <a:t>Reviewer 3: </a:t>
+              <a:t>So, try </a:t>
             </a:r>
             <a:r>
               <a:rPr lang="en-US" dirty="0" smtClean="0">
@@ -9465,48 +9572,13 @@
                   <a:schemeClr val="bg2"/>
                 </a:solidFill>
               </a:rPr>
-              <a:t>“plot hard to read!!!”</a:t>
-            </a:r>
-            <a:endParaRPr lang="en-US" dirty="0" smtClean="0">
-              <a:solidFill>
-                <a:schemeClr val="bg2"/>
-              </a:solidFill>
-            </a:endParaRPr>
-          </a:p>
-          <a:p>
-            <a:r>
-              <a:rPr lang="en-US" dirty="0" smtClean="0">
-                <a:solidFill>
-                  <a:schemeClr val="bg2"/>
-                </a:solidFill>
-              </a:rPr>
-              <a:t>Try “few </a:t>
-            </a:r>
-            <a:r>
-              <a:rPr lang="en-US" dirty="0" smtClean="0">
-                <a:solidFill>
-                  <a:schemeClr val="bg2"/>
-                </a:solidFill>
-              </a:rPr>
-              <a:t>to </a:t>
-            </a:r>
-            <a:r>
-              <a:rPr lang="en-US" dirty="0" smtClean="0">
-                <a:solidFill>
-                  <a:schemeClr val="bg2"/>
-                </a:solidFill>
-              </a:rPr>
-              <a:t>many”</a:t>
+              <a:t>“few to many”</a:t>
             </a:r>
           </a:p>
           <a:p>
             <a:r>
               <a:rPr lang="en-US" dirty="0" smtClean="0"/>
-              <a:t>Plot </a:t>
-            </a:r>
-            <a:r>
-              <a:rPr lang="en-US" dirty="0" smtClean="0"/>
-              <a:t>data in panels</a:t>
+              <a:t>Plot data in panels</a:t>
             </a:r>
           </a:p>
           <a:p>
@@ -9687,15 +9759,17 @@
                   <a:schemeClr val="bg2"/>
                 </a:solidFill>
               </a:rPr>
-              <a:t>How </a:t>
-            </a:r>
+              <a:t>How many grouping variables?</a:t>
+            </a:r>
+          </a:p>
+          <a:p>
             <a:r>
               <a:rPr lang="en-US" dirty="0" smtClean="0">
                 <a:solidFill>
                   <a:schemeClr val="bg2"/>
                 </a:solidFill>
               </a:rPr>
-              <a:t>many grouping variables?</a:t>
+              <a:t>Reviewer 3: “plot hard to read!!!”</a:t>
             </a:r>
           </a:p>
           <a:p>
@@ -9705,60 +9779,13 @@
                   <a:schemeClr val="bg2"/>
                 </a:solidFill>
               </a:rPr>
-              <a:t>Reviewer 3: </a:t>
-            </a:r>
-            <a:r>
-              <a:rPr lang="en-US" dirty="0" smtClean="0">
-                <a:solidFill>
-                  <a:schemeClr val="bg2"/>
-                </a:solidFill>
-              </a:rPr>
-              <a:t>“plot hard to read!!!”</a:t>
-            </a:r>
-            <a:endParaRPr lang="en-US" dirty="0" smtClean="0">
-              <a:solidFill>
-                <a:schemeClr val="bg2"/>
-              </a:solidFill>
-            </a:endParaRPr>
-          </a:p>
-          <a:p>
-            <a:r>
-              <a:rPr lang="en-US" dirty="0" smtClean="0">
-                <a:solidFill>
-                  <a:schemeClr val="bg2"/>
-                </a:solidFill>
-              </a:rPr>
-              <a:t>Try “few </a:t>
-            </a:r>
-            <a:r>
-              <a:rPr lang="en-US" dirty="0" smtClean="0">
-                <a:solidFill>
-                  <a:schemeClr val="bg2"/>
-                </a:solidFill>
-              </a:rPr>
-              <a:t>to </a:t>
-            </a:r>
-            <a:r>
-              <a:rPr lang="en-US" dirty="0" smtClean="0">
-                <a:solidFill>
-                  <a:schemeClr val="bg2"/>
-                </a:solidFill>
-              </a:rPr>
-              <a:t>many”</a:t>
+              <a:t>Try “few to many”</a:t>
             </a:r>
           </a:p>
           <a:p>
             <a:r>
               <a:rPr lang="en-US" dirty="0" smtClean="0"/>
-              <a:t>Plot </a:t>
-            </a:r>
-            <a:r>
-              <a:rPr lang="en-US" dirty="0" smtClean="0"/>
-              <a:t>data in </a:t>
-            </a:r>
-            <a:r>
-              <a:rPr lang="en-US" dirty="0" smtClean="0"/>
-              <a:t>panels</a:t>
+              <a:t>Plot data in panels</a:t>
             </a:r>
           </a:p>
           <a:p>
@@ -9773,7 +9800,6 @@
               <a:rPr lang="en-US" dirty="0" smtClean="0"/>
               <a:t>“much clearer!”</a:t>
             </a:r>
-            <a:endParaRPr lang="en-US" dirty="0" smtClean="0"/>
           </a:p>
           <a:p>
             <a:endParaRPr lang="en-US" dirty="0" smtClean="0"/>
@@ -10359,20 +10385,19 @@
             <p:ph idx="10"/>
           </p:nvPr>
         </p:nvSpPr>
-        <p:spPr/>
+        <p:spPr>
+          <a:xfrm>
+            <a:off x="664061" y="1600201"/>
+            <a:ext cx="9970535" cy="4123702"/>
+          </a:xfrm>
+        </p:spPr>
         <p:txBody>
           <a:bodyPr/>
           <a:lstStyle/>
           <a:p>
             <a:r>
               <a:rPr lang="en-US" dirty="0" smtClean="0"/>
-              <a:t>Connect related items</a:t>
-            </a:r>
-          </a:p>
-          <a:p>
-            <a:r>
-              <a:rPr lang="en-US" dirty="0" smtClean="0"/>
-              <a:t>Lines </a:t>
+              <a:t>Data/ink ratio and data density</a:t>
             </a:r>
             <a:endParaRPr lang="en-US" dirty="0"/>
           </a:p>
@@ -10465,7 +10490,7 @@
     </p:spTree>
     <p:extLst>
       <p:ext uri="{BB962C8B-B14F-4D97-AF65-F5344CB8AC3E}">
-        <p14:creationId xmlns:p14="http://schemas.microsoft.com/office/powerpoint/2010/main" val="4196235552"/>
+        <p14:creationId xmlns:p14="http://schemas.microsoft.com/office/powerpoint/2010/main" val="3520467149"/>
       </p:ext>
     </p:extLst>
   </p:cSld>
@@ -10494,29 +10519,6 @@
       </p:grpSpPr>
       <p:sp>
         <p:nvSpPr>
-          <p:cNvPr id="4" name="Content Placeholder 3"/>
-          <p:cNvSpPr>
-            <a:spLocks noGrp="1"/>
-          </p:cNvSpPr>
-          <p:nvPr>
-            <p:ph idx="10"/>
-          </p:nvPr>
-        </p:nvSpPr>
-        <p:spPr/>
-        <p:txBody>
-          <a:bodyPr/>
-          <a:lstStyle/>
-          <a:p>
-            <a:r>
-              <a:rPr lang="en-US" dirty="0" smtClean="0"/>
-              <a:t>Data/ink ratio and data density</a:t>
-            </a:r>
-            <a:endParaRPr lang="en-US" dirty="0"/>
-          </a:p>
-        </p:txBody>
-      </p:sp>
-      <p:sp>
-        <p:nvSpPr>
           <p:cNvPr id="10" name="Title 9">
             <a:extLst>
               <a:ext uri="{FF2B5EF4-FFF2-40B4-BE49-F238E27FC236}">
@@ -10532,6 +10534,10 @@
           </p:nvPr>
         </p:nvSpPr>
         <p:spPr>
+          <a:xfrm>
+            <a:off x="1168708" y="675829"/>
+            <a:ext cx="9616202" cy="500289"/>
+          </a:xfrm>
           <a:prstGeom prst="rect">
             <a:avLst/>
           </a:prstGeom>
@@ -10541,18 +10547,13 @@
           <a:lstStyle/>
           <a:p>
             <a:r>
-              <a:rPr lang="en-US" b="1" smtClean="0">
+              <a:rPr lang="en-US" b="1" dirty="0">
                 <a:solidFill>
                   <a:srgbClr val="8E1731"/>
                 </a:solidFill>
               </a:rPr>
-              <a:t>Step 2: effective visuals</a:t>
-            </a:r>
-            <a:endParaRPr lang="en-US" b="1" dirty="0">
-              <a:solidFill>
-                <a:srgbClr val="8E1731"/>
-              </a:solidFill>
-            </a:endParaRPr>
+              <a:t>What is effective about this?  What is not?</a:t>
+            </a:r>
           </a:p>
         </p:txBody>
       </p:sp>
@@ -10599,10 +10600,34 @@
           </a:p>
         </p:txBody>
       </p:sp>
+      <p:pic>
+        <p:nvPicPr>
+          <p:cNvPr id="7" name="Picture 6"/>
+          <p:cNvPicPr>
+            <a:picLocks noChangeAspect="1"/>
+          </p:cNvPicPr>
+          <p:nvPr/>
+        </p:nvPicPr>
+        <p:blipFill>
+          <a:blip r:embed="rId2"/>
+          <a:stretch>
+            <a:fillRect/>
+          </a:stretch>
+        </p:blipFill>
+        <p:spPr>
+          <a:xfrm>
+            <a:off x="1379944" y="2104836"/>
+            <a:ext cx="6057143" cy="3895238"/>
+          </a:xfrm>
+          <a:prstGeom prst="rect">
+            <a:avLst/>
+          </a:prstGeom>
+        </p:spPr>
+      </p:pic>
     </p:spTree>
     <p:extLst>
       <p:ext uri="{BB962C8B-B14F-4D97-AF65-F5344CB8AC3E}">
-        <p14:creationId xmlns:p14="http://schemas.microsoft.com/office/powerpoint/2010/main" val="3520467149"/>
+        <p14:creationId xmlns:p14="http://schemas.microsoft.com/office/powerpoint/2010/main" val="41676820"/>
       </p:ext>
     </p:extLst>
   </p:cSld>
@@ -10736,10 +10761,105 @@
           </a:prstGeom>
         </p:spPr>
       </p:pic>
+      <p:sp>
+        <p:nvSpPr>
+          <p:cNvPr id="5" name="Rectangle 4"/>
+          <p:cNvSpPr/>
+          <p:nvPr/>
+        </p:nvSpPr>
+        <p:spPr>
+          <a:xfrm>
+            <a:off x="7752970" y="1790297"/>
+            <a:ext cx="4439030" cy="3139321"/>
+          </a:xfrm>
+          <a:prstGeom prst="rect">
+            <a:avLst/>
+          </a:prstGeom>
+        </p:spPr>
+        <p:txBody>
+          <a:bodyPr wrap="square">
+            <a:spAutoFit/>
+          </a:bodyPr>
+          <a:lstStyle/>
+          <a:p>
+            <a:r>
+              <a:rPr lang="en-US" dirty="0" smtClean="0"/>
+              <a:t>Effective</a:t>
+            </a:r>
+          </a:p>
+          <a:p>
+            <a:pPr marL="742950" lvl="1" indent="-285750">
+              <a:buFont typeface="Arial" panose="020B0604020202020204" pitchFamily="34" charset="0"/>
+              <a:buChar char="•"/>
+            </a:pPr>
+            <a:r>
+              <a:rPr lang="en-US" dirty="0" smtClean="0"/>
+              <a:t>No related items needing connected</a:t>
+            </a:r>
+          </a:p>
+          <a:p>
+            <a:r>
+              <a:rPr lang="en-US" dirty="0" smtClean="0"/>
+              <a:t>Not effective</a:t>
+            </a:r>
+          </a:p>
+          <a:p>
+            <a:pPr marL="742950" lvl="1" indent="-285750">
+              <a:buFont typeface="Arial" panose="020B0604020202020204" pitchFamily="34" charset="0"/>
+              <a:buChar char="•"/>
+            </a:pPr>
+            <a:r>
+              <a:rPr lang="en-US" dirty="0" smtClean="0"/>
+              <a:t>Extraneous grid lines</a:t>
+            </a:r>
+          </a:p>
+          <a:p>
+            <a:pPr marL="742950" lvl="1" indent="-285750">
+              <a:buFont typeface="Arial" panose="020B0604020202020204" pitchFamily="34" charset="0"/>
+              <a:buChar char="•"/>
+            </a:pPr>
+            <a:r>
+              <a:rPr lang="en-US" dirty="0" smtClean="0"/>
+              <a:t>Unnecessary color</a:t>
+            </a:r>
+          </a:p>
+          <a:p>
+            <a:pPr marL="742950" lvl="1" indent="-285750">
+              <a:buFont typeface="Arial" panose="020B0604020202020204" pitchFamily="34" charset="0"/>
+              <a:buChar char="•"/>
+            </a:pPr>
+            <a:r>
+              <a:rPr lang="en-US" dirty="0" smtClean="0"/>
+              <a:t>Low contrast between shades of blue</a:t>
+            </a:r>
+          </a:p>
+          <a:p>
+            <a:pPr marL="742950" lvl="1" indent="-285750">
+              <a:buFont typeface="Arial" panose="020B0604020202020204" pitchFamily="34" charset="0"/>
+              <a:buChar char="•"/>
+            </a:pPr>
+            <a:r>
+              <a:rPr lang="en-US" dirty="0" smtClean="0"/>
+              <a:t>Font </a:t>
+            </a:r>
+            <a:r>
+              <a:rPr lang="en-US" dirty="0"/>
+              <a:t>sizes (presentations vs manuscripts)</a:t>
+            </a:r>
+          </a:p>
+          <a:p>
+            <a:pPr marL="742950" lvl="1" indent="-285750">
+              <a:buFont typeface="Arial" panose="020B0604020202020204" pitchFamily="34" charset="0"/>
+              <a:buChar char="•"/>
+            </a:pPr>
+            <a:endParaRPr lang="en-US" b="1" dirty="0"/>
+          </a:p>
+        </p:txBody>
+      </p:sp>
     </p:spTree>
     <p:extLst>
       <p:ext uri="{BB962C8B-B14F-4D97-AF65-F5344CB8AC3E}">
-        <p14:creationId xmlns:p14="http://schemas.microsoft.com/office/powerpoint/2010/main" val="41676820"/>
+        <p14:creationId xmlns:p14="http://schemas.microsoft.com/office/powerpoint/2010/main" val="3841075137"/>
       </p:ext>
     </p:extLst>
   </p:cSld>
@@ -10801,8 +10921,21 @@
                   <a:srgbClr val="8E1731"/>
                 </a:solidFill>
               </a:rPr>
-              <a:t>What is effective about this?  What is not?</a:t>
-            </a:r>
+              <a:t>What </a:t>
+            </a:r>
+            <a:r>
+              <a:rPr lang="en-US" b="1" dirty="0" smtClean="0">
+                <a:solidFill>
+                  <a:srgbClr val="8E1731"/>
+                </a:solidFill>
+              </a:rPr>
+              <a:t>improvements can we make?</a:t>
+            </a:r>
+            <a:endParaRPr lang="en-US" b="1" dirty="0">
+              <a:solidFill>
+                <a:srgbClr val="8E1731"/>
+              </a:solidFill>
+            </a:endParaRPr>
           </a:p>
         </p:txBody>
       </p:sp>
@@ -10849,9 +10982,80 @@
           </a:p>
         </p:txBody>
       </p:sp>
+      <p:sp>
+        <p:nvSpPr>
+          <p:cNvPr id="8" name="Rectangle 7"/>
+          <p:cNvSpPr/>
+          <p:nvPr/>
+        </p:nvSpPr>
+        <p:spPr>
+          <a:xfrm>
+            <a:off x="7742867" y="2031585"/>
+            <a:ext cx="3977186" cy="2677656"/>
+          </a:xfrm>
+          <a:prstGeom prst="rect">
+            <a:avLst/>
+          </a:prstGeom>
+        </p:spPr>
+        <p:txBody>
+          <a:bodyPr wrap="square">
+            <a:spAutoFit/>
+          </a:bodyPr>
+          <a:lstStyle/>
+          <a:p>
+            <a:pPr marL="742950" lvl="1" indent="-285750">
+              <a:buFont typeface="Arial" panose="020B0604020202020204" pitchFamily="34" charset="0"/>
+              <a:buChar char="•"/>
+            </a:pPr>
+            <a:r>
+              <a:rPr lang="en-US" sz="2400" dirty="0" smtClean="0"/>
+              <a:t>Increased data density with colors</a:t>
+            </a:r>
+          </a:p>
+          <a:p>
+            <a:pPr marL="742950" lvl="1" indent="-285750">
+              <a:buFont typeface="Arial" panose="020B0604020202020204" pitchFamily="34" charset="0"/>
+              <a:buChar char="•"/>
+            </a:pPr>
+            <a:r>
+              <a:rPr lang="en-US" sz="2400" dirty="0" smtClean="0"/>
+              <a:t>Color contrasts</a:t>
+            </a:r>
+            <a:endParaRPr lang="en-US" sz="2400" dirty="0"/>
+          </a:p>
+          <a:p>
+            <a:pPr marL="742950" lvl="1" indent="-285750">
+              <a:buFont typeface="Arial" panose="020B0604020202020204" pitchFamily="34" charset="0"/>
+              <a:buChar char="•"/>
+            </a:pPr>
+            <a:r>
+              <a:rPr lang="en-US" sz="2400" dirty="0" smtClean="0"/>
+              <a:t>Removed grid lines</a:t>
+            </a:r>
+          </a:p>
+          <a:p>
+            <a:pPr marL="742950" lvl="1" indent="-285750">
+              <a:buFont typeface="Arial" panose="020B0604020202020204" pitchFamily="34" charset="0"/>
+              <a:buChar char="•"/>
+            </a:pPr>
+            <a:r>
+              <a:rPr lang="en-US" sz="2400" dirty="0" smtClean="0"/>
+              <a:t>Increased font size for readability</a:t>
+            </a:r>
+            <a:endParaRPr lang="en-US" sz="2400" dirty="0"/>
+          </a:p>
+          <a:p>
+            <a:pPr marL="742950" lvl="1" indent="-285750">
+              <a:buFont typeface="Arial" panose="020B0604020202020204" pitchFamily="34" charset="0"/>
+              <a:buChar char="•"/>
+            </a:pPr>
+            <a:endParaRPr lang="en-US" sz="2400" b="1" dirty="0"/>
+          </a:p>
+        </p:txBody>
+      </p:sp>
       <p:pic>
         <p:nvPicPr>
-          <p:cNvPr id="7" name="Picture 6"/>
+          <p:cNvPr id="9" name="Picture 8"/>
           <p:cNvPicPr>
             <a:picLocks noChangeAspect="1"/>
           </p:cNvPicPr>
@@ -10865,7 +11069,7 @@
         </p:blipFill>
         <p:spPr>
           <a:xfrm>
-            <a:off x="1379944" y="2104836"/>
+            <a:off x="1001038" y="2137857"/>
             <a:ext cx="6057143" cy="3895238"/>
           </a:xfrm>
           <a:prstGeom prst="rect">
@@ -10873,110 +11077,10 @@
           </a:prstGeom>
         </p:spPr>
       </p:pic>
-      <p:sp>
-        <p:nvSpPr>
-          <p:cNvPr id="5" name="Rectangle 4"/>
-          <p:cNvSpPr/>
-          <p:nvPr/>
-        </p:nvSpPr>
-        <p:spPr>
-          <a:xfrm>
-            <a:off x="7752970" y="1790297"/>
-            <a:ext cx="4439030" cy="3139321"/>
-          </a:xfrm>
-          <a:prstGeom prst="rect">
-            <a:avLst/>
-          </a:prstGeom>
-        </p:spPr>
-        <p:txBody>
-          <a:bodyPr wrap="square">
-            <a:spAutoFit/>
-          </a:bodyPr>
-          <a:lstStyle/>
-          <a:p>
-            <a:r>
-              <a:rPr lang="en-US" dirty="0" smtClean="0"/>
-              <a:t>Effective</a:t>
-            </a:r>
-          </a:p>
-          <a:p>
-            <a:pPr marL="742950" lvl="1" indent="-285750">
-              <a:buFont typeface="Arial" panose="020B0604020202020204" pitchFamily="34" charset="0"/>
-              <a:buChar char="•"/>
-            </a:pPr>
-            <a:r>
-              <a:rPr lang="en-US" dirty="0" smtClean="0"/>
-              <a:t>No </a:t>
-            </a:r>
-            <a:r>
-              <a:rPr lang="en-US" dirty="0" smtClean="0"/>
-              <a:t>related items needing connected</a:t>
-            </a:r>
-            <a:endParaRPr lang="en-US" dirty="0" smtClean="0"/>
-          </a:p>
-          <a:p>
-            <a:r>
-              <a:rPr lang="en-US" dirty="0" smtClean="0"/>
-              <a:t>Not effective</a:t>
-            </a:r>
-          </a:p>
-          <a:p>
-            <a:pPr marL="742950" lvl="1" indent="-285750">
-              <a:buFont typeface="Arial" panose="020B0604020202020204" pitchFamily="34" charset="0"/>
-              <a:buChar char="•"/>
-            </a:pPr>
-            <a:r>
-              <a:rPr lang="en-US" dirty="0" smtClean="0"/>
-              <a:t>Extraneous grid lines</a:t>
-            </a:r>
-          </a:p>
-          <a:p>
-            <a:pPr marL="742950" lvl="1" indent="-285750">
-              <a:buFont typeface="Arial" panose="020B0604020202020204" pitchFamily="34" charset="0"/>
-              <a:buChar char="•"/>
-            </a:pPr>
-            <a:r>
-              <a:rPr lang="en-US" dirty="0" smtClean="0"/>
-              <a:t>Unnecessary color</a:t>
-            </a:r>
-          </a:p>
-          <a:p>
-            <a:pPr marL="742950" lvl="1" indent="-285750">
-              <a:buFont typeface="Arial" panose="020B0604020202020204" pitchFamily="34" charset="0"/>
-              <a:buChar char="•"/>
-            </a:pPr>
-            <a:r>
-              <a:rPr lang="en-US" dirty="0" smtClean="0"/>
-              <a:t>Low contrast between shades of blue</a:t>
-            </a:r>
-          </a:p>
-          <a:p>
-            <a:pPr marL="742950" lvl="1" indent="-285750">
-              <a:buFont typeface="Arial" panose="020B0604020202020204" pitchFamily="34" charset="0"/>
-              <a:buChar char="•"/>
-            </a:pPr>
-            <a:r>
-              <a:rPr lang="en-US" dirty="0" smtClean="0"/>
-              <a:t>Font </a:t>
-            </a:r>
-            <a:r>
-              <a:rPr lang="en-US" dirty="0"/>
-              <a:t>sizes (presentations vs manuscripts)</a:t>
-            </a:r>
-          </a:p>
-          <a:p>
-            <a:pPr marL="742950" lvl="1" indent="-285750">
-              <a:buFont typeface="Arial" panose="020B0604020202020204" pitchFamily="34" charset="0"/>
-              <a:buChar char="•"/>
-            </a:pPr>
-            <a:endParaRPr lang="en-US" b="1" dirty="0"/>
-          </a:p>
-        </p:txBody>
-      </p:sp>
     </p:spTree>
     <p:extLst>
       <p:ext uri="{BB962C8B-B14F-4D97-AF65-F5344CB8AC3E}">
-        <p14:creationId xmlns:p14="http://schemas.microsoft.com/office/powerpoint/2010/main" val="3841075137"/>
+        <p14:creationId xmlns:p14="http://schemas.microsoft.com/office/powerpoint/2010/main" val="1502662390"/>
       </p:ext>
     </p:extLst>
   </p:cSld>
@@ -11046,7 +11150,7 @@
                   <a:srgbClr val="8E1731"/>
                 </a:solidFill>
               </a:rPr>
-              <a:t>improvements can we make?</a:t>
+              <a:t>else could we improve?</a:t>
             </a:r>
             <a:endParaRPr lang="en-US" b="1" dirty="0">
               <a:solidFill>
@@ -11107,8 +11211,8 @@
         </p:nvSpPr>
         <p:spPr>
           <a:xfrm>
-            <a:off x="7742867" y="2031585"/>
-            <a:ext cx="3977186" cy="2677656"/>
+            <a:off x="7058181" y="1176118"/>
+            <a:ext cx="4011376" cy="4893647"/>
           </a:xfrm>
           <a:prstGeom prst="rect">
             <a:avLst/>
@@ -11126,11 +11230,7 @@
             </a:pPr>
             <a:r>
               <a:rPr lang="en-US" sz="2400" dirty="0" smtClean="0"/>
-              <a:t>Increased data density with </a:t>
-            </a:r>
-            <a:r>
-              <a:rPr lang="en-US" sz="2400" dirty="0" smtClean="0"/>
-              <a:t>colors</a:t>
+              <a:t>Test or change color to grayscale</a:t>
             </a:r>
           </a:p>
           <a:p>
@@ -11140,13 +11240,8 @@
             </a:pPr>
             <a:r>
               <a:rPr lang="en-US" sz="2400" dirty="0" smtClean="0"/>
-              <a:t>Color </a:t>
-            </a:r>
-            <a:r>
-              <a:rPr lang="en-US" sz="2400" dirty="0" smtClean="0"/>
-              <a:t>contrasts</a:t>
-            </a:r>
-            <a:endParaRPr lang="en-US" sz="2400" dirty="0"/>
+              <a:t>Increase legend size</a:t>
+            </a:r>
           </a:p>
           <a:p>
             <a:pPr marL="742950" lvl="1" indent="-285750">
@@ -11155,7 +11250,7 @@
             </a:pPr>
             <a:r>
               <a:rPr lang="en-US" sz="2400" dirty="0" smtClean="0"/>
-              <a:t>Removed grid lines</a:t>
+              <a:t>What is clarity?  Is it ordered?</a:t>
             </a:r>
           </a:p>
           <a:p>
@@ -11165,7 +11260,7 @@
             </a:pPr>
             <a:r>
               <a:rPr lang="en-US" sz="2400" dirty="0" smtClean="0"/>
-              <a:t>Increased font size for readability</a:t>
+              <a:t>For a presentation, rotate y-axis label to horizontal</a:t>
             </a:r>
             <a:endParaRPr lang="en-US" sz="2400" dirty="0"/>
           </a:p>
@@ -11174,7 +11269,11 @@
               <a:buFont typeface="Arial" panose="020B0604020202020204" pitchFamily="34" charset="0"/>
               <a:buChar char="•"/>
             </a:pPr>
-            <a:endParaRPr lang="en-US" sz="2400" b="1" dirty="0"/>
+            <a:r>
+              <a:rPr lang="en-US" sz="2400" dirty="0" smtClean="0"/>
+              <a:t>Add commas (or periods in Europe) to large numbers if domain- or journal-specific allows</a:t>
+            </a:r>
+            <a:endParaRPr lang="en-US" sz="2400" dirty="0"/>
           </a:p>
         </p:txBody>
       </p:sp>
@@ -11205,7 +11304,7 @@
     </p:spTree>
     <p:extLst>
       <p:ext uri="{BB962C8B-B14F-4D97-AF65-F5344CB8AC3E}">
-        <p14:creationId xmlns:p14="http://schemas.microsoft.com/office/powerpoint/2010/main" val="1502662390"/>
+        <p14:creationId xmlns:p14="http://schemas.microsoft.com/office/powerpoint/2010/main" val="310885816"/>
       </p:ext>
     </p:extLst>
   </p:cSld>
@@ -11234,13 +11333,34 @@
       </p:grpSpPr>
       <p:sp>
         <p:nvSpPr>
-          <p:cNvPr id="10" name="Title 9">
-            <a:extLst>
-              <a:ext uri="{FF2B5EF4-FFF2-40B4-BE49-F238E27FC236}">
-                <a16:creationId xmlns:a16="http://schemas.microsoft.com/office/drawing/2014/main" id="{FFFB4824-2F2C-0B4E-8B65-C35C93FB68FF}"/>
-              </a:ext>
-            </a:extLst>
-          </p:cNvPr>
+          <p:cNvPr id="4" name="Content Placeholder 3"/>
+          <p:cNvSpPr>
+            <a:spLocks noGrp="1"/>
+          </p:cNvSpPr>
+          <p:nvPr>
+            <p:ph idx="1"/>
+          </p:nvPr>
+        </p:nvSpPr>
+        <p:spPr/>
+        <p:txBody>
+          <a:bodyPr/>
+          <a:lstStyle/>
+          <a:p>
+            <a:r>
+              <a:rPr lang="en-US" dirty="0" smtClean="0"/>
+              <a:t>Symbols and axes </a:t>
+            </a:r>
+            <a:r>
+              <a:rPr lang="en-US" dirty="0" smtClean="0"/>
+              <a:t>proportional</a:t>
+            </a:r>
+            <a:endParaRPr lang="en-US" dirty="0" smtClean="0"/>
+          </a:p>
+        </p:txBody>
+      </p:sp>
+      <p:sp>
+        <p:nvSpPr>
+          <p:cNvPr id="2" name="Title 1"/>
           <p:cNvSpPr>
             <a:spLocks noGrp="1"/>
           </p:cNvSpPr>
@@ -11248,188 +11368,27 @@
             <p:ph type="title"/>
           </p:nvPr>
         </p:nvSpPr>
-        <p:spPr>
-          <a:xfrm>
-            <a:off x="1168708" y="675829"/>
-            <a:ext cx="9616202" cy="500289"/>
-          </a:xfrm>
-          <a:prstGeom prst="rect">
-            <a:avLst/>
-          </a:prstGeom>
-        </p:spPr>
+        <p:spPr/>
         <p:txBody>
           <a:bodyPr/>
           <a:lstStyle/>
           <a:p>
             <a:r>
-              <a:rPr lang="en-US" b="1" dirty="0">
+              <a:rPr lang="en-US" b="1" dirty="0" smtClean="0">
                 <a:solidFill>
                   <a:srgbClr val="8E1731"/>
                 </a:solidFill>
               </a:rPr>
-              <a:t>What </a:t>
-            </a:r>
-            <a:r>
-              <a:rPr lang="en-US" b="1" dirty="0" smtClean="0">
-                <a:solidFill>
-                  <a:srgbClr val="8E1731"/>
-                </a:solidFill>
-              </a:rPr>
-              <a:t>else could we improve?</a:t>
-            </a:r>
-            <a:endParaRPr lang="en-US" b="1" dirty="0">
-              <a:solidFill>
-                <a:srgbClr val="8E1731"/>
-              </a:solidFill>
-            </a:endParaRPr>
-          </a:p>
-        </p:txBody>
-      </p:sp>
-      <p:sp>
-        <p:nvSpPr>
-          <p:cNvPr id="6" name="Title 1"/>
-          <p:cNvSpPr txBox="1">
-            <a:spLocks/>
-          </p:cNvSpPr>
-          <p:nvPr/>
-        </p:nvSpPr>
-        <p:spPr>
-          <a:xfrm>
-            <a:off x="838200" y="365125"/>
-            <a:ext cx="10515600" cy="1325563"/>
-          </a:xfrm>
-          <a:prstGeom prst="rect">
-            <a:avLst/>
-          </a:prstGeom>
-        </p:spPr>
-        <p:txBody>
-          <a:bodyPr/>
-          <a:lstStyle>
-            <a:lvl1pPr algn="l" defTabSz="914400" rtl="0" eaLnBrk="1" latinLnBrk="0" hangingPunct="1">
-              <a:lnSpc>
-                <a:spcPct val="90000"/>
-              </a:lnSpc>
-              <a:spcBef>
-                <a:spcPct val="0"/>
-              </a:spcBef>
-              <a:buNone/>
-              <a:defRPr sz="3600" kern="1200">
-                <a:solidFill>
-                  <a:schemeClr val="tx1"/>
-                </a:solidFill>
-                <a:latin typeface="+mj-lt"/>
-                <a:ea typeface="+mj-ea"/>
-                <a:cs typeface="+mj-cs"/>
-              </a:defRPr>
-            </a:lvl1pPr>
-          </a:lstStyle>
-          <a:p>
+              <a:t>Step 3: clear visuals</a:t>
+            </a:r>
             <a:endParaRPr lang="en-US" dirty="0"/>
           </a:p>
         </p:txBody>
       </p:sp>
-      <p:sp>
-        <p:nvSpPr>
-          <p:cNvPr id="8" name="Rectangle 7"/>
-          <p:cNvSpPr/>
-          <p:nvPr/>
-        </p:nvSpPr>
-        <p:spPr>
-          <a:xfrm>
-            <a:off x="7058181" y="1176118"/>
-            <a:ext cx="4011376" cy="4893647"/>
-          </a:xfrm>
-          <a:prstGeom prst="rect">
-            <a:avLst/>
-          </a:prstGeom>
-        </p:spPr>
-        <p:txBody>
-          <a:bodyPr wrap="square">
-            <a:spAutoFit/>
-          </a:bodyPr>
-          <a:lstStyle/>
-          <a:p>
-            <a:pPr marL="742950" lvl="1" indent="-285750">
-              <a:buFont typeface="Arial" panose="020B0604020202020204" pitchFamily="34" charset="0"/>
-              <a:buChar char="•"/>
-            </a:pPr>
-            <a:r>
-              <a:rPr lang="en-US" sz="2400" dirty="0" smtClean="0"/>
-              <a:t>Test or change color to grayscale</a:t>
-            </a:r>
-          </a:p>
-          <a:p>
-            <a:pPr marL="742950" lvl="1" indent="-285750">
-              <a:buFont typeface="Arial" panose="020B0604020202020204" pitchFamily="34" charset="0"/>
-              <a:buChar char="•"/>
-            </a:pPr>
-            <a:r>
-              <a:rPr lang="en-US" sz="2400" dirty="0" smtClean="0"/>
-              <a:t>Increase legend size</a:t>
-            </a:r>
-          </a:p>
-          <a:p>
-            <a:pPr marL="742950" lvl="1" indent="-285750">
-              <a:buFont typeface="Arial" panose="020B0604020202020204" pitchFamily="34" charset="0"/>
-              <a:buChar char="•"/>
-            </a:pPr>
-            <a:r>
-              <a:rPr lang="en-US" sz="2400" dirty="0" smtClean="0"/>
-              <a:t>What is clarity?  Is it ordered?</a:t>
-            </a:r>
-          </a:p>
-          <a:p>
-            <a:pPr marL="742950" lvl="1" indent="-285750">
-              <a:buFont typeface="Arial" panose="020B0604020202020204" pitchFamily="34" charset="0"/>
-              <a:buChar char="•"/>
-            </a:pPr>
-            <a:r>
-              <a:rPr lang="en-US" sz="2400" dirty="0" smtClean="0"/>
-              <a:t>For a presentation, rotate y-axis label to horizontal</a:t>
-            </a:r>
-            <a:endParaRPr lang="en-US" sz="2400" dirty="0"/>
-          </a:p>
-          <a:p>
-            <a:pPr marL="742950" lvl="1" indent="-285750">
-              <a:buFont typeface="Arial" panose="020B0604020202020204" pitchFamily="34" charset="0"/>
-              <a:buChar char="•"/>
-            </a:pPr>
-            <a:r>
-              <a:rPr lang="en-US" sz="2400" dirty="0" smtClean="0"/>
-              <a:t>Add commas (or periods in Europe) to large numbers if domain- or journal-specific allows</a:t>
-            </a:r>
-            <a:endParaRPr lang="en-US" sz="2400" dirty="0"/>
-          </a:p>
-        </p:txBody>
-      </p:sp>
-      <p:pic>
-        <p:nvPicPr>
-          <p:cNvPr id="9" name="Picture 8"/>
-          <p:cNvPicPr>
-            <a:picLocks noChangeAspect="1"/>
-          </p:cNvPicPr>
-          <p:nvPr/>
-        </p:nvPicPr>
-        <p:blipFill>
-          <a:blip r:embed="rId2"/>
-          <a:stretch>
-            <a:fillRect/>
-          </a:stretch>
-        </p:blipFill>
-        <p:spPr>
-          <a:xfrm>
-            <a:off x="1001038" y="2137857"/>
-            <a:ext cx="6057143" cy="3895238"/>
-          </a:xfrm>
-          <a:prstGeom prst="rect">
-            <a:avLst/>
-          </a:prstGeom>
-        </p:spPr>
-      </p:pic>
     </p:spTree>
     <p:extLst>
       <p:ext uri="{BB962C8B-B14F-4D97-AF65-F5344CB8AC3E}">
-        <p14:creationId xmlns:p14="http://schemas.microsoft.com/office/powerpoint/2010/main" val="310885816"/>
+        <p14:creationId xmlns:p14="http://schemas.microsoft.com/office/powerpoint/2010/main" val="3712317676"/>
       </p:ext>
     </p:extLst>
   </p:cSld>
@@ -11473,35 +11432,17 @@
           <a:p>
             <a:r>
               <a:rPr lang="en-US" dirty="0" smtClean="0"/>
-              <a:t>Symbols and axes proportional</a:t>
-            </a:r>
-          </a:p>
-          <a:p>
+              <a:t>Clear </a:t>
+            </a:r>
             <a:r>
               <a:rPr lang="en-US" dirty="0" smtClean="0"/>
-              <a:t>Clear labels consistent with rest of document</a:t>
-            </a:r>
-          </a:p>
-          <a:p>
+              <a:t>labels consistent with rest of </a:t>
+            </a:r>
             <a:r>
               <a:rPr lang="en-US" dirty="0" smtClean="0"/>
-              <a:t>Reduce lack of context</a:t>
-            </a:r>
-          </a:p>
-          <a:p>
-            <a:r>
-              <a:rPr lang="en-US" dirty="0" smtClean="0"/>
-              <a:t>Do not change chart design partway through – can be done accidentally by having unevenly spaced numbers as categories!</a:t>
-            </a:r>
-          </a:p>
-          <a:p>
-            <a:r>
-              <a:rPr lang="en-US" dirty="0"/>
-              <a:t>Meet your goal – what is your question or hypothesis?</a:t>
-            </a:r>
-          </a:p>
-          <a:p>
-            <a:endParaRPr lang="en-US" dirty="0"/>
+              <a:t>document</a:t>
+            </a:r>
+            <a:endParaRPr lang="en-US" dirty="0" smtClean="0"/>
           </a:p>
         </p:txBody>
       </p:sp>
@@ -11535,7 +11476,7 @@
     </p:spTree>
     <p:extLst>
       <p:ext uri="{BB962C8B-B14F-4D97-AF65-F5344CB8AC3E}">
-        <p14:creationId xmlns:p14="http://schemas.microsoft.com/office/powerpoint/2010/main" val="3712317676"/>
+        <p14:creationId xmlns:p14="http://schemas.microsoft.com/office/powerpoint/2010/main" val="932924359"/>
       </p:ext>
     </p:extLst>
   </p:cSld>
@@ -11564,6 +11505,35 @@
       </p:grpSpPr>
       <p:sp>
         <p:nvSpPr>
+          <p:cNvPr id="4" name="Content Placeholder 3"/>
+          <p:cNvSpPr>
+            <a:spLocks noGrp="1"/>
+          </p:cNvSpPr>
+          <p:nvPr>
+            <p:ph idx="1"/>
+          </p:nvPr>
+        </p:nvSpPr>
+        <p:spPr/>
+        <p:txBody>
+          <a:bodyPr/>
+          <a:lstStyle/>
+          <a:p>
+            <a:r>
+              <a:rPr lang="en-US" dirty="0" smtClean="0"/>
+              <a:t>Reduce </a:t>
+            </a:r>
+            <a:r>
+              <a:rPr lang="en-US" dirty="0" smtClean="0"/>
+              <a:t>lack of context</a:t>
+            </a:r>
+          </a:p>
+          <a:p>
+            <a:endParaRPr lang="en-US" dirty="0"/>
+          </a:p>
+        </p:txBody>
+      </p:sp>
+      <p:sp>
+        <p:nvSpPr>
           <p:cNvPr id="2" name="Title 1"/>
           <p:cNvSpPr>
             <a:spLocks noGrp="1"/>
@@ -11572,64 +11542,27 @@
             <p:ph type="title"/>
           </p:nvPr>
         </p:nvSpPr>
-        <p:spPr>
-          <a:xfrm>
-            <a:off x="1168708" y="675829"/>
-            <a:ext cx="10229977" cy="500289"/>
-          </a:xfrm>
-        </p:spPr>
+        <p:spPr/>
         <p:txBody>
           <a:bodyPr/>
           <a:lstStyle/>
           <a:p>
             <a:r>
-              <a:rPr lang="en-US" b="1" dirty="0">
+              <a:rPr lang="en-US" b="1" dirty="0" smtClean="0">
                 <a:solidFill>
                   <a:srgbClr val="8E1731"/>
                 </a:solidFill>
               </a:rPr>
-              <a:t>What is </a:t>
-            </a:r>
-            <a:r>
-              <a:rPr lang="en-US" b="1" dirty="0" smtClean="0">
-                <a:solidFill>
-                  <a:srgbClr val="8E1731"/>
-                </a:solidFill>
-              </a:rPr>
-              <a:t>clear or misleading about this?</a:t>
+              <a:t>Step 3: clear visuals</a:t>
             </a:r>
             <a:endParaRPr lang="en-US" dirty="0"/>
           </a:p>
         </p:txBody>
       </p:sp>
-      <p:pic>
-        <p:nvPicPr>
-          <p:cNvPr id="3" name="Picture 2"/>
-          <p:cNvPicPr>
-            <a:picLocks noChangeAspect="1"/>
-          </p:cNvPicPr>
-          <p:nvPr/>
-        </p:nvPicPr>
-        <p:blipFill>
-          <a:blip r:embed="rId2"/>
-          <a:stretch>
-            <a:fillRect/>
-          </a:stretch>
-        </p:blipFill>
-        <p:spPr>
-          <a:xfrm>
-            <a:off x="1147188" y="2221214"/>
-            <a:ext cx="6057143" cy="3895238"/>
-          </a:xfrm>
-          <a:prstGeom prst="rect">
-            <a:avLst/>
-          </a:prstGeom>
-        </p:spPr>
-      </p:pic>
     </p:spTree>
     <p:extLst>
       <p:ext uri="{BB962C8B-B14F-4D97-AF65-F5344CB8AC3E}">
-        <p14:creationId xmlns:p14="http://schemas.microsoft.com/office/powerpoint/2010/main" val="3582042232"/>
+        <p14:creationId xmlns:p14="http://schemas.microsoft.com/office/powerpoint/2010/main" val="2331525005"/>
       </p:ext>
     </p:extLst>
   </p:cSld>
@@ -11658,6 +11591,33 @@
       </p:grpSpPr>
       <p:sp>
         <p:nvSpPr>
+          <p:cNvPr id="4" name="Content Placeholder 3"/>
+          <p:cNvSpPr>
+            <a:spLocks noGrp="1"/>
+          </p:cNvSpPr>
+          <p:nvPr>
+            <p:ph idx="1"/>
+          </p:nvPr>
+        </p:nvSpPr>
+        <p:spPr/>
+        <p:txBody>
+          <a:bodyPr/>
+          <a:lstStyle/>
+          <a:p>
+            <a:r>
+              <a:rPr lang="en-US" dirty="0"/>
+              <a:t>Do not change chart design partway through – can be done accidentally by having unevenly spaced numbers as categories</a:t>
+            </a:r>
+            <a:r>
+              <a:rPr lang="en-US" dirty="0" smtClean="0"/>
+              <a:t>!</a:t>
+            </a:r>
+            <a:endParaRPr lang="en-US" dirty="0"/>
+          </a:p>
+        </p:txBody>
+      </p:sp>
+      <p:sp>
+        <p:nvSpPr>
           <p:cNvPr id="2" name="Title 1"/>
           <p:cNvSpPr>
             <a:spLocks noGrp="1"/>
@@ -11666,152 +11626,27 @@
             <p:ph type="title"/>
           </p:nvPr>
         </p:nvSpPr>
-        <p:spPr>
-          <a:xfrm>
-            <a:off x="1168708" y="675829"/>
-            <a:ext cx="10229977" cy="500289"/>
-          </a:xfrm>
-        </p:spPr>
+        <p:spPr/>
         <p:txBody>
           <a:bodyPr/>
           <a:lstStyle/>
           <a:p>
             <a:r>
-              <a:rPr lang="en-US" b="1" dirty="0">
+              <a:rPr lang="en-US" b="1" dirty="0" smtClean="0">
                 <a:solidFill>
                   <a:srgbClr val="8E1731"/>
                 </a:solidFill>
               </a:rPr>
-              <a:t>What is </a:t>
-            </a:r>
-            <a:r>
-              <a:rPr lang="en-US" b="1" dirty="0" smtClean="0">
-                <a:solidFill>
-                  <a:srgbClr val="8E1731"/>
-                </a:solidFill>
-              </a:rPr>
-              <a:t>clear or misleading about this?</a:t>
+              <a:t>Step 3: clear visuals</a:t>
             </a:r>
             <a:endParaRPr lang="en-US" dirty="0"/>
-          </a:p>
-        </p:txBody>
-      </p:sp>
-      <p:pic>
-        <p:nvPicPr>
-          <p:cNvPr id="3" name="Picture 2"/>
-          <p:cNvPicPr>
-            <a:picLocks noChangeAspect="1"/>
-          </p:cNvPicPr>
-          <p:nvPr/>
-        </p:nvPicPr>
-        <p:blipFill>
-          <a:blip r:embed="rId2"/>
-          <a:stretch>
-            <a:fillRect/>
-          </a:stretch>
-        </p:blipFill>
-        <p:spPr>
-          <a:xfrm>
-            <a:off x="1147188" y="2221214"/>
-            <a:ext cx="6057143" cy="3895238"/>
-          </a:xfrm>
-          <a:prstGeom prst="rect">
-            <a:avLst/>
-          </a:prstGeom>
-        </p:spPr>
-      </p:pic>
-      <p:sp>
-        <p:nvSpPr>
-          <p:cNvPr id="4" name="Rectangle 3"/>
-          <p:cNvSpPr/>
-          <p:nvPr/>
-        </p:nvSpPr>
-        <p:spPr>
-          <a:xfrm>
-            <a:off x="7407057" y="1860766"/>
-            <a:ext cx="4129414" cy="3416320"/>
-          </a:xfrm>
-          <a:prstGeom prst="rect">
-            <a:avLst/>
-          </a:prstGeom>
-        </p:spPr>
-        <p:txBody>
-          <a:bodyPr wrap="square">
-            <a:spAutoFit/>
-          </a:bodyPr>
-          <a:lstStyle/>
-          <a:p>
-            <a:r>
-              <a:rPr lang="en-US" dirty="0"/>
-              <a:t>Clear</a:t>
-            </a:r>
-          </a:p>
-          <a:p>
-            <a:pPr marL="285750" indent="-285750">
-              <a:buFont typeface="Arial" panose="020B0604020202020204" pitchFamily="34" charset="0"/>
-              <a:buChar char="•"/>
-            </a:pPr>
-            <a:r>
-              <a:rPr lang="en-US" dirty="0"/>
-              <a:t>Chart design consistent throughout</a:t>
-            </a:r>
-          </a:p>
-          <a:p>
-            <a:pPr marL="285750" indent="-285750">
-              <a:buFont typeface="Arial" panose="020B0604020202020204" pitchFamily="34" charset="0"/>
-              <a:buChar char="•"/>
-            </a:pPr>
-            <a:r>
-              <a:rPr lang="en-US" dirty="0"/>
-              <a:t>Units appropriate</a:t>
-            </a:r>
-          </a:p>
-          <a:p>
-            <a:endParaRPr lang="en-US" dirty="0"/>
-          </a:p>
-          <a:p>
-            <a:r>
-              <a:rPr lang="en-US" dirty="0" smtClean="0"/>
-              <a:t>Potentially misleading</a:t>
-            </a:r>
-            <a:endParaRPr lang="en-US" dirty="0"/>
-          </a:p>
-          <a:p>
-            <a:pPr marL="285750" indent="-285750">
-              <a:buFont typeface="Arial" panose="020B0604020202020204" pitchFamily="34" charset="0"/>
-              <a:buChar char="•"/>
-            </a:pPr>
-            <a:r>
-              <a:rPr lang="en-US" dirty="0"/>
-              <a:t>Symbols and axes proportional to numbers represented (problem with pie charts, area in general)</a:t>
-            </a:r>
-          </a:p>
-          <a:p>
-            <a:pPr marL="285750" indent="-285750">
-              <a:buFont typeface="Arial" panose="020B0604020202020204" pitchFamily="34" charset="0"/>
-              <a:buChar char="•"/>
-            </a:pPr>
-            <a:r>
-              <a:rPr lang="en-US" dirty="0"/>
-              <a:t>Lack of context: did not show all relevant data</a:t>
-            </a:r>
-          </a:p>
-          <a:p>
-            <a:pPr marL="285750" indent="-285750">
-              <a:buFont typeface="Arial" panose="020B0604020202020204" pitchFamily="34" charset="0"/>
-              <a:buChar char="•"/>
-            </a:pPr>
-            <a:r>
-              <a:rPr lang="en-US" dirty="0"/>
-              <a:t>Clear labels (minimize abbreviations)	</a:t>
-            </a:r>
           </a:p>
         </p:txBody>
       </p:sp>
     </p:spTree>
     <p:extLst>
       <p:ext uri="{BB962C8B-B14F-4D97-AF65-F5344CB8AC3E}">
-        <p14:creationId xmlns:p14="http://schemas.microsoft.com/office/powerpoint/2010/main" val="2671584075"/>
+        <p14:creationId xmlns:p14="http://schemas.microsoft.com/office/powerpoint/2010/main" val="3158119898"/>
       </p:ext>
     </p:extLst>
   </p:cSld>
@@ -11838,30 +11673,6 @@
           <a:chExt cx="0" cy="0"/>
         </a:xfrm>
       </p:grpSpPr>
-      <p:pic>
-        <p:nvPicPr>
-          <p:cNvPr id="4" name="Picture 3"/>
-          <p:cNvPicPr>
-            <a:picLocks noChangeAspect="1"/>
-          </p:cNvPicPr>
-          <p:nvPr/>
-        </p:nvPicPr>
-        <p:blipFill>
-          <a:blip r:embed="rId2"/>
-          <a:stretch>
-            <a:fillRect/>
-          </a:stretch>
-        </p:blipFill>
-        <p:spPr>
-          <a:xfrm>
-            <a:off x="5379202" y="1228201"/>
-            <a:ext cx="6431798" cy="4958190"/>
-          </a:xfrm>
-          <a:prstGeom prst="rect">
-            <a:avLst/>
-          </a:prstGeom>
-        </p:spPr>
-      </p:pic>
       <p:sp>
         <p:nvSpPr>
           <p:cNvPr id="2" name="Content Placeholder 1"/>
@@ -11981,6 +11792,30 @@
           </a:p>
         </p:txBody>
       </p:sp>
+      <p:pic>
+        <p:nvPicPr>
+          <p:cNvPr id="3" name="Picture 2"/>
+          <p:cNvPicPr>
+            <a:picLocks noChangeAspect="1"/>
+          </p:cNvPicPr>
+          <p:nvPr/>
+        </p:nvPicPr>
+        <p:blipFill>
+          <a:blip r:embed="rId2"/>
+          <a:stretch>
+            <a:fillRect/>
+          </a:stretch>
+        </p:blipFill>
+        <p:spPr>
+          <a:xfrm>
+            <a:off x="5473874" y="1864332"/>
+            <a:ext cx="5179564" cy="3988144"/>
+          </a:xfrm>
+          <a:prstGeom prst="rect">
+            <a:avLst/>
+          </a:prstGeom>
+        </p:spPr>
+      </p:pic>
     </p:spTree>
     <p:extLst>
       <p:ext uri="{BB962C8B-B14F-4D97-AF65-F5344CB8AC3E}">
@@ -12013,6 +11848,33 @@
       </p:grpSpPr>
       <p:sp>
         <p:nvSpPr>
+          <p:cNvPr id="4" name="Content Placeholder 3"/>
+          <p:cNvSpPr>
+            <a:spLocks noGrp="1"/>
+          </p:cNvSpPr>
+          <p:nvPr>
+            <p:ph idx="1"/>
+          </p:nvPr>
+        </p:nvSpPr>
+        <p:spPr/>
+        <p:txBody>
+          <a:bodyPr/>
+          <a:lstStyle/>
+          <a:p>
+            <a:r>
+              <a:rPr lang="en-US" dirty="0" smtClean="0"/>
+              <a:t>Meet </a:t>
+            </a:r>
+            <a:r>
+              <a:rPr lang="en-US" dirty="0"/>
+              <a:t>your goal – what is your question or hypothesis?</a:t>
+            </a:r>
+            <a:endParaRPr lang="en-US" dirty="0"/>
+          </a:p>
+        </p:txBody>
+      </p:sp>
+      <p:sp>
+        <p:nvSpPr>
           <p:cNvPr id="2" name="Title 1"/>
           <p:cNvSpPr>
             <a:spLocks noGrp="1"/>
@@ -12021,12 +11883,7 @@
             <p:ph type="title"/>
           </p:nvPr>
         </p:nvSpPr>
-        <p:spPr>
-          <a:xfrm>
-            <a:off x="1168708" y="675829"/>
-            <a:ext cx="10229977" cy="500289"/>
-          </a:xfrm>
-        </p:spPr>
+        <p:spPr/>
         <p:txBody>
           <a:bodyPr/>
           <a:lstStyle/>
@@ -12037,108 +11894,16 @@
                   <a:srgbClr val="8E1731"/>
                 </a:solidFill>
               </a:rPr>
-              <a:t>What improvements can we make?</a:t>
+              <a:t>Step 3: clear visuals</a:t>
             </a:r>
             <a:endParaRPr lang="en-US" dirty="0"/>
-          </a:p>
-        </p:txBody>
-      </p:sp>
-      <p:pic>
-        <p:nvPicPr>
-          <p:cNvPr id="6" name="Picture 5"/>
-          <p:cNvPicPr>
-            <a:picLocks noChangeAspect="1"/>
-          </p:cNvPicPr>
-          <p:nvPr/>
-        </p:nvPicPr>
-        <p:blipFill>
-          <a:blip r:embed="rId2"/>
-          <a:stretch>
-            <a:fillRect/>
-          </a:stretch>
-        </p:blipFill>
-        <p:spPr>
-          <a:xfrm>
-            <a:off x="1007416" y="2081149"/>
-            <a:ext cx="6047619" cy="3895238"/>
-          </a:xfrm>
-          <a:prstGeom prst="rect">
-            <a:avLst/>
-          </a:prstGeom>
-        </p:spPr>
-      </p:pic>
-      <p:sp>
-        <p:nvSpPr>
-          <p:cNvPr id="7" name="Rectangle 6"/>
-          <p:cNvSpPr/>
-          <p:nvPr/>
-        </p:nvSpPr>
-        <p:spPr>
-          <a:xfrm>
-            <a:off x="7407057" y="2490031"/>
-            <a:ext cx="4129414" cy="1938992"/>
-          </a:xfrm>
-          <a:prstGeom prst="rect">
-            <a:avLst/>
-          </a:prstGeom>
-        </p:spPr>
-        <p:txBody>
-          <a:bodyPr wrap="square">
-            <a:spAutoFit/>
-          </a:bodyPr>
-          <a:lstStyle/>
-          <a:p>
-            <a:pPr marL="285750" indent="-285750">
-              <a:buFont typeface="Arial" panose="020B0604020202020204" pitchFamily="34" charset="0"/>
-              <a:buChar char="•"/>
-            </a:pPr>
-            <a:r>
-              <a:rPr lang="en-US" sz="2400" dirty="0" smtClean="0"/>
-              <a:t>Removed </a:t>
-            </a:r>
-            <a:r>
-              <a:rPr lang="en-US" sz="2400" dirty="0"/>
-              <a:t>area-cut relationship</a:t>
-            </a:r>
-          </a:p>
-          <a:p>
-            <a:pPr marL="285750" indent="-285750">
-              <a:buFont typeface="Arial" panose="020B0604020202020204" pitchFamily="34" charset="0"/>
-              <a:buChar char="•"/>
-            </a:pPr>
-            <a:r>
-              <a:rPr lang="en-US" sz="2400" dirty="0" smtClean="0"/>
-              <a:t>Show full range of data</a:t>
-            </a:r>
-          </a:p>
-          <a:p>
-            <a:pPr marL="285750" indent="-285750">
-              <a:buFont typeface="Arial" panose="020B0604020202020204" pitchFamily="34" charset="0"/>
-              <a:buChar char="•"/>
-            </a:pPr>
-            <a:r>
-              <a:rPr lang="en-US" sz="2400" dirty="0" smtClean="0"/>
-              <a:t>Units for y-axis</a:t>
-            </a:r>
-            <a:endParaRPr lang="en-US" sz="2400" dirty="0"/>
-          </a:p>
-          <a:p>
-            <a:pPr marL="285750" indent="-285750">
-              <a:buFont typeface="Arial" panose="020B0604020202020204" pitchFamily="34" charset="0"/>
-              <a:buChar char="•"/>
-            </a:pPr>
-            <a:r>
-              <a:rPr lang="en-US" sz="2400" dirty="0" smtClean="0"/>
-              <a:t>Labels not abbreviated</a:t>
-            </a:r>
-            <a:endParaRPr lang="en-US" sz="2400" dirty="0"/>
           </a:p>
         </p:txBody>
       </p:sp>
     </p:spTree>
     <p:extLst>
       <p:ext uri="{BB962C8B-B14F-4D97-AF65-F5344CB8AC3E}">
-        <p14:creationId xmlns:p14="http://schemas.microsoft.com/office/powerpoint/2010/main" val="1203345857"/>
+        <p14:creationId xmlns:p14="http://schemas.microsoft.com/office/powerpoint/2010/main" val="4152606566"/>
       </p:ext>
     </p:extLst>
   </p:cSld>
@@ -12191,7 +11956,7 @@
                   <a:srgbClr val="8E1731"/>
                 </a:solidFill>
               </a:rPr>
-              <a:t>What </a:t>
+              <a:t>What is </a:t>
             </a:r>
             <a:r>
               <a:rPr lang="en-US" b="1" dirty="0" smtClean="0">
@@ -12199,7 +11964,7 @@
                   <a:srgbClr val="8E1731"/>
                 </a:solidFill>
               </a:rPr>
-              <a:t>else could we improve?</a:t>
+              <a:t>clear or misleading about this?</a:t>
             </a:r>
             <a:endParaRPr lang="en-US" dirty="0"/>
           </a:p>
@@ -12207,7 +11972,7 @@
       </p:sp>
       <p:pic>
         <p:nvPicPr>
-          <p:cNvPr id="6" name="Picture 5"/>
+          <p:cNvPr id="3" name="Picture 2"/>
           <p:cNvPicPr>
             <a:picLocks noChangeAspect="1"/>
           </p:cNvPicPr>
@@ -12221,92 +11986,18 @@
         </p:blipFill>
         <p:spPr>
           <a:xfrm>
-            <a:off x="1007416" y="2081149"/>
-            <a:ext cx="6047619" cy="3895238"/>
+            <a:off x="1147188" y="2221214"/>
+            <a:ext cx="6057143" cy="3895238"/>
           </a:xfrm>
           <a:prstGeom prst="rect">
             <a:avLst/>
           </a:prstGeom>
         </p:spPr>
       </p:pic>
-      <p:sp>
-        <p:nvSpPr>
-          <p:cNvPr id="5" name="Rectangle 4"/>
-          <p:cNvSpPr/>
-          <p:nvPr/>
-        </p:nvSpPr>
-        <p:spPr>
-          <a:xfrm>
-            <a:off x="7055035" y="1615859"/>
-            <a:ext cx="4343650" cy="4154984"/>
-          </a:xfrm>
-          <a:prstGeom prst="rect">
-            <a:avLst/>
-          </a:prstGeom>
-        </p:spPr>
-        <p:txBody>
-          <a:bodyPr wrap="square">
-            <a:spAutoFit/>
-          </a:bodyPr>
-          <a:lstStyle/>
-          <a:p>
-            <a:pPr marL="285750" indent="-285750">
-              <a:buFont typeface="Arial" panose="020B0604020202020204" pitchFamily="34" charset="0"/>
-              <a:buChar char="•"/>
-            </a:pPr>
-            <a:r>
-              <a:rPr lang="en-US" sz="2400" dirty="0" smtClean="0"/>
-              <a:t>Decide if data density in interior is acceptable</a:t>
-            </a:r>
-          </a:p>
-          <a:p>
-            <a:pPr marL="285750" indent="-285750">
-              <a:buFont typeface="Arial" panose="020B0604020202020204" pitchFamily="34" charset="0"/>
-              <a:buChar char="•"/>
-            </a:pPr>
-            <a:r>
-              <a:rPr lang="en-US" sz="2400" dirty="0" smtClean="0"/>
-              <a:t>Make “fair” easier to see from a distance (darker color)</a:t>
-            </a:r>
-          </a:p>
-          <a:p>
-            <a:pPr marL="285750" indent="-285750">
-              <a:buFont typeface="Arial" panose="020B0604020202020204" pitchFamily="34" charset="0"/>
-              <a:buChar char="•"/>
-            </a:pPr>
-            <a:r>
-              <a:rPr lang="en-US" sz="2400" dirty="0" smtClean="0"/>
-              <a:t>Make all points easier to see from a distance (larger size)</a:t>
-            </a:r>
-          </a:p>
-          <a:p>
-            <a:pPr marL="285750" indent="-285750">
-              <a:buFont typeface="Arial" panose="020B0604020202020204" pitchFamily="34" charset="0"/>
-              <a:buChar char="•"/>
-            </a:pPr>
-            <a:r>
-              <a:rPr lang="en-US" sz="2400" dirty="0" smtClean="0"/>
-              <a:t>Consider goal – do we need all cut categories</a:t>
-            </a:r>
-            <a:r>
-              <a:rPr lang="en-US" sz="2400" dirty="0" smtClean="0"/>
-              <a:t>?  Do we need a summary instead?</a:t>
-            </a:r>
-            <a:endParaRPr lang="en-US" sz="2400" dirty="0" smtClean="0"/>
-          </a:p>
-          <a:p>
-            <a:pPr marL="285750" indent="-285750">
-              <a:buFont typeface="Arial" panose="020B0604020202020204" pitchFamily="34" charset="0"/>
-              <a:buChar char="•"/>
-            </a:pPr>
-            <a:endParaRPr lang="en-US" sz="2400" dirty="0" smtClean="0"/>
-          </a:p>
-        </p:txBody>
-      </p:sp>
     </p:spTree>
     <p:extLst>
       <p:ext uri="{BB962C8B-B14F-4D97-AF65-F5344CB8AC3E}">
-        <p14:creationId xmlns:p14="http://schemas.microsoft.com/office/powerpoint/2010/main" val="871147982"/>
+        <p14:creationId xmlns:p14="http://schemas.microsoft.com/office/powerpoint/2010/main" val="3582042232"/>
       </p:ext>
     </p:extLst>
   </p:cSld>
@@ -12335,156 +12026,7 @@
       </p:grpSpPr>
       <p:sp>
         <p:nvSpPr>
-          <p:cNvPr id="4" name="Content Placeholder 3"/>
-          <p:cNvSpPr>
-            <a:spLocks noGrp="1"/>
-          </p:cNvSpPr>
-          <p:nvPr>
-            <p:ph idx="10"/>
-          </p:nvPr>
-        </p:nvSpPr>
-        <p:spPr>
-          <a:xfrm>
-            <a:off x="358816" y="2091847"/>
-            <a:ext cx="5787342" cy="3665922"/>
-          </a:xfrm>
-        </p:spPr>
-        <p:txBody>
-          <a:bodyPr>
-            <a:normAutofit/>
-          </a:bodyPr>
-          <a:lstStyle/>
-          <a:p>
-            <a:r>
-              <a:rPr lang="en-US" sz="2800" dirty="0" smtClean="0"/>
-              <a:t>Digital Skills Hub Calendar</a:t>
-            </a:r>
-            <a:br>
-              <a:rPr lang="en-US" sz="2800" dirty="0" smtClean="0"/>
-            </a:br>
-            <a:r>
-              <a:rPr lang="en-US" sz="2800" dirty="0" smtClean="0">
-                <a:hlinkClick r:id="rId2"/>
-              </a:rPr>
-              <a:t>https://digitalskills.oucreate.com</a:t>
-            </a:r>
-            <a:r>
-              <a:rPr lang="en-US" sz="2800" dirty="0" smtClean="0"/>
-              <a:t>   </a:t>
-            </a:r>
-          </a:p>
-          <a:p>
-            <a:r>
-              <a:rPr lang="en-US" sz="2800" dirty="0" smtClean="0"/>
-              <a:t>Information Specialists @ DAVIS</a:t>
-            </a:r>
-            <a:br>
-              <a:rPr lang="en-US" sz="2800" dirty="0" smtClean="0"/>
-            </a:br>
-            <a:r>
-              <a:rPr lang="en-US" sz="2800" dirty="0" smtClean="0">
-                <a:hlinkClick r:id="rId3"/>
-              </a:rPr>
-              <a:t>https://libraries.ou.edu/davis</a:t>
-            </a:r>
-            <a:r>
-              <a:rPr lang="en-US" sz="2800" dirty="0" smtClean="0"/>
-              <a:t> </a:t>
-            </a:r>
-            <a:endParaRPr lang="en-US" sz="2800" dirty="0"/>
-          </a:p>
-        </p:txBody>
-      </p:sp>
-      <p:sp>
-        <p:nvSpPr>
-          <p:cNvPr id="6" name="Content Placeholder 5"/>
-          <p:cNvSpPr>
-            <a:spLocks noGrp="1"/>
-          </p:cNvSpPr>
-          <p:nvPr>
-            <p:ph idx="11"/>
-          </p:nvPr>
-        </p:nvSpPr>
-        <p:spPr>
-          <a:xfrm>
-            <a:off x="6616910" y="1979111"/>
-            <a:ext cx="5742868" cy="3778657"/>
-          </a:xfrm>
-        </p:spPr>
-        <p:txBody>
-          <a:bodyPr>
-            <a:noAutofit/>
-          </a:bodyPr>
-          <a:lstStyle/>
-          <a:p>
-            <a:r>
-              <a:rPr lang="en-US" sz="2800" dirty="0" smtClean="0"/>
-              <a:t>DAVIS workshops </a:t>
-            </a:r>
-            <a:r>
-              <a:rPr lang="en-US" sz="2800" dirty="0" smtClean="0">
-                <a:hlinkClick r:id="rId4"/>
-              </a:rPr>
-              <a:t>https://calendar.ou.edu/dsh</a:t>
-            </a:r>
-            <a:r>
-              <a:rPr lang="en-US" sz="2800" dirty="0" smtClean="0"/>
-              <a:t> </a:t>
-            </a:r>
-            <a:endParaRPr lang="en-US" sz="2000" dirty="0" smtClean="0"/>
-          </a:p>
-          <a:p>
-            <a:r>
-              <a:rPr lang="en-US" sz="2800" dirty="0" smtClean="0"/>
-              <a:t>Carpentries </a:t>
-            </a:r>
-            <a:r>
-              <a:rPr lang="en-US" sz="2800" dirty="0"/>
-              <a:t>two-day workshops </a:t>
-            </a:r>
-            <a:r>
-              <a:rPr lang="en-US" sz="2800" dirty="0">
-                <a:hlinkClick r:id="rId5"/>
-              </a:rPr>
-              <a:t>https://libraries.ou.edu</a:t>
-            </a:r>
-            <a:r>
-              <a:rPr lang="en-US" sz="2800" dirty="0" smtClean="0">
-                <a:hlinkClick r:id="rId5"/>
-              </a:rPr>
-              <a:t>/</a:t>
-            </a:r>
-            <a:br>
-              <a:rPr lang="en-US" sz="2800" dirty="0" smtClean="0">
-                <a:hlinkClick r:id="rId5"/>
-              </a:rPr>
-            </a:br>
-            <a:r>
-              <a:rPr lang="en-US" sz="2800" dirty="0" smtClean="0">
-                <a:hlinkClick r:id="rId5"/>
-              </a:rPr>
-              <a:t>carpentries</a:t>
-            </a:r>
-            <a:r>
-              <a:rPr lang="en-US" sz="2800" dirty="0" smtClean="0"/>
-              <a:t> </a:t>
-            </a:r>
-            <a:endParaRPr lang="en-US" sz="2800" dirty="0"/>
-          </a:p>
-          <a:p>
-            <a:endParaRPr lang="en-US" sz="2800" dirty="0"/>
-          </a:p>
-        </p:txBody>
-      </p:sp>
-      <p:sp>
-        <p:nvSpPr>
-          <p:cNvPr id="2" name="Title 1">
-            <a:extLst>
-              <a:ext uri="{FF2B5EF4-FFF2-40B4-BE49-F238E27FC236}">
-                <a16:creationId xmlns:a16="http://schemas.microsoft.com/office/drawing/2014/main" id="{D313C71A-5F8A-5C4C-B19D-A92B8ED34A75}"/>
-              </a:ext>
-            </a:extLst>
-          </p:cNvPr>
+          <p:cNvPr id="2" name="Title 1"/>
           <p:cNvSpPr>
             <a:spLocks noGrp="1"/>
           </p:cNvSpPr>
@@ -12495,255 +12037,149 @@
         <p:spPr>
           <a:xfrm>
             <a:off x="1168708" y="675829"/>
-            <a:ext cx="9916826" cy="500289"/>
+            <a:ext cx="10229977" cy="500289"/>
+          </a:xfrm>
+        </p:spPr>
+        <p:txBody>
+          <a:bodyPr/>
+          <a:lstStyle/>
+          <a:p>
+            <a:r>
+              <a:rPr lang="en-US" b="1" dirty="0">
+                <a:solidFill>
+                  <a:srgbClr val="8E1731"/>
+                </a:solidFill>
+              </a:rPr>
+              <a:t>What is </a:t>
+            </a:r>
+            <a:r>
+              <a:rPr lang="en-US" b="1" dirty="0" smtClean="0">
+                <a:solidFill>
+                  <a:srgbClr val="8E1731"/>
+                </a:solidFill>
+              </a:rPr>
+              <a:t>clear or misleading about this?</a:t>
+            </a:r>
+            <a:endParaRPr lang="en-US" dirty="0"/>
+          </a:p>
+        </p:txBody>
+      </p:sp>
+      <p:pic>
+        <p:nvPicPr>
+          <p:cNvPr id="3" name="Picture 2"/>
+          <p:cNvPicPr>
+            <a:picLocks noChangeAspect="1"/>
+          </p:cNvPicPr>
+          <p:nvPr/>
+        </p:nvPicPr>
+        <p:blipFill>
+          <a:blip r:embed="rId2"/>
+          <a:stretch>
+            <a:fillRect/>
+          </a:stretch>
+        </p:blipFill>
+        <p:spPr>
+          <a:xfrm>
+            <a:off x="1147188" y="2221214"/>
+            <a:ext cx="6057143" cy="3895238"/>
           </a:xfrm>
           <a:prstGeom prst="rect">
             <a:avLst/>
           </a:prstGeom>
         </p:spPr>
-        <p:txBody>
-          <a:bodyPr/>
-          <a:lstStyle/>
-          <a:p>
-            <a:r>
-              <a:rPr lang="en-US" b="1" dirty="0" smtClean="0">
-                <a:solidFill>
-                  <a:srgbClr val="8E1731"/>
-                </a:solidFill>
-              </a:rPr>
-              <a:t>Step 4: get help and learn more</a:t>
-            </a:r>
-            <a:endParaRPr lang="en-US" b="1" dirty="0">
-              <a:solidFill>
-                <a:srgbClr val="8E1731"/>
-              </a:solidFill>
-            </a:endParaRPr>
-          </a:p>
-        </p:txBody>
-      </p:sp>
-      <p:sp>
-        <p:nvSpPr>
-          <p:cNvPr id="5" name="Content Placeholder 3"/>
-          <p:cNvSpPr txBox="1">
-            <a:spLocks/>
-          </p:cNvSpPr>
+      </p:pic>
+      <p:sp>
+        <p:nvSpPr>
+          <p:cNvPr id="4" name="Rectangle 3"/>
+          <p:cNvSpPr/>
           <p:nvPr/>
         </p:nvSpPr>
         <p:spPr>
           <a:xfrm>
-            <a:off x="358815" y="4912304"/>
-            <a:ext cx="10964713" cy="3891391"/>
+            <a:off x="7407057" y="1860766"/>
+            <a:ext cx="4129414" cy="3416320"/>
           </a:xfrm>
           <a:prstGeom prst="rect">
             <a:avLst/>
           </a:prstGeom>
         </p:spPr>
         <p:txBody>
-          <a:bodyPr>
-            <a:normAutofit/>
+          <a:bodyPr wrap="square">
+            <a:spAutoFit/>
           </a:bodyPr>
-          <a:lstStyle>
-            <a:lvl1pPr marL="257162" indent="-257162" algn="l" defTabSz="914400" rtl="0" eaLnBrk="1" latinLnBrk="0" hangingPunct="1">
-              <a:lnSpc>
-                <a:spcPct val="90000"/>
-              </a:lnSpc>
-              <a:spcBef>
-                <a:spcPts val="1000"/>
-              </a:spcBef>
-              <a:buClr>
-                <a:srgbClr val="8E1731"/>
-              </a:buClr>
-              <a:buFont typeface="Wingdings" panose="05000000000000000000" pitchFamily="2" charset="2"/>
-              <a:buChar char="§"/>
-              <a:defRPr lang="en-US" sz="3200" kern="1200" dirty="0" smtClean="0">
-                <a:solidFill>
-                  <a:schemeClr val="tx1"/>
-                </a:solidFill>
-                <a:latin typeface="Arial" panose="020B0604020202020204" pitchFamily="34" charset="0"/>
-                <a:ea typeface="+mn-ea"/>
-                <a:cs typeface="Arial" panose="020B0604020202020204" pitchFamily="34" charset="0"/>
-              </a:defRPr>
-            </a:lvl1pPr>
-            <a:lvl2pPr marL="557185" indent="-214303" algn="l" defTabSz="914400" rtl="0" eaLnBrk="1" latinLnBrk="0" hangingPunct="1">
-              <a:lnSpc>
-                <a:spcPct val="90000"/>
-              </a:lnSpc>
-              <a:spcBef>
-                <a:spcPts val="500"/>
-              </a:spcBef>
-              <a:buClrTx/>
+          <a:lstStyle/>
+          <a:p>
+            <a:r>
+              <a:rPr lang="en-US" dirty="0"/>
+              <a:t>Clear</a:t>
+            </a:r>
+          </a:p>
+          <a:p>
+            <a:pPr marL="285750" indent="-285750">
               <a:buFont typeface="Arial" panose="020B0604020202020204" pitchFamily="34" charset="0"/>
               <a:buChar char="•"/>
-              <a:defRPr lang="en-US" sz="3200" kern="1200" dirty="0" smtClean="0">
-                <a:solidFill>
-                  <a:schemeClr val="tx1"/>
-                </a:solidFill>
-                <a:latin typeface="Arial" panose="020B0604020202020204" pitchFamily="34" charset="0"/>
-                <a:ea typeface="+mn-ea"/>
-                <a:cs typeface="Arial" panose="020B0604020202020204" pitchFamily="34" charset="0"/>
-              </a:defRPr>
-            </a:lvl2pPr>
-            <a:lvl3pPr marL="857208" indent="-171442" algn="l" defTabSz="914400" rtl="0" eaLnBrk="1" latinLnBrk="0" hangingPunct="1">
-              <a:lnSpc>
-                <a:spcPct val="90000"/>
-              </a:lnSpc>
-              <a:spcBef>
-                <a:spcPts val="500"/>
-              </a:spcBef>
-              <a:buClrTx/>
-              <a:buSzPct val="60000"/>
-              <a:buFont typeface="Courier New" panose="02070309020205020404" pitchFamily="49" charset="0"/>
-              <a:buChar char="o"/>
-              <a:defRPr lang="en-US" sz="3200" kern="1200" dirty="0" smtClean="0">
-                <a:solidFill>
-                  <a:schemeClr val="tx1"/>
-                </a:solidFill>
-                <a:latin typeface="Arial" panose="020B0604020202020204" pitchFamily="34" charset="0"/>
-                <a:ea typeface="+mn-ea"/>
-                <a:cs typeface="Arial" panose="020B0604020202020204" pitchFamily="34" charset="0"/>
-              </a:defRPr>
-            </a:lvl3pPr>
-            <a:lvl4pPr marL="1200091" indent="-171442" algn="l" defTabSz="914400" rtl="0" eaLnBrk="1" latinLnBrk="0" hangingPunct="1">
-              <a:lnSpc>
-                <a:spcPct val="90000"/>
-              </a:lnSpc>
-              <a:spcBef>
-                <a:spcPts val="500"/>
-              </a:spcBef>
-              <a:buClrTx/>
+            </a:pPr>
+            <a:r>
+              <a:rPr lang="en-US" dirty="0"/>
+              <a:t>Chart design consistent throughout</a:t>
+            </a:r>
+          </a:p>
+          <a:p>
+            <a:pPr marL="285750" indent="-285750">
               <a:buFont typeface="Arial" panose="020B0604020202020204" pitchFamily="34" charset="0"/>
               <a:buChar char="•"/>
-              <a:defRPr lang="en-US" sz="3200" kern="1200" dirty="0" smtClean="0">
-                <a:solidFill>
-                  <a:schemeClr val="tx1"/>
-                </a:solidFill>
-                <a:latin typeface="Arial" panose="020B0604020202020204" pitchFamily="34" charset="0"/>
-                <a:ea typeface="+mn-ea"/>
-                <a:cs typeface="Arial" panose="020B0604020202020204" pitchFamily="34" charset="0"/>
-              </a:defRPr>
-            </a:lvl4pPr>
-            <a:lvl5pPr marL="1542973" indent="-171442" algn="l" defTabSz="914400" rtl="0" eaLnBrk="1" latinLnBrk="0" hangingPunct="1">
-              <a:lnSpc>
-                <a:spcPct val="90000"/>
-              </a:lnSpc>
-              <a:spcBef>
-                <a:spcPts val="500"/>
-              </a:spcBef>
-              <a:buClrTx/>
-              <a:buSzPct val="35000"/>
-              <a:buFont typeface="Courier New" panose="02070309020205020404" pitchFamily="49" charset="0"/>
-              <a:buChar char="o"/>
-              <a:defRPr lang="en-US" sz="3200" kern="1200" dirty="0">
-                <a:solidFill>
-                  <a:schemeClr val="tx1"/>
-                </a:solidFill>
-                <a:latin typeface="Arial" panose="020B0604020202020204" pitchFamily="34" charset="0"/>
-                <a:ea typeface="+mn-ea"/>
-                <a:cs typeface="Arial" panose="020B0604020202020204" pitchFamily="34" charset="0"/>
-              </a:defRPr>
-            </a:lvl5pPr>
-            <a:lvl6pPr marL="2514600" indent="-228600" algn="l" defTabSz="914400" rtl="0" eaLnBrk="1" latinLnBrk="0" hangingPunct="1">
-              <a:lnSpc>
-                <a:spcPct val="90000"/>
-              </a:lnSpc>
-              <a:spcBef>
-                <a:spcPts val="500"/>
-              </a:spcBef>
+            </a:pPr>
+            <a:r>
+              <a:rPr lang="en-US" dirty="0"/>
+              <a:t>Units appropriate</a:t>
+            </a:r>
+          </a:p>
+          <a:p>
+            <a:endParaRPr lang="en-US" dirty="0"/>
+          </a:p>
+          <a:p>
+            <a:r>
+              <a:rPr lang="en-US" dirty="0" smtClean="0"/>
+              <a:t>Potentially misleading</a:t>
+            </a:r>
+            <a:endParaRPr lang="en-US" dirty="0"/>
+          </a:p>
+          <a:p>
+            <a:pPr marL="285750" indent="-285750">
               <a:buFont typeface="Arial" panose="020B0604020202020204" pitchFamily="34" charset="0"/>
               <a:buChar char="•"/>
-              <a:defRPr sz="1800" kern="1200">
-                <a:solidFill>
-                  <a:schemeClr val="tx1"/>
-                </a:solidFill>
-                <a:latin typeface="+mn-lt"/>
-                <a:ea typeface="+mn-ea"/>
-                <a:cs typeface="+mn-cs"/>
-              </a:defRPr>
-            </a:lvl6pPr>
-            <a:lvl7pPr marL="2971800" indent="-228600" algn="l" defTabSz="914400" rtl="0" eaLnBrk="1" latinLnBrk="0" hangingPunct="1">
-              <a:lnSpc>
-                <a:spcPct val="90000"/>
-              </a:lnSpc>
-              <a:spcBef>
-                <a:spcPts val="500"/>
-              </a:spcBef>
+            </a:pPr>
+            <a:r>
+              <a:rPr lang="en-US" dirty="0"/>
+              <a:t>Symbols and axes proportional to numbers represented (problem with pie charts, area in general)</a:t>
+            </a:r>
+          </a:p>
+          <a:p>
+            <a:pPr marL="285750" indent="-285750">
               <a:buFont typeface="Arial" panose="020B0604020202020204" pitchFamily="34" charset="0"/>
               <a:buChar char="•"/>
-              <a:defRPr sz="1800" kern="1200">
-                <a:solidFill>
-                  <a:schemeClr val="tx1"/>
-                </a:solidFill>
-                <a:latin typeface="+mn-lt"/>
-                <a:ea typeface="+mn-ea"/>
-                <a:cs typeface="+mn-cs"/>
-              </a:defRPr>
-            </a:lvl7pPr>
-            <a:lvl8pPr marL="3429000" indent="-228600" algn="l" defTabSz="914400" rtl="0" eaLnBrk="1" latinLnBrk="0" hangingPunct="1">
-              <a:lnSpc>
-                <a:spcPct val="90000"/>
-              </a:lnSpc>
-              <a:spcBef>
-                <a:spcPts val="500"/>
-              </a:spcBef>
+            </a:pPr>
+            <a:r>
+              <a:rPr lang="en-US" dirty="0"/>
+              <a:t>Lack of context: did not show all relevant data</a:t>
+            </a:r>
+          </a:p>
+          <a:p>
+            <a:pPr marL="285750" indent="-285750">
               <a:buFont typeface="Arial" panose="020B0604020202020204" pitchFamily="34" charset="0"/>
               <a:buChar char="•"/>
-              <a:defRPr sz="1800" kern="1200">
-                <a:solidFill>
-                  <a:schemeClr val="tx1"/>
-                </a:solidFill>
-                <a:latin typeface="+mn-lt"/>
-                <a:ea typeface="+mn-ea"/>
-                <a:cs typeface="+mn-cs"/>
-              </a:defRPr>
-            </a:lvl8pPr>
-            <a:lvl9pPr marL="3886200" indent="-228600" algn="l" defTabSz="914400" rtl="0" eaLnBrk="1" latinLnBrk="0" hangingPunct="1">
-              <a:lnSpc>
-                <a:spcPct val="90000"/>
-              </a:lnSpc>
-              <a:spcBef>
-                <a:spcPts val="500"/>
-              </a:spcBef>
-              <a:buFont typeface="Arial" panose="020B0604020202020204" pitchFamily="34" charset="0"/>
-              <a:buChar char="•"/>
-              <a:defRPr sz="1800" kern="1200">
-                <a:solidFill>
-                  <a:schemeClr val="tx1"/>
-                </a:solidFill>
-                <a:latin typeface="+mn-lt"/>
-                <a:ea typeface="+mn-ea"/>
-                <a:cs typeface="+mn-cs"/>
-              </a:defRPr>
-            </a:lvl9pPr>
-          </a:lstStyle>
-          <a:p>
-            <a:r>
-              <a:rPr lang="en-US" sz="2800" dirty="0" smtClean="0"/>
-              <a:t>Read </a:t>
-            </a:r>
-            <a:r>
-              <a:rPr lang="en-US" sz="2800" dirty="0" err="1" smtClean="0"/>
-              <a:t>Tufte’s</a:t>
-            </a:r>
-            <a:r>
-              <a:rPr lang="en-US" sz="2800" dirty="0" smtClean="0"/>
-              <a:t> </a:t>
-            </a:r>
-            <a:r>
-              <a:rPr lang="en-US" sz="2800" i="1" dirty="0" smtClean="0"/>
-              <a:t>The Visual Display of Quantitative Information</a:t>
-            </a:r>
-            <a:r>
-              <a:rPr lang="en-US" sz="2800" dirty="0" smtClean="0"/>
-              <a:t> on Reserves at Circulation Desk (4 hour checkout)</a:t>
-            </a:r>
-            <a:endParaRPr lang="en-US" sz="2800" dirty="0"/>
+            </a:pPr>
+            <a:r>
+              <a:rPr lang="en-US" dirty="0"/>
+              <a:t>Clear labels (minimize abbreviations)	</a:t>
+            </a:r>
           </a:p>
         </p:txBody>
       </p:sp>
     </p:spTree>
     <p:extLst>
       <p:ext uri="{BB962C8B-B14F-4D97-AF65-F5344CB8AC3E}">
-        <p14:creationId xmlns:p14="http://schemas.microsoft.com/office/powerpoint/2010/main" val="1761210051"/>
+        <p14:creationId xmlns:p14="http://schemas.microsoft.com/office/powerpoint/2010/main" val="2671584075"/>
       </p:ext>
     </p:extLst>
   </p:cSld>
@@ -12772,6 +12208,941 @@
       </p:grpSpPr>
       <p:sp>
         <p:nvSpPr>
+          <p:cNvPr id="2" name="Title 1"/>
+          <p:cNvSpPr>
+            <a:spLocks noGrp="1"/>
+          </p:cNvSpPr>
+          <p:nvPr>
+            <p:ph type="title"/>
+          </p:nvPr>
+        </p:nvSpPr>
+        <p:spPr>
+          <a:xfrm>
+            <a:off x="1168708" y="675829"/>
+            <a:ext cx="10229977" cy="500289"/>
+          </a:xfrm>
+        </p:spPr>
+        <p:txBody>
+          <a:bodyPr/>
+          <a:lstStyle/>
+          <a:p>
+            <a:r>
+              <a:rPr lang="en-US" b="1" dirty="0" smtClean="0">
+                <a:solidFill>
+                  <a:srgbClr val="8E1731"/>
+                </a:solidFill>
+              </a:rPr>
+              <a:t>What improvements can we make?</a:t>
+            </a:r>
+            <a:endParaRPr lang="en-US" dirty="0"/>
+          </a:p>
+        </p:txBody>
+      </p:sp>
+      <p:pic>
+        <p:nvPicPr>
+          <p:cNvPr id="6" name="Picture 5"/>
+          <p:cNvPicPr>
+            <a:picLocks noChangeAspect="1"/>
+          </p:cNvPicPr>
+          <p:nvPr/>
+        </p:nvPicPr>
+        <p:blipFill>
+          <a:blip r:embed="rId2"/>
+          <a:stretch>
+            <a:fillRect/>
+          </a:stretch>
+        </p:blipFill>
+        <p:spPr>
+          <a:xfrm>
+            <a:off x="1007416" y="2081149"/>
+            <a:ext cx="6047619" cy="3895238"/>
+          </a:xfrm>
+          <a:prstGeom prst="rect">
+            <a:avLst/>
+          </a:prstGeom>
+        </p:spPr>
+      </p:pic>
+      <p:sp>
+        <p:nvSpPr>
+          <p:cNvPr id="7" name="Rectangle 6"/>
+          <p:cNvSpPr/>
+          <p:nvPr/>
+        </p:nvSpPr>
+        <p:spPr>
+          <a:xfrm>
+            <a:off x="7407057" y="2490031"/>
+            <a:ext cx="4129414" cy="1938992"/>
+          </a:xfrm>
+          <a:prstGeom prst="rect">
+            <a:avLst/>
+          </a:prstGeom>
+        </p:spPr>
+        <p:txBody>
+          <a:bodyPr wrap="square">
+            <a:spAutoFit/>
+          </a:bodyPr>
+          <a:lstStyle/>
+          <a:p>
+            <a:pPr marL="285750" indent="-285750">
+              <a:buFont typeface="Arial" panose="020B0604020202020204" pitchFamily="34" charset="0"/>
+              <a:buChar char="•"/>
+            </a:pPr>
+            <a:r>
+              <a:rPr lang="en-US" sz="2400" dirty="0" smtClean="0"/>
+              <a:t>Removed </a:t>
+            </a:r>
+            <a:r>
+              <a:rPr lang="en-US" sz="2400" dirty="0"/>
+              <a:t>area-cut relationship</a:t>
+            </a:r>
+          </a:p>
+          <a:p>
+            <a:pPr marL="285750" indent="-285750">
+              <a:buFont typeface="Arial" panose="020B0604020202020204" pitchFamily="34" charset="0"/>
+              <a:buChar char="•"/>
+            </a:pPr>
+            <a:r>
+              <a:rPr lang="en-US" sz="2400" dirty="0" smtClean="0"/>
+              <a:t>Show full range of data</a:t>
+            </a:r>
+          </a:p>
+          <a:p>
+            <a:pPr marL="285750" indent="-285750">
+              <a:buFont typeface="Arial" panose="020B0604020202020204" pitchFamily="34" charset="0"/>
+              <a:buChar char="•"/>
+            </a:pPr>
+            <a:r>
+              <a:rPr lang="en-US" sz="2400" dirty="0" smtClean="0"/>
+              <a:t>Units for y-axis</a:t>
+            </a:r>
+            <a:endParaRPr lang="en-US" sz="2400" dirty="0"/>
+          </a:p>
+          <a:p>
+            <a:pPr marL="285750" indent="-285750">
+              <a:buFont typeface="Arial" panose="020B0604020202020204" pitchFamily="34" charset="0"/>
+              <a:buChar char="•"/>
+            </a:pPr>
+            <a:r>
+              <a:rPr lang="en-US" sz="2400" dirty="0" smtClean="0"/>
+              <a:t>Labels not abbreviated</a:t>
+            </a:r>
+            <a:endParaRPr lang="en-US" sz="2400" dirty="0"/>
+          </a:p>
+        </p:txBody>
+      </p:sp>
+    </p:spTree>
+    <p:extLst>
+      <p:ext uri="{BB962C8B-B14F-4D97-AF65-F5344CB8AC3E}">
+        <p14:creationId xmlns:p14="http://schemas.microsoft.com/office/powerpoint/2010/main" val="1203345857"/>
+      </p:ext>
+    </p:extLst>
+  </p:cSld>
+  <p:clrMapOvr>
+    <a:masterClrMapping/>
+  </p:clrMapOvr>
+</p:sld>
+</file>
+
+<file path=ppt/slides/slide44.xml><?xml version="1.0" encoding="utf-8"?>
+<p:sld xmlns:a="http://schemas.openxmlformats.org/drawingml/2006/main" xmlns:r="http://schemas.openxmlformats.org/officeDocument/2006/relationships" xmlns:p="http://schemas.openxmlformats.org/presentationml/2006/main">
+  <p:cSld>
+    <p:spTree>
+      <p:nvGrpSpPr>
+        <p:cNvPr id="1" name=""/>
+        <p:cNvGrpSpPr/>
+        <p:nvPr/>
+      </p:nvGrpSpPr>
+      <p:grpSpPr>
+        <a:xfrm>
+          <a:off x="0" y="0"/>
+          <a:ext cx="0" cy="0"/>
+          <a:chOff x="0" y="0"/>
+          <a:chExt cx="0" cy="0"/>
+        </a:xfrm>
+      </p:grpSpPr>
+      <p:sp>
+        <p:nvSpPr>
+          <p:cNvPr id="2" name="Title 1"/>
+          <p:cNvSpPr>
+            <a:spLocks noGrp="1"/>
+          </p:cNvSpPr>
+          <p:nvPr>
+            <p:ph type="title"/>
+          </p:nvPr>
+        </p:nvSpPr>
+        <p:spPr>
+          <a:xfrm>
+            <a:off x="1168708" y="675829"/>
+            <a:ext cx="10229977" cy="500289"/>
+          </a:xfrm>
+        </p:spPr>
+        <p:txBody>
+          <a:bodyPr/>
+          <a:lstStyle/>
+          <a:p>
+            <a:r>
+              <a:rPr lang="en-US" b="1" dirty="0">
+                <a:solidFill>
+                  <a:srgbClr val="8E1731"/>
+                </a:solidFill>
+              </a:rPr>
+              <a:t>What </a:t>
+            </a:r>
+            <a:r>
+              <a:rPr lang="en-US" b="1" dirty="0" smtClean="0">
+                <a:solidFill>
+                  <a:srgbClr val="8E1731"/>
+                </a:solidFill>
+              </a:rPr>
+              <a:t>else could we improve?</a:t>
+            </a:r>
+            <a:endParaRPr lang="en-US" dirty="0"/>
+          </a:p>
+        </p:txBody>
+      </p:sp>
+      <p:pic>
+        <p:nvPicPr>
+          <p:cNvPr id="6" name="Picture 5"/>
+          <p:cNvPicPr>
+            <a:picLocks noChangeAspect="1"/>
+          </p:cNvPicPr>
+          <p:nvPr/>
+        </p:nvPicPr>
+        <p:blipFill>
+          <a:blip r:embed="rId2"/>
+          <a:stretch>
+            <a:fillRect/>
+          </a:stretch>
+        </p:blipFill>
+        <p:spPr>
+          <a:xfrm>
+            <a:off x="1007416" y="2081149"/>
+            <a:ext cx="6047619" cy="3895238"/>
+          </a:xfrm>
+          <a:prstGeom prst="rect">
+            <a:avLst/>
+          </a:prstGeom>
+        </p:spPr>
+      </p:pic>
+      <p:sp>
+        <p:nvSpPr>
+          <p:cNvPr id="5" name="Rectangle 4"/>
+          <p:cNvSpPr/>
+          <p:nvPr/>
+        </p:nvSpPr>
+        <p:spPr>
+          <a:xfrm>
+            <a:off x="7055035" y="1615859"/>
+            <a:ext cx="4343650" cy="4154984"/>
+          </a:xfrm>
+          <a:prstGeom prst="rect">
+            <a:avLst/>
+          </a:prstGeom>
+        </p:spPr>
+        <p:txBody>
+          <a:bodyPr wrap="square">
+            <a:spAutoFit/>
+          </a:bodyPr>
+          <a:lstStyle/>
+          <a:p>
+            <a:pPr marL="285750" indent="-285750">
+              <a:buFont typeface="Arial" panose="020B0604020202020204" pitchFamily="34" charset="0"/>
+              <a:buChar char="•"/>
+            </a:pPr>
+            <a:r>
+              <a:rPr lang="en-US" sz="2400" dirty="0" smtClean="0"/>
+              <a:t>Decide if data density in interior is acceptable</a:t>
+            </a:r>
+          </a:p>
+          <a:p>
+            <a:pPr marL="285750" indent="-285750">
+              <a:buFont typeface="Arial" panose="020B0604020202020204" pitchFamily="34" charset="0"/>
+              <a:buChar char="•"/>
+            </a:pPr>
+            <a:r>
+              <a:rPr lang="en-US" sz="2400" dirty="0" smtClean="0"/>
+              <a:t>Make “fair” easier to see from a distance (darker color)</a:t>
+            </a:r>
+          </a:p>
+          <a:p>
+            <a:pPr marL="285750" indent="-285750">
+              <a:buFont typeface="Arial" panose="020B0604020202020204" pitchFamily="34" charset="0"/>
+              <a:buChar char="•"/>
+            </a:pPr>
+            <a:r>
+              <a:rPr lang="en-US" sz="2400" dirty="0" smtClean="0"/>
+              <a:t>Make all points easier to see from a distance (larger size)</a:t>
+            </a:r>
+          </a:p>
+          <a:p>
+            <a:pPr marL="285750" indent="-285750">
+              <a:buFont typeface="Arial" panose="020B0604020202020204" pitchFamily="34" charset="0"/>
+              <a:buChar char="•"/>
+            </a:pPr>
+            <a:r>
+              <a:rPr lang="en-US" sz="2400" dirty="0" smtClean="0"/>
+              <a:t>Consider goal – do we need all cut categories?  Do we need a summary instead?</a:t>
+            </a:r>
+          </a:p>
+          <a:p>
+            <a:pPr marL="285750" indent="-285750">
+              <a:buFont typeface="Arial" panose="020B0604020202020204" pitchFamily="34" charset="0"/>
+              <a:buChar char="•"/>
+            </a:pPr>
+            <a:endParaRPr lang="en-US" sz="2400" dirty="0" smtClean="0"/>
+          </a:p>
+        </p:txBody>
+      </p:sp>
+    </p:spTree>
+    <p:extLst>
+      <p:ext uri="{BB962C8B-B14F-4D97-AF65-F5344CB8AC3E}">
+        <p14:creationId xmlns:p14="http://schemas.microsoft.com/office/powerpoint/2010/main" val="871147982"/>
+      </p:ext>
+    </p:extLst>
+  </p:cSld>
+  <p:clrMapOvr>
+    <a:masterClrMapping/>
+  </p:clrMapOvr>
+</p:sld>
+</file>
+
+<file path=ppt/slides/slide45.xml><?xml version="1.0" encoding="utf-8"?>
+<p:sld xmlns:a="http://schemas.openxmlformats.org/drawingml/2006/main" xmlns:r="http://schemas.openxmlformats.org/officeDocument/2006/relationships" xmlns:p="http://schemas.openxmlformats.org/presentationml/2006/main">
+  <p:cSld>
+    <p:spTree>
+      <p:nvGrpSpPr>
+        <p:cNvPr id="1" name=""/>
+        <p:cNvGrpSpPr/>
+        <p:nvPr/>
+      </p:nvGrpSpPr>
+      <p:grpSpPr>
+        <a:xfrm>
+          <a:off x="0" y="0"/>
+          <a:ext cx="0" cy="0"/>
+          <a:chOff x="0" y="0"/>
+          <a:chExt cx="0" cy="0"/>
+        </a:xfrm>
+      </p:grpSpPr>
+      <p:sp>
+        <p:nvSpPr>
+          <p:cNvPr id="4" name="Content Placeholder 3"/>
+          <p:cNvSpPr>
+            <a:spLocks noGrp="1"/>
+          </p:cNvSpPr>
+          <p:nvPr>
+            <p:ph idx="10"/>
+          </p:nvPr>
+        </p:nvSpPr>
+        <p:spPr>
+          <a:xfrm>
+            <a:off x="150313" y="2091847"/>
+            <a:ext cx="12475924" cy="3665922"/>
+          </a:xfrm>
+        </p:spPr>
+        <p:txBody>
+          <a:bodyPr>
+            <a:normAutofit/>
+          </a:bodyPr>
+          <a:lstStyle/>
+          <a:p>
+            <a:r>
+              <a:rPr lang="en-US" sz="2800" dirty="0" smtClean="0"/>
+              <a:t>Digital Skills Hub </a:t>
+            </a:r>
+            <a:r>
+              <a:rPr lang="en-US" sz="2800" dirty="0" smtClean="0"/>
+              <a:t>Calendar			</a:t>
+            </a:r>
+            <a:r>
+              <a:rPr lang="en-US" sz="2800" dirty="0" smtClean="0">
+                <a:hlinkClick r:id="rId2"/>
+              </a:rPr>
+              <a:t>https://calendar.ou.edu/dsh</a:t>
+            </a:r>
+            <a:endParaRPr lang="en-US" sz="2800" dirty="0" smtClean="0"/>
+          </a:p>
+          <a:p>
+            <a:r>
+              <a:rPr lang="en-US" sz="2800" dirty="0" smtClean="0"/>
+              <a:t>Carpentries workshops 	</a:t>
+            </a:r>
+            <a:r>
+              <a:rPr lang="en-US" sz="2800" dirty="0"/>
+              <a:t>	</a:t>
+            </a:r>
+            <a:r>
+              <a:rPr lang="en-US" sz="2800" dirty="0" smtClean="0"/>
+              <a:t>	</a:t>
+            </a:r>
+            <a:r>
+              <a:rPr lang="en-US" sz="2800" dirty="0" smtClean="0">
+                <a:hlinkClick r:id="rId3"/>
+              </a:rPr>
+              <a:t>https</a:t>
+            </a:r>
+            <a:r>
+              <a:rPr lang="en-US" sz="2800" dirty="0">
+                <a:hlinkClick r:id="rId3"/>
+              </a:rPr>
+              <a:t>://</a:t>
+            </a:r>
+            <a:r>
+              <a:rPr lang="en-US" sz="2800" dirty="0" smtClean="0">
+                <a:hlinkClick r:id="rId3"/>
+              </a:rPr>
+              <a:t>libraries.ou.edu/carpentries</a:t>
+            </a:r>
+            <a:endParaRPr lang="en-US" sz="2800" dirty="0"/>
+          </a:p>
+          <a:p>
+            <a:r>
+              <a:rPr lang="en-US" sz="2800" dirty="0" smtClean="0"/>
+              <a:t>Information </a:t>
+            </a:r>
+            <a:r>
+              <a:rPr lang="en-US" sz="2800" dirty="0" smtClean="0"/>
+              <a:t>Specialists @ </a:t>
+            </a:r>
+            <a:r>
+              <a:rPr lang="en-US" sz="2800" dirty="0" smtClean="0"/>
+              <a:t>DAVIS		</a:t>
+            </a:r>
+            <a:r>
+              <a:rPr lang="en-US" sz="2800" dirty="0" smtClean="0">
+                <a:hlinkClick r:id="rId4"/>
+              </a:rPr>
+              <a:t>https</a:t>
+            </a:r>
+            <a:r>
+              <a:rPr lang="en-US" sz="2800" dirty="0" smtClean="0">
+                <a:hlinkClick r:id="rId4"/>
+              </a:rPr>
+              <a:t>://</a:t>
+            </a:r>
+            <a:r>
+              <a:rPr lang="en-US" sz="2800" dirty="0" smtClean="0">
+                <a:hlinkClick r:id="rId4"/>
+              </a:rPr>
+              <a:t>libraries.ou.edu/davis</a:t>
+            </a:r>
+            <a:endParaRPr lang="en-US" sz="2800" dirty="0" smtClean="0"/>
+          </a:p>
+          <a:p>
+            <a:endParaRPr lang="en-US" sz="2800" dirty="0" smtClean="0"/>
+          </a:p>
+          <a:p>
+            <a:r>
+              <a:rPr lang="en-US" sz="2800" dirty="0" smtClean="0"/>
+              <a:t>Read </a:t>
+            </a:r>
+            <a:r>
+              <a:rPr lang="en-US" sz="2800" dirty="0" err="1"/>
+              <a:t>Tufte’s</a:t>
+            </a:r>
+            <a:r>
+              <a:rPr lang="en-US" sz="2800" dirty="0"/>
+              <a:t> </a:t>
+            </a:r>
+            <a:r>
+              <a:rPr lang="en-US" sz="2800" i="1" dirty="0"/>
+              <a:t>The Visual Display of Quantitative </a:t>
+            </a:r>
+            <a:r>
+              <a:rPr lang="en-US" sz="2800" i="1" dirty="0" smtClean="0"/>
+              <a:t>Information</a:t>
+            </a:r>
+            <a:br>
+              <a:rPr lang="en-US" sz="2800" i="1" dirty="0" smtClean="0"/>
+            </a:br>
+            <a:r>
+              <a:rPr lang="en-US" sz="2800" dirty="0" smtClean="0"/>
+              <a:t>on </a:t>
+            </a:r>
+            <a:r>
+              <a:rPr lang="en-US" sz="2800" dirty="0"/>
+              <a:t>Reserves at Circulation Desk (4 hour checkout)</a:t>
+            </a:r>
+          </a:p>
+          <a:p>
+            <a:endParaRPr lang="en-US" sz="2800" dirty="0"/>
+          </a:p>
+        </p:txBody>
+      </p:sp>
+      <p:sp>
+        <p:nvSpPr>
+          <p:cNvPr id="2" name="Title 1">
+            <a:extLst>
+              <a:ext uri="{FF2B5EF4-FFF2-40B4-BE49-F238E27FC236}">
+                <a16:creationId xmlns:a16="http://schemas.microsoft.com/office/drawing/2014/main" id="{D313C71A-5F8A-5C4C-B19D-A92B8ED34A75}"/>
+              </a:ext>
+            </a:extLst>
+          </p:cNvPr>
+          <p:cNvSpPr>
+            <a:spLocks noGrp="1"/>
+          </p:cNvSpPr>
+          <p:nvPr>
+            <p:ph type="title"/>
+          </p:nvPr>
+        </p:nvSpPr>
+        <p:spPr>
+          <a:xfrm>
+            <a:off x="1168708" y="675829"/>
+            <a:ext cx="9916826" cy="500289"/>
+          </a:xfrm>
+          <a:prstGeom prst="rect">
+            <a:avLst/>
+          </a:prstGeom>
+        </p:spPr>
+        <p:txBody>
+          <a:bodyPr/>
+          <a:lstStyle/>
+          <a:p>
+            <a:r>
+              <a:rPr lang="en-US" b="1" dirty="0" smtClean="0">
+                <a:solidFill>
+                  <a:srgbClr val="8E1731"/>
+                </a:solidFill>
+              </a:rPr>
+              <a:t>Step 4: get help and learn more</a:t>
+            </a:r>
+            <a:endParaRPr lang="en-US" b="1" dirty="0">
+              <a:solidFill>
+                <a:srgbClr val="8E1731"/>
+              </a:solidFill>
+            </a:endParaRPr>
+          </a:p>
+        </p:txBody>
+      </p:sp>
+      <p:sp>
+        <p:nvSpPr>
+          <p:cNvPr id="5" name="Content Placeholder 3"/>
+          <p:cNvSpPr txBox="1">
+            <a:spLocks/>
+          </p:cNvSpPr>
+          <p:nvPr/>
+        </p:nvSpPr>
+        <p:spPr>
+          <a:xfrm>
+            <a:off x="358815" y="4912304"/>
+            <a:ext cx="10964713" cy="3891391"/>
+          </a:xfrm>
+          <a:prstGeom prst="rect">
+            <a:avLst/>
+          </a:prstGeom>
+        </p:spPr>
+        <p:txBody>
+          <a:bodyPr>
+            <a:normAutofit/>
+          </a:bodyPr>
+          <a:lstStyle>
+            <a:lvl1pPr marL="257162" indent="-257162" algn="l" defTabSz="914400" rtl="0" eaLnBrk="1" latinLnBrk="0" hangingPunct="1">
+              <a:lnSpc>
+                <a:spcPct val="90000"/>
+              </a:lnSpc>
+              <a:spcBef>
+                <a:spcPts val="1000"/>
+              </a:spcBef>
+              <a:buClr>
+                <a:srgbClr val="8E1731"/>
+              </a:buClr>
+              <a:buFont typeface="Wingdings" panose="05000000000000000000" pitchFamily="2" charset="2"/>
+              <a:buChar char="§"/>
+              <a:defRPr lang="en-US" sz="3200" kern="1200" dirty="0" smtClean="0">
+                <a:solidFill>
+                  <a:schemeClr val="tx1"/>
+                </a:solidFill>
+                <a:latin typeface="Arial" panose="020B0604020202020204" pitchFamily="34" charset="0"/>
+                <a:ea typeface="+mn-ea"/>
+                <a:cs typeface="Arial" panose="020B0604020202020204" pitchFamily="34" charset="0"/>
+              </a:defRPr>
+            </a:lvl1pPr>
+            <a:lvl2pPr marL="557185" indent="-214303" algn="l" defTabSz="914400" rtl="0" eaLnBrk="1" latinLnBrk="0" hangingPunct="1">
+              <a:lnSpc>
+                <a:spcPct val="90000"/>
+              </a:lnSpc>
+              <a:spcBef>
+                <a:spcPts val="500"/>
+              </a:spcBef>
+              <a:buClrTx/>
+              <a:buFont typeface="Arial" panose="020B0604020202020204" pitchFamily="34" charset="0"/>
+              <a:buChar char="•"/>
+              <a:defRPr lang="en-US" sz="3200" kern="1200" dirty="0" smtClean="0">
+                <a:solidFill>
+                  <a:schemeClr val="tx1"/>
+                </a:solidFill>
+                <a:latin typeface="Arial" panose="020B0604020202020204" pitchFamily="34" charset="0"/>
+                <a:ea typeface="+mn-ea"/>
+                <a:cs typeface="Arial" panose="020B0604020202020204" pitchFamily="34" charset="0"/>
+              </a:defRPr>
+            </a:lvl2pPr>
+            <a:lvl3pPr marL="857208" indent="-171442" algn="l" defTabSz="914400" rtl="0" eaLnBrk="1" latinLnBrk="0" hangingPunct="1">
+              <a:lnSpc>
+                <a:spcPct val="90000"/>
+              </a:lnSpc>
+              <a:spcBef>
+                <a:spcPts val="500"/>
+              </a:spcBef>
+              <a:buClrTx/>
+              <a:buSzPct val="60000"/>
+              <a:buFont typeface="Courier New" panose="02070309020205020404" pitchFamily="49" charset="0"/>
+              <a:buChar char="o"/>
+              <a:defRPr lang="en-US" sz="3200" kern="1200" dirty="0" smtClean="0">
+                <a:solidFill>
+                  <a:schemeClr val="tx1"/>
+                </a:solidFill>
+                <a:latin typeface="Arial" panose="020B0604020202020204" pitchFamily="34" charset="0"/>
+                <a:ea typeface="+mn-ea"/>
+                <a:cs typeface="Arial" panose="020B0604020202020204" pitchFamily="34" charset="0"/>
+              </a:defRPr>
+            </a:lvl3pPr>
+            <a:lvl4pPr marL="1200091" indent="-171442" algn="l" defTabSz="914400" rtl="0" eaLnBrk="1" latinLnBrk="0" hangingPunct="1">
+              <a:lnSpc>
+                <a:spcPct val="90000"/>
+              </a:lnSpc>
+              <a:spcBef>
+                <a:spcPts val="500"/>
+              </a:spcBef>
+              <a:buClrTx/>
+              <a:buFont typeface="Arial" panose="020B0604020202020204" pitchFamily="34" charset="0"/>
+              <a:buChar char="•"/>
+              <a:defRPr lang="en-US" sz="3200" kern="1200" dirty="0" smtClean="0">
+                <a:solidFill>
+                  <a:schemeClr val="tx1"/>
+                </a:solidFill>
+                <a:latin typeface="Arial" panose="020B0604020202020204" pitchFamily="34" charset="0"/>
+                <a:ea typeface="+mn-ea"/>
+                <a:cs typeface="Arial" panose="020B0604020202020204" pitchFamily="34" charset="0"/>
+              </a:defRPr>
+            </a:lvl4pPr>
+            <a:lvl5pPr marL="1542973" indent="-171442" algn="l" defTabSz="914400" rtl="0" eaLnBrk="1" latinLnBrk="0" hangingPunct="1">
+              <a:lnSpc>
+                <a:spcPct val="90000"/>
+              </a:lnSpc>
+              <a:spcBef>
+                <a:spcPts val="500"/>
+              </a:spcBef>
+              <a:buClrTx/>
+              <a:buSzPct val="35000"/>
+              <a:buFont typeface="Courier New" panose="02070309020205020404" pitchFamily="49" charset="0"/>
+              <a:buChar char="o"/>
+              <a:defRPr lang="en-US" sz="3200" kern="1200" dirty="0">
+                <a:solidFill>
+                  <a:schemeClr val="tx1"/>
+                </a:solidFill>
+                <a:latin typeface="Arial" panose="020B0604020202020204" pitchFamily="34" charset="0"/>
+                <a:ea typeface="+mn-ea"/>
+                <a:cs typeface="Arial" panose="020B0604020202020204" pitchFamily="34" charset="0"/>
+              </a:defRPr>
+            </a:lvl5pPr>
+            <a:lvl6pPr marL="2514600" indent="-228600" algn="l" defTabSz="914400" rtl="0" eaLnBrk="1" latinLnBrk="0" hangingPunct="1">
+              <a:lnSpc>
+                <a:spcPct val="90000"/>
+              </a:lnSpc>
+              <a:spcBef>
+                <a:spcPts val="500"/>
+              </a:spcBef>
+              <a:buFont typeface="Arial" panose="020B0604020202020204" pitchFamily="34" charset="0"/>
+              <a:buChar char="•"/>
+              <a:defRPr sz="1800" kern="1200">
+                <a:solidFill>
+                  <a:schemeClr val="tx1"/>
+                </a:solidFill>
+                <a:latin typeface="+mn-lt"/>
+                <a:ea typeface="+mn-ea"/>
+                <a:cs typeface="+mn-cs"/>
+              </a:defRPr>
+            </a:lvl6pPr>
+            <a:lvl7pPr marL="2971800" indent="-228600" algn="l" defTabSz="914400" rtl="0" eaLnBrk="1" latinLnBrk="0" hangingPunct="1">
+              <a:lnSpc>
+                <a:spcPct val="90000"/>
+              </a:lnSpc>
+              <a:spcBef>
+                <a:spcPts val="500"/>
+              </a:spcBef>
+              <a:buFont typeface="Arial" panose="020B0604020202020204" pitchFamily="34" charset="0"/>
+              <a:buChar char="•"/>
+              <a:defRPr sz="1800" kern="1200">
+                <a:solidFill>
+                  <a:schemeClr val="tx1"/>
+                </a:solidFill>
+                <a:latin typeface="+mn-lt"/>
+                <a:ea typeface="+mn-ea"/>
+                <a:cs typeface="+mn-cs"/>
+              </a:defRPr>
+            </a:lvl7pPr>
+            <a:lvl8pPr marL="3429000" indent="-228600" algn="l" defTabSz="914400" rtl="0" eaLnBrk="1" latinLnBrk="0" hangingPunct="1">
+              <a:lnSpc>
+                <a:spcPct val="90000"/>
+              </a:lnSpc>
+              <a:spcBef>
+                <a:spcPts val="500"/>
+              </a:spcBef>
+              <a:buFont typeface="Arial" panose="020B0604020202020204" pitchFamily="34" charset="0"/>
+              <a:buChar char="•"/>
+              <a:defRPr sz="1800" kern="1200">
+                <a:solidFill>
+                  <a:schemeClr val="tx1"/>
+                </a:solidFill>
+                <a:latin typeface="+mn-lt"/>
+                <a:ea typeface="+mn-ea"/>
+                <a:cs typeface="+mn-cs"/>
+              </a:defRPr>
+            </a:lvl8pPr>
+            <a:lvl9pPr marL="3886200" indent="-228600" algn="l" defTabSz="914400" rtl="0" eaLnBrk="1" latinLnBrk="0" hangingPunct="1">
+              <a:lnSpc>
+                <a:spcPct val="90000"/>
+              </a:lnSpc>
+              <a:spcBef>
+                <a:spcPts val="500"/>
+              </a:spcBef>
+              <a:buFont typeface="Arial" panose="020B0604020202020204" pitchFamily="34" charset="0"/>
+              <a:buChar char="•"/>
+              <a:defRPr sz="1800" kern="1200">
+                <a:solidFill>
+                  <a:schemeClr val="tx1"/>
+                </a:solidFill>
+                <a:latin typeface="+mn-lt"/>
+                <a:ea typeface="+mn-ea"/>
+                <a:cs typeface="+mn-cs"/>
+              </a:defRPr>
+            </a:lvl9pPr>
+          </a:lstStyle>
+          <a:p>
+            <a:endParaRPr lang="en-US" sz="2800" dirty="0"/>
+          </a:p>
+        </p:txBody>
+      </p:sp>
+      <p:sp>
+        <p:nvSpPr>
+          <p:cNvPr id="7" name="Content Placeholder 5"/>
+          <p:cNvSpPr txBox="1">
+            <a:spLocks/>
+          </p:cNvSpPr>
+          <p:nvPr/>
+        </p:nvSpPr>
+        <p:spPr>
+          <a:xfrm>
+            <a:off x="6616910" y="1979111"/>
+            <a:ext cx="4806827" cy="3778657"/>
+          </a:xfrm>
+          <a:prstGeom prst="rect">
+            <a:avLst/>
+          </a:prstGeom>
+        </p:spPr>
+        <p:txBody>
+          <a:bodyPr>
+            <a:noAutofit/>
+          </a:bodyPr>
+          <a:lstStyle>
+            <a:lvl1pPr marL="257162" indent="-257162" algn="l" defTabSz="914400" rtl="0" eaLnBrk="1" latinLnBrk="0" hangingPunct="1">
+              <a:lnSpc>
+                <a:spcPct val="90000"/>
+              </a:lnSpc>
+              <a:spcBef>
+                <a:spcPts val="1000"/>
+              </a:spcBef>
+              <a:buClr>
+                <a:srgbClr val="8E1731"/>
+              </a:buClr>
+              <a:buFont typeface="Wingdings" panose="05000000000000000000" pitchFamily="2" charset="2"/>
+              <a:buChar char="§"/>
+              <a:defRPr lang="en-US" sz="3200" kern="1200" dirty="0" smtClean="0">
+                <a:solidFill>
+                  <a:schemeClr val="tx1"/>
+                </a:solidFill>
+                <a:latin typeface="Arial" panose="020B0604020202020204" pitchFamily="34" charset="0"/>
+                <a:ea typeface="+mn-ea"/>
+                <a:cs typeface="Arial" panose="020B0604020202020204" pitchFamily="34" charset="0"/>
+              </a:defRPr>
+            </a:lvl1pPr>
+            <a:lvl2pPr marL="557185" indent="-214303" algn="l" defTabSz="914400" rtl="0" eaLnBrk="1" latinLnBrk="0" hangingPunct="1">
+              <a:lnSpc>
+                <a:spcPct val="90000"/>
+              </a:lnSpc>
+              <a:spcBef>
+                <a:spcPts val="500"/>
+              </a:spcBef>
+              <a:buClrTx/>
+              <a:buFont typeface="Arial" panose="020B0604020202020204" pitchFamily="34" charset="0"/>
+              <a:buChar char="•"/>
+              <a:defRPr lang="en-US" sz="3200" kern="1200" dirty="0" smtClean="0">
+                <a:solidFill>
+                  <a:schemeClr val="tx1"/>
+                </a:solidFill>
+                <a:latin typeface="Arial" panose="020B0604020202020204" pitchFamily="34" charset="0"/>
+                <a:ea typeface="+mn-ea"/>
+                <a:cs typeface="Arial" panose="020B0604020202020204" pitchFamily="34" charset="0"/>
+              </a:defRPr>
+            </a:lvl2pPr>
+            <a:lvl3pPr marL="857208" indent="-171442" algn="l" defTabSz="914400" rtl="0" eaLnBrk="1" latinLnBrk="0" hangingPunct="1">
+              <a:lnSpc>
+                <a:spcPct val="90000"/>
+              </a:lnSpc>
+              <a:spcBef>
+                <a:spcPts val="500"/>
+              </a:spcBef>
+              <a:buClrTx/>
+              <a:buSzPct val="60000"/>
+              <a:buFont typeface="Courier New" panose="02070309020205020404" pitchFamily="49" charset="0"/>
+              <a:buChar char="o"/>
+              <a:defRPr lang="en-US" sz="3200" kern="1200" dirty="0" smtClean="0">
+                <a:solidFill>
+                  <a:schemeClr val="tx1"/>
+                </a:solidFill>
+                <a:latin typeface="Arial" panose="020B0604020202020204" pitchFamily="34" charset="0"/>
+                <a:ea typeface="+mn-ea"/>
+                <a:cs typeface="Arial" panose="020B0604020202020204" pitchFamily="34" charset="0"/>
+              </a:defRPr>
+            </a:lvl3pPr>
+            <a:lvl4pPr marL="1200091" indent="-171442" algn="l" defTabSz="914400" rtl="0" eaLnBrk="1" latinLnBrk="0" hangingPunct="1">
+              <a:lnSpc>
+                <a:spcPct val="90000"/>
+              </a:lnSpc>
+              <a:spcBef>
+                <a:spcPts val="500"/>
+              </a:spcBef>
+              <a:buClrTx/>
+              <a:buFont typeface="Arial" panose="020B0604020202020204" pitchFamily="34" charset="0"/>
+              <a:buChar char="•"/>
+              <a:defRPr lang="en-US" sz="3200" kern="1200" dirty="0" smtClean="0">
+                <a:solidFill>
+                  <a:schemeClr val="tx1"/>
+                </a:solidFill>
+                <a:latin typeface="Arial" panose="020B0604020202020204" pitchFamily="34" charset="0"/>
+                <a:ea typeface="+mn-ea"/>
+                <a:cs typeface="Arial" panose="020B0604020202020204" pitchFamily="34" charset="0"/>
+              </a:defRPr>
+            </a:lvl4pPr>
+            <a:lvl5pPr marL="1542973" indent="-171442" algn="l" defTabSz="914400" rtl="0" eaLnBrk="1" latinLnBrk="0" hangingPunct="1">
+              <a:lnSpc>
+                <a:spcPct val="90000"/>
+              </a:lnSpc>
+              <a:spcBef>
+                <a:spcPts val="500"/>
+              </a:spcBef>
+              <a:buClrTx/>
+              <a:buSzPct val="35000"/>
+              <a:buFont typeface="Courier New" panose="02070309020205020404" pitchFamily="49" charset="0"/>
+              <a:buChar char="o"/>
+              <a:defRPr lang="en-US" sz="3200" kern="1200" dirty="0">
+                <a:solidFill>
+                  <a:schemeClr val="tx1"/>
+                </a:solidFill>
+                <a:latin typeface="Arial" panose="020B0604020202020204" pitchFamily="34" charset="0"/>
+                <a:ea typeface="+mn-ea"/>
+                <a:cs typeface="Arial" panose="020B0604020202020204" pitchFamily="34" charset="0"/>
+              </a:defRPr>
+            </a:lvl5pPr>
+            <a:lvl6pPr marL="2514600" indent="-228600" algn="l" defTabSz="914400" rtl="0" eaLnBrk="1" latinLnBrk="0" hangingPunct="1">
+              <a:lnSpc>
+                <a:spcPct val="90000"/>
+              </a:lnSpc>
+              <a:spcBef>
+                <a:spcPts val="500"/>
+              </a:spcBef>
+              <a:buFont typeface="Arial" panose="020B0604020202020204" pitchFamily="34" charset="0"/>
+              <a:buChar char="•"/>
+              <a:defRPr sz="1800" kern="1200">
+                <a:solidFill>
+                  <a:schemeClr val="tx1"/>
+                </a:solidFill>
+                <a:latin typeface="+mn-lt"/>
+                <a:ea typeface="+mn-ea"/>
+                <a:cs typeface="+mn-cs"/>
+              </a:defRPr>
+            </a:lvl6pPr>
+            <a:lvl7pPr marL="2971800" indent="-228600" algn="l" defTabSz="914400" rtl="0" eaLnBrk="1" latinLnBrk="0" hangingPunct="1">
+              <a:lnSpc>
+                <a:spcPct val="90000"/>
+              </a:lnSpc>
+              <a:spcBef>
+                <a:spcPts val="500"/>
+              </a:spcBef>
+              <a:buFont typeface="Arial" panose="020B0604020202020204" pitchFamily="34" charset="0"/>
+              <a:buChar char="•"/>
+              <a:defRPr sz="1800" kern="1200">
+                <a:solidFill>
+                  <a:schemeClr val="tx1"/>
+                </a:solidFill>
+                <a:latin typeface="+mn-lt"/>
+                <a:ea typeface="+mn-ea"/>
+                <a:cs typeface="+mn-cs"/>
+              </a:defRPr>
+            </a:lvl7pPr>
+            <a:lvl8pPr marL="3429000" indent="-228600" algn="l" defTabSz="914400" rtl="0" eaLnBrk="1" latinLnBrk="0" hangingPunct="1">
+              <a:lnSpc>
+                <a:spcPct val="90000"/>
+              </a:lnSpc>
+              <a:spcBef>
+                <a:spcPts val="500"/>
+              </a:spcBef>
+              <a:buFont typeface="Arial" panose="020B0604020202020204" pitchFamily="34" charset="0"/>
+              <a:buChar char="•"/>
+              <a:defRPr sz="1800" kern="1200">
+                <a:solidFill>
+                  <a:schemeClr val="tx1"/>
+                </a:solidFill>
+                <a:latin typeface="+mn-lt"/>
+                <a:ea typeface="+mn-ea"/>
+                <a:cs typeface="+mn-cs"/>
+              </a:defRPr>
+            </a:lvl8pPr>
+            <a:lvl9pPr marL="3886200" indent="-228600" algn="l" defTabSz="914400" rtl="0" eaLnBrk="1" latinLnBrk="0" hangingPunct="1">
+              <a:lnSpc>
+                <a:spcPct val="90000"/>
+              </a:lnSpc>
+              <a:spcBef>
+                <a:spcPts val="500"/>
+              </a:spcBef>
+              <a:buFont typeface="Arial" panose="020B0604020202020204" pitchFamily="34" charset="0"/>
+              <a:buChar char="•"/>
+              <a:defRPr sz="1800" kern="1200">
+                <a:solidFill>
+                  <a:schemeClr val="tx1"/>
+                </a:solidFill>
+                <a:latin typeface="+mn-lt"/>
+                <a:ea typeface="+mn-ea"/>
+                <a:cs typeface="+mn-cs"/>
+              </a:defRPr>
+            </a:lvl9pPr>
+          </a:lstStyle>
+          <a:p>
+            <a:endParaRPr lang="en-US" sz="2800" dirty="0"/>
+          </a:p>
+        </p:txBody>
+      </p:sp>
+    </p:spTree>
+    <p:extLst>
+      <p:ext uri="{BB962C8B-B14F-4D97-AF65-F5344CB8AC3E}">
+        <p14:creationId xmlns:p14="http://schemas.microsoft.com/office/powerpoint/2010/main" val="1761210051"/>
+      </p:ext>
+    </p:extLst>
+  </p:cSld>
+  <p:clrMapOvr>
+    <a:masterClrMapping/>
+  </p:clrMapOvr>
+</p:sld>
+</file>
+
+<file path=ppt/slides/slide46.xml><?xml version="1.0" encoding="utf-8"?>
+<p:sld xmlns:a="http://schemas.openxmlformats.org/drawingml/2006/main" xmlns:r="http://schemas.openxmlformats.org/officeDocument/2006/relationships" xmlns:p="http://schemas.openxmlformats.org/presentationml/2006/main">
+  <p:cSld>
+    <p:spTree>
+      <p:nvGrpSpPr>
+        <p:cNvPr id="1" name=""/>
+        <p:cNvGrpSpPr/>
+        <p:nvPr/>
+      </p:nvGrpSpPr>
+      <p:grpSpPr>
+        <a:xfrm>
+          <a:off x="0" y="0"/>
+          <a:ext cx="0" cy="0"/>
+          <a:chOff x="0" y="0"/>
+          <a:chExt cx="0" cy="0"/>
+        </a:xfrm>
+      </p:grpSpPr>
+      <p:sp>
+        <p:nvSpPr>
           <p:cNvPr id="2" name="Content Placeholder 1"/>
           <p:cNvSpPr>
             <a:spLocks noGrp="1"/>
@@ -12808,23 +13179,19 @@
           </a:p>
           <a:p>
             <a:r>
+              <a:rPr lang="en-US" dirty="0" smtClean="0"/>
+              <a:t>Workshop topic: Data-driven visualizations</a:t>
+            </a:r>
+          </a:p>
+          <a:p>
+            <a:r>
+              <a:rPr lang="en-US" dirty="0" smtClean="0"/>
+              <a:t>Workshop date: </a:t>
+            </a:r>
+            <a:fld id="{DC282969-C8BF-4EBF-812F-FF7661414B35}" type="datetime4">
               <a:rPr lang="en-US" smtClean="0"/>
-              <a:t>Workshop </a:t>
-            </a:r>
-            <a:r>
-              <a:rPr lang="en-US" dirty="0" smtClean="0"/>
-              <a:t>topic: Data-driven </a:t>
-            </a:r>
-            <a:r>
-              <a:rPr lang="en-US" dirty="0" smtClean="0"/>
-              <a:t>visualizations</a:t>
-            </a:r>
-          </a:p>
-          <a:p>
-            <a:r>
-              <a:rPr lang="en-US" dirty="0" smtClean="0"/>
-              <a:t>Workshop date: April 5, 2019</a:t>
-            </a:r>
+              <a:t>March 28, 2019</a:t>
+            </a:fld>
             <a:endParaRPr lang="en-US" dirty="0" smtClean="0"/>
           </a:p>
         </p:txBody>
@@ -13032,7 +13399,7 @@
           <p:nvPr>
             <p:extLst>
               <p:ext uri="{D42A27DB-BD31-4B8C-83A1-F6EECF244321}">
-                <p14:modId xmlns:p14="http://schemas.microsoft.com/office/powerpoint/2010/main" val="3972734012"/>
+                <p14:modId xmlns:p14="http://schemas.microsoft.com/office/powerpoint/2010/main" val="3203960620"/>
               </p:ext>
             </p:extLst>
           </p:nvPr>
@@ -13077,7 +13444,7 @@
                       <a:endParaRPr lang="en-US" sz="3600" dirty="0"/>
                     </a:p>
                   </a:txBody>
-                  <a:tcPr/>
+                  <a:tcPr anchor="ctr"/>
                 </a:tc>
                 <a:tc>
                   <a:txBody>
@@ -13092,7 +13459,7 @@
                       <a:endParaRPr lang="en-US" sz="3600" dirty="0"/>
                     </a:p>
                   </a:txBody>
-                  <a:tcPr/>
+                  <a:tcPr anchor="ctr"/>
                 </a:tc>
                 <a:extLst>
                   <a:ext uri="{0D108BD9-81ED-4DB2-BD59-A6C34878D82A}">
@@ -13114,7 +13481,7 @@
                       <a:endParaRPr lang="en-US" sz="3600" dirty="0"/>
                     </a:p>
                   </a:txBody>
-                  <a:tcPr/>
+                  <a:tcPr anchor="ctr"/>
                 </a:tc>
                 <a:tc>
                   <a:txBody>
@@ -13122,10 +13489,14 @@
                     <a:lstStyle/>
                     <a:p>
                       <a:pPr algn="ctr"/>
-                      <a:endParaRPr lang="en-US" sz="3600"/>
+                      <a:r>
+                        <a:rPr lang="en-US" sz="3600" dirty="0" smtClean="0"/>
+                        <a:t>122,843</a:t>
+                      </a:r>
+                      <a:endParaRPr lang="en-US" sz="3600" dirty="0"/>
                     </a:p>
                   </a:txBody>
-                  <a:tcPr/>
+                  <a:tcPr anchor="ctr"/>
                 </a:tc>
                 <a:extLst>
                   <a:ext uri="{0D108BD9-81ED-4DB2-BD59-A6C34878D82A}">
@@ -13147,7 +13518,7 @@
                       <a:endParaRPr lang="en-US" sz="3600" dirty="0"/>
                     </a:p>
                   </a:txBody>
-                  <a:tcPr/>
+                  <a:tcPr anchor="ctr"/>
                 </a:tc>
                 <a:tc>
                   <a:txBody>
@@ -13155,10 +13526,14 @@
                     <a:lstStyle/>
                     <a:p>
                       <a:pPr algn="ctr"/>
+                      <a:r>
+                        <a:rPr lang="en-US" sz="3600" dirty="0" smtClean="0"/>
+                        <a:t>49,829</a:t>
+                      </a:r>
                       <a:endParaRPr lang="en-US" sz="3600" dirty="0"/>
                     </a:p>
                   </a:txBody>
-                  <a:tcPr/>
+                  <a:tcPr anchor="ctr"/>
                 </a:tc>
                 <a:extLst>
                   <a:ext uri="{0D108BD9-81ED-4DB2-BD59-A6C34878D82A}">
@@ -13334,7 +13709,7 @@
           <p:nvPr>
             <p:extLst>
               <p:ext uri="{D42A27DB-BD31-4B8C-83A1-F6EECF244321}">
-                <p14:modId xmlns:p14="http://schemas.microsoft.com/office/powerpoint/2010/main" val="1498101857"/>
+                <p14:modId xmlns:p14="http://schemas.microsoft.com/office/powerpoint/2010/main" val="1766378558"/>
               </p:ext>
             </p:extLst>
           </p:nvPr>
@@ -13379,7 +13754,7 @@
                       <a:endParaRPr lang="en-US" sz="3600" dirty="0"/>
                     </a:p>
                   </a:txBody>
-                  <a:tcPr/>
+                  <a:tcPr anchor="ctr"/>
                 </a:tc>
                 <a:tc>
                   <a:txBody>
@@ -13394,7 +13769,7 @@
                       <a:endParaRPr lang="en-US" sz="3600" dirty="0"/>
                     </a:p>
                   </a:txBody>
-                  <a:tcPr/>
+                  <a:tcPr anchor="ctr"/>
                 </a:tc>
                 <a:extLst>
                   <a:ext uri="{0D108BD9-81ED-4DB2-BD59-A6C34878D82A}">
@@ -13416,7 +13791,7 @@
                       <a:endParaRPr lang="en-US" sz="3600" dirty="0"/>
                     </a:p>
                   </a:txBody>
-                  <a:tcPr/>
+                  <a:tcPr anchor="ctr"/>
                 </a:tc>
                 <a:tc>
                   <a:txBody>
@@ -13424,10 +13799,14 @@
                     <a:lstStyle/>
                     <a:p>
                       <a:pPr algn="ctr"/>
-                      <a:endParaRPr lang="en-US" sz="3600"/>
+                      <a:r>
+                        <a:rPr lang="en-US" sz="3600" dirty="0" smtClean="0"/>
+                        <a:t>122,843</a:t>
+                      </a:r>
+                      <a:endParaRPr lang="en-US" sz="3600" dirty="0"/>
                     </a:p>
                   </a:txBody>
-                  <a:tcPr/>
+                  <a:tcPr anchor="ctr"/>
                 </a:tc>
                 <a:extLst>
                   <a:ext uri="{0D108BD9-81ED-4DB2-BD59-A6C34878D82A}">
@@ -13449,7 +13828,7 @@
                       <a:endParaRPr lang="en-US" sz="3600" dirty="0"/>
                     </a:p>
                   </a:txBody>
-                  <a:tcPr/>
+                  <a:tcPr anchor="ctr"/>
                 </a:tc>
                 <a:tc>
                   <a:txBody>
@@ -13457,10 +13836,14 @@
                     <a:lstStyle/>
                     <a:p>
                       <a:pPr algn="ctr"/>
+                      <a:r>
+                        <a:rPr lang="en-US" sz="3600" dirty="0" smtClean="0"/>
+                        <a:t>49,829</a:t>
+                      </a:r>
                       <a:endParaRPr lang="en-US" sz="3600" dirty="0"/>
                     </a:p>
                   </a:txBody>
-                  <a:tcPr/>
+                  <a:tcPr anchor="ctr"/>
                 </a:tc>
                 <a:extLst>
                   <a:ext uri="{0D108BD9-81ED-4DB2-BD59-A6C34878D82A}">
@@ -13662,7 +14045,7 @@
           <p:nvPr>
             <p:extLst>
               <p:ext uri="{D42A27DB-BD31-4B8C-83A1-F6EECF244321}">
-                <p14:modId xmlns:p14="http://schemas.microsoft.com/office/powerpoint/2010/main" val="262190029"/>
+                <p14:modId xmlns:p14="http://schemas.microsoft.com/office/powerpoint/2010/main" val="306507672"/>
               </p:ext>
             </p:extLst>
           </p:nvPr>
@@ -13707,7 +14090,7 @@
                       <a:endParaRPr lang="en-US" sz="3600" dirty="0"/>
                     </a:p>
                   </a:txBody>
-                  <a:tcPr/>
+                  <a:tcPr anchor="ctr"/>
                 </a:tc>
                 <a:tc>
                   <a:txBody>
@@ -13722,7 +14105,7 @@
                       <a:endParaRPr lang="en-US" sz="3600" dirty="0"/>
                     </a:p>
                   </a:txBody>
-                  <a:tcPr/>
+                  <a:tcPr anchor="ctr"/>
                 </a:tc>
                 <a:extLst>
                   <a:ext uri="{0D108BD9-81ED-4DB2-BD59-A6C34878D82A}">
@@ -13744,7 +14127,7 @@
                       <a:endParaRPr lang="en-US" sz="3600" dirty="0"/>
                     </a:p>
                   </a:txBody>
-                  <a:tcPr/>
+                  <a:tcPr anchor="ctr"/>
                 </a:tc>
                 <a:tc>
                   <a:txBody>
@@ -13752,10 +14135,14 @@
                     <a:lstStyle/>
                     <a:p>
                       <a:pPr algn="ctr"/>
-                      <a:endParaRPr lang="en-US" sz="3600"/>
+                      <a:r>
+                        <a:rPr lang="en-US" sz="3600" dirty="0" smtClean="0"/>
+                        <a:t>122,843</a:t>
+                      </a:r>
+                      <a:endParaRPr lang="en-US" sz="3600" dirty="0"/>
                     </a:p>
                   </a:txBody>
-                  <a:tcPr/>
+                  <a:tcPr anchor="ctr"/>
                 </a:tc>
                 <a:extLst>
                   <a:ext uri="{0D108BD9-81ED-4DB2-BD59-A6C34878D82A}">
@@ -13777,7 +14164,7 @@
                       <a:endParaRPr lang="en-US" sz="3600" dirty="0"/>
                     </a:p>
                   </a:txBody>
-                  <a:tcPr/>
+                  <a:tcPr anchor="ctr"/>
                 </a:tc>
                 <a:tc>
                   <a:txBody>
@@ -13785,10 +14172,14 @@
                     <a:lstStyle/>
                     <a:p>
                       <a:pPr algn="ctr"/>
+                      <a:r>
+                        <a:rPr lang="en-US" sz="3600" dirty="0" smtClean="0"/>
+                        <a:t>49,829</a:t>
+                      </a:r>
                       <a:endParaRPr lang="en-US" sz="3600" dirty="0"/>
                     </a:p>
                   </a:txBody>
-                  <a:tcPr/>
+                  <a:tcPr anchor="ctr"/>
                 </a:tc>
                 <a:extLst>
                   <a:ext uri="{0D108BD9-81ED-4DB2-BD59-A6C34878D82A}">
@@ -14000,7 +14391,7 @@
           <p:nvPr>
             <p:extLst>
               <p:ext uri="{D42A27DB-BD31-4B8C-83A1-F6EECF244321}">
-                <p14:modId xmlns:p14="http://schemas.microsoft.com/office/powerpoint/2010/main" val="262190029"/>
+                <p14:modId xmlns:p14="http://schemas.microsoft.com/office/powerpoint/2010/main" val="2398169073"/>
               </p:ext>
             </p:extLst>
           </p:nvPr>
@@ -14045,7 +14436,7 @@
                       <a:endParaRPr lang="en-US" sz="3600" dirty="0"/>
                     </a:p>
                   </a:txBody>
-                  <a:tcPr/>
+                  <a:tcPr anchor="ctr"/>
                 </a:tc>
                 <a:tc>
                   <a:txBody>
@@ -14060,7 +14451,7 @@
                       <a:endParaRPr lang="en-US" sz="3600" dirty="0"/>
                     </a:p>
                   </a:txBody>
-                  <a:tcPr/>
+                  <a:tcPr anchor="ctr"/>
                 </a:tc>
                 <a:extLst>
                   <a:ext uri="{0D108BD9-81ED-4DB2-BD59-A6C34878D82A}">
@@ -14082,7 +14473,7 @@
                       <a:endParaRPr lang="en-US" sz="3600" dirty="0"/>
                     </a:p>
                   </a:txBody>
-                  <a:tcPr/>
+                  <a:tcPr anchor="ctr"/>
                 </a:tc>
                 <a:tc>
                   <a:txBody>
@@ -14090,10 +14481,14 @@
                     <a:lstStyle/>
                     <a:p>
                       <a:pPr algn="ctr"/>
-                      <a:endParaRPr lang="en-US" sz="3600"/>
+                      <a:r>
+                        <a:rPr lang="en-US" sz="3600" dirty="0" smtClean="0"/>
+                        <a:t>122,843</a:t>
+                      </a:r>
+                      <a:endParaRPr lang="en-US" sz="3600" dirty="0"/>
                     </a:p>
                   </a:txBody>
-                  <a:tcPr/>
+                  <a:tcPr anchor="ctr"/>
                 </a:tc>
                 <a:extLst>
                   <a:ext uri="{0D108BD9-81ED-4DB2-BD59-A6C34878D82A}">
@@ -14115,7 +14510,7 @@
                       <a:endParaRPr lang="en-US" sz="3600" dirty="0"/>
                     </a:p>
                   </a:txBody>
-                  <a:tcPr/>
+                  <a:tcPr anchor="ctr"/>
                 </a:tc>
                 <a:tc>
                   <a:txBody>
@@ -14123,10 +14518,14 @@
                     <a:lstStyle/>
                     <a:p>
                       <a:pPr algn="ctr"/>
+                      <a:r>
+                        <a:rPr lang="en-US" sz="3600" dirty="0" smtClean="0"/>
+                        <a:t>49,829</a:t>
+                      </a:r>
                       <a:endParaRPr lang="en-US" sz="3600" dirty="0"/>
                     </a:p>
                   </a:txBody>
-                  <a:tcPr/>
+                  <a:tcPr anchor="ctr"/>
                 </a:tc>
                 <a:extLst>
                   <a:ext uri="{0D108BD9-81ED-4DB2-BD59-A6C34878D82A}">
@@ -14348,7 +14747,7 @@
           <p:nvPr>
             <p:extLst>
               <p:ext uri="{D42A27DB-BD31-4B8C-83A1-F6EECF244321}">
-                <p14:modId xmlns:p14="http://schemas.microsoft.com/office/powerpoint/2010/main" val="262190029"/>
+                <p14:modId xmlns:p14="http://schemas.microsoft.com/office/powerpoint/2010/main" val="1458974362"/>
               </p:ext>
             </p:extLst>
           </p:nvPr>
@@ -14393,7 +14792,7 @@
                       <a:endParaRPr lang="en-US" sz="3600" dirty="0"/>
                     </a:p>
                   </a:txBody>
-                  <a:tcPr/>
+                  <a:tcPr anchor="ctr"/>
                 </a:tc>
                 <a:tc>
                   <a:txBody>
@@ -14408,7 +14807,7 @@
                       <a:endParaRPr lang="en-US" sz="3600" dirty="0"/>
                     </a:p>
                   </a:txBody>
-                  <a:tcPr/>
+                  <a:tcPr anchor="ctr"/>
                 </a:tc>
                 <a:extLst>
                   <a:ext uri="{0D108BD9-81ED-4DB2-BD59-A6C34878D82A}">
@@ -14430,7 +14829,7 @@
                       <a:endParaRPr lang="en-US" sz="3600" dirty="0"/>
                     </a:p>
                   </a:txBody>
-                  <a:tcPr/>
+                  <a:tcPr anchor="ctr"/>
                 </a:tc>
                 <a:tc>
                   <a:txBody>
@@ -14438,10 +14837,14 @@
                     <a:lstStyle/>
                     <a:p>
                       <a:pPr algn="ctr"/>
-                      <a:endParaRPr lang="en-US" sz="3600"/>
+                      <a:r>
+                        <a:rPr lang="en-US" sz="3600" dirty="0" smtClean="0"/>
+                        <a:t>122,843</a:t>
+                      </a:r>
+                      <a:endParaRPr lang="en-US" sz="3600" dirty="0"/>
                     </a:p>
                   </a:txBody>
-                  <a:tcPr/>
+                  <a:tcPr anchor="ctr"/>
                 </a:tc>
                 <a:extLst>
                   <a:ext uri="{0D108BD9-81ED-4DB2-BD59-A6C34878D82A}">
@@ -14463,7 +14866,7 @@
                       <a:endParaRPr lang="en-US" sz="3600" dirty="0"/>
                     </a:p>
                   </a:txBody>
-                  <a:tcPr/>
+                  <a:tcPr anchor="ctr"/>
                 </a:tc>
                 <a:tc>
                   <a:txBody>
@@ -14471,10 +14874,14 @@
                     <a:lstStyle/>
                     <a:p>
                       <a:pPr algn="ctr"/>
+                      <a:r>
+                        <a:rPr lang="en-US" sz="3600" dirty="0" smtClean="0"/>
+                        <a:t>49,829</a:t>
+                      </a:r>
                       <a:endParaRPr lang="en-US" sz="3600" dirty="0"/>
                     </a:p>
                   </a:txBody>
-                  <a:tcPr/>
+                  <a:tcPr anchor="ctr"/>
                 </a:tc>
                 <a:extLst>
                   <a:ext uri="{0D108BD9-81ED-4DB2-BD59-A6C34878D82A}">

</xml_diff>

<commit_message>
last three clarity example slides
</commit_message>
<xml_diff>
--- a/activities.pptx
+++ b/activities.pptx
@@ -5,7 +5,7 @@
     <p:sldMasterId id="2147483660" r:id="rId1"/>
   </p:sldMasterIdLst>
   <p:notesMasterIdLst>
-    <p:notesMasterId r:id="rId59"/>
+    <p:notesMasterId r:id="rId64"/>
   </p:notesMasterIdLst>
   <p:sldIdLst>
     <p:sldId id="265" r:id="rId2"/>
@@ -51,20 +51,25 @@
     <p:sldId id="270" r:id="rId42"/>
     <p:sldId id="271" r:id="rId43"/>
     <p:sldId id="331" r:id="rId44"/>
-    <p:sldId id="272" r:id="rId45"/>
-    <p:sldId id="315" r:id="rId46"/>
-    <p:sldId id="317" r:id="rId47"/>
-    <p:sldId id="318" r:id="rId48"/>
-    <p:sldId id="342" r:id="rId49"/>
-    <p:sldId id="319" r:id="rId50"/>
-    <p:sldId id="340" r:id="rId51"/>
-    <p:sldId id="313" r:id="rId52"/>
-    <p:sldId id="273" r:id="rId53"/>
-    <p:sldId id="274" r:id="rId54"/>
-    <p:sldId id="275" r:id="rId55"/>
-    <p:sldId id="332" r:id="rId56"/>
-    <p:sldId id="277" r:id="rId57"/>
-    <p:sldId id="276" r:id="rId58"/>
+    <p:sldId id="343" r:id="rId45"/>
+    <p:sldId id="272" r:id="rId46"/>
+    <p:sldId id="315" r:id="rId47"/>
+    <p:sldId id="344" r:id="rId48"/>
+    <p:sldId id="345" r:id="rId49"/>
+    <p:sldId id="346" r:id="rId50"/>
+    <p:sldId id="317" r:id="rId51"/>
+    <p:sldId id="347" r:id="rId52"/>
+    <p:sldId id="318" r:id="rId53"/>
+    <p:sldId id="342" r:id="rId54"/>
+    <p:sldId id="319" r:id="rId55"/>
+    <p:sldId id="340" r:id="rId56"/>
+    <p:sldId id="313" r:id="rId57"/>
+    <p:sldId id="273" r:id="rId58"/>
+    <p:sldId id="274" r:id="rId59"/>
+    <p:sldId id="275" r:id="rId60"/>
+    <p:sldId id="332" r:id="rId61"/>
+    <p:sldId id="277" r:id="rId62"/>
+    <p:sldId id="276" r:id="rId63"/>
   </p:sldIdLst>
   <p:sldSz cx="12192000" cy="6858000"/>
   <p:notesSz cx="6858000" cy="9144000"/>
@@ -253,7 +258,7 @@
           <a:p>
             <a:fld id="{DC7024D4-8219-4EEB-977B-76F389E98656}" type="datetimeFigureOut">
               <a:rPr lang="en-US" smtClean="0"/>
-              <a:t>3/28/2019</a:t>
+              <a:t>4/4/2019</a:t>
             </a:fld>
             <a:endParaRPr lang="en-US"/>
           </a:p>
@@ -598,7 +603,7 @@
           <a:p>
             <a:fld id="{7D86B546-8556-4315-96DD-942723B58990}" type="slidenum">
               <a:rPr lang="en-US" smtClean="0"/>
-              <a:t>57</a:t>
+              <a:t>62</a:t>
             </a:fld>
             <a:endParaRPr lang="en-US"/>
           </a:p>
@@ -11554,11 +11559,7 @@
           <a:p>
             <a:r>
               <a:rPr lang="en-US" dirty="0" smtClean="0"/>
-              <a:t>Data/ink </a:t>
-            </a:r>
-            <a:r>
-              <a:rPr lang="en-US" dirty="0" smtClean="0"/>
-              <a:t>ratio</a:t>
+              <a:t>Data/ink ratio</a:t>
             </a:r>
             <a:endParaRPr lang="en-US" dirty="0"/>
           </a:p>
@@ -11724,11 +11725,7 @@
           <a:p>
             <a:r>
               <a:rPr lang="en-US" dirty="0" smtClean="0"/>
-              <a:t>Data/ink </a:t>
-            </a:r>
-            <a:r>
-              <a:rPr lang="en-US" dirty="0" smtClean="0"/>
-              <a:t>ratio</a:t>
+              <a:t>Data/ink ratio</a:t>
             </a:r>
             <a:endParaRPr lang="en-US" dirty="0"/>
           </a:p>
@@ -13441,10 +13438,80 @@
           </a:p>
         </p:txBody>
       </p:sp>
+      <p:pic>
+        <p:nvPicPr>
+          <p:cNvPr id="3" name="Picture 2"/>
+          <p:cNvPicPr>
+            <a:picLocks noChangeAspect="1"/>
+          </p:cNvPicPr>
+          <p:nvPr/>
+        </p:nvPicPr>
+        <p:blipFill>
+          <a:blip r:embed="rId2"/>
+          <a:stretch>
+            <a:fillRect/>
+          </a:stretch>
+        </p:blipFill>
+        <p:spPr>
+          <a:xfrm>
+            <a:off x="609600" y="2658980"/>
+            <a:ext cx="5133333" cy="3285714"/>
+          </a:xfrm>
+          <a:prstGeom prst="rect">
+            <a:avLst/>
+          </a:prstGeom>
+        </p:spPr>
+      </p:pic>
+      <p:sp>
+        <p:nvSpPr>
+          <p:cNvPr id="6" name="Rectangle 5"/>
+          <p:cNvSpPr/>
+          <p:nvPr/>
+        </p:nvSpPr>
+        <p:spPr>
+          <a:xfrm>
+            <a:off x="10177325" y="2917767"/>
+            <a:ext cx="1172095" cy="864524"/>
+          </a:xfrm>
+          <a:prstGeom prst="rect">
+            <a:avLst/>
+          </a:prstGeom>
+          <a:solidFill>
+            <a:schemeClr val="bg1"/>
+          </a:solidFill>
+          <a:ln>
+            <a:noFill/>
+          </a:ln>
+        </p:spPr>
+        <p:style>
+          <a:lnRef idx="2">
+            <a:schemeClr val="accent1">
+              <a:shade val="50000"/>
+            </a:schemeClr>
+          </a:lnRef>
+          <a:fillRef idx="1">
+            <a:schemeClr val="accent1"/>
+          </a:fillRef>
+          <a:effectRef idx="0">
+            <a:schemeClr val="accent1"/>
+          </a:effectRef>
+          <a:fontRef idx="minor">
+            <a:schemeClr val="lt1"/>
+          </a:fontRef>
+        </p:style>
+        <p:txBody>
+          <a:bodyPr rtlCol="0" anchor="ctr"/>
+          <a:lstStyle/>
+          <a:p>
+            <a:pPr algn="ctr"/>
+            <a:endParaRPr lang="en-US"/>
+          </a:p>
+        </p:txBody>
+      </p:sp>
     </p:spTree>
     <p:extLst>
       <p:ext uri="{BB962C8B-B14F-4D97-AF65-F5344CB8AC3E}">
-        <p14:creationId xmlns:p14="http://schemas.microsoft.com/office/powerpoint/2010/main" val="3712317676"/>
+        <p14:creationId xmlns:p14="http://schemas.microsoft.com/office/powerpoint/2010/main" val="3340547296"/>
       </p:ext>
     </p:extLst>
   </p:cSld>
@@ -13488,23 +13555,7 @@
           <a:p>
             <a:r>
               <a:rPr lang="en-US" dirty="0" smtClean="0"/>
-              <a:t>Clear </a:t>
-            </a:r>
-            <a:r>
-              <a:rPr lang="en-US" dirty="0" smtClean="0"/>
-              <a:t>labels/</a:t>
-            </a:r>
-            <a:r>
-              <a:rPr lang="en-US" dirty="0" err="1" smtClean="0"/>
-              <a:t>symbology</a:t>
-            </a:r>
-            <a:r>
-              <a:rPr lang="en-US" dirty="0" smtClean="0"/>
-              <a:t> </a:t>
-            </a:r>
-            <a:r>
-              <a:rPr lang="en-US" dirty="0" smtClean="0"/>
-              <a:t>consistent with rest of document</a:t>
+              <a:t>Symbols and axes proportional</a:t>
             </a:r>
           </a:p>
         </p:txBody>
@@ -13536,10 +13587,104 @@
           </a:p>
         </p:txBody>
       </p:sp>
+      <p:pic>
+        <p:nvPicPr>
+          <p:cNvPr id="3" name="Picture 2"/>
+          <p:cNvPicPr>
+            <a:picLocks noChangeAspect="1"/>
+          </p:cNvPicPr>
+          <p:nvPr/>
+        </p:nvPicPr>
+        <p:blipFill>
+          <a:blip r:embed="rId2"/>
+          <a:stretch>
+            <a:fillRect/>
+          </a:stretch>
+        </p:blipFill>
+        <p:spPr>
+          <a:xfrm>
+            <a:off x="609600" y="2658980"/>
+            <a:ext cx="5133333" cy="3285714"/>
+          </a:xfrm>
+          <a:prstGeom prst="rect">
+            <a:avLst/>
+          </a:prstGeom>
+        </p:spPr>
+      </p:pic>
+      <p:pic>
+        <p:nvPicPr>
+          <p:cNvPr id="5" name="Picture 4"/>
+          <p:cNvPicPr>
+            <a:picLocks noChangeAspect="1"/>
+          </p:cNvPicPr>
+          <p:nvPr/>
+        </p:nvPicPr>
+        <p:blipFill>
+          <a:blip r:embed="rId3"/>
+          <a:stretch>
+            <a:fillRect/>
+          </a:stretch>
+        </p:blipFill>
+        <p:spPr>
+          <a:xfrm>
+            <a:off x="5742933" y="2658980"/>
+            <a:ext cx="5133333" cy="3285714"/>
+          </a:xfrm>
+          <a:prstGeom prst="rect">
+            <a:avLst/>
+          </a:prstGeom>
+        </p:spPr>
+      </p:pic>
+      <p:sp>
+        <p:nvSpPr>
+          <p:cNvPr id="6" name="Rectangle 5"/>
+          <p:cNvSpPr/>
+          <p:nvPr/>
+        </p:nvSpPr>
+        <p:spPr>
+          <a:xfrm>
+            <a:off x="10177325" y="2917767"/>
+            <a:ext cx="1172095" cy="864524"/>
+          </a:xfrm>
+          <a:prstGeom prst="rect">
+            <a:avLst/>
+          </a:prstGeom>
+          <a:solidFill>
+            <a:schemeClr val="bg1"/>
+          </a:solidFill>
+          <a:ln>
+            <a:noFill/>
+          </a:ln>
+        </p:spPr>
+        <p:style>
+          <a:lnRef idx="2">
+            <a:schemeClr val="accent1">
+              <a:shade val="50000"/>
+            </a:schemeClr>
+          </a:lnRef>
+          <a:fillRef idx="1">
+            <a:schemeClr val="accent1"/>
+          </a:fillRef>
+          <a:effectRef idx="0">
+            <a:schemeClr val="accent1"/>
+          </a:effectRef>
+          <a:fontRef idx="minor">
+            <a:schemeClr val="lt1"/>
+          </a:fontRef>
+        </p:style>
+        <p:txBody>
+          <a:bodyPr rtlCol="0" anchor="ctr"/>
+          <a:lstStyle/>
+          <a:p>
+            <a:pPr algn="ctr"/>
+            <a:endParaRPr lang="en-US"/>
+          </a:p>
+        </p:txBody>
+      </p:sp>
     </p:spTree>
     <p:extLst>
       <p:ext uri="{BB962C8B-B14F-4D97-AF65-F5344CB8AC3E}">
-        <p14:creationId xmlns:p14="http://schemas.microsoft.com/office/powerpoint/2010/main" val="932924359"/>
+        <p14:creationId xmlns:p14="http://schemas.microsoft.com/office/powerpoint/2010/main" val="3712317676"/>
       </p:ext>
     </p:extLst>
   </p:cSld>
@@ -13583,11 +13728,16 @@
           <a:p>
             <a:r>
               <a:rPr lang="en-US" dirty="0" smtClean="0"/>
-              <a:t>Reduce lack of context</a:t>
-            </a:r>
-          </a:p>
-          <a:p>
-            <a:endParaRPr lang="en-US" dirty="0"/>
+              <a:t>Clear labels/</a:t>
+            </a:r>
+            <a:r>
+              <a:rPr lang="en-US" dirty="0" err="1" smtClean="0"/>
+              <a:t>symbology</a:t>
+            </a:r>
+            <a:r>
+              <a:rPr lang="en-US" dirty="0" smtClean="0"/>
+              <a:t> consistent with rest of document</a:t>
+            </a:r>
           </a:p>
         </p:txBody>
       </p:sp>
@@ -13618,10 +13768,58 @@
           </a:p>
         </p:txBody>
       </p:sp>
+      <p:pic>
+        <p:nvPicPr>
+          <p:cNvPr id="3" name="Picture 2"/>
+          <p:cNvPicPr>
+            <a:picLocks noChangeAspect="1"/>
+          </p:cNvPicPr>
+          <p:nvPr/>
+        </p:nvPicPr>
+        <p:blipFill>
+          <a:blip r:embed="rId2"/>
+          <a:stretch>
+            <a:fillRect/>
+          </a:stretch>
+        </p:blipFill>
+        <p:spPr>
+          <a:xfrm>
+            <a:off x="873218" y="2761503"/>
+            <a:ext cx="5133333" cy="3285714"/>
+          </a:xfrm>
+          <a:prstGeom prst="rect">
+            <a:avLst/>
+          </a:prstGeom>
+        </p:spPr>
+      </p:pic>
+      <p:pic>
+        <p:nvPicPr>
+          <p:cNvPr id="5" name="Picture 4"/>
+          <p:cNvPicPr>
+            <a:picLocks noChangeAspect="1"/>
+          </p:cNvPicPr>
+          <p:nvPr/>
+        </p:nvPicPr>
+        <p:blipFill>
+          <a:blip r:embed="rId3"/>
+          <a:stretch>
+            <a:fillRect/>
+          </a:stretch>
+        </p:blipFill>
+        <p:spPr>
+          <a:xfrm>
+            <a:off x="6227809" y="2761503"/>
+            <a:ext cx="5133333" cy="3285714"/>
+          </a:xfrm>
+          <a:prstGeom prst="rect">
+            <a:avLst/>
+          </a:prstGeom>
+        </p:spPr>
+      </p:pic>
     </p:spTree>
     <p:extLst>
       <p:ext uri="{BB962C8B-B14F-4D97-AF65-F5344CB8AC3E}">
-        <p14:creationId xmlns:p14="http://schemas.microsoft.com/office/powerpoint/2010/main" val="2331525005"/>
+        <p14:creationId xmlns:p14="http://schemas.microsoft.com/office/powerpoint/2010/main" val="932924359"/>
       </p:ext>
     </p:extLst>
   </p:cSld>
@@ -13648,9 +13846,66 @@
           <a:chExt cx="0" cy="0"/>
         </a:xfrm>
       </p:grpSpPr>
+      <p:sp>
+        <p:nvSpPr>
+          <p:cNvPr id="4" name="Content Placeholder 3"/>
+          <p:cNvSpPr>
+            <a:spLocks noGrp="1"/>
+          </p:cNvSpPr>
+          <p:nvPr>
+            <p:ph idx="1"/>
+          </p:nvPr>
+        </p:nvSpPr>
+        <p:spPr/>
+        <p:txBody>
+          <a:bodyPr/>
+          <a:lstStyle/>
+          <a:p>
+            <a:r>
+              <a:rPr lang="en-US" dirty="0" smtClean="0"/>
+              <a:t>Clear labels/</a:t>
+            </a:r>
+            <a:r>
+              <a:rPr lang="en-US" dirty="0" err="1" smtClean="0"/>
+              <a:t>symbology</a:t>
+            </a:r>
+            <a:r>
+              <a:rPr lang="en-US" dirty="0" smtClean="0"/>
+              <a:t> consistent with rest of document</a:t>
+            </a:r>
+          </a:p>
+        </p:txBody>
+      </p:sp>
+      <p:sp>
+        <p:nvSpPr>
+          <p:cNvPr id="2" name="Title 1"/>
+          <p:cNvSpPr>
+            <a:spLocks noGrp="1"/>
+          </p:cNvSpPr>
+          <p:nvPr>
+            <p:ph type="title"/>
+          </p:nvPr>
+        </p:nvSpPr>
+        <p:spPr/>
+        <p:txBody>
+          <a:bodyPr/>
+          <a:lstStyle/>
+          <a:p>
+            <a:r>
+              <a:rPr lang="en-US" b="1" dirty="0" smtClean="0">
+                <a:solidFill>
+                  <a:srgbClr val="8E1731"/>
+                </a:solidFill>
+              </a:rPr>
+              <a:t>Step 3: clear visuals</a:t>
+            </a:r>
+            <a:endParaRPr lang="en-US" dirty="0"/>
+          </a:p>
+        </p:txBody>
+      </p:sp>
       <p:pic>
         <p:nvPicPr>
-          <p:cNvPr id="5" name="Picture 4"/>
+          <p:cNvPr id="3" name="Picture 2"/>
           <p:cNvPicPr>
             <a:picLocks noChangeAspect="1"/>
           </p:cNvPicPr>
@@ -13664,7 +13919,7 @@
         </p:blipFill>
         <p:spPr>
           <a:xfrm>
-            <a:off x="827697" y="2758733"/>
+            <a:off x="873218" y="2761503"/>
             <a:ext cx="5133333" cy="3285714"/>
           </a:xfrm>
           <a:prstGeom prst="rect">
@@ -13672,64 +13927,118 @@
           </a:prstGeom>
         </p:spPr>
       </p:pic>
-      <p:sp>
-        <p:nvSpPr>
-          <p:cNvPr id="4" name="Content Placeholder 3"/>
-          <p:cNvSpPr>
-            <a:spLocks noGrp="1"/>
-          </p:cNvSpPr>
-          <p:nvPr>
-            <p:ph idx="1"/>
-          </p:nvPr>
-        </p:nvSpPr>
-        <p:spPr/>
-        <p:txBody>
-          <a:bodyPr/>
+      <p:pic>
+        <p:nvPicPr>
+          <p:cNvPr id="5" name="Picture 4"/>
+          <p:cNvPicPr>
+            <a:picLocks noChangeAspect="1"/>
+          </p:cNvPicPr>
+          <p:nvPr/>
+        </p:nvPicPr>
+        <p:blipFill>
+          <a:blip r:embed="rId3"/>
+          <a:stretch>
+            <a:fillRect/>
+          </a:stretch>
+        </p:blipFill>
+        <p:spPr>
+          <a:xfrm>
+            <a:off x="6227809" y="2761503"/>
+            <a:ext cx="5133333" cy="3285714"/>
+          </a:xfrm>
+          <a:prstGeom prst="rect">
+            <a:avLst/>
+          </a:prstGeom>
+        </p:spPr>
+      </p:pic>
+      <p:sp>
+        <p:nvSpPr>
+          <p:cNvPr id="6" name="Rectangle 5"/>
+          <p:cNvSpPr/>
+          <p:nvPr/>
+        </p:nvSpPr>
+        <p:spPr>
+          <a:xfrm>
+            <a:off x="4728754" y="3187337"/>
+            <a:ext cx="1410789" cy="1942012"/>
+          </a:xfrm>
+          <a:prstGeom prst="rect">
+            <a:avLst/>
+          </a:prstGeom>
+          <a:noFill/>
+          <a:ln w="76200"/>
+        </p:spPr>
+        <p:style>
+          <a:lnRef idx="2">
+            <a:schemeClr val="accent1">
+              <a:shade val="50000"/>
+            </a:schemeClr>
+          </a:lnRef>
+          <a:fillRef idx="1">
+            <a:schemeClr val="accent1"/>
+          </a:fillRef>
+          <a:effectRef idx="0">
+            <a:schemeClr val="accent1"/>
+          </a:effectRef>
+          <a:fontRef idx="minor">
+            <a:schemeClr val="lt1"/>
+          </a:fontRef>
+        </p:style>
+        <p:txBody>
+          <a:bodyPr rtlCol="0" anchor="ctr"/>
           <a:lstStyle/>
           <a:p>
-            <a:r>
-              <a:rPr lang="en-US" dirty="0"/>
-              <a:t>Do not change chart design partway through – can be done accidentally by having unevenly spaced numbers as categories</a:t>
-            </a:r>
-            <a:r>
-              <a:rPr lang="en-US" dirty="0" smtClean="0"/>
-              <a:t>!</a:t>
-            </a:r>
-            <a:endParaRPr lang="en-US" dirty="0"/>
-          </a:p>
-        </p:txBody>
-      </p:sp>
-      <p:sp>
-        <p:nvSpPr>
-          <p:cNvPr id="2" name="Title 1"/>
-          <p:cNvSpPr>
-            <a:spLocks noGrp="1"/>
-          </p:cNvSpPr>
-          <p:nvPr>
-            <p:ph type="title"/>
-          </p:nvPr>
-        </p:nvSpPr>
-        <p:spPr/>
-        <p:txBody>
-          <a:bodyPr/>
+            <a:pPr algn="ctr"/>
+            <a:endParaRPr lang="en-US"/>
+          </a:p>
+        </p:txBody>
+      </p:sp>
+      <p:sp>
+        <p:nvSpPr>
+          <p:cNvPr id="7" name="Rectangle 6"/>
+          <p:cNvSpPr/>
+          <p:nvPr/>
+        </p:nvSpPr>
+        <p:spPr>
+          <a:xfrm>
+            <a:off x="10171611" y="3187337"/>
+            <a:ext cx="1410789" cy="1942012"/>
+          </a:xfrm>
+          <a:prstGeom prst="rect">
+            <a:avLst/>
+          </a:prstGeom>
+          <a:noFill/>
+          <a:ln w="76200"/>
+        </p:spPr>
+        <p:style>
+          <a:lnRef idx="2">
+            <a:schemeClr val="accent1">
+              <a:shade val="50000"/>
+            </a:schemeClr>
+          </a:lnRef>
+          <a:fillRef idx="1">
+            <a:schemeClr val="accent1"/>
+          </a:fillRef>
+          <a:effectRef idx="0">
+            <a:schemeClr val="accent1"/>
+          </a:effectRef>
+          <a:fontRef idx="minor">
+            <a:schemeClr val="lt1"/>
+          </a:fontRef>
+        </p:style>
+        <p:txBody>
+          <a:bodyPr rtlCol="0" anchor="ctr"/>
           <a:lstStyle/>
           <a:p>
-            <a:r>
-              <a:rPr lang="en-US" b="1" dirty="0" smtClean="0">
-                <a:solidFill>
-                  <a:srgbClr val="8E1731"/>
-                </a:solidFill>
-              </a:rPr>
-              <a:t>Step 3: clear visuals</a:t>
-            </a:r>
-            <a:endParaRPr lang="en-US" dirty="0"/>
+            <a:pPr algn="ctr"/>
+            <a:endParaRPr lang="en-US"/>
           </a:p>
         </p:txBody>
       </p:sp>
     </p:spTree>
     <p:extLst>
       <p:ext uri="{BB962C8B-B14F-4D97-AF65-F5344CB8AC3E}">
-        <p14:creationId xmlns:p14="http://schemas.microsoft.com/office/powerpoint/2010/main" val="3158119898"/>
+        <p14:creationId xmlns:p14="http://schemas.microsoft.com/office/powerpoint/2010/main" val="2691572824"/>
       </p:ext>
     </p:extLst>
   </p:cSld>
@@ -13758,7 +14067,7 @@
       </p:grpSpPr>
       <p:pic>
         <p:nvPicPr>
-          <p:cNvPr id="5" name="Picture 4"/>
+          <p:cNvPr id="9" name="Picture 8"/>
           <p:cNvPicPr>
             <a:picLocks noChangeAspect="1"/>
           </p:cNvPicPr>
@@ -13772,7 +14081,7 @@
         </p:blipFill>
         <p:spPr>
           <a:xfrm>
-            <a:off x="827697" y="2758733"/>
+            <a:off x="933368" y="2515486"/>
             <a:ext cx="5133333" cy="3285714"/>
           </a:xfrm>
           <a:prstGeom prst="rect">
@@ -13780,63 +14089,9 @@
           </a:prstGeom>
         </p:spPr>
       </p:pic>
-      <p:sp>
-        <p:nvSpPr>
-          <p:cNvPr id="4" name="Content Placeholder 3"/>
-          <p:cNvSpPr>
-            <a:spLocks noGrp="1"/>
-          </p:cNvSpPr>
-          <p:nvPr>
-            <p:ph idx="1"/>
-          </p:nvPr>
-        </p:nvSpPr>
-        <p:spPr/>
-        <p:txBody>
-          <a:bodyPr/>
-          <a:lstStyle/>
-          <a:p>
-            <a:r>
-              <a:rPr lang="en-US" dirty="0"/>
-              <a:t>Do not change chart design partway through – can be done accidentally by having unevenly spaced numbers as categories</a:t>
-            </a:r>
-            <a:r>
-              <a:rPr lang="en-US" dirty="0" smtClean="0"/>
-              <a:t>!</a:t>
-            </a:r>
-            <a:endParaRPr lang="en-US" dirty="0"/>
-          </a:p>
-        </p:txBody>
-      </p:sp>
-      <p:sp>
-        <p:nvSpPr>
-          <p:cNvPr id="2" name="Title 1"/>
-          <p:cNvSpPr>
-            <a:spLocks noGrp="1"/>
-          </p:cNvSpPr>
-          <p:nvPr>
-            <p:ph type="title"/>
-          </p:nvPr>
-        </p:nvSpPr>
-        <p:spPr/>
-        <p:txBody>
-          <a:bodyPr/>
-          <a:lstStyle/>
-          <a:p>
-            <a:r>
-              <a:rPr lang="en-US" b="1" dirty="0" smtClean="0">
-                <a:solidFill>
-                  <a:srgbClr val="8E1731"/>
-                </a:solidFill>
-              </a:rPr>
-              <a:t>Step 3: clear visuals</a:t>
-            </a:r>
-            <a:endParaRPr lang="en-US" dirty="0"/>
-          </a:p>
-        </p:txBody>
-      </p:sp>
       <p:pic>
         <p:nvPicPr>
-          <p:cNvPr id="3" name="Picture 2"/>
+          <p:cNvPr id="8" name="Picture 7"/>
           <p:cNvPicPr>
             <a:picLocks noChangeAspect="1"/>
           </p:cNvPicPr>
@@ -13850,7 +14105,7 @@
         </p:blipFill>
         <p:spPr>
           <a:xfrm>
-            <a:off x="5441260" y="2758733"/>
+            <a:off x="6390469" y="2525823"/>
             <a:ext cx="5133333" cy="3285714"/>
           </a:xfrm>
           <a:prstGeom prst="rect">
@@ -13858,10 +14113,67 @@
           </a:prstGeom>
         </p:spPr>
       </p:pic>
+      <p:sp>
+        <p:nvSpPr>
+          <p:cNvPr id="4" name="Content Placeholder 3"/>
+          <p:cNvSpPr>
+            <a:spLocks noGrp="1"/>
+          </p:cNvSpPr>
+          <p:nvPr>
+            <p:ph idx="1"/>
+          </p:nvPr>
+        </p:nvSpPr>
+        <p:spPr/>
+        <p:txBody>
+          <a:bodyPr/>
+          <a:lstStyle/>
+          <a:p>
+            <a:r>
+              <a:rPr lang="en-US" dirty="0" smtClean="0"/>
+              <a:t>Clear labels/</a:t>
+            </a:r>
+            <a:r>
+              <a:rPr lang="en-US" dirty="0" err="1" smtClean="0"/>
+              <a:t>symbology</a:t>
+            </a:r>
+            <a:r>
+              <a:rPr lang="en-US" dirty="0" smtClean="0"/>
+              <a:t> consistent with rest of document</a:t>
+            </a:r>
+          </a:p>
+        </p:txBody>
+      </p:sp>
+      <p:sp>
+        <p:nvSpPr>
+          <p:cNvPr id="2" name="Title 1"/>
+          <p:cNvSpPr>
+            <a:spLocks noGrp="1"/>
+          </p:cNvSpPr>
+          <p:nvPr>
+            <p:ph type="title"/>
+          </p:nvPr>
+        </p:nvSpPr>
+        <p:spPr/>
+        <p:txBody>
+          <a:bodyPr/>
+          <a:lstStyle/>
+          <a:p>
+            <a:r>
+              <a:rPr lang="en-US" b="1" dirty="0" smtClean="0">
+                <a:solidFill>
+                  <a:srgbClr val="8E1731"/>
+                </a:solidFill>
+              </a:rPr>
+              <a:t>Step 3: clear visuals</a:t>
+            </a:r>
+            <a:endParaRPr lang="en-US" dirty="0"/>
+          </a:p>
+        </p:txBody>
+      </p:sp>
     </p:spTree>
     <p:extLst>
       <p:ext uri="{BB962C8B-B14F-4D97-AF65-F5344CB8AC3E}">
-        <p14:creationId xmlns:p14="http://schemas.microsoft.com/office/powerpoint/2010/main" val="4274842682"/>
+        <p14:creationId xmlns:p14="http://schemas.microsoft.com/office/powerpoint/2010/main" val="3528202059"/>
       </p:ext>
     </p:extLst>
   </p:cSld>
@@ -13888,73 +14200,9 @@
           <a:chExt cx="0" cy="0"/>
         </a:xfrm>
       </p:grpSpPr>
-      <p:sp>
-        <p:nvSpPr>
-          <p:cNvPr id="4" name="Content Placeholder 3"/>
-          <p:cNvSpPr>
-            <a:spLocks noGrp="1"/>
-          </p:cNvSpPr>
-          <p:nvPr>
-            <p:ph idx="1"/>
-          </p:nvPr>
-        </p:nvSpPr>
-        <p:spPr/>
-        <p:txBody>
-          <a:bodyPr/>
-          <a:lstStyle/>
-          <a:p>
-            <a:r>
-              <a:rPr lang="en-US" dirty="0" smtClean="0"/>
-              <a:t>Meet </a:t>
-            </a:r>
-            <a:r>
-              <a:rPr lang="en-US" dirty="0"/>
-              <a:t>your goal – what is your question or hypothesis</a:t>
-            </a:r>
-            <a:r>
-              <a:rPr lang="en-US" dirty="0" smtClean="0"/>
-              <a:t>?</a:t>
-            </a:r>
-          </a:p>
-          <a:p>
-            <a:r>
-              <a:rPr lang="en-US" dirty="0" smtClean="0"/>
-              <a:t>“Here we demonstrate four diets affect chicken weight divergently over time.”</a:t>
-            </a:r>
-            <a:endParaRPr lang="en-US" dirty="0"/>
-          </a:p>
-        </p:txBody>
-      </p:sp>
-      <p:sp>
-        <p:nvSpPr>
-          <p:cNvPr id="2" name="Title 1"/>
-          <p:cNvSpPr>
-            <a:spLocks noGrp="1"/>
-          </p:cNvSpPr>
-          <p:nvPr>
-            <p:ph type="title"/>
-          </p:nvPr>
-        </p:nvSpPr>
-        <p:spPr/>
-        <p:txBody>
-          <a:bodyPr/>
-          <a:lstStyle/>
-          <a:p>
-            <a:r>
-              <a:rPr lang="en-US" b="1" dirty="0" smtClean="0">
-                <a:solidFill>
-                  <a:srgbClr val="8E1731"/>
-                </a:solidFill>
-              </a:rPr>
-              <a:t>Step 3: clear visuals</a:t>
-            </a:r>
-            <a:endParaRPr lang="en-US" dirty="0"/>
-          </a:p>
-        </p:txBody>
-      </p:sp>
       <p:pic>
         <p:nvPicPr>
-          <p:cNvPr id="5" name="Picture 4"/>
+          <p:cNvPr id="9" name="Picture 8"/>
           <p:cNvPicPr>
             <a:picLocks noChangeAspect="1"/>
           </p:cNvPicPr>
@@ -13968,7 +14216,7 @@
         </p:blipFill>
         <p:spPr>
           <a:xfrm>
-            <a:off x="3146947" y="3174369"/>
+            <a:off x="933368" y="2515486"/>
             <a:ext cx="5133333" cy="3285714"/>
           </a:xfrm>
           <a:prstGeom prst="rect">
@@ -13976,10 +14224,175 @@
           </a:prstGeom>
         </p:spPr>
       </p:pic>
+      <p:pic>
+        <p:nvPicPr>
+          <p:cNvPr id="8" name="Picture 7"/>
+          <p:cNvPicPr>
+            <a:picLocks noChangeAspect="1"/>
+          </p:cNvPicPr>
+          <p:nvPr/>
+        </p:nvPicPr>
+        <p:blipFill>
+          <a:blip r:embed="rId3"/>
+          <a:stretch>
+            <a:fillRect/>
+          </a:stretch>
+        </p:blipFill>
+        <p:spPr>
+          <a:xfrm>
+            <a:off x="6390469" y="2525823"/>
+            <a:ext cx="5133333" cy="3285714"/>
+          </a:xfrm>
+          <a:prstGeom prst="rect">
+            <a:avLst/>
+          </a:prstGeom>
+        </p:spPr>
+      </p:pic>
+      <p:sp>
+        <p:nvSpPr>
+          <p:cNvPr id="4" name="Content Placeholder 3"/>
+          <p:cNvSpPr>
+            <a:spLocks noGrp="1"/>
+          </p:cNvSpPr>
+          <p:nvPr>
+            <p:ph idx="1"/>
+          </p:nvPr>
+        </p:nvSpPr>
+        <p:spPr/>
+        <p:txBody>
+          <a:bodyPr/>
+          <a:lstStyle/>
+          <a:p>
+            <a:r>
+              <a:rPr lang="en-US" dirty="0" smtClean="0"/>
+              <a:t>Clear labels/</a:t>
+            </a:r>
+            <a:r>
+              <a:rPr lang="en-US" dirty="0" err="1" smtClean="0"/>
+              <a:t>symbology</a:t>
+            </a:r>
+            <a:r>
+              <a:rPr lang="en-US" dirty="0" smtClean="0"/>
+              <a:t> consistent with rest of document</a:t>
+            </a:r>
+          </a:p>
+        </p:txBody>
+      </p:sp>
+      <p:sp>
+        <p:nvSpPr>
+          <p:cNvPr id="2" name="Title 1"/>
+          <p:cNvSpPr>
+            <a:spLocks noGrp="1"/>
+          </p:cNvSpPr>
+          <p:nvPr>
+            <p:ph type="title"/>
+          </p:nvPr>
+        </p:nvSpPr>
+        <p:spPr/>
+        <p:txBody>
+          <a:bodyPr/>
+          <a:lstStyle/>
+          <a:p>
+            <a:r>
+              <a:rPr lang="en-US" b="1" dirty="0" smtClean="0">
+                <a:solidFill>
+                  <a:srgbClr val="8E1731"/>
+                </a:solidFill>
+              </a:rPr>
+              <a:t>Step 3: clear visuals</a:t>
+            </a:r>
+            <a:endParaRPr lang="en-US" dirty="0"/>
+          </a:p>
+        </p:txBody>
+      </p:sp>
+      <p:sp>
+        <p:nvSpPr>
+          <p:cNvPr id="6" name="Rectangle 5"/>
+          <p:cNvSpPr/>
+          <p:nvPr/>
+        </p:nvSpPr>
+        <p:spPr>
+          <a:xfrm>
+            <a:off x="4921082" y="3004457"/>
+            <a:ext cx="1410789" cy="1942012"/>
+          </a:xfrm>
+          <a:prstGeom prst="rect">
+            <a:avLst/>
+          </a:prstGeom>
+          <a:noFill/>
+          <a:ln w="76200"/>
+        </p:spPr>
+        <p:style>
+          <a:lnRef idx="2">
+            <a:schemeClr val="accent1">
+              <a:shade val="50000"/>
+            </a:schemeClr>
+          </a:lnRef>
+          <a:fillRef idx="1">
+            <a:schemeClr val="accent1"/>
+          </a:fillRef>
+          <a:effectRef idx="0">
+            <a:schemeClr val="accent1"/>
+          </a:effectRef>
+          <a:fontRef idx="minor">
+            <a:schemeClr val="lt1"/>
+          </a:fontRef>
+        </p:style>
+        <p:txBody>
+          <a:bodyPr rtlCol="0" anchor="ctr"/>
+          <a:lstStyle/>
+          <a:p>
+            <a:pPr algn="ctr"/>
+            <a:endParaRPr lang="en-US"/>
+          </a:p>
+        </p:txBody>
+      </p:sp>
+      <p:sp>
+        <p:nvSpPr>
+          <p:cNvPr id="7" name="Rectangle 6"/>
+          <p:cNvSpPr/>
+          <p:nvPr/>
+        </p:nvSpPr>
+        <p:spPr>
+          <a:xfrm>
+            <a:off x="10333495" y="3004457"/>
+            <a:ext cx="1410789" cy="1942012"/>
+          </a:xfrm>
+          <a:prstGeom prst="rect">
+            <a:avLst/>
+          </a:prstGeom>
+          <a:noFill/>
+          <a:ln w="76200"/>
+        </p:spPr>
+        <p:style>
+          <a:lnRef idx="2">
+            <a:schemeClr val="accent1">
+              <a:shade val="50000"/>
+            </a:schemeClr>
+          </a:lnRef>
+          <a:fillRef idx="1">
+            <a:schemeClr val="accent1"/>
+          </a:fillRef>
+          <a:effectRef idx="0">
+            <a:schemeClr val="accent1"/>
+          </a:effectRef>
+          <a:fontRef idx="minor">
+            <a:schemeClr val="lt1"/>
+          </a:fontRef>
+        </p:style>
+        <p:txBody>
+          <a:bodyPr rtlCol="0" anchor="ctr"/>
+          <a:lstStyle/>
+          <a:p>
+            <a:pPr algn="ctr"/>
+            <a:endParaRPr lang="en-US"/>
+          </a:p>
+        </p:txBody>
+      </p:sp>
     </p:spTree>
     <p:extLst>
       <p:ext uri="{BB962C8B-B14F-4D97-AF65-F5344CB8AC3E}">
-        <p14:creationId xmlns:p14="http://schemas.microsoft.com/office/powerpoint/2010/main" val="4152606566"/>
+        <p14:creationId xmlns:p14="http://schemas.microsoft.com/office/powerpoint/2010/main" val="2430742362"/>
       </p:ext>
     </p:extLst>
   </p:cSld>
@@ -14327,22 +14740,10 @@
           <a:p>
             <a:r>
               <a:rPr lang="en-US" dirty="0" smtClean="0"/>
-              <a:t>Meet </a:t>
-            </a:r>
-            <a:r>
-              <a:rPr lang="en-US" dirty="0"/>
-              <a:t>your goal – what is your question or hypothesis</a:t>
-            </a:r>
-            <a:r>
-              <a:rPr lang="en-US" dirty="0" smtClean="0"/>
-              <a:t>?</a:t>
-            </a:r>
-          </a:p>
-          <a:p>
-            <a:r>
-              <a:rPr lang="en-US" dirty="0" smtClean="0"/>
-              <a:t>“Here we demonstrate four diets affect chicken weight divergently over time.”</a:t>
-            </a:r>
+              <a:t>Reduce lack of context</a:t>
+            </a:r>
+          </a:p>
+          <a:p>
             <a:endParaRPr lang="en-US" dirty="0"/>
           </a:p>
         </p:txBody>
@@ -14376,7 +14777,7 @@
       </p:sp>
       <p:pic>
         <p:nvPicPr>
-          <p:cNvPr id="6" name="Picture 5"/>
+          <p:cNvPr id="5" name="Picture 4"/>
           <p:cNvPicPr>
             <a:picLocks noChangeAspect="1"/>
           </p:cNvPicPr>
@@ -14390,7 +14791,7 @@
         </p:blipFill>
         <p:spPr>
           <a:xfrm>
-            <a:off x="3122009" y="3332310"/>
+            <a:off x="609600" y="2683126"/>
             <a:ext cx="5133333" cy="3285714"/>
           </a:xfrm>
           <a:prstGeom prst="rect">
@@ -14401,7 +14802,7 @@
     </p:spTree>
     <p:extLst>
       <p:ext uri="{BB962C8B-B14F-4D97-AF65-F5344CB8AC3E}">
-        <p14:creationId xmlns:p14="http://schemas.microsoft.com/office/powerpoint/2010/main" val="1779855684"/>
+        <p14:creationId xmlns:p14="http://schemas.microsoft.com/office/powerpoint/2010/main" val="2331525005"/>
       </p:ext>
     </p:extLst>
   </p:cSld>
@@ -14430,6 +14831,31 @@
       </p:grpSpPr>
       <p:sp>
         <p:nvSpPr>
+          <p:cNvPr id="4" name="Content Placeholder 3"/>
+          <p:cNvSpPr>
+            <a:spLocks noGrp="1"/>
+          </p:cNvSpPr>
+          <p:nvPr>
+            <p:ph idx="1"/>
+          </p:nvPr>
+        </p:nvSpPr>
+        <p:spPr/>
+        <p:txBody>
+          <a:bodyPr/>
+          <a:lstStyle/>
+          <a:p>
+            <a:r>
+              <a:rPr lang="en-US" dirty="0" smtClean="0"/>
+              <a:t>Reduce lack of context</a:t>
+            </a:r>
+          </a:p>
+          <a:p>
+            <a:endParaRPr lang="en-US" dirty="0"/>
+          </a:p>
+        </p:txBody>
+      </p:sp>
+      <p:sp>
+        <p:nvSpPr>
           <p:cNvPr id="2" name="Title 1"/>
           <p:cNvSpPr>
             <a:spLocks noGrp="1"/>
@@ -14438,31 +14864,18 @@
             <p:ph type="title"/>
           </p:nvPr>
         </p:nvSpPr>
-        <p:spPr>
-          <a:xfrm>
-            <a:off x="1168708" y="675829"/>
-            <a:ext cx="10229977" cy="500289"/>
-          </a:xfrm>
-        </p:spPr>
+        <p:spPr/>
         <p:txBody>
           <a:bodyPr/>
           <a:lstStyle/>
           <a:p>
             <a:r>
-              <a:rPr lang="en-US" b="1" dirty="0">
+              <a:rPr lang="en-US" b="1" dirty="0" smtClean="0">
                 <a:solidFill>
                   <a:srgbClr val="8E1731"/>
                 </a:solidFill>
               </a:rPr>
-              <a:t>What is </a:t>
-            </a:r>
-            <a:r>
-              <a:rPr lang="en-US" b="1" dirty="0" smtClean="0">
-                <a:solidFill>
-                  <a:srgbClr val="8E1731"/>
-                </a:solidFill>
-              </a:rPr>
-              <a:t>clear or misleading about this?</a:t>
+              <a:t>Step 3: clear visuals</a:t>
             </a:r>
             <a:endParaRPr lang="en-US" dirty="0"/>
           </a:p>
@@ -14470,7 +14883,7 @@
       </p:sp>
       <p:pic>
         <p:nvPicPr>
-          <p:cNvPr id="3" name="Picture 2"/>
+          <p:cNvPr id="5" name="Picture 4"/>
           <p:cNvPicPr>
             <a:picLocks noChangeAspect="1"/>
           </p:cNvPicPr>
@@ -14484,8 +14897,32 @@
         </p:blipFill>
         <p:spPr>
           <a:xfrm>
-            <a:off x="1147188" y="2221214"/>
-            <a:ext cx="6057143" cy="3895238"/>
+            <a:off x="609600" y="2683126"/>
+            <a:ext cx="5133333" cy="3285714"/>
+          </a:xfrm>
+          <a:prstGeom prst="rect">
+            <a:avLst/>
+          </a:prstGeom>
+        </p:spPr>
+      </p:pic>
+      <p:pic>
+        <p:nvPicPr>
+          <p:cNvPr id="6" name="Picture 5"/>
+          <p:cNvPicPr>
+            <a:picLocks noChangeAspect="1"/>
+          </p:cNvPicPr>
+          <p:nvPr/>
+        </p:nvPicPr>
+        <p:blipFill>
+          <a:blip r:embed="rId3"/>
+          <a:stretch>
+            <a:fillRect/>
+          </a:stretch>
+        </p:blipFill>
+        <p:spPr>
+          <a:xfrm>
+            <a:off x="6095999" y="2657886"/>
+            <a:ext cx="5133333" cy="3285714"/>
           </a:xfrm>
           <a:prstGeom prst="rect">
             <a:avLst/>
@@ -14495,7 +14932,7 @@
     </p:spTree>
     <p:extLst>
       <p:ext uri="{BB962C8B-B14F-4D97-AF65-F5344CB8AC3E}">
-        <p14:creationId xmlns:p14="http://schemas.microsoft.com/office/powerpoint/2010/main" val="3582042232"/>
+        <p14:creationId xmlns:p14="http://schemas.microsoft.com/office/powerpoint/2010/main" val="3494018411"/>
       </p:ext>
     </p:extLst>
   </p:cSld>
@@ -14522,49 +14959,9 @@
           <a:chExt cx="0" cy="0"/>
         </a:xfrm>
       </p:grpSpPr>
-      <p:sp>
-        <p:nvSpPr>
-          <p:cNvPr id="2" name="Title 1"/>
-          <p:cNvSpPr>
-            <a:spLocks noGrp="1"/>
-          </p:cNvSpPr>
-          <p:nvPr>
-            <p:ph type="title"/>
-          </p:nvPr>
-        </p:nvSpPr>
-        <p:spPr>
-          <a:xfrm>
-            <a:off x="1168708" y="675829"/>
-            <a:ext cx="10229977" cy="500289"/>
-          </a:xfrm>
-        </p:spPr>
-        <p:txBody>
-          <a:bodyPr/>
-          <a:lstStyle/>
-          <a:p>
-            <a:r>
-              <a:rPr lang="en-US" b="1" dirty="0">
-                <a:solidFill>
-                  <a:srgbClr val="8E1731"/>
-                </a:solidFill>
-              </a:rPr>
-              <a:t>What is </a:t>
-            </a:r>
-            <a:r>
-              <a:rPr lang="en-US" b="1" dirty="0" smtClean="0">
-                <a:solidFill>
-                  <a:srgbClr val="8E1731"/>
-                </a:solidFill>
-              </a:rPr>
-              <a:t>clear or misleading about this?</a:t>
-            </a:r>
-            <a:endParaRPr lang="en-US" dirty="0"/>
-          </a:p>
-        </p:txBody>
-      </p:sp>
       <p:pic>
         <p:nvPicPr>
-          <p:cNvPr id="3" name="Picture 2"/>
+          <p:cNvPr id="5" name="Picture 4"/>
           <p:cNvPicPr>
             <a:picLocks noChangeAspect="1"/>
           </p:cNvPicPr>
@@ -14578,8 +14975,8 @@
         </p:blipFill>
         <p:spPr>
           <a:xfrm>
-            <a:off x="1147188" y="2221214"/>
-            <a:ext cx="6057143" cy="3895238"/>
+            <a:off x="827697" y="2758733"/>
+            <a:ext cx="5133333" cy="3285714"/>
           </a:xfrm>
           <a:prstGeom prst="rect">
             <a:avLst/>
@@ -14588,96 +14985,237 @@
       </p:pic>
       <p:sp>
         <p:nvSpPr>
-          <p:cNvPr id="4" name="Rectangle 3"/>
-          <p:cNvSpPr/>
+          <p:cNvPr id="2" name="Title 1"/>
+          <p:cNvSpPr>
+            <a:spLocks noGrp="1"/>
+          </p:cNvSpPr>
+          <p:nvPr>
+            <p:ph type="title"/>
+          </p:nvPr>
+        </p:nvSpPr>
+        <p:spPr/>
+        <p:txBody>
+          <a:bodyPr/>
+          <a:lstStyle/>
+          <a:p>
+            <a:r>
+              <a:rPr lang="en-US" b="1" dirty="0" smtClean="0">
+                <a:solidFill>
+                  <a:srgbClr val="8E1731"/>
+                </a:solidFill>
+              </a:rPr>
+              <a:t>Step 3: clear visuals</a:t>
+            </a:r>
+            <a:endParaRPr lang="en-US" dirty="0"/>
+          </a:p>
+        </p:txBody>
+      </p:sp>
+      <p:sp>
+        <p:nvSpPr>
+          <p:cNvPr id="6" name="Content Placeholder 3"/>
+          <p:cNvSpPr txBox="1">
+            <a:spLocks/>
+          </p:cNvSpPr>
           <p:nvPr/>
         </p:nvSpPr>
         <p:spPr>
           <a:xfrm>
-            <a:off x="7407057" y="1860766"/>
-            <a:ext cx="4129414" cy="3416320"/>
-          </a:xfrm>
-          <a:prstGeom prst="rect">
-            <a:avLst/>
-          </a:prstGeom>
-        </p:spPr>
-        <p:txBody>
-          <a:bodyPr wrap="square">
-            <a:spAutoFit/>
+            <a:off x="609600" y="1446415"/>
+            <a:ext cx="10972800" cy="4277488"/>
+          </a:xfrm>
+          <a:prstGeom prst="rect">
+            <a:avLst/>
+          </a:prstGeom>
+        </p:spPr>
+        <p:txBody>
+          <a:bodyPr>
+            <a:normAutofit/>
           </a:bodyPr>
-          <a:lstStyle/>
-          <a:p>
-            <a:r>
-              <a:rPr lang="en-US" dirty="0"/>
-              <a:t>Clear</a:t>
-            </a:r>
-          </a:p>
-          <a:p>
-            <a:pPr marL="285750" indent="-285750">
+          <a:lstStyle>
+            <a:lvl1pPr marL="257162" indent="-257162" algn="l" defTabSz="914400" rtl="0" eaLnBrk="1" latinLnBrk="0" hangingPunct="1">
+              <a:lnSpc>
+                <a:spcPct val="90000"/>
+              </a:lnSpc>
+              <a:spcBef>
+                <a:spcPts val="1000"/>
+              </a:spcBef>
+              <a:buClr>
+                <a:srgbClr val="8E1731"/>
+              </a:buClr>
+              <a:buFont typeface="Wingdings" panose="05000000000000000000" pitchFamily="2" charset="2"/>
+              <a:buChar char="§"/>
+              <a:defRPr lang="en-US" sz="3200" kern="1200" dirty="0" smtClean="0">
+                <a:solidFill>
+                  <a:schemeClr val="tx1"/>
+                </a:solidFill>
+                <a:latin typeface="Arial" panose="020B0604020202020204" pitchFamily="34" charset="0"/>
+                <a:ea typeface="+mn-ea"/>
+                <a:cs typeface="Arial" panose="020B0604020202020204" pitchFamily="34" charset="0"/>
+              </a:defRPr>
+            </a:lvl1pPr>
+            <a:lvl2pPr marL="557185" indent="-214303" algn="l" defTabSz="914400" rtl="0" eaLnBrk="1" latinLnBrk="0" hangingPunct="1">
+              <a:lnSpc>
+                <a:spcPct val="90000"/>
+              </a:lnSpc>
+              <a:spcBef>
+                <a:spcPts val="500"/>
+              </a:spcBef>
+              <a:buClrTx/>
               <a:buFont typeface="Arial" panose="020B0604020202020204" pitchFamily="34" charset="0"/>
               <a:buChar char="•"/>
-            </a:pPr>
-            <a:r>
-              <a:rPr lang="en-US" dirty="0"/>
-              <a:t>Chart design consistent throughout</a:t>
-            </a:r>
-          </a:p>
-          <a:p>
-            <a:pPr marL="285750" indent="-285750">
+              <a:defRPr lang="en-US" sz="3200" kern="1200" dirty="0" smtClean="0">
+                <a:solidFill>
+                  <a:schemeClr val="tx1"/>
+                </a:solidFill>
+                <a:latin typeface="Arial" panose="020B0604020202020204" pitchFamily="34" charset="0"/>
+                <a:ea typeface="+mn-ea"/>
+                <a:cs typeface="Arial" panose="020B0604020202020204" pitchFamily="34" charset="0"/>
+              </a:defRPr>
+            </a:lvl2pPr>
+            <a:lvl3pPr marL="857208" indent="-171442" algn="l" defTabSz="914400" rtl="0" eaLnBrk="1" latinLnBrk="0" hangingPunct="1">
+              <a:lnSpc>
+                <a:spcPct val="90000"/>
+              </a:lnSpc>
+              <a:spcBef>
+                <a:spcPts val="500"/>
+              </a:spcBef>
+              <a:buClrTx/>
+              <a:buFont typeface="Courier New" panose="02070309020205020404" pitchFamily="49" charset="0"/>
+              <a:buChar char="o"/>
+              <a:defRPr lang="en-US" sz="3200" kern="1200" dirty="0" smtClean="0">
+                <a:solidFill>
+                  <a:schemeClr val="tx1"/>
+                </a:solidFill>
+                <a:latin typeface="Arial" panose="020B0604020202020204" pitchFamily="34" charset="0"/>
+                <a:ea typeface="+mn-ea"/>
+                <a:cs typeface="Arial" panose="020B0604020202020204" pitchFamily="34" charset="0"/>
+              </a:defRPr>
+            </a:lvl3pPr>
+            <a:lvl4pPr marL="1200091" indent="-171442" algn="l" defTabSz="914400" rtl="0" eaLnBrk="1" latinLnBrk="0" hangingPunct="1">
+              <a:lnSpc>
+                <a:spcPct val="90000"/>
+              </a:lnSpc>
+              <a:spcBef>
+                <a:spcPts val="500"/>
+              </a:spcBef>
+              <a:buClrTx/>
               <a:buFont typeface="Arial" panose="020B0604020202020204" pitchFamily="34" charset="0"/>
               <a:buChar char="•"/>
-            </a:pPr>
-            <a:r>
-              <a:rPr lang="en-US" dirty="0"/>
-              <a:t>Units appropriate</a:t>
-            </a:r>
-          </a:p>
-          <a:p>
-            <a:endParaRPr lang="en-US" dirty="0"/>
-          </a:p>
-          <a:p>
-            <a:r>
-              <a:rPr lang="en-US" dirty="0" smtClean="0"/>
-              <a:t>Potentially misleading</a:t>
-            </a:r>
-            <a:endParaRPr lang="en-US" dirty="0"/>
-          </a:p>
-          <a:p>
-            <a:pPr marL="285750" indent="-285750">
+              <a:defRPr lang="en-US" sz="3200" kern="1200" dirty="0" smtClean="0">
+                <a:solidFill>
+                  <a:schemeClr val="tx1"/>
+                </a:solidFill>
+                <a:latin typeface="Arial" panose="020B0604020202020204" pitchFamily="34" charset="0"/>
+                <a:ea typeface="+mn-ea"/>
+                <a:cs typeface="Arial" panose="020B0604020202020204" pitchFamily="34" charset="0"/>
+              </a:defRPr>
+            </a:lvl4pPr>
+            <a:lvl5pPr marL="1542973" indent="-171442" algn="l" defTabSz="914400" rtl="0" eaLnBrk="1" latinLnBrk="0" hangingPunct="1">
+              <a:lnSpc>
+                <a:spcPct val="90000"/>
+              </a:lnSpc>
+              <a:spcBef>
+                <a:spcPts val="500"/>
+              </a:spcBef>
+              <a:buClrTx/>
+              <a:buSzPct val="35000"/>
+              <a:buFont typeface="Courier New" panose="02070309020205020404" pitchFamily="49" charset="0"/>
+              <a:buChar char="o"/>
+              <a:defRPr lang="en-US" sz="3200" kern="1200" dirty="0">
+                <a:solidFill>
+                  <a:schemeClr val="tx1"/>
+                </a:solidFill>
+                <a:latin typeface="Arial" panose="020B0604020202020204" pitchFamily="34" charset="0"/>
+                <a:ea typeface="+mn-ea"/>
+                <a:cs typeface="Arial" panose="020B0604020202020204" pitchFamily="34" charset="0"/>
+              </a:defRPr>
+            </a:lvl5pPr>
+            <a:lvl6pPr marL="2514600" indent="-228600" algn="l" defTabSz="914400" rtl="0" eaLnBrk="1" latinLnBrk="0" hangingPunct="1">
+              <a:lnSpc>
+                <a:spcPct val="90000"/>
+              </a:lnSpc>
+              <a:spcBef>
+                <a:spcPts val="500"/>
+              </a:spcBef>
               <a:buFont typeface="Arial" panose="020B0604020202020204" pitchFamily="34" charset="0"/>
               <a:buChar char="•"/>
-            </a:pPr>
-            <a:r>
-              <a:rPr lang="en-US" dirty="0"/>
-              <a:t>Symbols and axes proportional to numbers represented (problem with pie charts, area in general)</a:t>
-            </a:r>
-          </a:p>
-          <a:p>
-            <a:pPr marL="285750" indent="-285750">
+              <a:defRPr sz="1800" kern="1200">
+                <a:solidFill>
+                  <a:schemeClr val="tx1"/>
+                </a:solidFill>
+                <a:latin typeface="+mn-lt"/>
+                <a:ea typeface="+mn-ea"/>
+                <a:cs typeface="+mn-cs"/>
+              </a:defRPr>
+            </a:lvl6pPr>
+            <a:lvl7pPr marL="2971800" indent="-228600" algn="l" defTabSz="914400" rtl="0" eaLnBrk="1" latinLnBrk="0" hangingPunct="1">
+              <a:lnSpc>
+                <a:spcPct val="90000"/>
+              </a:lnSpc>
+              <a:spcBef>
+                <a:spcPts val="500"/>
+              </a:spcBef>
               <a:buFont typeface="Arial" panose="020B0604020202020204" pitchFamily="34" charset="0"/>
               <a:buChar char="•"/>
-            </a:pPr>
-            <a:r>
-              <a:rPr lang="en-US" dirty="0"/>
-              <a:t>Lack of context: did not show all relevant data</a:t>
-            </a:r>
-          </a:p>
-          <a:p>
-            <a:pPr marL="285750" indent="-285750">
+              <a:defRPr sz="1800" kern="1200">
+                <a:solidFill>
+                  <a:schemeClr val="tx1"/>
+                </a:solidFill>
+                <a:latin typeface="+mn-lt"/>
+                <a:ea typeface="+mn-ea"/>
+                <a:cs typeface="+mn-cs"/>
+              </a:defRPr>
+            </a:lvl7pPr>
+            <a:lvl8pPr marL="3429000" indent="-228600" algn="l" defTabSz="914400" rtl="0" eaLnBrk="1" latinLnBrk="0" hangingPunct="1">
+              <a:lnSpc>
+                <a:spcPct val="90000"/>
+              </a:lnSpc>
+              <a:spcBef>
+                <a:spcPts val="500"/>
+              </a:spcBef>
               <a:buFont typeface="Arial" panose="020B0604020202020204" pitchFamily="34" charset="0"/>
               <a:buChar char="•"/>
-            </a:pPr>
-            <a:r>
-              <a:rPr lang="en-US" dirty="0"/>
-              <a:t>Clear labels (minimize abbreviations)	</a:t>
-            </a:r>
+              <a:defRPr sz="1800" kern="1200">
+                <a:solidFill>
+                  <a:schemeClr val="tx1"/>
+                </a:solidFill>
+                <a:latin typeface="+mn-lt"/>
+                <a:ea typeface="+mn-ea"/>
+                <a:cs typeface="+mn-cs"/>
+              </a:defRPr>
+            </a:lvl8pPr>
+            <a:lvl9pPr marL="3886200" indent="-228600" algn="l" defTabSz="914400" rtl="0" eaLnBrk="1" latinLnBrk="0" hangingPunct="1">
+              <a:lnSpc>
+                <a:spcPct val="90000"/>
+              </a:lnSpc>
+              <a:spcBef>
+                <a:spcPts val="500"/>
+              </a:spcBef>
+              <a:buFont typeface="Arial" panose="020B0604020202020204" pitchFamily="34" charset="0"/>
+              <a:buChar char="•"/>
+              <a:defRPr sz="1800" kern="1200">
+                <a:solidFill>
+                  <a:schemeClr val="tx1"/>
+                </a:solidFill>
+                <a:latin typeface="+mn-lt"/>
+                <a:ea typeface="+mn-ea"/>
+                <a:cs typeface="+mn-cs"/>
+              </a:defRPr>
+            </a:lvl9pPr>
+          </a:lstStyle>
+          <a:p>
+            <a:r>
+              <a:rPr lang="en-US" smtClean="0"/>
+              <a:t>Do not change chart design partway through – can be done accidentally by having unevenly spaced numbers as categories!</a:t>
+            </a:r>
+            <a:endParaRPr lang="en-US"/>
           </a:p>
         </p:txBody>
       </p:sp>
     </p:spTree>
     <p:extLst>
       <p:ext uri="{BB962C8B-B14F-4D97-AF65-F5344CB8AC3E}">
-        <p14:creationId xmlns:p14="http://schemas.microsoft.com/office/powerpoint/2010/main" val="2671584075"/>
+        <p14:creationId xmlns:p14="http://schemas.microsoft.com/office/powerpoint/2010/main" val="3158119898"/>
       </p:ext>
     </p:extLst>
   </p:cSld>
@@ -14704,41 +15242,9 @@
           <a:chExt cx="0" cy="0"/>
         </a:xfrm>
       </p:grpSpPr>
-      <p:sp>
-        <p:nvSpPr>
-          <p:cNvPr id="2" name="Title 1"/>
-          <p:cNvSpPr>
-            <a:spLocks noGrp="1"/>
-          </p:cNvSpPr>
-          <p:nvPr>
-            <p:ph type="title"/>
-          </p:nvPr>
-        </p:nvSpPr>
-        <p:spPr>
-          <a:xfrm>
-            <a:off x="1168708" y="675829"/>
-            <a:ext cx="10229977" cy="500289"/>
-          </a:xfrm>
-        </p:spPr>
-        <p:txBody>
-          <a:bodyPr/>
-          <a:lstStyle/>
-          <a:p>
-            <a:r>
-              <a:rPr lang="en-US" b="1" dirty="0" smtClean="0">
-                <a:solidFill>
-                  <a:srgbClr val="8E1731"/>
-                </a:solidFill>
-              </a:rPr>
-              <a:t>What improvements can we make?</a:t>
-            </a:r>
-            <a:endParaRPr lang="en-US" dirty="0"/>
-          </a:p>
-        </p:txBody>
-      </p:sp>
       <p:pic>
         <p:nvPicPr>
-          <p:cNvPr id="6" name="Picture 5"/>
+          <p:cNvPr id="5" name="Picture 4"/>
           <p:cNvPicPr>
             <a:picLocks noChangeAspect="1"/>
           </p:cNvPicPr>
@@ -14752,8 +15258,8 @@
         </p:blipFill>
         <p:spPr>
           <a:xfrm>
-            <a:off x="1007416" y="2081149"/>
-            <a:ext cx="6047619" cy="3895238"/>
+            <a:off x="827697" y="2758733"/>
+            <a:ext cx="5133333" cy="3285714"/>
           </a:xfrm>
           <a:prstGeom prst="rect">
             <a:avLst/>
@@ -14762,76 +15268,91 @@
       </p:pic>
       <p:sp>
         <p:nvSpPr>
-          <p:cNvPr id="7" name="Rectangle 6"/>
-          <p:cNvSpPr/>
+          <p:cNvPr id="4" name="Content Placeholder 3"/>
+          <p:cNvSpPr>
+            <a:spLocks noGrp="1"/>
+          </p:cNvSpPr>
+          <p:nvPr>
+            <p:ph idx="1"/>
+          </p:nvPr>
+        </p:nvSpPr>
+        <p:spPr>
+          <a:xfrm>
+            <a:off x="609600" y="1446415"/>
+            <a:ext cx="10972800" cy="4277488"/>
+          </a:xfrm>
+        </p:spPr>
+        <p:txBody>
+          <a:bodyPr/>
+          <a:lstStyle/>
+          <a:p>
+            <a:r>
+              <a:rPr lang="en-US" dirty="0"/>
+              <a:t>Do not change chart design partway through – can be done accidentally by having unevenly spaced numbers as categories</a:t>
+            </a:r>
+            <a:r>
+              <a:rPr lang="en-US" dirty="0" smtClean="0"/>
+              <a:t>!</a:t>
+            </a:r>
+            <a:endParaRPr lang="en-US" dirty="0"/>
+          </a:p>
+        </p:txBody>
+      </p:sp>
+      <p:sp>
+        <p:nvSpPr>
+          <p:cNvPr id="2" name="Title 1"/>
+          <p:cNvSpPr>
+            <a:spLocks noGrp="1"/>
+          </p:cNvSpPr>
+          <p:nvPr>
+            <p:ph type="title"/>
+          </p:nvPr>
+        </p:nvSpPr>
+        <p:spPr/>
+        <p:txBody>
+          <a:bodyPr/>
+          <a:lstStyle/>
+          <a:p>
+            <a:r>
+              <a:rPr lang="en-US" b="1" dirty="0" smtClean="0">
+                <a:solidFill>
+                  <a:srgbClr val="8E1731"/>
+                </a:solidFill>
+              </a:rPr>
+              <a:t>Step 3: clear visuals</a:t>
+            </a:r>
+            <a:endParaRPr lang="en-US" dirty="0"/>
+          </a:p>
+        </p:txBody>
+      </p:sp>
+      <p:pic>
+        <p:nvPicPr>
+          <p:cNvPr id="3" name="Picture 2"/>
+          <p:cNvPicPr>
+            <a:picLocks noChangeAspect="1"/>
+          </p:cNvPicPr>
           <p:nvPr/>
-        </p:nvSpPr>
-        <p:spPr>
-          <a:xfrm>
-            <a:off x="7407057" y="2490031"/>
-            <a:ext cx="4129414" cy="1938992"/>
-          </a:xfrm>
-          <a:prstGeom prst="rect">
-            <a:avLst/>
-          </a:prstGeom>
-        </p:spPr>
-        <p:txBody>
-          <a:bodyPr wrap="square">
-            <a:spAutoFit/>
-          </a:bodyPr>
-          <a:lstStyle/>
-          <a:p>
-            <a:pPr marL="285750" indent="-285750">
-              <a:buFont typeface="Arial" panose="020B0604020202020204" pitchFamily="34" charset="0"/>
-              <a:buChar char="•"/>
-            </a:pPr>
-            <a:r>
-              <a:rPr lang="en-US" sz="2400" dirty="0" smtClean="0"/>
-              <a:t>Removed </a:t>
-            </a:r>
-            <a:r>
-              <a:rPr lang="en-US" sz="2400" dirty="0"/>
-              <a:t>area-cut relationship</a:t>
-            </a:r>
-          </a:p>
-          <a:p>
-            <a:pPr marL="285750" indent="-285750">
-              <a:buFont typeface="Arial" panose="020B0604020202020204" pitchFamily="34" charset="0"/>
-              <a:buChar char="•"/>
-            </a:pPr>
-            <a:r>
-              <a:rPr lang="en-US" sz="2400" dirty="0" smtClean="0"/>
-              <a:t>Show full range of data</a:t>
-            </a:r>
-          </a:p>
-          <a:p>
-            <a:pPr marL="285750" indent="-285750">
-              <a:buFont typeface="Arial" panose="020B0604020202020204" pitchFamily="34" charset="0"/>
-              <a:buChar char="•"/>
-            </a:pPr>
-            <a:r>
-              <a:rPr lang="en-US" sz="2400" dirty="0" smtClean="0"/>
-              <a:t>Units for y-axis</a:t>
-            </a:r>
-            <a:endParaRPr lang="en-US" sz="2400" dirty="0"/>
-          </a:p>
-          <a:p>
-            <a:pPr marL="285750" indent="-285750">
-              <a:buFont typeface="Arial" panose="020B0604020202020204" pitchFamily="34" charset="0"/>
-              <a:buChar char="•"/>
-            </a:pPr>
-            <a:r>
-              <a:rPr lang="en-US" sz="2400" dirty="0" smtClean="0"/>
-              <a:t>Labels not abbreviated</a:t>
-            </a:r>
-            <a:endParaRPr lang="en-US" sz="2400" dirty="0"/>
-          </a:p>
-        </p:txBody>
-      </p:sp>
+        </p:nvPicPr>
+        <p:blipFill>
+          <a:blip r:embed="rId3"/>
+          <a:stretch>
+            <a:fillRect/>
+          </a:stretch>
+        </p:blipFill>
+        <p:spPr>
+          <a:xfrm>
+            <a:off x="5928954" y="2758733"/>
+            <a:ext cx="5133333" cy="3285714"/>
+          </a:xfrm>
+          <a:prstGeom prst="rect">
+            <a:avLst/>
+          </a:prstGeom>
+        </p:spPr>
+      </p:pic>
     </p:spTree>
     <p:extLst>
       <p:ext uri="{BB962C8B-B14F-4D97-AF65-F5344CB8AC3E}">
-        <p14:creationId xmlns:p14="http://schemas.microsoft.com/office/powerpoint/2010/main" val="1203345857"/>
+        <p14:creationId xmlns:p14="http://schemas.microsoft.com/office/powerpoint/2010/main" val="4274842682"/>
       </p:ext>
     </p:extLst>
   </p:cSld>
@@ -14860,6 +15381,43 @@
       </p:grpSpPr>
       <p:sp>
         <p:nvSpPr>
+          <p:cNvPr id="4" name="Content Placeholder 3"/>
+          <p:cNvSpPr>
+            <a:spLocks noGrp="1"/>
+          </p:cNvSpPr>
+          <p:nvPr>
+            <p:ph idx="1"/>
+          </p:nvPr>
+        </p:nvSpPr>
+        <p:spPr/>
+        <p:txBody>
+          <a:bodyPr/>
+          <a:lstStyle/>
+          <a:p>
+            <a:r>
+              <a:rPr lang="en-US" dirty="0" smtClean="0"/>
+              <a:t>Meet </a:t>
+            </a:r>
+            <a:r>
+              <a:rPr lang="en-US" dirty="0"/>
+              <a:t>your goal – what is your question or hypothesis</a:t>
+            </a:r>
+            <a:r>
+              <a:rPr lang="en-US" dirty="0" smtClean="0"/>
+              <a:t>?</a:t>
+            </a:r>
+          </a:p>
+          <a:p>
+            <a:r>
+              <a:rPr lang="en-US" dirty="0" smtClean="0"/>
+              <a:t>“Here we demonstrate four diets affect chicken weight divergently over time.”</a:t>
+            </a:r>
+            <a:endParaRPr lang="en-US" dirty="0"/>
+          </a:p>
+        </p:txBody>
+      </p:sp>
+      <p:sp>
+        <p:nvSpPr>
           <p:cNvPr id="2" name="Title 1"/>
           <p:cNvSpPr>
             <a:spLocks noGrp="1"/>
@@ -14868,31 +15426,18 @@
             <p:ph type="title"/>
           </p:nvPr>
         </p:nvSpPr>
-        <p:spPr>
-          <a:xfrm>
-            <a:off x="1168708" y="675829"/>
-            <a:ext cx="10229977" cy="500289"/>
-          </a:xfrm>
-        </p:spPr>
+        <p:spPr/>
         <p:txBody>
           <a:bodyPr/>
           <a:lstStyle/>
           <a:p>
             <a:r>
-              <a:rPr lang="en-US" b="1" dirty="0">
+              <a:rPr lang="en-US" b="1" dirty="0" smtClean="0">
                 <a:solidFill>
                   <a:srgbClr val="8E1731"/>
                 </a:solidFill>
               </a:rPr>
-              <a:t>What </a:t>
-            </a:r>
-            <a:r>
-              <a:rPr lang="en-US" b="1" dirty="0" smtClean="0">
-                <a:solidFill>
-                  <a:srgbClr val="8E1731"/>
-                </a:solidFill>
-              </a:rPr>
-              <a:t>else could we improve?</a:t>
+              <a:t>Step 3: clear visuals</a:t>
             </a:r>
             <a:endParaRPr lang="en-US" dirty="0"/>
           </a:p>
@@ -14900,7 +15445,7 @@
       </p:sp>
       <p:pic>
         <p:nvPicPr>
-          <p:cNvPr id="6" name="Picture 5"/>
+          <p:cNvPr id="5" name="Picture 4"/>
           <p:cNvPicPr>
             <a:picLocks noChangeAspect="1"/>
           </p:cNvPicPr>
@@ -14914,87 +15459,18 @@
         </p:blipFill>
         <p:spPr>
           <a:xfrm>
-            <a:off x="1007416" y="2081149"/>
-            <a:ext cx="6047619" cy="3895238"/>
+            <a:off x="3146947" y="3174369"/>
+            <a:ext cx="5133333" cy="3285714"/>
           </a:xfrm>
           <a:prstGeom prst="rect">
             <a:avLst/>
           </a:prstGeom>
         </p:spPr>
       </p:pic>
-      <p:sp>
-        <p:nvSpPr>
-          <p:cNvPr id="5" name="Rectangle 4"/>
-          <p:cNvSpPr/>
-          <p:nvPr/>
-        </p:nvSpPr>
-        <p:spPr>
-          <a:xfrm>
-            <a:off x="7055035" y="1615859"/>
-            <a:ext cx="4343650" cy="4154984"/>
-          </a:xfrm>
-          <a:prstGeom prst="rect">
-            <a:avLst/>
-          </a:prstGeom>
-        </p:spPr>
-        <p:txBody>
-          <a:bodyPr wrap="square">
-            <a:spAutoFit/>
-          </a:bodyPr>
-          <a:lstStyle/>
-          <a:p>
-            <a:pPr marL="285750" indent="-285750">
-              <a:buFont typeface="Arial" panose="020B0604020202020204" pitchFamily="34" charset="0"/>
-              <a:buChar char="•"/>
-            </a:pPr>
-            <a:r>
-              <a:rPr lang="en-US" sz="2400" dirty="0" smtClean="0"/>
-              <a:t>Decide if data density in interior is acceptable</a:t>
-            </a:r>
-          </a:p>
-          <a:p>
-            <a:pPr marL="285750" indent="-285750">
-              <a:buFont typeface="Arial" panose="020B0604020202020204" pitchFamily="34" charset="0"/>
-              <a:buChar char="•"/>
-            </a:pPr>
-            <a:r>
-              <a:rPr lang="en-US" sz="2400" dirty="0" smtClean="0"/>
-              <a:t>Make “fair” easier to see from a distance (darker color)</a:t>
-            </a:r>
-          </a:p>
-          <a:p>
-            <a:pPr marL="285750" indent="-285750">
-              <a:buFont typeface="Arial" panose="020B0604020202020204" pitchFamily="34" charset="0"/>
-              <a:buChar char="•"/>
-            </a:pPr>
-            <a:r>
-              <a:rPr lang="en-US" sz="2400" dirty="0" smtClean="0"/>
-              <a:t>Make all points easier to see from a distance (larger size)</a:t>
-            </a:r>
-          </a:p>
-          <a:p>
-            <a:pPr marL="285750" indent="-285750">
-              <a:buFont typeface="Arial" panose="020B0604020202020204" pitchFamily="34" charset="0"/>
-              <a:buChar char="•"/>
-            </a:pPr>
-            <a:r>
-              <a:rPr lang="en-US" sz="2400" dirty="0" smtClean="0"/>
-              <a:t>Consider goal – do we need all cut categories?  Do we need a summary instead?</a:t>
-            </a:r>
-          </a:p>
-          <a:p>
-            <a:pPr marL="285750" indent="-285750">
-              <a:buFont typeface="Arial" panose="020B0604020202020204" pitchFamily="34" charset="0"/>
-              <a:buChar char="•"/>
-            </a:pPr>
-            <a:endParaRPr lang="en-US" sz="2400" dirty="0" smtClean="0"/>
-          </a:p>
-        </p:txBody>
-      </p:sp>
     </p:spTree>
     <p:extLst>
       <p:ext uri="{BB962C8B-B14F-4D97-AF65-F5344CB8AC3E}">
-        <p14:creationId xmlns:p14="http://schemas.microsoft.com/office/powerpoint/2010/main" val="871147982"/>
+        <p14:creationId xmlns:p14="http://schemas.microsoft.com/office/powerpoint/2010/main" val="4152606566"/>
       </p:ext>
     </p:extLst>
   </p:cSld>
@@ -15023,7 +15499,7 @@
       </p:grpSpPr>
       <p:sp>
         <p:nvSpPr>
-          <p:cNvPr id="2" name="Content Placeholder 1"/>
+          <p:cNvPr id="4" name="Content Placeholder 3"/>
           <p:cNvSpPr>
             <a:spLocks noGrp="1"/>
           </p:cNvSpPr>
@@ -15031,48 +15507,36 @@
             <p:ph idx="1"/>
           </p:nvPr>
         </p:nvSpPr>
-        <p:spPr>
-          <a:xfrm>
-            <a:off x="609600" y="1600201"/>
-            <a:ext cx="10744200" cy="4123702"/>
-          </a:xfrm>
-        </p:spPr>
-        <p:txBody>
-          <a:bodyPr>
-            <a:normAutofit/>
-          </a:bodyPr>
+        <p:spPr/>
+        <p:txBody>
+          <a:bodyPr/>
           <a:lstStyle/>
           <a:p>
             <a:r>
               <a:rPr lang="en-US" dirty="0" smtClean="0"/>
-              <a:t>We’ve made our visualization clear and effective to get our </a:t>
+              <a:t>Meet </a:t>
+            </a:r>
+            <a:r>
+              <a:rPr lang="en-US" dirty="0"/>
+              <a:t>your goal – what is your question or hypothesis</a:t>
             </a:r>
             <a:r>
               <a:rPr lang="en-US" dirty="0" smtClean="0"/>
-              <a:t>result </a:t>
-            </a:r>
+              <a:t>?</a:t>
+            </a:r>
+          </a:p>
+          <a:p>
             <a:r>
               <a:rPr lang="en-US" dirty="0" smtClean="0"/>
-              <a:t>to the viewer</a:t>
-            </a:r>
-          </a:p>
-          <a:p>
-            <a:r>
-              <a:rPr lang="en-US" dirty="0" smtClean="0"/>
-              <a:t>Next, resources to learn more</a:t>
-            </a:r>
-          </a:p>
-        </p:txBody>
-      </p:sp>
-      <p:sp>
-        <p:nvSpPr>
-          <p:cNvPr id="10" name="Title 9">
-            <a:extLst>
-              <a:ext uri="{FF2B5EF4-FFF2-40B4-BE49-F238E27FC236}">
-                <a16:creationId xmlns:a16="http://schemas.microsoft.com/office/drawing/2014/main" id="{FFFB4824-2F2C-0B4E-8B65-C35C93FB68FF}"/>
-              </a:ext>
-            </a:extLst>
-          </p:cNvPr>
+              <a:t>“Here we demonstrate four diets affect chicken weight divergently over time.”</a:t>
+            </a:r>
+            <a:endParaRPr lang="en-US" dirty="0"/>
+          </a:p>
+        </p:txBody>
+      </p:sp>
+      <p:sp>
+        <p:nvSpPr>
+          <p:cNvPr id="2" name="Title 1"/>
           <p:cNvSpPr>
             <a:spLocks noGrp="1"/>
           </p:cNvSpPr>
@@ -15080,15 +15544,7 @@
             <p:ph type="title"/>
           </p:nvPr>
         </p:nvSpPr>
-        <p:spPr>
-          <a:xfrm>
-            <a:off x="1168708" y="675829"/>
-            <a:ext cx="9478415" cy="500289"/>
-          </a:xfrm>
-          <a:prstGeom prst="rect">
-            <a:avLst/>
-          </a:prstGeom>
-        </p:spPr>
+        <p:spPr/>
         <p:txBody>
           <a:bodyPr/>
           <a:lstStyle/>
@@ -15099,63 +15555,40 @@
                   <a:srgbClr val="8E1731"/>
                 </a:solidFill>
               </a:rPr>
-              <a:t>Step 3 summary</a:t>
-            </a:r>
-            <a:endParaRPr lang="en-US" b="1" dirty="0">
-              <a:solidFill>
-                <a:srgbClr val="8E1731"/>
-              </a:solidFill>
-            </a:endParaRPr>
-          </a:p>
-        </p:txBody>
-      </p:sp>
-      <p:sp>
-        <p:nvSpPr>
-          <p:cNvPr id="6" name="Title 1"/>
-          <p:cNvSpPr txBox="1">
-            <a:spLocks/>
-          </p:cNvSpPr>
+              <a:t>Step 3: clear visuals</a:t>
+            </a:r>
+            <a:endParaRPr lang="en-US" dirty="0"/>
+          </a:p>
+        </p:txBody>
+      </p:sp>
+      <p:pic>
+        <p:nvPicPr>
+          <p:cNvPr id="6" name="Picture 5"/>
+          <p:cNvPicPr>
+            <a:picLocks noChangeAspect="1"/>
+          </p:cNvPicPr>
           <p:nvPr/>
-        </p:nvSpPr>
-        <p:spPr>
-          <a:xfrm>
-            <a:off x="838200" y="365125"/>
-            <a:ext cx="10515600" cy="1325563"/>
-          </a:xfrm>
-          <a:prstGeom prst="rect">
-            <a:avLst/>
-          </a:prstGeom>
-        </p:spPr>
-        <p:txBody>
-          <a:bodyPr/>
-          <a:lstStyle>
-            <a:lvl1pPr algn="l" defTabSz="914400" rtl="0" eaLnBrk="1" latinLnBrk="0" hangingPunct="1">
-              <a:lnSpc>
-                <a:spcPct val="90000"/>
-              </a:lnSpc>
-              <a:spcBef>
-                <a:spcPct val="0"/>
-              </a:spcBef>
-              <a:buNone/>
-              <a:defRPr sz="3600" kern="1200">
-                <a:solidFill>
-                  <a:schemeClr val="tx1"/>
-                </a:solidFill>
-                <a:latin typeface="+mj-lt"/>
-                <a:ea typeface="+mj-ea"/>
-                <a:cs typeface="+mj-cs"/>
-              </a:defRPr>
-            </a:lvl1pPr>
-          </a:lstStyle>
-          <a:p>
-            <a:endParaRPr lang="en-US" dirty="0"/>
-          </a:p>
-        </p:txBody>
-      </p:sp>
+        </p:nvPicPr>
+        <p:blipFill>
+          <a:blip r:embed="rId2"/>
+          <a:stretch>
+            <a:fillRect/>
+          </a:stretch>
+        </p:blipFill>
+        <p:spPr>
+          <a:xfrm>
+            <a:off x="3122009" y="3332310"/>
+            <a:ext cx="5133333" cy="3285714"/>
+          </a:xfrm>
+          <a:prstGeom prst="rect">
+            <a:avLst/>
+          </a:prstGeom>
+        </p:spPr>
+      </p:pic>
     </p:spTree>
     <p:extLst>
       <p:ext uri="{BB962C8B-B14F-4D97-AF65-F5344CB8AC3E}">
-        <p14:creationId xmlns:p14="http://schemas.microsoft.com/office/powerpoint/2010/main" val="1615217877"/>
+        <p14:creationId xmlns:p14="http://schemas.microsoft.com/office/powerpoint/2010/main" val="1779855684"/>
       </p:ext>
     </p:extLst>
   </p:cSld>
@@ -15184,184 +15617,7 @@
       </p:grpSpPr>
       <p:sp>
         <p:nvSpPr>
-          <p:cNvPr id="4" name="Content Placeholder 3"/>
-          <p:cNvSpPr>
-            <a:spLocks noGrp="1"/>
-          </p:cNvSpPr>
-          <p:nvPr>
-            <p:ph idx="10"/>
-          </p:nvPr>
-        </p:nvSpPr>
-        <p:spPr>
-          <a:xfrm>
-            <a:off x="150313" y="1465545"/>
-            <a:ext cx="11774465" cy="4659682"/>
-          </a:xfrm>
-        </p:spPr>
-        <p:txBody>
-          <a:bodyPr>
-            <a:normAutofit fontScale="92500" lnSpcReduction="10000"/>
-          </a:bodyPr>
-          <a:lstStyle/>
-          <a:p>
-            <a:pPr marL="0" indent="0" algn="ctr">
-              <a:buNone/>
-            </a:pPr>
-            <a:r>
-              <a:rPr lang="en-US" sz="2800" dirty="0" smtClean="0"/>
-              <a:t>Digital Skills Hub Calendar</a:t>
-            </a:r>
-            <a:br>
-              <a:rPr lang="en-US" sz="2800" dirty="0" smtClean="0"/>
-            </a:br>
-            <a:r>
-              <a:rPr lang="en-US" sz="2800" dirty="0" smtClean="0">
-                <a:hlinkClick r:id="rId2"/>
-              </a:rPr>
-              <a:t>https://calendar.ou.edu/dsh</a:t>
-            </a:r>
-            <a:endParaRPr lang="en-US" sz="2800" dirty="0" smtClean="0"/>
-          </a:p>
-          <a:p>
-            <a:pPr marL="0" indent="0" algn="ctr">
-              <a:buNone/>
-            </a:pPr>
-            <a:r>
-              <a:rPr lang="en-US" sz="2800" dirty="0" smtClean="0"/>
-              <a:t>Carpentries workshops</a:t>
-            </a:r>
-            <a:br>
-              <a:rPr lang="en-US" sz="2800" dirty="0" smtClean="0"/>
-            </a:br>
-            <a:r>
-              <a:rPr lang="en-US" sz="2800" dirty="0" smtClean="0">
-                <a:hlinkClick r:id="rId3"/>
-              </a:rPr>
-              <a:t>https</a:t>
-            </a:r>
-            <a:r>
-              <a:rPr lang="en-US" sz="2800" dirty="0">
-                <a:hlinkClick r:id="rId3"/>
-              </a:rPr>
-              <a:t>://</a:t>
-            </a:r>
-            <a:r>
-              <a:rPr lang="en-US" sz="2800" dirty="0" smtClean="0">
-                <a:hlinkClick r:id="rId3"/>
-              </a:rPr>
-              <a:t>libraries.ou.edu/carpentries</a:t>
-            </a:r>
-            <a:endParaRPr lang="en-US" sz="2800" dirty="0"/>
-          </a:p>
-          <a:p>
-            <a:pPr marL="0" indent="0" algn="ctr">
-              <a:buNone/>
-            </a:pPr>
-            <a:r>
-              <a:rPr lang="en-US" sz="2800" dirty="0" smtClean="0"/>
-              <a:t>Information Specialists @ DAVIS</a:t>
-            </a:r>
-            <a:br>
-              <a:rPr lang="en-US" sz="2800" dirty="0" smtClean="0"/>
-            </a:br>
-            <a:r>
-              <a:rPr lang="en-US" sz="2800" dirty="0" smtClean="0">
-                <a:hlinkClick r:id="rId4"/>
-              </a:rPr>
-              <a:t>https://libraries.ou.edu/davis</a:t>
-            </a:r>
-            <a:endParaRPr lang="en-US" sz="2800" dirty="0" smtClean="0"/>
-          </a:p>
-          <a:p>
-            <a:endParaRPr lang="en-US" sz="2800" dirty="0" smtClean="0"/>
-          </a:p>
-          <a:p>
-            <a:pPr marL="0" indent="0" algn="ctr">
-              <a:buNone/>
-            </a:pPr>
-            <a:r>
-              <a:rPr lang="en-US" sz="2800" dirty="0" smtClean="0"/>
-              <a:t>Read </a:t>
-            </a:r>
-            <a:r>
-              <a:rPr lang="en-US" sz="2800" dirty="0" err="1"/>
-              <a:t>Tufte’s</a:t>
-            </a:r>
-            <a:r>
-              <a:rPr lang="en-US" sz="2800" dirty="0"/>
-              <a:t> </a:t>
-            </a:r>
-            <a:r>
-              <a:rPr lang="en-US" sz="2800" i="1" dirty="0"/>
-              <a:t>The Visual Display of Quantitative </a:t>
-            </a:r>
-            <a:r>
-              <a:rPr lang="en-US" sz="2800" i="1" dirty="0" smtClean="0"/>
-              <a:t>Information</a:t>
-            </a:r>
-            <a:br>
-              <a:rPr lang="en-US" sz="2800" i="1" dirty="0" smtClean="0"/>
-            </a:br>
-            <a:r>
-              <a:rPr lang="en-US" sz="2800" dirty="0" smtClean="0"/>
-              <a:t>on </a:t>
-            </a:r>
-            <a:r>
-              <a:rPr lang="en-US" sz="2800" dirty="0"/>
-              <a:t>Reserves at Circulation Desk (4 hour checkout</a:t>
-            </a:r>
-            <a:r>
-              <a:rPr lang="en-US" sz="2800" dirty="0" smtClean="0"/>
-              <a:t>)</a:t>
-            </a:r>
-          </a:p>
-          <a:p>
-            <a:pPr marL="0" indent="0" algn="ctr">
-              <a:buNone/>
-            </a:pPr>
-            <a:endParaRPr lang="en-US" sz="2800" dirty="0" smtClean="0"/>
-          </a:p>
-          <a:p>
-            <a:pPr marL="0" indent="0" algn="ctr">
-              <a:buNone/>
-            </a:pPr>
-            <a:r>
-              <a:rPr lang="en-US" sz="2800" dirty="0" smtClean="0"/>
-              <a:t>This slide deck available on our curriculum archive </a:t>
-            </a:r>
-            <a:r>
-              <a:rPr lang="en-US" sz="2800" dirty="0"/>
-              <a:t>at </a:t>
-            </a:r>
-            <a:r>
-              <a:rPr lang="en-US" sz="2800" dirty="0">
-                <a:hlinkClick r:id="rId5"/>
-              </a:rPr>
-              <a:t>https://osf.io/a9yt5</a:t>
-            </a:r>
-            <a:r>
-              <a:rPr lang="en-US" sz="2800" dirty="0" smtClean="0">
-                <a:hlinkClick r:id="rId5"/>
-              </a:rPr>
-              <a:t>/</a:t>
-            </a:r>
-            <a:r>
-              <a:rPr lang="en-US" sz="2800" dirty="0" smtClean="0"/>
-              <a:t> </a:t>
-            </a:r>
-            <a:endParaRPr lang="en-US" sz="2800" dirty="0"/>
-          </a:p>
-        </p:txBody>
-      </p:sp>
-      <p:sp>
-        <p:nvSpPr>
-          <p:cNvPr id="2" name="Title 1">
-            <a:extLst>
-              <a:ext uri="{FF2B5EF4-FFF2-40B4-BE49-F238E27FC236}">
-                <a16:creationId xmlns:a16="http://schemas.microsoft.com/office/drawing/2014/main" id="{D313C71A-5F8A-5C4C-B19D-A92B8ED34A75}"/>
-              </a:ext>
-            </a:extLst>
-          </p:cNvPr>
+          <p:cNvPr id="2" name="Title 1"/>
           <p:cNvSpPr>
             <a:spLocks noGrp="1"/>
           </p:cNvSpPr>
@@ -15372,434 +15628,61 @@
         <p:spPr>
           <a:xfrm>
             <a:off x="1168708" y="675829"/>
-            <a:ext cx="9916826" cy="500289"/>
-          </a:xfrm>
-          <a:prstGeom prst="rect">
-            <a:avLst/>
-          </a:prstGeom>
+            <a:ext cx="10229977" cy="500289"/>
+          </a:xfrm>
         </p:spPr>
         <p:txBody>
           <a:bodyPr/>
           <a:lstStyle/>
           <a:p>
             <a:r>
+              <a:rPr lang="en-US" b="1" dirty="0">
+                <a:solidFill>
+                  <a:srgbClr val="8E1731"/>
+                </a:solidFill>
+              </a:rPr>
+              <a:t>What is </a:t>
+            </a:r>
+            <a:r>
               <a:rPr lang="en-US" b="1" dirty="0" smtClean="0">
                 <a:solidFill>
                   <a:srgbClr val="8E1731"/>
                 </a:solidFill>
               </a:rPr>
-              <a:t>Step 4: get help and learn more</a:t>
-            </a:r>
-            <a:endParaRPr lang="en-US" b="1" dirty="0">
-              <a:solidFill>
-                <a:srgbClr val="8E1731"/>
-              </a:solidFill>
-            </a:endParaRPr>
-          </a:p>
-        </p:txBody>
-      </p:sp>
-      <p:sp>
-        <p:nvSpPr>
-          <p:cNvPr id="5" name="Content Placeholder 3"/>
-          <p:cNvSpPr txBox="1">
-            <a:spLocks/>
-          </p:cNvSpPr>
+              <a:t>clear or misleading about this?</a:t>
+            </a:r>
+            <a:endParaRPr lang="en-US" dirty="0"/>
+          </a:p>
+        </p:txBody>
+      </p:sp>
+      <p:pic>
+        <p:nvPicPr>
+          <p:cNvPr id="3" name="Picture 2"/>
+          <p:cNvPicPr>
+            <a:picLocks noChangeAspect="1"/>
+          </p:cNvPicPr>
           <p:nvPr/>
-        </p:nvSpPr>
-        <p:spPr>
-          <a:xfrm>
-            <a:off x="358815" y="4912304"/>
-            <a:ext cx="10964713" cy="3891391"/>
-          </a:xfrm>
-          <a:prstGeom prst="rect">
-            <a:avLst/>
-          </a:prstGeom>
-        </p:spPr>
-        <p:txBody>
-          <a:bodyPr>
-            <a:normAutofit/>
-          </a:bodyPr>
-          <a:lstStyle>
-            <a:lvl1pPr marL="257162" indent="-257162" algn="l" defTabSz="914400" rtl="0" eaLnBrk="1" latinLnBrk="0" hangingPunct="1">
-              <a:lnSpc>
-                <a:spcPct val="90000"/>
-              </a:lnSpc>
-              <a:spcBef>
-                <a:spcPts val="1000"/>
-              </a:spcBef>
-              <a:buClr>
-                <a:srgbClr val="8E1731"/>
-              </a:buClr>
-              <a:buFont typeface="Wingdings" panose="05000000000000000000" pitchFamily="2" charset="2"/>
-              <a:buChar char="§"/>
-              <a:defRPr lang="en-US" sz="3200" kern="1200" dirty="0" smtClean="0">
-                <a:solidFill>
-                  <a:schemeClr val="tx1"/>
-                </a:solidFill>
-                <a:latin typeface="Arial" panose="020B0604020202020204" pitchFamily="34" charset="0"/>
-                <a:ea typeface="+mn-ea"/>
-                <a:cs typeface="Arial" panose="020B0604020202020204" pitchFamily="34" charset="0"/>
-              </a:defRPr>
-            </a:lvl1pPr>
-            <a:lvl2pPr marL="557185" indent="-214303" algn="l" defTabSz="914400" rtl="0" eaLnBrk="1" latinLnBrk="0" hangingPunct="1">
-              <a:lnSpc>
-                <a:spcPct val="90000"/>
-              </a:lnSpc>
-              <a:spcBef>
-                <a:spcPts val="500"/>
-              </a:spcBef>
-              <a:buClrTx/>
-              <a:buFont typeface="Arial" panose="020B0604020202020204" pitchFamily="34" charset="0"/>
-              <a:buChar char="•"/>
-              <a:defRPr lang="en-US" sz="3200" kern="1200" dirty="0" smtClean="0">
-                <a:solidFill>
-                  <a:schemeClr val="tx1"/>
-                </a:solidFill>
-                <a:latin typeface="Arial" panose="020B0604020202020204" pitchFamily="34" charset="0"/>
-                <a:ea typeface="+mn-ea"/>
-                <a:cs typeface="Arial" panose="020B0604020202020204" pitchFamily="34" charset="0"/>
-              </a:defRPr>
-            </a:lvl2pPr>
-            <a:lvl3pPr marL="857208" indent="-171442" algn="l" defTabSz="914400" rtl="0" eaLnBrk="1" latinLnBrk="0" hangingPunct="1">
-              <a:lnSpc>
-                <a:spcPct val="90000"/>
-              </a:lnSpc>
-              <a:spcBef>
-                <a:spcPts val="500"/>
-              </a:spcBef>
-              <a:buClrTx/>
-              <a:buSzPct val="60000"/>
-              <a:buFont typeface="Courier New" panose="02070309020205020404" pitchFamily="49" charset="0"/>
-              <a:buChar char="o"/>
-              <a:defRPr lang="en-US" sz="3200" kern="1200" dirty="0" smtClean="0">
-                <a:solidFill>
-                  <a:schemeClr val="tx1"/>
-                </a:solidFill>
-                <a:latin typeface="Arial" panose="020B0604020202020204" pitchFamily="34" charset="0"/>
-                <a:ea typeface="+mn-ea"/>
-                <a:cs typeface="Arial" panose="020B0604020202020204" pitchFamily="34" charset="0"/>
-              </a:defRPr>
-            </a:lvl3pPr>
-            <a:lvl4pPr marL="1200091" indent="-171442" algn="l" defTabSz="914400" rtl="0" eaLnBrk="1" latinLnBrk="0" hangingPunct="1">
-              <a:lnSpc>
-                <a:spcPct val="90000"/>
-              </a:lnSpc>
-              <a:spcBef>
-                <a:spcPts val="500"/>
-              </a:spcBef>
-              <a:buClrTx/>
-              <a:buFont typeface="Arial" panose="020B0604020202020204" pitchFamily="34" charset="0"/>
-              <a:buChar char="•"/>
-              <a:defRPr lang="en-US" sz="3200" kern="1200" dirty="0" smtClean="0">
-                <a:solidFill>
-                  <a:schemeClr val="tx1"/>
-                </a:solidFill>
-                <a:latin typeface="Arial" panose="020B0604020202020204" pitchFamily="34" charset="0"/>
-                <a:ea typeface="+mn-ea"/>
-                <a:cs typeface="Arial" panose="020B0604020202020204" pitchFamily="34" charset="0"/>
-              </a:defRPr>
-            </a:lvl4pPr>
-            <a:lvl5pPr marL="1542973" indent="-171442" algn="l" defTabSz="914400" rtl="0" eaLnBrk="1" latinLnBrk="0" hangingPunct="1">
-              <a:lnSpc>
-                <a:spcPct val="90000"/>
-              </a:lnSpc>
-              <a:spcBef>
-                <a:spcPts val="500"/>
-              </a:spcBef>
-              <a:buClrTx/>
-              <a:buSzPct val="35000"/>
-              <a:buFont typeface="Courier New" panose="02070309020205020404" pitchFamily="49" charset="0"/>
-              <a:buChar char="o"/>
-              <a:defRPr lang="en-US" sz="3200" kern="1200" dirty="0">
-                <a:solidFill>
-                  <a:schemeClr val="tx1"/>
-                </a:solidFill>
-                <a:latin typeface="Arial" panose="020B0604020202020204" pitchFamily="34" charset="0"/>
-                <a:ea typeface="+mn-ea"/>
-                <a:cs typeface="Arial" panose="020B0604020202020204" pitchFamily="34" charset="0"/>
-              </a:defRPr>
-            </a:lvl5pPr>
-            <a:lvl6pPr marL="2514600" indent="-228600" algn="l" defTabSz="914400" rtl="0" eaLnBrk="1" latinLnBrk="0" hangingPunct="1">
-              <a:lnSpc>
-                <a:spcPct val="90000"/>
-              </a:lnSpc>
-              <a:spcBef>
-                <a:spcPts val="500"/>
-              </a:spcBef>
-              <a:buFont typeface="Arial" panose="020B0604020202020204" pitchFamily="34" charset="0"/>
-              <a:buChar char="•"/>
-              <a:defRPr sz="1800" kern="1200">
-                <a:solidFill>
-                  <a:schemeClr val="tx1"/>
-                </a:solidFill>
-                <a:latin typeface="+mn-lt"/>
-                <a:ea typeface="+mn-ea"/>
-                <a:cs typeface="+mn-cs"/>
-              </a:defRPr>
-            </a:lvl6pPr>
-            <a:lvl7pPr marL="2971800" indent="-228600" algn="l" defTabSz="914400" rtl="0" eaLnBrk="1" latinLnBrk="0" hangingPunct="1">
-              <a:lnSpc>
-                <a:spcPct val="90000"/>
-              </a:lnSpc>
-              <a:spcBef>
-                <a:spcPts val="500"/>
-              </a:spcBef>
-              <a:buFont typeface="Arial" panose="020B0604020202020204" pitchFamily="34" charset="0"/>
-              <a:buChar char="•"/>
-              <a:defRPr sz="1800" kern="1200">
-                <a:solidFill>
-                  <a:schemeClr val="tx1"/>
-                </a:solidFill>
-                <a:latin typeface="+mn-lt"/>
-                <a:ea typeface="+mn-ea"/>
-                <a:cs typeface="+mn-cs"/>
-              </a:defRPr>
-            </a:lvl7pPr>
-            <a:lvl8pPr marL="3429000" indent="-228600" algn="l" defTabSz="914400" rtl="0" eaLnBrk="1" latinLnBrk="0" hangingPunct="1">
-              <a:lnSpc>
-                <a:spcPct val="90000"/>
-              </a:lnSpc>
-              <a:spcBef>
-                <a:spcPts val="500"/>
-              </a:spcBef>
-              <a:buFont typeface="Arial" panose="020B0604020202020204" pitchFamily="34" charset="0"/>
-              <a:buChar char="•"/>
-              <a:defRPr sz="1800" kern="1200">
-                <a:solidFill>
-                  <a:schemeClr val="tx1"/>
-                </a:solidFill>
-                <a:latin typeface="+mn-lt"/>
-                <a:ea typeface="+mn-ea"/>
-                <a:cs typeface="+mn-cs"/>
-              </a:defRPr>
-            </a:lvl8pPr>
-            <a:lvl9pPr marL="3886200" indent="-228600" algn="l" defTabSz="914400" rtl="0" eaLnBrk="1" latinLnBrk="0" hangingPunct="1">
-              <a:lnSpc>
-                <a:spcPct val="90000"/>
-              </a:lnSpc>
-              <a:spcBef>
-                <a:spcPts val="500"/>
-              </a:spcBef>
-              <a:buFont typeface="Arial" panose="020B0604020202020204" pitchFamily="34" charset="0"/>
-              <a:buChar char="•"/>
-              <a:defRPr sz="1800" kern="1200">
-                <a:solidFill>
-                  <a:schemeClr val="tx1"/>
-                </a:solidFill>
-                <a:latin typeface="+mn-lt"/>
-                <a:ea typeface="+mn-ea"/>
-                <a:cs typeface="+mn-cs"/>
-              </a:defRPr>
-            </a:lvl9pPr>
-          </a:lstStyle>
-          <a:p>
-            <a:endParaRPr lang="en-US" sz="2800" dirty="0"/>
-          </a:p>
-        </p:txBody>
-      </p:sp>
-      <p:sp>
-        <p:nvSpPr>
-          <p:cNvPr id="7" name="Content Placeholder 5"/>
-          <p:cNvSpPr txBox="1">
-            <a:spLocks/>
-          </p:cNvSpPr>
-          <p:nvPr/>
-        </p:nvSpPr>
-        <p:spPr>
-          <a:xfrm>
-            <a:off x="6616910" y="1979111"/>
-            <a:ext cx="4806827" cy="3778657"/>
-          </a:xfrm>
-          <a:prstGeom prst="rect">
-            <a:avLst/>
-          </a:prstGeom>
-        </p:spPr>
-        <p:txBody>
-          <a:bodyPr>
-            <a:noAutofit/>
-          </a:bodyPr>
-          <a:lstStyle>
-            <a:lvl1pPr marL="257162" indent="-257162" algn="l" defTabSz="914400" rtl="0" eaLnBrk="1" latinLnBrk="0" hangingPunct="1">
-              <a:lnSpc>
-                <a:spcPct val="90000"/>
-              </a:lnSpc>
-              <a:spcBef>
-                <a:spcPts val="1000"/>
-              </a:spcBef>
-              <a:buClr>
-                <a:srgbClr val="8E1731"/>
-              </a:buClr>
-              <a:buFont typeface="Wingdings" panose="05000000000000000000" pitchFamily="2" charset="2"/>
-              <a:buChar char="§"/>
-              <a:defRPr lang="en-US" sz="3200" kern="1200" dirty="0" smtClean="0">
-                <a:solidFill>
-                  <a:schemeClr val="tx1"/>
-                </a:solidFill>
-                <a:latin typeface="Arial" panose="020B0604020202020204" pitchFamily="34" charset="0"/>
-                <a:ea typeface="+mn-ea"/>
-                <a:cs typeface="Arial" panose="020B0604020202020204" pitchFamily="34" charset="0"/>
-              </a:defRPr>
-            </a:lvl1pPr>
-            <a:lvl2pPr marL="557185" indent="-214303" algn="l" defTabSz="914400" rtl="0" eaLnBrk="1" latinLnBrk="0" hangingPunct="1">
-              <a:lnSpc>
-                <a:spcPct val="90000"/>
-              </a:lnSpc>
-              <a:spcBef>
-                <a:spcPts val="500"/>
-              </a:spcBef>
-              <a:buClrTx/>
-              <a:buFont typeface="Arial" panose="020B0604020202020204" pitchFamily="34" charset="0"/>
-              <a:buChar char="•"/>
-              <a:defRPr lang="en-US" sz="3200" kern="1200" dirty="0" smtClean="0">
-                <a:solidFill>
-                  <a:schemeClr val="tx1"/>
-                </a:solidFill>
-                <a:latin typeface="Arial" panose="020B0604020202020204" pitchFamily="34" charset="0"/>
-                <a:ea typeface="+mn-ea"/>
-                <a:cs typeface="Arial" panose="020B0604020202020204" pitchFamily="34" charset="0"/>
-              </a:defRPr>
-            </a:lvl2pPr>
-            <a:lvl3pPr marL="857208" indent="-171442" algn="l" defTabSz="914400" rtl="0" eaLnBrk="1" latinLnBrk="0" hangingPunct="1">
-              <a:lnSpc>
-                <a:spcPct val="90000"/>
-              </a:lnSpc>
-              <a:spcBef>
-                <a:spcPts val="500"/>
-              </a:spcBef>
-              <a:buClrTx/>
-              <a:buSzPct val="60000"/>
-              <a:buFont typeface="Courier New" panose="02070309020205020404" pitchFamily="49" charset="0"/>
-              <a:buChar char="o"/>
-              <a:defRPr lang="en-US" sz="3200" kern="1200" dirty="0" smtClean="0">
-                <a:solidFill>
-                  <a:schemeClr val="tx1"/>
-                </a:solidFill>
-                <a:latin typeface="Arial" panose="020B0604020202020204" pitchFamily="34" charset="0"/>
-                <a:ea typeface="+mn-ea"/>
-                <a:cs typeface="Arial" panose="020B0604020202020204" pitchFamily="34" charset="0"/>
-              </a:defRPr>
-            </a:lvl3pPr>
-            <a:lvl4pPr marL="1200091" indent="-171442" algn="l" defTabSz="914400" rtl="0" eaLnBrk="1" latinLnBrk="0" hangingPunct="1">
-              <a:lnSpc>
-                <a:spcPct val="90000"/>
-              </a:lnSpc>
-              <a:spcBef>
-                <a:spcPts val="500"/>
-              </a:spcBef>
-              <a:buClrTx/>
-              <a:buFont typeface="Arial" panose="020B0604020202020204" pitchFamily="34" charset="0"/>
-              <a:buChar char="•"/>
-              <a:defRPr lang="en-US" sz="3200" kern="1200" dirty="0" smtClean="0">
-                <a:solidFill>
-                  <a:schemeClr val="tx1"/>
-                </a:solidFill>
-                <a:latin typeface="Arial" panose="020B0604020202020204" pitchFamily="34" charset="0"/>
-                <a:ea typeface="+mn-ea"/>
-                <a:cs typeface="Arial" panose="020B0604020202020204" pitchFamily="34" charset="0"/>
-              </a:defRPr>
-            </a:lvl4pPr>
-            <a:lvl5pPr marL="1542973" indent="-171442" algn="l" defTabSz="914400" rtl="0" eaLnBrk="1" latinLnBrk="0" hangingPunct="1">
-              <a:lnSpc>
-                <a:spcPct val="90000"/>
-              </a:lnSpc>
-              <a:spcBef>
-                <a:spcPts val="500"/>
-              </a:spcBef>
-              <a:buClrTx/>
-              <a:buSzPct val="35000"/>
-              <a:buFont typeface="Courier New" panose="02070309020205020404" pitchFamily="49" charset="0"/>
-              <a:buChar char="o"/>
-              <a:defRPr lang="en-US" sz="3200" kern="1200" dirty="0">
-                <a:solidFill>
-                  <a:schemeClr val="tx1"/>
-                </a:solidFill>
-                <a:latin typeface="Arial" panose="020B0604020202020204" pitchFamily="34" charset="0"/>
-                <a:ea typeface="+mn-ea"/>
-                <a:cs typeface="Arial" panose="020B0604020202020204" pitchFamily="34" charset="0"/>
-              </a:defRPr>
-            </a:lvl5pPr>
-            <a:lvl6pPr marL="2514600" indent="-228600" algn="l" defTabSz="914400" rtl="0" eaLnBrk="1" latinLnBrk="0" hangingPunct="1">
-              <a:lnSpc>
-                <a:spcPct val="90000"/>
-              </a:lnSpc>
-              <a:spcBef>
-                <a:spcPts val="500"/>
-              </a:spcBef>
-              <a:buFont typeface="Arial" panose="020B0604020202020204" pitchFamily="34" charset="0"/>
-              <a:buChar char="•"/>
-              <a:defRPr sz="1800" kern="1200">
-                <a:solidFill>
-                  <a:schemeClr val="tx1"/>
-                </a:solidFill>
-                <a:latin typeface="+mn-lt"/>
-                <a:ea typeface="+mn-ea"/>
-                <a:cs typeface="+mn-cs"/>
-              </a:defRPr>
-            </a:lvl6pPr>
-            <a:lvl7pPr marL="2971800" indent="-228600" algn="l" defTabSz="914400" rtl="0" eaLnBrk="1" latinLnBrk="0" hangingPunct="1">
-              <a:lnSpc>
-                <a:spcPct val="90000"/>
-              </a:lnSpc>
-              <a:spcBef>
-                <a:spcPts val="500"/>
-              </a:spcBef>
-              <a:buFont typeface="Arial" panose="020B0604020202020204" pitchFamily="34" charset="0"/>
-              <a:buChar char="•"/>
-              <a:defRPr sz="1800" kern="1200">
-                <a:solidFill>
-                  <a:schemeClr val="tx1"/>
-                </a:solidFill>
-                <a:latin typeface="+mn-lt"/>
-                <a:ea typeface="+mn-ea"/>
-                <a:cs typeface="+mn-cs"/>
-              </a:defRPr>
-            </a:lvl7pPr>
-            <a:lvl8pPr marL="3429000" indent="-228600" algn="l" defTabSz="914400" rtl="0" eaLnBrk="1" latinLnBrk="0" hangingPunct="1">
-              <a:lnSpc>
-                <a:spcPct val="90000"/>
-              </a:lnSpc>
-              <a:spcBef>
-                <a:spcPts val="500"/>
-              </a:spcBef>
-              <a:buFont typeface="Arial" panose="020B0604020202020204" pitchFamily="34" charset="0"/>
-              <a:buChar char="•"/>
-              <a:defRPr sz="1800" kern="1200">
-                <a:solidFill>
-                  <a:schemeClr val="tx1"/>
-                </a:solidFill>
-                <a:latin typeface="+mn-lt"/>
-                <a:ea typeface="+mn-ea"/>
-                <a:cs typeface="+mn-cs"/>
-              </a:defRPr>
-            </a:lvl8pPr>
-            <a:lvl9pPr marL="3886200" indent="-228600" algn="l" defTabSz="914400" rtl="0" eaLnBrk="1" latinLnBrk="0" hangingPunct="1">
-              <a:lnSpc>
-                <a:spcPct val="90000"/>
-              </a:lnSpc>
-              <a:spcBef>
-                <a:spcPts val="500"/>
-              </a:spcBef>
-              <a:buFont typeface="Arial" panose="020B0604020202020204" pitchFamily="34" charset="0"/>
-              <a:buChar char="•"/>
-              <a:defRPr sz="1800" kern="1200">
-                <a:solidFill>
-                  <a:schemeClr val="tx1"/>
-                </a:solidFill>
-                <a:latin typeface="+mn-lt"/>
-                <a:ea typeface="+mn-ea"/>
-                <a:cs typeface="+mn-cs"/>
-              </a:defRPr>
-            </a:lvl9pPr>
-          </a:lstStyle>
-          <a:p>
-            <a:endParaRPr lang="en-US" sz="2800" dirty="0"/>
-          </a:p>
-        </p:txBody>
-      </p:sp>
+        </p:nvPicPr>
+        <p:blipFill>
+          <a:blip r:embed="rId2"/>
+          <a:stretch>
+            <a:fillRect/>
+          </a:stretch>
+        </p:blipFill>
+        <p:spPr>
+          <a:xfrm>
+            <a:off x="1147188" y="2221214"/>
+            <a:ext cx="6057143" cy="3895238"/>
+          </a:xfrm>
+          <a:prstGeom prst="rect">
+            <a:avLst/>
+          </a:prstGeom>
+        </p:spPr>
+      </p:pic>
     </p:spTree>
     <p:extLst>
       <p:ext uri="{BB962C8B-B14F-4D97-AF65-F5344CB8AC3E}">
-        <p14:creationId xmlns:p14="http://schemas.microsoft.com/office/powerpoint/2010/main" val="1761210051"/>
+        <p14:creationId xmlns:p14="http://schemas.microsoft.com/office/powerpoint/2010/main" val="3582042232"/>
       </p:ext>
     </p:extLst>
   </p:cSld>
@@ -15828,76 +15711,7 @@
       </p:grpSpPr>
       <p:sp>
         <p:nvSpPr>
-          <p:cNvPr id="2" name="Content Placeholder 1"/>
-          <p:cNvSpPr>
-            <a:spLocks noGrp="1"/>
-          </p:cNvSpPr>
-          <p:nvPr>
-            <p:ph idx="1"/>
-          </p:nvPr>
-        </p:nvSpPr>
-        <p:spPr/>
-        <p:txBody>
-          <a:bodyPr/>
-          <a:lstStyle/>
-          <a:p>
-            <a:r>
-              <a:rPr lang="en-US" dirty="0" smtClean="0"/>
-              <a:t>Survey link: </a:t>
-            </a:r>
-            <a:r>
-              <a:rPr lang="en-US" dirty="0">
-                <a:solidFill>
-                  <a:schemeClr val="accent5">
-                    <a:lumMod val="50000"/>
-                  </a:schemeClr>
-                </a:solidFill>
-              </a:rPr>
-              <a:t>http://</a:t>
-            </a:r>
-            <a:r>
-              <a:rPr lang="en-US" dirty="0" smtClean="0">
-                <a:solidFill>
-                  <a:schemeClr val="accent5">
-                    <a:lumMod val="50000"/>
-                  </a:schemeClr>
-                </a:solidFill>
-              </a:rPr>
-              <a:t>bit.ly/oulib_davis_workshop</a:t>
-            </a:r>
-            <a:r>
-              <a:rPr lang="en-US" dirty="0" smtClean="0"/>
-              <a:t> </a:t>
-            </a:r>
-          </a:p>
-          <a:p>
-            <a:r>
-              <a:rPr lang="en-US" dirty="0" smtClean="0"/>
-              <a:t>Workshop topic: Data-driven visualizations</a:t>
-            </a:r>
-          </a:p>
-          <a:p>
-            <a:r>
-              <a:rPr lang="en-US" dirty="0" smtClean="0"/>
-              <a:t>Workshop date: </a:t>
-            </a:r>
-            <a:fld id="{DC282969-C8BF-4EBF-812F-FF7661414B35}" type="datetime4">
-              <a:rPr lang="en-US" smtClean="0"/>
-              <a:t>March 28, 2019</a:t>
-            </a:fld>
-            <a:endParaRPr lang="en-US" dirty="0" smtClean="0"/>
-          </a:p>
-        </p:txBody>
-      </p:sp>
-      <p:sp>
-        <p:nvSpPr>
-          <p:cNvPr id="4" name="Title 3">
-            <a:extLst>
-              <a:ext uri="{FF2B5EF4-FFF2-40B4-BE49-F238E27FC236}">
-                <a16:creationId xmlns:a16="http://schemas.microsoft.com/office/drawing/2014/main" id="{EE4C4D20-498A-0B4C-B3DF-B1E363085ADC}"/>
-              </a:ext>
-            </a:extLst>
-          </p:cNvPr>
+          <p:cNvPr id="2" name="Title 1"/>
           <p:cNvSpPr>
             <a:spLocks noGrp="1"/>
           </p:cNvSpPr>
@@ -15908,36 +15722,466 @@
         <p:spPr>
           <a:xfrm>
             <a:off x="1168708" y="675829"/>
-            <a:ext cx="10042087" cy="500289"/>
-          </a:xfrm>
-          <a:prstGeom prst="rect">
-            <a:avLst/>
-          </a:prstGeom>
+            <a:ext cx="10229977" cy="500289"/>
+          </a:xfrm>
         </p:spPr>
         <p:txBody>
           <a:bodyPr/>
           <a:lstStyle/>
           <a:p>
             <a:r>
+              <a:rPr lang="en-US" b="1" dirty="0">
+                <a:solidFill>
+                  <a:srgbClr val="8E1731"/>
+                </a:solidFill>
+              </a:rPr>
+              <a:t>What is </a:t>
+            </a:r>
+            <a:r>
               <a:rPr lang="en-US" b="1" dirty="0" smtClean="0">
                 <a:solidFill>
                   <a:srgbClr val="8E1731"/>
                 </a:solidFill>
               </a:rPr>
-              <a:t>Please take 3 min to help us improve</a:t>
-            </a:r>
-            <a:endParaRPr lang="en-US" b="1" dirty="0">
-              <a:solidFill>
-                <a:srgbClr val="8E1731"/>
-              </a:solidFill>
-            </a:endParaRPr>
+              <a:t>clear or misleading about this?</a:t>
+            </a:r>
+            <a:endParaRPr lang="en-US" dirty="0"/>
+          </a:p>
+        </p:txBody>
+      </p:sp>
+      <p:pic>
+        <p:nvPicPr>
+          <p:cNvPr id="3" name="Picture 2"/>
+          <p:cNvPicPr>
+            <a:picLocks noChangeAspect="1"/>
+          </p:cNvPicPr>
+          <p:nvPr/>
+        </p:nvPicPr>
+        <p:blipFill>
+          <a:blip r:embed="rId2"/>
+          <a:stretch>
+            <a:fillRect/>
+          </a:stretch>
+        </p:blipFill>
+        <p:spPr>
+          <a:xfrm>
+            <a:off x="1147188" y="2221214"/>
+            <a:ext cx="6057143" cy="3895238"/>
+          </a:xfrm>
+          <a:prstGeom prst="rect">
+            <a:avLst/>
+          </a:prstGeom>
+        </p:spPr>
+      </p:pic>
+      <p:sp>
+        <p:nvSpPr>
+          <p:cNvPr id="4" name="Rectangle 3"/>
+          <p:cNvSpPr/>
+          <p:nvPr/>
+        </p:nvSpPr>
+        <p:spPr>
+          <a:xfrm>
+            <a:off x="7407057" y="1860766"/>
+            <a:ext cx="4129414" cy="3416320"/>
+          </a:xfrm>
+          <a:prstGeom prst="rect">
+            <a:avLst/>
+          </a:prstGeom>
+        </p:spPr>
+        <p:txBody>
+          <a:bodyPr wrap="square">
+            <a:spAutoFit/>
+          </a:bodyPr>
+          <a:lstStyle/>
+          <a:p>
+            <a:r>
+              <a:rPr lang="en-US" dirty="0"/>
+              <a:t>Clear</a:t>
+            </a:r>
+          </a:p>
+          <a:p>
+            <a:pPr marL="285750" indent="-285750">
+              <a:buFont typeface="Arial" panose="020B0604020202020204" pitchFamily="34" charset="0"/>
+              <a:buChar char="•"/>
+            </a:pPr>
+            <a:r>
+              <a:rPr lang="en-US" dirty="0"/>
+              <a:t>Chart design consistent throughout</a:t>
+            </a:r>
+          </a:p>
+          <a:p>
+            <a:pPr marL="285750" indent="-285750">
+              <a:buFont typeface="Arial" panose="020B0604020202020204" pitchFamily="34" charset="0"/>
+              <a:buChar char="•"/>
+            </a:pPr>
+            <a:r>
+              <a:rPr lang="en-US" dirty="0"/>
+              <a:t>Units appropriate</a:t>
+            </a:r>
+          </a:p>
+          <a:p>
+            <a:endParaRPr lang="en-US" dirty="0"/>
+          </a:p>
+          <a:p>
+            <a:r>
+              <a:rPr lang="en-US" dirty="0" smtClean="0"/>
+              <a:t>Potentially misleading</a:t>
+            </a:r>
+            <a:endParaRPr lang="en-US" dirty="0"/>
+          </a:p>
+          <a:p>
+            <a:pPr marL="285750" indent="-285750">
+              <a:buFont typeface="Arial" panose="020B0604020202020204" pitchFamily="34" charset="0"/>
+              <a:buChar char="•"/>
+            </a:pPr>
+            <a:r>
+              <a:rPr lang="en-US" dirty="0"/>
+              <a:t>Symbols and axes proportional to numbers represented (problem with pie charts, area in general)</a:t>
+            </a:r>
+          </a:p>
+          <a:p>
+            <a:pPr marL="285750" indent="-285750">
+              <a:buFont typeface="Arial" panose="020B0604020202020204" pitchFamily="34" charset="0"/>
+              <a:buChar char="•"/>
+            </a:pPr>
+            <a:r>
+              <a:rPr lang="en-US" dirty="0"/>
+              <a:t>Lack of context: did not show all relevant data</a:t>
+            </a:r>
+          </a:p>
+          <a:p>
+            <a:pPr marL="285750" indent="-285750">
+              <a:buFont typeface="Arial" panose="020B0604020202020204" pitchFamily="34" charset="0"/>
+              <a:buChar char="•"/>
+            </a:pPr>
+            <a:r>
+              <a:rPr lang="en-US" dirty="0"/>
+              <a:t>Clear labels (minimize abbreviations)	</a:t>
+            </a:r>
           </a:p>
         </p:txBody>
       </p:sp>
     </p:spTree>
     <p:extLst>
       <p:ext uri="{BB962C8B-B14F-4D97-AF65-F5344CB8AC3E}">
-        <p14:creationId xmlns:p14="http://schemas.microsoft.com/office/powerpoint/2010/main" val="1017636609"/>
+        <p14:creationId xmlns:p14="http://schemas.microsoft.com/office/powerpoint/2010/main" val="2671584075"/>
+      </p:ext>
+    </p:extLst>
+  </p:cSld>
+  <p:clrMapOvr>
+    <a:masterClrMapping/>
+  </p:clrMapOvr>
+</p:sld>
+</file>
+
+<file path=ppt/slides/slide58.xml><?xml version="1.0" encoding="utf-8"?>
+<p:sld xmlns:a="http://schemas.openxmlformats.org/drawingml/2006/main" xmlns:r="http://schemas.openxmlformats.org/officeDocument/2006/relationships" xmlns:p="http://schemas.openxmlformats.org/presentationml/2006/main">
+  <p:cSld>
+    <p:spTree>
+      <p:nvGrpSpPr>
+        <p:cNvPr id="1" name=""/>
+        <p:cNvGrpSpPr/>
+        <p:nvPr/>
+      </p:nvGrpSpPr>
+      <p:grpSpPr>
+        <a:xfrm>
+          <a:off x="0" y="0"/>
+          <a:ext cx="0" cy="0"/>
+          <a:chOff x="0" y="0"/>
+          <a:chExt cx="0" cy="0"/>
+        </a:xfrm>
+      </p:grpSpPr>
+      <p:sp>
+        <p:nvSpPr>
+          <p:cNvPr id="2" name="Title 1"/>
+          <p:cNvSpPr>
+            <a:spLocks noGrp="1"/>
+          </p:cNvSpPr>
+          <p:nvPr>
+            <p:ph type="title"/>
+          </p:nvPr>
+        </p:nvSpPr>
+        <p:spPr>
+          <a:xfrm>
+            <a:off x="1168708" y="675829"/>
+            <a:ext cx="10229977" cy="500289"/>
+          </a:xfrm>
+        </p:spPr>
+        <p:txBody>
+          <a:bodyPr/>
+          <a:lstStyle/>
+          <a:p>
+            <a:r>
+              <a:rPr lang="en-US" b="1" dirty="0" smtClean="0">
+                <a:solidFill>
+                  <a:srgbClr val="8E1731"/>
+                </a:solidFill>
+              </a:rPr>
+              <a:t>What improvements can we make?</a:t>
+            </a:r>
+            <a:endParaRPr lang="en-US" dirty="0"/>
+          </a:p>
+        </p:txBody>
+      </p:sp>
+      <p:pic>
+        <p:nvPicPr>
+          <p:cNvPr id="6" name="Picture 5"/>
+          <p:cNvPicPr>
+            <a:picLocks noChangeAspect="1"/>
+          </p:cNvPicPr>
+          <p:nvPr/>
+        </p:nvPicPr>
+        <p:blipFill>
+          <a:blip r:embed="rId2"/>
+          <a:stretch>
+            <a:fillRect/>
+          </a:stretch>
+        </p:blipFill>
+        <p:spPr>
+          <a:xfrm>
+            <a:off x="1007416" y="2081149"/>
+            <a:ext cx="6047619" cy="3895238"/>
+          </a:xfrm>
+          <a:prstGeom prst="rect">
+            <a:avLst/>
+          </a:prstGeom>
+        </p:spPr>
+      </p:pic>
+      <p:sp>
+        <p:nvSpPr>
+          <p:cNvPr id="7" name="Rectangle 6"/>
+          <p:cNvSpPr/>
+          <p:nvPr/>
+        </p:nvSpPr>
+        <p:spPr>
+          <a:xfrm>
+            <a:off x="7407057" y="2490031"/>
+            <a:ext cx="4129414" cy="1938992"/>
+          </a:xfrm>
+          <a:prstGeom prst="rect">
+            <a:avLst/>
+          </a:prstGeom>
+        </p:spPr>
+        <p:txBody>
+          <a:bodyPr wrap="square">
+            <a:spAutoFit/>
+          </a:bodyPr>
+          <a:lstStyle/>
+          <a:p>
+            <a:pPr marL="285750" indent="-285750">
+              <a:buFont typeface="Arial" panose="020B0604020202020204" pitchFamily="34" charset="0"/>
+              <a:buChar char="•"/>
+            </a:pPr>
+            <a:r>
+              <a:rPr lang="en-US" sz="2400" dirty="0" smtClean="0"/>
+              <a:t>Removed </a:t>
+            </a:r>
+            <a:r>
+              <a:rPr lang="en-US" sz="2400" dirty="0"/>
+              <a:t>area-cut relationship</a:t>
+            </a:r>
+          </a:p>
+          <a:p>
+            <a:pPr marL="285750" indent="-285750">
+              <a:buFont typeface="Arial" panose="020B0604020202020204" pitchFamily="34" charset="0"/>
+              <a:buChar char="•"/>
+            </a:pPr>
+            <a:r>
+              <a:rPr lang="en-US" sz="2400" dirty="0" smtClean="0"/>
+              <a:t>Show full range of data</a:t>
+            </a:r>
+          </a:p>
+          <a:p>
+            <a:pPr marL="285750" indent="-285750">
+              <a:buFont typeface="Arial" panose="020B0604020202020204" pitchFamily="34" charset="0"/>
+              <a:buChar char="•"/>
+            </a:pPr>
+            <a:r>
+              <a:rPr lang="en-US" sz="2400" dirty="0" smtClean="0"/>
+              <a:t>Units for y-axis</a:t>
+            </a:r>
+            <a:endParaRPr lang="en-US" sz="2400" dirty="0"/>
+          </a:p>
+          <a:p>
+            <a:pPr marL="285750" indent="-285750">
+              <a:buFont typeface="Arial" panose="020B0604020202020204" pitchFamily="34" charset="0"/>
+              <a:buChar char="•"/>
+            </a:pPr>
+            <a:r>
+              <a:rPr lang="en-US" sz="2400" dirty="0" smtClean="0"/>
+              <a:t>Labels not abbreviated</a:t>
+            </a:r>
+            <a:endParaRPr lang="en-US" sz="2400" dirty="0"/>
+          </a:p>
+        </p:txBody>
+      </p:sp>
+    </p:spTree>
+    <p:extLst>
+      <p:ext uri="{BB962C8B-B14F-4D97-AF65-F5344CB8AC3E}">
+        <p14:creationId xmlns:p14="http://schemas.microsoft.com/office/powerpoint/2010/main" val="1203345857"/>
+      </p:ext>
+    </p:extLst>
+  </p:cSld>
+  <p:clrMapOvr>
+    <a:masterClrMapping/>
+  </p:clrMapOvr>
+</p:sld>
+</file>
+
+<file path=ppt/slides/slide59.xml><?xml version="1.0" encoding="utf-8"?>
+<p:sld xmlns:a="http://schemas.openxmlformats.org/drawingml/2006/main" xmlns:r="http://schemas.openxmlformats.org/officeDocument/2006/relationships" xmlns:p="http://schemas.openxmlformats.org/presentationml/2006/main">
+  <p:cSld>
+    <p:spTree>
+      <p:nvGrpSpPr>
+        <p:cNvPr id="1" name=""/>
+        <p:cNvGrpSpPr/>
+        <p:nvPr/>
+      </p:nvGrpSpPr>
+      <p:grpSpPr>
+        <a:xfrm>
+          <a:off x="0" y="0"/>
+          <a:ext cx="0" cy="0"/>
+          <a:chOff x="0" y="0"/>
+          <a:chExt cx="0" cy="0"/>
+        </a:xfrm>
+      </p:grpSpPr>
+      <p:sp>
+        <p:nvSpPr>
+          <p:cNvPr id="2" name="Title 1"/>
+          <p:cNvSpPr>
+            <a:spLocks noGrp="1"/>
+          </p:cNvSpPr>
+          <p:nvPr>
+            <p:ph type="title"/>
+          </p:nvPr>
+        </p:nvSpPr>
+        <p:spPr>
+          <a:xfrm>
+            <a:off x="1168708" y="675829"/>
+            <a:ext cx="10229977" cy="500289"/>
+          </a:xfrm>
+        </p:spPr>
+        <p:txBody>
+          <a:bodyPr/>
+          <a:lstStyle/>
+          <a:p>
+            <a:r>
+              <a:rPr lang="en-US" b="1" dirty="0">
+                <a:solidFill>
+                  <a:srgbClr val="8E1731"/>
+                </a:solidFill>
+              </a:rPr>
+              <a:t>What </a:t>
+            </a:r>
+            <a:r>
+              <a:rPr lang="en-US" b="1" dirty="0" smtClean="0">
+                <a:solidFill>
+                  <a:srgbClr val="8E1731"/>
+                </a:solidFill>
+              </a:rPr>
+              <a:t>else could we improve?</a:t>
+            </a:r>
+            <a:endParaRPr lang="en-US" dirty="0"/>
+          </a:p>
+        </p:txBody>
+      </p:sp>
+      <p:pic>
+        <p:nvPicPr>
+          <p:cNvPr id="6" name="Picture 5"/>
+          <p:cNvPicPr>
+            <a:picLocks noChangeAspect="1"/>
+          </p:cNvPicPr>
+          <p:nvPr/>
+        </p:nvPicPr>
+        <p:blipFill>
+          <a:blip r:embed="rId2"/>
+          <a:stretch>
+            <a:fillRect/>
+          </a:stretch>
+        </p:blipFill>
+        <p:spPr>
+          <a:xfrm>
+            <a:off x="1007416" y="2081149"/>
+            <a:ext cx="6047619" cy="3895238"/>
+          </a:xfrm>
+          <a:prstGeom prst="rect">
+            <a:avLst/>
+          </a:prstGeom>
+        </p:spPr>
+      </p:pic>
+      <p:sp>
+        <p:nvSpPr>
+          <p:cNvPr id="5" name="Rectangle 4"/>
+          <p:cNvSpPr/>
+          <p:nvPr/>
+        </p:nvSpPr>
+        <p:spPr>
+          <a:xfrm>
+            <a:off x="7055035" y="1615859"/>
+            <a:ext cx="4343650" cy="4154984"/>
+          </a:xfrm>
+          <a:prstGeom prst="rect">
+            <a:avLst/>
+          </a:prstGeom>
+        </p:spPr>
+        <p:txBody>
+          <a:bodyPr wrap="square">
+            <a:spAutoFit/>
+          </a:bodyPr>
+          <a:lstStyle/>
+          <a:p>
+            <a:pPr marL="285750" indent="-285750">
+              <a:buFont typeface="Arial" panose="020B0604020202020204" pitchFamily="34" charset="0"/>
+              <a:buChar char="•"/>
+            </a:pPr>
+            <a:r>
+              <a:rPr lang="en-US" sz="2400" dirty="0" smtClean="0"/>
+              <a:t>Decide if data density in interior is acceptable</a:t>
+            </a:r>
+          </a:p>
+          <a:p>
+            <a:pPr marL="285750" indent="-285750">
+              <a:buFont typeface="Arial" panose="020B0604020202020204" pitchFamily="34" charset="0"/>
+              <a:buChar char="•"/>
+            </a:pPr>
+            <a:r>
+              <a:rPr lang="en-US" sz="2400" dirty="0" smtClean="0"/>
+              <a:t>Make “fair” easier to see from a distance (darker color)</a:t>
+            </a:r>
+          </a:p>
+          <a:p>
+            <a:pPr marL="285750" indent="-285750">
+              <a:buFont typeface="Arial" panose="020B0604020202020204" pitchFamily="34" charset="0"/>
+              <a:buChar char="•"/>
+            </a:pPr>
+            <a:r>
+              <a:rPr lang="en-US" sz="2400" dirty="0" smtClean="0"/>
+              <a:t>Make all points easier to see from a distance (larger size)</a:t>
+            </a:r>
+          </a:p>
+          <a:p>
+            <a:pPr marL="285750" indent="-285750">
+              <a:buFont typeface="Arial" panose="020B0604020202020204" pitchFamily="34" charset="0"/>
+              <a:buChar char="•"/>
+            </a:pPr>
+            <a:r>
+              <a:rPr lang="en-US" sz="2400" dirty="0" smtClean="0"/>
+              <a:t>Consider goal – do we need all cut categories?  Do we need a summary instead?</a:t>
+            </a:r>
+          </a:p>
+          <a:p>
+            <a:pPr marL="285750" indent="-285750">
+              <a:buFont typeface="Arial" panose="020B0604020202020204" pitchFamily="34" charset="0"/>
+              <a:buChar char="•"/>
+            </a:pPr>
+            <a:endParaRPr lang="en-US" sz="2400" dirty="0" smtClean="0"/>
+          </a:p>
+        </p:txBody>
+      </p:sp>
+    </p:spTree>
+    <p:extLst>
+      <p:ext uri="{BB962C8B-B14F-4D97-AF65-F5344CB8AC3E}">
+        <p14:creationId xmlns:p14="http://schemas.microsoft.com/office/powerpoint/2010/main" val="871147982"/>
       </p:ext>
     </p:extLst>
   </p:cSld>
@@ -16248,6 +16492,941 @@
     <p:extLst>
       <p:ext uri="{BB962C8B-B14F-4D97-AF65-F5344CB8AC3E}">
         <p14:creationId xmlns:p14="http://schemas.microsoft.com/office/powerpoint/2010/main" val="3811131155"/>
+      </p:ext>
+    </p:extLst>
+  </p:cSld>
+  <p:clrMapOvr>
+    <a:masterClrMapping/>
+  </p:clrMapOvr>
+</p:sld>
+</file>
+
+<file path=ppt/slides/slide60.xml><?xml version="1.0" encoding="utf-8"?>
+<p:sld xmlns:a="http://schemas.openxmlformats.org/drawingml/2006/main" xmlns:r="http://schemas.openxmlformats.org/officeDocument/2006/relationships" xmlns:p="http://schemas.openxmlformats.org/presentationml/2006/main">
+  <p:cSld>
+    <p:spTree>
+      <p:nvGrpSpPr>
+        <p:cNvPr id="1" name=""/>
+        <p:cNvGrpSpPr/>
+        <p:nvPr/>
+      </p:nvGrpSpPr>
+      <p:grpSpPr>
+        <a:xfrm>
+          <a:off x="0" y="0"/>
+          <a:ext cx="0" cy="0"/>
+          <a:chOff x="0" y="0"/>
+          <a:chExt cx="0" cy="0"/>
+        </a:xfrm>
+      </p:grpSpPr>
+      <p:sp>
+        <p:nvSpPr>
+          <p:cNvPr id="2" name="Content Placeholder 1"/>
+          <p:cNvSpPr>
+            <a:spLocks noGrp="1"/>
+          </p:cNvSpPr>
+          <p:nvPr>
+            <p:ph idx="1"/>
+          </p:nvPr>
+        </p:nvSpPr>
+        <p:spPr>
+          <a:xfrm>
+            <a:off x="609600" y="1600201"/>
+            <a:ext cx="10744200" cy="4123702"/>
+          </a:xfrm>
+        </p:spPr>
+        <p:txBody>
+          <a:bodyPr>
+            <a:normAutofit/>
+          </a:bodyPr>
+          <a:lstStyle/>
+          <a:p>
+            <a:r>
+              <a:rPr lang="en-US" dirty="0" smtClean="0"/>
+              <a:t>We’ve made our visualization clear and effective to get our result to the viewer</a:t>
+            </a:r>
+          </a:p>
+          <a:p>
+            <a:r>
+              <a:rPr lang="en-US" dirty="0" smtClean="0"/>
+              <a:t>Next, resources to learn more</a:t>
+            </a:r>
+          </a:p>
+        </p:txBody>
+      </p:sp>
+      <p:sp>
+        <p:nvSpPr>
+          <p:cNvPr id="10" name="Title 9">
+            <a:extLst>
+              <a:ext uri="{FF2B5EF4-FFF2-40B4-BE49-F238E27FC236}">
+                <a16:creationId xmlns:a16="http://schemas.microsoft.com/office/drawing/2014/main" id="{FFFB4824-2F2C-0B4E-8B65-C35C93FB68FF}"/>
+              </a:ext>
+            </a:extLst>
+          </p:cNvPr>
+          <p:cNvSpPr>
+            <a:spLocks noGrp="1"/>
+          </p:cNvSpPr>
+          <p:nvPr>
+            <p:ph type="title"/>
+          </p:nvPr>
+        </p:nvSpPr>
+        <p:spPr>
+          <a:xfrm>
+            <a:off x="1168708" y="675829"/>
+            <a:ext cx="9478415" cy="500289"/>
+          </a:xfrm>
+          <a:prstGeom prst="rect">
+            <a:avLst/>
+          </a:prstGeom>
+        </p:spPr>
+        <p:txBody>
+          <a:bodyPr/>
+          <a:lstStyle/>
+          <a:p>
+            <a:r>
+              <a:rPr lang="en-US" b="1" dirty="0" smtClean="0">
+                <a:solidFill>
+                  <a:srgbClr val="8E1731"/>
+                </a:solidFill>
+              </a:rPr>
+              <a:t>Step 3 summary</a:t>
+            </a:r>
+            <a:endParaRPr lang="en-US" b="1" dirty="0">
+              <a:solidFill>
+                <a:srgbClr val="8E1731"/>
+              </a:solidFill>
+            </a:endParaRPr>
+          </a:p>
+        </p:txBody>
+      </p:sp>
+      <p:sp>
+        <p:nvSpPr>
+          <p:cNvPr id="6" name="Title 1"/>
+          <p:cNvSpPr txBox="1">
+            <a:spLocks/>
+          </p:cNvSpPr>
+          <p:nvPr/>
+        </p:nvSpPr>
+        <p:spPr>
+          <a:xfrm>
+            <a:off x="838200" y="365125"/>
+            <a:ext cx="10515600" cy="1325563"/>
+          </a:xfrm>
+          <a:prstGeom prst="rect">
+            <a:avLst/>
+          </a:prstGeom>
+        </p:spPr>
+        <p:txBody>
+          <a:bodyPr/>
+          <a:lstStyle>
+            <a:lvl1pPr algn="l" defTabSz="914400" rtl="0" eaLnBrk="1" latinLnBrk="0" hangingPunct="1">
+              <a:lnSpc>
+                <a:spcPct val="90000"/>
+              </a:lnSpc>
+              <a:spcBef>
+                <a:spcPct val="0"/>
+              </a:spcBef>
+              <a:buNone/>
+              <a:defRPr sz="3600" kern="1200">
+                <a:solidFill>
+                  <a:schemeClr val="tx1"/>
+                </a:solidFill>
+                <a:latin typeface="+mj-lt"/>
+                <a:ea typeface="+mj-ea"/>
+                <a:cs typeface="+mj-cs"/>
+              </a:defRPr>
+            </a:lvl1pPr>
+          </a:lstStyle>
+          <a:p>
+            <a:endParaRPr lang="en-US" dirty="0"/>
+          </a:p>
+        </p:txBody>
+      </p:sp>
+    </p:spTree>
+    <p:extLst>
+      <p:ext uri="{BB962C8B-B14F-4D97-AF65-F5344CB8AC3E}">
+        <p14:creationId xmlns:p14="http://schemas.microsoft.com/office/powerpoint/2010/main" val="1615217877"/>
+      </p:ext>
+    </p:extLst>
+  </p:cSld>
+  <p:clrMapOvr>
+    <a:masterClrMapping/>
+  </p:clrMapOvr>
+</p:sld>
+</file>
+
+<file path=ppt/slides/slide61.xml><?xml version="1.0" encoding="utf-8"?>
+<p:sld xmlns:a="http://schemas.openxmlformats.org/drawingml/2006/main" xmlns:r="http://schemas.openxmlformats.org/officeDocument/2006/relationships" xmlns:p="http://schemas.openxmlformats.org/presentationml/2006/main">
+  <p:cSld>
+    <p:spTree>
+      <p:nvGrpSpPr>
+        <p:cNvPr id="1" name=""/>
+        <p:cNvGrpSpPr/>
+        <p:nvPr/>
+      </p:nvGrpSpPr>
+      <p:grpSpPr>
+        <a:xfrm>
+          <a:off x="0" y="0"/>
+          <a:ext cx="0" cy="0"/>
+          <a:chOff x="0" y="0"/>
+          <a:chExt cx="0" cy="0"/>
+        </a:xfrm>
+      </p:grpSpPr>
+      <p:sp>
+        <p:nvSpPr>
+          <p:cNvPr id="4" name="Content Placeholder 3"/>
+          <p:cNvSpPr>
+            <a:spLocks noGrp="1"/>
+          </p:cNvSpPr>
+          <p:nvPr>
+            <p:ph idx="10"/>
+          </p:nvPr>
+        </p:nvSpPr>
+        <p:spPr>
+          <a:xfrm>
+            <a:off x="150313" y="1465545"/>
+            <a:ext cx="11774465" cy="4659682"/>
+          </a:xfrm>
+        </p:spPr>
+        <p:txBody>
+          <a:bodyPr>
+            <a:normAutofit fontScale="92500" lnSpcReduction="10000"/>
+          </a:bodyPr>
+          <a:lstStyle/>
+          <a:p>
+            <a:pPr marL="0" indent="0" algn="ctr">
+              <a:buNone/>
+            </a:pPr>
+            <a:r>
+              <a:rPr lang="en-US" sz="2800" dirty="0" smtClean="0"/>
+              <a:t>Digital Skills Hub Calendar</a:t>
+            </a:r>
+            <a:br>
+              <a:rPr lang="en-US" sz="2800" dirty="0" smtClean="0"/>
+            </a:br>
+            <a:r>
+              <a:rPr lang="en-US" sz="2800" dirty="0" smtClean="0">
+                <a:hlinkClick r:id="rId2"/>
+              </a:rPr>
+              <a:t>https://calendar.ou.edu/dsh</a:t>
+            </a:r>
+            <a:endParaRPr lang="en-US" sz="2800" dirty="0" smtClean="0"/>
+          </a:p>
+          <a:p>
+            <a:pPr marL="0" indent="0" algn="ctr">
+              <a:buNone/>
+            </a:pPr>
+            <a:r>
+              <a:rPr lang="en-US" sz="2800" dirty="0" smtClean="0"/>
+              <a:t>Carpentries workshops</a:t>
+            </a:r>
+            <a:br>
+              <a:rPr lang="en-US" sz="2800" dirty="0" smtClean="0"/>
+            </a:br>
+            <a:r>
+              <a:rPr lang="en-US" sz="2800" dirty="0" smtClean="0">
+                <a:hlinkClick r:id="rId3"/>
+              </a:rPr>
+              <a:t>https</a:t>
+            </a:r>
+            <a:r>
+              <a:rPr lang="en-US" sz="2800" dirty="0">
+                <a:hlinkClick r:id="rId3"/>
+              </a:rPr>
+              <a:t>://</a:t>
+            </a:r>
+            <a:r>
+              <a:rPr lang="en-US" sz="2800" dirty="0" smtClean="0">
+                <a:hlinkClick r:id="rId3"/>
+              </a:rPr>
+              <a:t>libraries.ou.edu/carpentries</a:t>
+            </a:r>
+            <a:endParaRPr lang="en-US" sz="2800" dirty="0"/>
+          </a:p>
+          <a:p>
+            <a:pPr marL="0" indent="0" algn="ctr">
+              <a:buNone/>
+            </a:pPr>
+            <a:r>
+              <a:rPr lang="en-US" sz="2800" dirty="0" smtClean="0"/>
+              <a:t>Information Specialists @ DAVIS</a:t>
+            </a:r>
+            <a:br>
+              <a:rPr lang="en-US" sz="2800" dirty="0" smtClean="0"/>
+            </a:br>
+            <a:r>
+              <a:rPr lang="en-US" sz="2800" dirty="0" smtClean="0">
+                <a:hlinkClick r:id="rId4"/>
+              </a:rPr>
+              <a:t>https://libraries.ou.edu/davis</a:t>
+            </a:r>
+            <a:endParaRPr lang="en-US" sz="2800" dirty="0" smtClean="0"/>
+          </a:p>
+          <a:p>
+            <a:endParaRPr lang="en-US" sz="2800" dirty="0" smtClean="0"/>
+          </a:p>
+          <a:p>
+            <a:pPr marL="0" indent="0" algn="ctr">
+              <a:buNone/>
+            </a:pPr>
+            <a:r>
+              <a:rPr lang="en-US" sz="2800" dirty="0" smtClean="0"/>
+              <a:t>Read </a:t>
+            </a:r>
+            <a:r>
+              <a:rPr lang="en-US" sz="2800" dirty="0" err="1"/>
+              <a:t>Tufte’s</a:t>
+            </a:r>
+            <a:r>
+              <a:rPr lang="en-US" sz="2800" dirty="0"/>
+              <a:t> </a:t>
+            </a:r>
+            <a:r>
+              <a:rPr lang="en-US" sz="2800" i="1" dirty="0"/>
+              <a:t>The Visual Display of Quantitative </a:t>
+            </a:r>
+            <a:r>
+              <a:rPr lang="en-US" sz="2800" i="1" dirty="0" smtClean="0"/>
+              <a:t>Information</a:t>
+            </a:r>
+            <a:br>
+              <a:rPr lang="en-US" sz="2800" i="1" dirty="0" smtClean="0"/>
+            </a:br>
+            <a:r>
+              <a:rPr lang="en-US" sz="2800" dirty="0" smtClean="0"/>
+              <a:t>on </a:t>
+            </a:r>
+            <a:r>
+              <a:rPr lang="en-US" sz="2800" dirty="0"/>
+              <a:t>Reserves at Circulation Desk (4 hour checkout</a:t>
+            </a:r>
+            <a:r>
+              <a:rPr lang="en-US" sz="2800" dirty="0" smtClean="0"/>
+              <a:t>)</a:t>
+            </a:r>
+          </a:p>
+          <a:p>
+            <a:pPr marL="0" indent="0" algn="ctr">
+              <a:buNone/>
+            </a:pPr>
+            <a:endParaRPr lang="en-US" sz="2800" dirty="0" smtClean="0"/>
+          </a:p>
+          <a:p>
+            <a:pPr marL="0" indent="0" algn="ctr">
+              <a:buNone/>
+            </a:pPr>
+            <a:r>
+              <a:rPr lang="en-US" sz="2800" dirty="0" smtClean="0"/>
+              <a:t>This slide deck available on our curriculum archive </a:t>
+            </a:r>
+            <a:r>
+              <a:rPr lang="en-US" sz="2800" dirty="0"/>
+              <a:t>at </a:t>
+            </a:r>
+            <a:r>
+              <a:rPr lang="en-US" sz="2800" dirty="0">
+                <a:hlinkClick r:id="rId5"/>
+              </a:rPr>
+              <a:t>https://osf.io/a9yt5</a:t>
+            </a:r>
+            <a:r>
+              <a:rPr lang="en-US" sz="2800" dirty="0" smtClean="0">
+                <a:hlinkClick r:id="rId5"/>
+              </a:rPr>
+              <a:t>/</a:t>
+            </a:r>
+            <a:r>
+              <a:rPr lang="en-US" sz="2800" dirty="0" smtClean="0"/>
+              <a:t> </a:t>
+            </a:r>
+            <a:endParaRPr lang="en-US" sz="2800" dirty="0"/>
+          </a:p>
+        </p:txBody>
+      </p:sp>
+      <p:sp>
+        <p:nvSpPr>
+          <p:cNvPr id="2" name="Title 1">
+            <a:extLst>
+              <a:ext uri="{FF2B5EF4-FFF2-40B4-BE49-F238E27FC236}">
+                <a16:creationId xmlns:a16="http://schemas.microsoft.com/office/drawing/2014/main" id="{D313C71A-5F8A-5C4C-B19D-A92B8ED34A75}"/>
+              </a:ext>
+            </a:extLst>
+          </p:cNvPr>
+          <p:cNvSpPr>
+            <a:spLocks noGrp="1"/>
+          </p:cNvSpPr>
+          <p:nvPr>
+            <p:ph type="title"/>
+          </p:nvPr>
+        </p:nvSpPr>
+        <p:spPr>
+          <a:xfrm>
+            <a:off x="1168708" y="675829"/>
+            <a:ext cx="9916826" cy="500289"/>
+          </a:xfrm>
+          <a:prstGeom prst="rect">
+            <a:avLst/>
+          </a:prstGeom>
+        </p:spPr>
+        <p:txBody>
+          <a:bodyPr/>
+          <a:lstStyle/>
+          <a:p>
+            <a:r>
+              <a:rPr lang="en-US" b="1" dirty="0" smtClean="0">
+                <a:solidFill>
+                  <a:srgbClr val="8E1731"/>
+                </a:solidFill>
+              </a:rPr>
+              <a:t>Step 4: get help and learn more</a:t>
+            </a:r>
+            <a:endParaRPr lang="en-US" b="1" dirty="0">
+              <a:solidFill>
+                <a:srgbClr val="8E1731"/>
+              </a:solidFill>
+            </a:endParaRPr>
+          </a:p>
+        </p:txBody>
+      </p:sp>
+      <p:sp>
+        <p:nvSpPr>
+          <p:cNvPr id="5" name="Content Placeholder 3"/>
+          <p:cNvSpPr txBox="1">
+            <a:spLocks/>
+          </p:cNvSpPr>
+          <p:nvPr/>
+        </p:nvSpPr>
+        <p:spPr>
+          <a:xfrm>
+            <a:off x="358815" y="4912304"/>
+            <a:ext cx="10964713" cy="3891391"/>
+          </a:xfrm>
+          <a:prstGeom prst="rect">
+            <a:avLst/>
+          </a:prstGeom>
+        </p:spPr>
+        <p:txBody>
+          <a:bodyPr>
+            <a:normAutofit/>
+          </a:bodyPr>
+          <a:lstStyle>
+            <a:lvl1pPr marL="257162" indent="-257162" algn="l" defTabSz="914400" rtl="0" eaLnBrk="1" latinLnBrk="0" hangingPunct="1">
+              <a:lnSpc>
+                <a:spcPct val="90000"/>
+              </a:lnSpc>
+              <a:spcBef>
+                <a:spcPts val="1000"/>
+              </a:spcBef>
+              <a:buClr>
+                <a:srgbClr val="8E1731"/>
+              </a:buClr>
+              <a:buFont typeface="Wingdings" panose="05000000000000000000" pitchFamily="2" charset="2"/>
+              <a:buChar char="§"/>
+              <a:defRPr lang="en-US" sz="3200" kern="1200" dirty="0" smtClean="0">
+                <a:solidFill>
+                  <a:schemeClr val="tx1"/>
+                </a:solidFill>
+                <a:latin typeface="Arial" panose="020B0604020202020204" pitchFamily="34" charset="0"/>
+                <a:ea typeface="+mn-ea"/>
+                <a:cs typeface="Arial" panose="020B0604020202020204" pitchFamily="34" charset="0"/>
+              </a:defRPr>
+            </a:lvl1pPr>
+            <a:lvl2pPr marL="557185" indent="-214303" algn="l" defTabSz="914400" rtl="0" eaLnBrk="1" latinLnBrk="0" hangingPunct="1">
+              <a:lnSpc>
+                <a:spcPct val="90000"/>
+              </a:lnSpc>
+              <a:spcBef>
+                <a:spcPts val="500"/>
+              </a:spcBef>
+              <a:buClrTx/>
+              <a:buFont typeface="Arial" panose="020B0604020202020204" pitchFamily="34" charset="0"/>
+              <a:buChar char="•"/>
+              <a:defRPr lang="en-US" sz="3200" kern="1200" dirty="0" smtClean="0">
+                <a:solidFill>
+                  <a:schemeClr val="tx1"/>
+                </a:solidFill>
+                <a:latin typeface="Arial" panose="020B0604020202020204" pitchFamily="34" charset="0"/>
+                <a:ea typeface="+mn-ea"/>
+                <a:cs typeface="Arial" panose="020B0604020202020204" pitchFamily="34" charset="0"/>
+              </a:defRPr>
+            </a:lvl2pPr>
+            <a:lvl3pPr marL="857208" indent="-171442" algn="l" defTabSz="914400" rtl="0" eaLnBrk="1" latinLnBrk="0" hangingPunct="1">
+              <a:lnSpc>
+                <a:spcPct val="90000"/>
+              </a:lnSpc>
+              <a:spcBef>
+                <a:spcPts val="500"/>
+              </a:spcBef>
+              <a:buClrTx/>
+              <a:buSzPct val="60000"/>
+              <a:buFont typeface="Courier New" panose="02070309020205020404" pitchFamily="49" charset="0"/>
+              <a:buChar char="o"/>
+              <a:defRPr lang="en-US" sz="3200" kern="1200" dirty="0" smtClean="0">
+                <a:solidFill>
+                  <a:schemeClr val="tx1"/>
+                </a:solidFill>
+                <a:latin typeface="Arial" panose="020B0604020202020204" pitchFamily="34" charset="0"/>
+                <a:ea typeface="+mn-ea"/>
+                <a:cs typeface="Arial" panose="020B0604020202020204" pitchFamily="34" charset="0"/>
+              </a:defRPr>
+            </a:lvl3pPr>
+            <a:lvl4pPr marL="1200091" indent="-171442" algn="l" defTabSz="914400" rtl="0" eaLnBrk="1" latinLnBrk="0" hangingPunct="1">
+              <a:lnSpc>
+                <a:spcPct val="90000"/>
+              </a:lnSpc>
+              <a:spcBef>
+                <a:spcPts val="500"/>
+              </a:spcBef>
+              <a:buClrTx/>
+              <a:buFont typeface="Arial" panose="020B0604020202020204" pitchFamily="34" charset="0"/>
+              <a:buChar char="•"/>
+              <a:defRPr lang="en-US" sz="3200" kern="1200" dirty="0" smtClean="0">
+                <a:solidFill>
+                  <a:schemeClr val="tx1"/>
+                </a:solidFill>
+                <a:latin typeface="Arial" panose="020B0604020202020204" pitchFamily="34" charset="0"/>
+                <a:ea typeface="+mn-ea"/>
+                <a:cs typeface="Arial" panose="020B0604020202020204" pitchFamily="34" charset="0"/>
+              </a:defRPr>
+            </a:lvl4pPr>
+            <a:lvl5pPr marL="1542973" indent="-171442" algn="l" defTabSz="914400" rtl="0" eaLnBrk="1" latinLnBrk="0" hangingPunct="1">
+              <a:lnSpc>
+                <a:spcPct val="90000"/>
+              </a:lnSpc>
+              <a:spcBef>
+                <a:spcPts val="500"/>
+              </a:spcBef>
+              <a:buClrTx/>
+              <a:buSzPct val="35000"/>
+              <a:buFont typeface="Courier New" panose="02070309020205020404" pitchFamily="49" charset="0"/>
+              <a:buChar char="o"/>
+              <a:defRPr lang="en-US" sz="3200" kern="1200" dirty="0">
+                <a:solidFill>
+                  <a:schemeClr val="tx1"/>
+                </a:solidFill>
+                <a:latin typeface="Arial" panose="020B0604020202020204" pitchFamily="34" charset="0"/>
+                <a:ea typeface="+mn-ea"/>
+                <a:cs typeface="Arial" panose="020B0604020202020204" pitchFamily="34" charset="0"/>
+              </a:defRPr>
+            </a:lvl5pPr>
+            <a:lvl6pPr marL="2514600" indent="-228600" algn="l" defTabSz="914400" rtl="0" eaLnBrk="1" latinLnBrk="0" hangingPunct="1">
+              <a:lnSpc>
+                <a:spcPct val="90000"/>
+              </a:lnSpc>
+              <a:spcBef>
+                <a:spcPts val="500"/>
+              </a:spcBef>
+              <a:buFont typeface="Arial" panose="020B0604020202020204" pitchFamily="34" charset="0"/>
+              <a:buChar char="•"/>
+              <a:defRPr sz="1800" kern="1200">
+                <a:solidFill>
+                  <a:schemeClr val="tx1"/>
+                </a:solidFill>
+                <a:latin typeface="+mn-lt"/>
+                <a:ea typeface="+mn-ea"/>
+                <a:cs typeface="+mn-cs"/>
+              </a:defRPr>
+            </a:lvl6pPr>
+            <a:lvl7pPr marL="2971800" indent="-228600" algn="l" defTabSz="914400" rtl="0" eaLnBrk="1" latinLnBrk="0" hangingPunct="1">
+              <a:lnSpc>
+                <a:spcPct val="90000"/>
+              </a:lnSpc>
+              <a:spcBef>
+                <a:spcPts val="500"/>
+              </a:spcBef>
+              <a:buFont typeface="Arial" panose="020B0604020202020204" pitchFamily="34" charset="0"/>
+              <a:buChar char="•"/>
+              <a:defRPr sz="1800" kern="1200">
+                <a:solidFill>
+                  <a:schemeClr val="tx1"/>
+                </a:solidFill>
+                <a:latin typeface="+mn-lt"/>
+                <a:ea typeface="+mn-ea"/>
+                <a:cs typeface="+mn-cs"/>
+              </a:defRPr>
+            </a:lvl7pPr>
+            <a:lvl8pPr marL="3429000" indent="-228600" algn="l" defTabSz="914400" rtl="0" eaLnBrk="1" latinLnBrk="0" hangingPunct="1">
+              <a:lnSpc>
+                <a:spcPct val="90000"/>
+              </a:lnSpc>
+              <a:spcBef>
+                <a:spcPts val="500"/>
+              </a:spcBef>
+              <a:buFont typeface="Arial" panose="020B0604020202020204" pitchFamily="34" charset="0"/>
+              <a:buChar char="•"/>
+              <a:defRPr sz="1800" kern="1200">
+                <a:solidFill>
+                  <a:schemeClr val="tx1"/>
+                </a:solidFill>
+                <a:latin typeface="+mn-lt"/>
+                <a:ea typeface="+mn-ea"/>
+                <a:cs typeface="+mn-cs"/>
+              </a:defRPr>
+            </a:lvl8pPr>
+            <a:lvl9pPr marL="3886200" indent="-228600" algn="l" defTabSz="914400" rtl="0" eaLnBrk="1" latinLnBrk="0" hangingPunct="1">
+              <a:lnSpc>
+                <a:spcPct val="90000"/>
+              </a:lnSpc>
+              <a:spcBef>
+                <a:spcPts val="500"/>
+              </a:spcBef>
+              <a:buFont typeface="Arial" panose="020B0604020202020204" pitchFamily="34" charset="0"/>
+              <a:buChar char="•"/>
+              <a:defRPr sz="1800" kern="1200">
+                <a:solidFill>
+                  <a:schemeClr val="tx1"/>
+                </a:solidFill>
+                <a:latin typeface="+mn-lt"/>
+                <a:ea typeface="+mn-ea"/>
+                <a:cs typeface="+mn-cs"/>
+              </a:defRPr>
+            </a:lvl9pPr>
+          </a:lstStyle>
+          <a:p>
+            <a:endParaRPr lang="en-US" sz="2800" dirty="0"/>
+          </a:p>
+        </p:txBody>
+      </p:sp>
+      <p:sp>
+        <p:nvSpPr>
+          <p:cNvPr id="7" name="Content Placeholder 5"/>
+          <p:cNvSpPr txBox="1">
+            <a:spLocks/>
+          </p:cNvSpPr>
+          <p:nvPr/>
+        </p:nvSpPr>
+        <p:spPr>
+          <a:xfrm>
+            <a:off x="6616910" y="1979111"/>
+            <a:ext cx="4806827" cy="3778657"/>
+          </a:xfrm>
+          <a:prstGeom prst="rect">
+            <a:avLst/>
+          </a:prstGeom>
+        </p:spPr>
+        <p:txBody>
+          <a:bodyPr>
+            <a:noAutofit/>
+          </a:bodyPr>
+          <a:lstStyle>
+            <a:lvl1pPr marL="257162" indent="-257162" algn="l" defTabSz="914400" rtl="0" eaLnBrk="1" latinLnBrk="0" hangingPunct="1">
+              <a:lnSpc>
+                <a:spcPct val="90000"/>
+              </a:lnSpc>
+              <a:spcBef>
+                <a:spcPts val="1000"/>
+              </a:spcBef>
+              <a:buClr>
+                <a:srgbClr val="8E1731"/>
+              </a:buClr>
+              <a:buFont typeface="Wingdings" panose="05000000000000000000" pitchFamily="2" charset="2"/>
+              <a:buChar char="§"/>
+              <a:defRPr lang="en-US" sz="3200" kern="1200" dirty="0" smtClean="0">
+                <a:solidFill>
+                  <a:schemeClr val="tx1"/>
+                </a:solidFill>
+                <a:latin typeface="Arial" panose="020B0604020202020204" pitchFamily="34" charset="0"/>
+                <a:ea typeface="+mn-ea"/>
+                <a:cs typeface="Arial" panose="020B0604020202020204" pitchFamily="34" charset="0"/>
+              </a:defRPr>
+            </a:lvl1pPr>
+            <a:lvl2pPr marL="557185" indent="-214303" algn="l" defTabSz="914400" rtl="0" eaLnBrk="1" latinLnBrk="0" hangingPunct="1">
+              <a:lnSpc>
+                <a:spcPct val="90000"/>
+              </a:lnSpc>
+              <a:spcBef>
+                <a:spcPts val="500"/>
+              </a:spcBef>
+              <a:buClrTx/>
+              <a:buFont typeface="Arial" panose="020B0604020202020204" pitchFamily="34" charset="0"/>
+              <a:buChar char="•"/>
+              <a:defRPr lang="en-US" sz="3200" kern="1200" dirty="0" smtClean="0">
+                <a:solidFill>
+                  <a:schemeClr val="tx1"/>
+                </a:solidFill>
+                <a:latin typeface="Arial" panose="020B0604020202020204" pitchFamily="34" charset="0"/>
+                <a:ea typeface="+mn-ea"/>
+                <a:cs typeface="Arial" panose="020B0604020202020204" pitchFamily="34" charset="0"/>
+              </a:defRPr>
+            </a:lvl2pPr>
+            <a:lvl3pPr marL="857208" indent="-171442" algn="l" defTabSz="914400" rtl="0" eaLnBrk="1" latinLnBrk="0" hangingPunct="1">
+              <a:lnSpc>
+                <a:spcPct val="90000"/>
+              </a:lnSpc>
+              <a:spcBef>
+                <a:spcPts val="500"/>
+              </a:spcBef>
+              <a:buClrTx/>
+              <a:buSzPct val="60000"/>
+              <a:buFont typeface="Courier New" panose="02070309020205020404" pitchFamily="49" charset="0"/>
+              <a:buChar char="o"/>
+              <a:defRPr lang="en-US" sz="3200" kern="1200" dirty="0" smtClean="0">
+                <a:solidFill>
+                  <a:schemeClr val="tx1"/>
+                </a:solidFill>
+                <a:latin typeface="Arial" panose="020B0604020202020204" pitchFamily="34" charset="0"/>
+                <a:ea typeface="+mn-ea"/>
+                <a:cs typeface="Arial" panose="020B0604020202020204" pitchFamily="34" charset="0"/>
+              </a:defRPr>
+            </a:lvl3pPr>
+            <a:lvl4pPr marL="1200091" indent="-171442" algn="l" defTabSz="914400" rtl="0" eaLnBrk="1" latinLnBrk="0" hangingPunct="1">
+              <a:lnSpc>
+                <a:spcPct val="90000"/>
+              </a:lnSpc>
+              <a:spcBef>
+                <a:spcPts val="500"/>
+              </a:spcBef>
+              <a:buClrTx/>
+              <a:buFont typeface="Arial" panose="020B0604020202020204" pitchFamily="34" charset="0"/>
+              <a:buChar char="•"/>
+              <a:defRPr lang="en-US" sz="3200" kern="1200" dirty="0" smtClean="0">
+                <a:solidFill>
+                  <a:schemeClr val="tx1"/>
+                </a:solidFill>
+                <a:latin typeface="Arial" panose="020B0604020202020204" pitchFamily="34" charset="0"/>
+                <a:ea typeface="+mn-ea"/>
+                <a:cs typeface="Arial" panose="020B0604020202020204" pitchFamily="34" charset="0"/>
+              </a:defRPr>
+            </a:lvl4pPr>
+            <a:lvl5pPr marL="1542973" indent="-171442" algn="l" defTabSz="914400" rtl="0" eaLnBrk="1" latinLnBrk="0" hangingPunct="1">
+              <a:lnSpc>
+                <a:spcPct val="90000"/>
+              </a:lnSpc>
+              <a:spcBef>
+                <a:spcPts val="500"/>
+              </a:spcBef>
+              <a:buClrTx/>
+              <a:buSzPct val="35000"/>
+              <a:buFont typeface="Courier New" panose="02070309020205020404" pitchFamily="49" charset="0"/>
+              <a:buChar char="o"/>
+              <a:defRPr lang="en-US" sz="3200" kern="1200" dirty="0">
+                <a:solidFill>
+                  <a:schemeClr val="tx1"/>
+                </a:solidFill>
+                <a:latin typeface="Arial" panose="020B0604020202020204" pitchFamily="34" charset="0"/>
+                <a:ea typeface="+mn-ea"/>
+                <a:cs typeface="Arial" panose="020B0604020202020204" pitchFamily="34" charset="0"/>
+              </a:defRPr>
+            </a:lvl5pPr>
+            <a:lvl6pPr marL="2514600" indent="-228600" algn="l" defTabSz="914400" rtl="0" eaLnBrk="1" latinLnBrk="0" hangingPunct="1">
+              <a:lnSpc>
+                <a:spcPct val="90000"/>
+              </a:lnSpc>
+              <a:spcBef>
+                <a:spcPts val="500"/>
+              </a:spcBef>
+              <a:buFont typeface="Arial" panose="020B0604020202020204" pitchFamily="34" charset="0"/>
+              <a:buChar char="•"/>
+              <a:defRPr sz="1800" kern="1200">
+                <a:solidFill>
+                  <a:schemeClr val="tx1"/>
+                </a:solidFill>
+                <a:latin typeface="+mn-lt"/>
+                <a:ea typeface="+mn-ea"/>
+                <a:cs typeface="+mn-cs"/>
+              </a:defRPr>
+            </a:lvl6pPr>
+            <a:lvl7pPr marL="2971800" indent="-228600" algn="l" defTabSz="914400" rtl="0" eaLnBrk="1" latinLnBrk="0" hangingPunct="1">
+              <a:lnSpc>
+                <a:spcPct val="90000"/>
+              </a:lnSpc>
+              <a:spcBef>
+                <a:spcPts val="500"/>
+              </a:spcBef>
+              <a:buFont typeface="Arial" panose="020B0604020202020204" pitchFamily="34" charset="0"/>
+              <a:buChar char="•"/>
+              <a:defRPr sz="1800" kern="1200">
+                <a:solidFill>
+                  <a:schemeClr val="tx1"/>
+                </a:solidFill>
+                <a:latin typeface="+mn-lt"/>
+                <a:ea typeface="+mn-ea"/>
+                <a:cs typeface="+mn-cs"/>
+              </a:defRPr>
+            </a:lvl7pPr>
+            <a:lvl8pPr marL="3429000" indent="-228600" algn="l" defTabSz="914400" rtl="0" eaLnBrk="1" latinLnBrk="0" hangingPunct="1">
+              <a:lnSpc>
+                <a:spcPct val="90000"/>
+              </a:lnSpc>
+              <a:spcBef>
+                <a:spcPts val="500"/>
+              </a:spcBef>
+              <a:buFont typeface="Arial" panose="020B0604020202020204" pitchFamily="34" charset="0"/>
+              <a:buChar char="•"/>
+              <a:defRPr sz="1800" kern="1200">
+                <a:solidFill>
+                  <a:schemeClr val="tx1"/>
+                </a:solidFill>
+                <a:latin typeface="+mn-lt"/>
+                <a:ea typeface="+mn-ea"/>
+                <a:cs typeface="+mn-cs"/>
+              </a:defRPr>
+            </a:lvl8pPr>
+            <a:lvl9pPr marL="3886200" indent="-228600" algn="l" defTabSz="914400" rtl="0" eaLnBrk="1" latinLnBrk="0" hangingPunct="1">
+              <a:lnSpc>
+                <a:spcPct val="90000"/>
+              </a:lnSpc>
+              <a:spcBef>
+                <a:spcPts val="500"/>
+              </a:spcBef>
+              <a:buFont typeface="Arial" panose="020B0604020202020204" pitchFamily="34" charset="0"/>
+              <a:buChar char="•"/>
+              <a:defRPr sz="1800" kern="1200">
+                <a:solidFill>
+                  <a:schemeClr val="tx1"/>
+                </a:solidFill>
+                <a:latin typeface="+mn-lt"/>
+                <a:ea typeface="+mn-ea"/>
+                <a:cs typeface="+mn-cs"/>
+              </a:defRPr>
+            </a:lvl9pPr>
+          </a:lstStyle>
+          <a:p>
+            <a:endParaRPr lang="en-US" sz="2800" dirty="0"/>
+          </a:p>
+        </p:txBody>
+      </p:sp>
+    </p:spTree>
+    <p:extLst>
+      <p:ext uri="{BB962C8B-B14F-4D97-AF65-F5344CB8AC3E}">
+        <p14:creationId xmlns:p14="http://schemas.microsoft.com/office/powerpoint/2010/main" val="1761210051"/>
+      </p:ext>
+    </p:extLst>
+  </p:cSld>
+  <p:clrMapOvr>
+    <a:masterClrMapping/>
+  </p:clrMapOvr>
+</p:sld>
+</file>
+
+<file path=ppt/slides/slide62.xml><?xml version="1.0" encoding="utf-8"?>
+<p:sld xmlns:a="http://schemas.openxmlformats.org/drawingml/2006/main" xmlns:r="http://schemas.openxmlformats.org/officeDocument/2006/relationships" xmlns:p="http://schemas.openxmlformats.org/presentationml/2006/main">
+  <p:cSld>
+    <p:spTree>
+      <p:nvGrpSpPr>
+        <p:cNvPr id="1" name=""/>
+        <p:cNvGrpSpPr/>
+        <p:nvPr/>
+      </p:nvGrpSpPr>
+      <p:grpSpPr>
+        <a:xfrm>
+          <a:off x="0" y="0"/>
+          <a:ext cx="0" cy="0"/>
+          <a:chOff x="0" y="0"/>
+          <a:chExt cx="0" cy="0"/>
+        </a:xfrm>
+      </p:grpSpPr>
+      <p:sp>
+        <p:nvSpPr>
+          <p:cNvPr id="2" name="Content Placeholder 1"/>
+          <p:cNvSpPr>
+            <a:spLocks noGrp="1"/>
+          </p:cNvSpPr>
+          <p:nvPr>
+            <p:ph idx="1"/>
+          </p:nvPr>
+        </p:nvSpPr>
+        <p:spPr/>
+        <p:txBody>
+          <a:bodyPr/>
+          <a:lstStyle/>
+          <a:p>
+            <a:r>
+              <a:rPr lang="en-US" dirty="0" smtClean="0"/>
+              <a:t>Survey link: </a:t>
+            </a:r>
+            <a:r>
+              <a:rPr lang="en-US" dirty="0">
+                <a:solidFill>
+                  <a:schemeClr val="accent5">
+                    <a:lumMod val="50000"/>
+                  </a:schemeClr>
+                </a:solidFill>
+              </a:rPr>
+              <a:t>http://</a:t>
+            </a:r>
+            <a:r>
+              <a:rPr lang="en-US" dirty="0" smtClean="0">
+                <a:solidFill>
+                  <a:schemeClr val="accent5">
+                    <a:lumMod val="50000"/>
+                  </a:schemeClr>
+                </a:solidFill>
+              </a:rPr>
+              <a:t>bit.ly/oulib_davis_workshop</a:t>
+            </a:r>
+            <a:r>
+              <a:rPr lang="en-US" dirty="0" smtClean="0"/>
+              <a:t> </a:t>
+            </a:r>
+          </a:p>
+          <a:p>
+            <a:r>
+              <a:rPr lang="en-US" dirty="0" smtClean="0"/>
+              <a:t>Workshop topic: Data-driven visualizations</a:t>
+            </a:r>
+          </a:p>
+          <a:p>
+            <a:r>
+              <a:rPr lang="en-US" dirty="0" smtClean="0"/>
+              <a:t>Workshop date: </a:t>
+            </a:r>
+            <a:fld id="{DC282969-C8BF-4EBF-812F-FF7661414B35}" type="datetime4">
+              <a:rPr lang="en-US" smtClean="0"/>
+              <a:t>April 4, 2019</a:t>
+            </a:fld>
+            <a:endParaRPr lang="en-US" dirty="0" smtClean="0"/>
+          </a:p>
+        </p:txBody>
+      </p:sp>
+      <p:sp>
+        <p:nvSpPr>
+          <p:cNvPr id="4" name="Title 3">
+            <a:extLst>
+              <a:ext uri="{FF2B5EF4-FFF2-40B4-BE49-F238E27FC236}">
+                <a16:creationId xmlns:a16="http://schemas.microsoft.com/office/drawing/2014/main" id="{EE4C4D20-498A-0B4C-B3DF-B1E363085ADC}"/>
+              </a:ext>
+            </a:extLst>
+          </p:cNvPr>
+          <p:cNvSpPr>
+            <a:spLocks noGrp="1"/>
+          </p:cNvSpPr>
+          <p:nvPr>
+            <p:ph type="title"/>
+          </p:nvPr>
+        </p:nvSpPr>
+        <p:spPr>
+          <a:xfrm>
+            <a:off x="1168708" y="675829"/>
+            <a:ext cx="10042087" cy="500289"/>
+          </a:xfrm>
+          <a:prstGeom prst="rect">
+            <a:avLst/>
+          </a:prstGeom>
+        </p:spPr>
+        <p:txBody>
+          <a:bodyPr/>
+          <a:lstStyle/>
+          <a:p>
+            <a:r>
+              <a:rPr lang="en-US" b="1" dirty="0" smtClean="0">
+                <a:solidFill>
+                  <a:srgbClr val="8E1731"/>
+                </a:solidFill>
+              </a:rPr>
+              <a:t>Please take 3 min to help us improve</a:t>
+            </a:r>
+            <a:endParaRPr lang="en-US" b="1" dirty="0">
+              <a:solidFill>
+                <a:srgbClr val="8E1731"/>
+              </a:solidFill>
+            </a:endParaRPr>
+          </a:p>
+        </p:txBody>
+      </p:sp>
+    </p:spTree>
+    <p:extLst>
+      <p:ext uri="{BB962C8B-B14F-4D97-AF65-F5344CB8AC3E}">
+        <p14:creationId xmlns:p14="http://schemas.microsoft.com/office/powerpoint/2010/main" val="1017636609"/>
       </p:ext>
     </p:extLst>
   </p:cSld>

</xml_diff>